<commit_message>
Added amenities slides to ppt
</commit_message>
<xml_diff>
--- a/Project1_Presentation.pptx
+++ b/Project1_Presentation.pptx
@@ -6,20 +6,25 @@
   </p:sldMasterIdLst>
   <p:sldIdLst>
     <p:sldId id="256" r:id="rId2"/>
-    <p:sldId id="257" r:id="rId3"/>
-    <p:sldId id="259" r:id="rId4"/>
-    <p:sldId id="260" r:id="rId5"/>
-    <p:sldId id="267" r:id="rId6"/>
-    <p:sldId id="268" r:id="rId7"/>
-    <p:sldId id="258" r:id="rId8"/>
-    <p:sldId id="262" r:id="rId9"/>
-    <p:sldId id="270" r:id="rId10"/>
-    <p:sldId id="271" r:id="rId11"/>
-    <p:sldId id="266" r:id="rId12"/>
-    <p:sldId id="272" r:id="rId13"/>
-    <p:sldId id="265" r:id="rId14"/>
-    <p:sldId id="263" r:id="rId15"/>
-    <p:sldId id="264" r:id="rId16"/>
+    <p:sldId id="273" r:id="rId3"/>
+    <p:sldId id="257" r:id="rId4"/>
+    <p:sldId id="259" r:id="rId5"/>
+    <p:sldId id="260" r:id="rId6"/>
+    <p:sldId id="267" r:id="rId7"/>
+    <p:sldId id="268" r:id="rId8"/>
+    <p:sldId id="258" r:id="rId9"/>
+    <p:sldId id="262" r:id="rId10"/>
+    <p:sldId id="270" r:id="rId11"/>
+    <p:sldId id="271" r:id="rId12"/>
+    <p:sldId id="266" r:id="rId13"/>
+    <p:sldId id="272" r:id="rId14"/>
+    <p:sldId id="265" r:id="rId15"/>
+    <p:sldId id="263" r:id="rId16"/>
+    <p:sldId id="264" r:id="rId17"/>
+    <p:sldId id="274" r:id="rId18"/>
+    <p:sldId id="275" r:id="rId19"/>
+    <p:sldId id="261" r:id="rId20"/>
+    <p:sldId id="277" r:id="rId21"/>
   </p:sldIdLst>
   <p:sldSz cx="12192000" cy="6858000"/>
   <p:notesSz cx="6858000" cy="9144000"/>
@@ -352,7 +357,7 @@
           <a:p>
             <a:fld id="{F70A646C-22A8-4D69-ACFD-CD88A31D50DB}" type="datetimeFigureOut">
               <a:rPr lang="en-US" smtClean="0"/>
-              <a:t>4/3/2018</a:t>
+              <a:t>4/3/18</a:t>
             </a:fld>
             <a:endParaRPr lang="en-US"/>
           </a:p>
@@ -560,7 +565,7 @@
           <a:p>
             <a:fld id="{F70A646C-22A8-4D69-ACFD-CD88A31D50DB}" type="datetimeFigureOut">
               <a:rPr lang="en-US" smtClean="0"/>
-              <a:t>4/3/2018</a:t>
+              <a:t>4/3/18</a:t>
             </a:fld>
             <a:endParaRPr lang="en-US"/>
           </a:p>
@@ -816,7 +821,7 @@
           <a:p>
             <a:fld id="{F70A646C-22A8-4D69-ACFD-CD88A31D50DB}" type="datetimeFigureOut">
               <a:rPr lang="en-US" smtClean="0"/>
-              <a:t>4/3/2018</a:t>
+              <a:t>4/3/18</a:t>
             </a:fld>
             <a:endParaRPr lang="en-US"/>
           </a:p>
@@ -990,7 +995,7 @@
           <a:p>
             <a:fld id="{F70A646C-22A8-4D69-ACFD-CD88A31D50DB}" type="datetimeFigureOut">
               <a:rPr lang="en-US" smtClean="0"/>
-              <a:t>4/3/2018</a:t>
+              <a:t>4/3/18</a:t>
             </a:fld>
             <a:endParaRPr lang="en-US"/>
           </a:p>
@@ -1333,7 +1338,7 @@
           <a:p>
             <a:fld id="{F70A646C-22A8-4D69-ACFD-CD88A31D50DB}" type="datetimeFigureOut">
               <a:rPr lang="en-US" smtClean="0"/>
-              <a:t>4/3/2018</a:t>
+              <a:t>4/3/18</a:t>
             </a:fld>
             <a:endParaRPr lang="en-US"/>
           </a:p>
@@ -1608,7 +1613,7 @@
           <a:p>
             <a:fld id="{F70A646C-22A8-4D69-ACFD-CD88A31D50DB}" type="datetimeFigureOut">
               <a:rPr lang="en-US" smtClean="0"/>
-              <a:t>4/3/2018</a:t>
+              <a:t>4/3/18</a:t>
             </a:fld>
             <a:endParaRPr lang="en-US"/>
           </a:p>
@@ -1987,7 +1992,7 @@
           <a:p>
             <a:fld id="{F70A646C-22A8-4D69-ACFD-CD88A31D50DB}" type="datetimeFigureOut">
               <a:rPr lang="en-US" smtClean="0"/>
-              <a:t>4/3/2018</a:t>
+              <a:t>4/3/18</a:t>
             </a:fld>
             <a:endParaRPr lang="en-US"/>
           </a:p>
@@ -2105,7 +2110,7 @@
           <a:p>
             <a:fld id="{F70A646C-22A8-4D69-ACFD-CD88A31D50DB}" type="datetimeFigureOut">
               <a:rPr lang="en-US" smtClean="0"/>
-              <a:t>4/3/2018</a:t>
+              <a:t>4/3/18</a:t>
             </a:fld>
             <a:endParaRPr lang="en-US"/>
           </a:p>
@@ -2276,7 +2281,7 @@
           <a:p>
             <a:fld id="{F70A646C-22A8-4D69-ACFD-CD88A31D50DB}" type="datetimeFigureOut">
               <a:rPr lang="en-US" smtClean="0"/>
-              <a:t>4/3/2018</a:t>
+              <a:t>4/3/18</a:t>
             </a:fld>
             <a:endParaRPr lang="en-US"/>
           </a:p>
@@ -2630,7 +2635,7 @@
           <a:p>
             <a:fld id="{F70A646C-22A8-4D69-ACFD-CD88A31D50DB}" type="datetimeFigureOut">
               <a:rPr lang="en-US" smtClean="0"/>
-              <a:t>4/3/2018</a:t>
+              <a:t>4/3/18</a:t>
             </a:fld>
             <a:endParaRPr lang="en-US"/>
           </a:p>
@@ -3012,7 +3017,7 @@
           <a:p>
             <a:fld id="{F70A646C-22A8-4D69-ACFD-CD88A31D50DB}" type="datetimeFigureOut">
               <a:rPr lang="en-US" smtClean="0"/>
-              <a:t>4/3/2018</a:t>
+              <a:t>4/3/18</a:t>
             </a:fld>
             <a:endParaRPr lang="en-US"/>
           </a:p>
@@ -3299,7 +3304,7 @@
           <a:p>
             <a:fld id="{F70A646C-22A8-4D69-ACFD-CD88A31D50DB}" type="datetimeFigureOut">
               <a:rPr lang="en-US" smtClean="0"/>
-              <a:t>4/3/2018</a:t>
+              <a:t>4/3/18</a:t>
             </a:fld>
             <a:endParaRPr lang="en-US"/>
           </a:p>
@@ -3989,6 +3994,146 @@
           <a:p>
             <a:r>
               <a:rPr lang="en-US" dirty="0"/>
+              <a:t>Talent Pool - Education</a:t>
+            </a:r>
+          </a:p>
+        </p:txBody>
+      </p:sp>
+      <p:pic>
+        <p:nvPicPr>
+          <p:cNvPr id="9" name="Picture 8">
+            <a:extLst>
+              <a:ext uri="{FF2B5EF4-FFF2-40B4-BE49-F238E27FC236}">
+                <a16:creationId xmlns:a16="http://schemas.microsoft.com/office/drawing/2014/main" id="{207048A4-7E15-4A7A-83D4-7F393FDAE879}"/>
+              </a:ext>
+            </a:extLst>
+          </p:cNvPr>
+          <p:cNvPicPr>
+            <a:picLocks noChangeAspect="1"/>
+          </p:cNvPicPr>
+          <p:nvPr/>
+        </p:nvPicPr>
+        <p:blipFill>
+          <a:blip r:embed="rId2">
+            <a:extLst>
+              <a:ext uri="{28A0092B-C50C-407E-A947-70E740481C1C}">
+                <a14:useLocalDpi xmlns:a14="http://schemas.microsoft.com/office/drawing/2010/main" val="0"/>
+              </a:ext>
+            </a:extLst>
+          </a:blip>
+          <a:stretch>
+            <a:fillRect/>
+          </a:stretch>
+        </p:blipFill>
+        <p:spPr>
+          <a:xfrm>
+            <a:off x="766118" y="1161535"/>
+            <a:ext cx="10730874" cy="4993085"/>
+          </a:xfrm>
+          <a:prstGeom prst="rect">
+            <a:avLst/>
+          </a:prstGeom>
+        </p:spPr>
+      </p:pic>
+      <p:cxnSp>
+        <p:nvCxnSpPr>
+          <p:cNvPr id="8" name="Straight Connector 7">
+            <a:extLst>
+              <a:ext uri="{FF2B5EF4-FFF2-40B4-BE49-F238E27FC236}">
+                <a16:creationId xmlns:a16="http://schemas.microsoft.com/office/drawing/2014/main" id="{D5D2E2BC-8AFC-496A-8DAF-5CC075C390DF}"/>
+              </a:ext>
+            </a:extLst>
+          </p:cNvPr>
+          <p:cNvCxnSpPr/>
+          <p:nvPr/>
+        </p:nvCxnSpPr>
+        <p:spPr>
+          <a:xfrm>
+            <a:off x="1186248" y="963827"/>
+            <a:ext cx="9069860" cy="0"/>
+          </a:xfrm>
+          <a:prstGeom prst="line">
+            <a:avLst/>
+          </a:prstGeom>
+          <a:ln>
+            <a:solidFill>
+              <a:srgbClr val="7030A0"/>
+            </a:solidFill>
+          </a:ln>
+        </p:spPr>
+        <p:style>
+          <a:lnRef idx="1">
+            <a:schemeClr val="accent1"/>
+          </a:lnRef>
+          <a:fillRef idx="0">
+            <a:schemeClr val="accent1"/>
+          </a:fillRef>
+          <a:effectRef idx="0">
+            <a:schemeClr val="accent1"/>
+          </a:effectRef>
+          <a:fontRef idx="minor">
+            <a:schemeClr val="tx1"/>
+          </a:fontRef>
+        </p:style>
+      </p:cxnSp>
+    </p:spTree>
+    <p:extLst>
+      <p:ext uri="{BB962C8B-B14F-4D97-AF65-F5344CB8AC3E}">
+        <p14:creationId xmlns:p14="http://schemas.microsoft.com/office/powerpoint/2010/main" val="732841463"/>
+      </p:ext>
+    </p:extLst>
+  </p:cSld>
+  <p:clrMapOvr>
+    <a:masterClrMapping/>
+  </p:clrMapOvr>
+</p:sld>
+</file>
+
+<file path=ppt/slides/slide11.xml><?xml version="1.0" encoding="utf-8"?>
+<p:sld xmlns:a="http://schemas.openxmlformats.org/drawingml/2006/main" xmlns:r="http://schemas.openxmlformats.org/officeDocument/2006/relationships" xmlns:p="http://schemas.openxmlformats.org/presentationml/2006/main">
+  <p:cSld>
+    <p:spTree>
+      <p:nvGrpSpPr>
+        <p:cNvPr id="1" name=""/>
+        <p:cNvGrpSpPr/>
+        <p:nvPr/>
+      </p:nvGrpSpPr>
+      <p:grpSpPr>
+        <a:xfrm>
+          <a:off x="0" y="0"/>
+          <a:ext cx="0" cy="0"/>
+          <a:chOff x="0" y="0"/>
+          <a:chExt cx="0" cy="0"/>
+        </a:xfrm>
+      </p:grpSpPr>
+      <p:sp>
+        <p:nvSpPr>
+          <p:cNvPr id="2" name="Title 1">
+            <a:extLst>
+              <a:ext uri="{FF2B5EF4-FFF2-40B4-BE49-F238E27FC236}">
+                <a16:creationId xmlns:a16="http://schemas.microsoft.com/office/drawing/2014/main" id="{390EB264-3883-41F9-BACB-285D2229980C}"/>
+              </a:ext>
+            </a:extLst>
+          </p:cNvPr>
+          <p:cNvSpPr>
+            <a:spLocks noGrp="1"/>
+          </p:cNvSpPr>
+          <p:nvPr>
+            <p:ph type="title"/>
+          </p:nvPr>
+        </p:nvSpPr>
+        <p:spPr>
+          <a:xfrm>
+            <a:off x="1066799" y="-376048"/>
+            <a:ext cx="10058400" cy="1450757"/>
+          </a:xfrm>
+        </p:spPr>
+        <p:txBody>
+          <a:bodyPr/>
+          <a:lstStyle/>
+          <a:p>
+            <a:r>
+              <a:rPr lang="en-US" dirty="0"/>
               <a:t>Talent Pool - Labor Force </a:t>
             </a:r>
           </a:p>
@@ -4084,7 +4229,7 @@
 </p:sld>
 </file>
 
-<file path=ppt/slides/slide11.xml><?xml version="1.0" encoding="utf-8"?>
+<file path=ppt/slides/slide12.xml><?xml version="1.0" encoding="utf-8"?>
 <p:sld xmlns:a="http://schemas.openxmlformats.org/drawingml/2006/main" xmlns:r="http://schemas.openxmlformats.org/officeDocument/2006/relationships" xmlns:p="http://schemas.openxmlformats.org/presentationml/2006/main">
   <p:cSld>
     <p:spTree>
@@ -4261,7 +4406,7 @@
 </p:sld>
 </file>
 
-<file path=ppt/slides/slide12.xml><?xml version="1.0" encoding="utf-8"?>
+<file path=ppt/slides/slide13.xml><?xml version="1.0" encoding="utf-8"?>
 <p:sld xmlns:a="http://schemas.openxmlformats.org/drawingml/2006/main" xmlns:r="http://schemas.openxmlformats.org/officeDocument/2006/relationships" xmlns:p="http://schemas.openxmlformats.org/presentationml/2006/main">
   <p:cSld>
     <p:spTree>
@@ -4402,7 +4547,7 @@
 </p:sld>
 </file>
 
-<file path=ppt/slides/slide13.xml><?xml version="1.0" encoding="utf-8"?>
+<file path=ppt/slides/slide14.xml><?xml version="1.0" encoding="utf-8"?>
 <p:sld xmlns:a="http://schemas.openxmlformats.org/drawingml/2006/main" xmlns:r="http://schemas.openxmlformats.org/officeDocument/2006/relationships" xmlns:p="http://schemas.openxmlformats.org/presentationml/2006/main">
   <p:cSld>
     <p:spTree>
@@ -4543,93 +4688,6 @@
 </p:sld>
 </file>
 
-<file path=ppt/slides/slide14.xml><?xml version="1.0" encoding="utf-8"?>
-<p:sld xmlns:a="http://schemas.openxmlformats.org/drawingml/2006/main" xmlns:r="http://schemas.openxmlformats.org/officeDocument/2006/relationships" xmlns:p="http://schemas.openxmlformats.org/presentationml/2006/main">
-  <p:cSld>
-    <p:spTree>
-      <p:nvGrpSpPr>
-        <p:cNvPr id="1" name=""/>
-        <p:cNvGrpSpPr/>
-        <p:nvPr/>
-      </p:nvGrpSpPr>
-      <p:grpSpPr>
-        <a:xfrm>
-          <a:off x="0" y="0"/>
-          <a:ext cx="0" cy="0"/>
-          <a:chOff x="0" y="0"/>
-          <a:chExt cx="0" cy="0"/>
-        </a:xfrm>
-      </p:grpSpPr>
-      <p:sp>
-        <p:nvSpPr>
-          <p:cNvPr id="2" name="Title 1">
-            <a:extLst>
-              <a:ext uri="{FF2B5EF4-FFF2-40B4-BE49-F238E27FC236}">
-                <a16:creationId xmlns:a16="http://schemas.microsoft.com/office/drawing/2014/main" id="{390EB264-3883-41F9-BACB-285D2229980C}"/>
-              </a:ext>
-            </a:extLst>
-          </p:cNvPr>
-          <p:cNvSpPr>
-            <a:spLocks noGrp="1"/>
-          </p:cNvSpPr>
-          <p:nvPr>
-            <p:ph type="title"/>
-          </p:nvPr>
-        </p:nvSpPr>
-        <p:spPr/>
-        <p:txBody>
-          <a:bodyPr/>
-          <a:lstStyle/>
-          <a:p>
-            <a:r>
-              <a:rPr lang="en-US" dirty="0"/>
-              <a:t>Findings </a:t>
-            </a:r>
-          </a:p>
-        </p:txBody>
-      </p:sp>
-      <p:sp>
-        <p:nvSpPr>
-          <p:cNvPr id="3" name="Content Placeholder 2">
-            <a:extLst>
-              <a:ext uri="{FF2B5EF4-FFF2-40B4-BE49-F238E27FC236}">
-                <a16:creationId xmlns:a16="http://schemas.microsoft.com/office/drawing/2014/main" id="{BEC8BDDB-FD44-4EB6-BE27-4A708B75BDAB}"/>
-              </a:ext>
-            </a:extLst>
-          </p:cNvPr>
-          <p:cNvSpPr>
-            <a:spLocks noGrp="1"/>
-          </p:cNvSpPr>
-          <p:nvPr>
-            <p:ph idx="1"/>
-          </p:nvPr>
-        </p:nvSpPr>
-        <p:spPr/>
-        <p:txBody>
-          <a:bodyPr/>
-          <a:lstStyle/>
-          <a:p>
-            <a:pPr>
-              <a:buFont typeface="Wingdings" panose="05000000000000000000" pitchFamily="2" charset="2"/>
-              <a:buChar char="§"/>
-            </a:pPr>
-            <a:endParaRPr lang="en-US" dirty="0"/>
-          </a:p>
-        </p:txBody>
-      </p:sp>
-    </p:spTree>
-    <p:extLst>
-      <p:ext uri="{BB962C8B-B14F-4D97-AF65-F5344CB8AC3E}">
-        <p14:creationId xmlns:p14="http://schemas.microsoft.com/office/powerpoint/2010/main" val="1806114423"/>
-      </p:ext>
-    </p:extLst>
-  </p:cSld>
-  <p:clrMapOvr>
-    <a:masterClrMapping/>
-  </p:clrMapOvr>
-</p:sld>
-</file>
-
 <file path=ppt/slides/slide15.xml><?xml version="1.0" encoding="utf-8"?>
 <p:sld xmlns:a="http://schemas.openxmlformats.org/drawingml/2006/main" xmlns:r="http://schemas.openxmlformats.org/officeDocument/2006/relationships" xmlns:p="http://schemas.openxmlformats.org/presentationml/2006/main">
   <p:cSld>
@@ -4670,7 +4728,7 @@
           <a:p>
             <a:r>
               <a:rPr lang="en-US" dirty="0"/>
-              <a:t>Lessons learnt </a:t>
+              <a:t>Findings </a:t>
             </a:r>
           </a:p>
         </p:txBody>
@@ -4696,6 +4754,93 @@
           <a:bodyPr/>
           <a:lstStyle/>
           <a:p>
+            <a:pPr>
+              <a:buFont typeface="Wingdings" panose="05000000000000000000" pitchFamily="2" charset="2"/>
+              <a:buChar char="§"/>
+            </a:pPr>
+            <a:endParaRPr lang="en-US" dirty="0"/>
+          </a:p>
+        </p:txBody>
+      </p:sp>
+    </p:spTree>
+    <p:extLst>
+      <p:ext uri="{BB962C8B-B14F-4D97-AF65-F5344CB8AC3E}">
+        <p14:creationId xmlns:p14="http://schemas.microsoft.com/office/powerpoint/2010/main" val="1806114423"/>
+      </p:ext>
+    </p:extLst>
+  </p:cSld>
+  <p:clrMapOvr>
+    <a:masterClrMapping/>
+  </p:clrMapOvr>
+</p:sld>
+</file>
+
+<file path=ppt/slides/slide16.xml><?xml version="1.0" encoding="utf-8"?>
+<p:sld xmlns:a="http://schemas.openxmlformats.org/drawingml/2006/main" xmlns:r="http://schemas.openxmlformats.org/officeDocument/2006/relationships" xmlns:p="http://schemas.openxmlformats.org/presentationml/2006/main">
+  <p:cSld>
+    <p:spTree>
+      <p:nvGrpSpPr>
+        <p:cNvPr id="1" name=""/>
+        <p:cNvGrpSpPr/>
+        <p:nvPr/>
+      </p:nvGrpSpPr>
+      <p:grpSpPr>
+        <a:xfrm>
+          <a:off x="0" y="0"/>
+          <a:ext cx="0" cy="0"/>
+          <a:chOff x="0" y="0"/>
+          <a:chExt cx="0" cy="0"/>
+        </a:xfrm>
+      </p:grpSpPr>
+      <p:sp>
+        <p:nvSpPr>
+          <p:cNvPr id="2" name="Title 1">
+            <a:extLst>
+              <a:ext uri="{FF2B5EF4-FFF2-40B4-BE49-F238E27FC236}">
+                <a16:creationId xmlns:a16="http://schemas.microsoft.com/office/drawing/2014/main" id="{390EB264-3883-41F9-BACB-285D2229980C}"/>
+              </a:ext>
+            </a:extLst>
+          </p:cNvPr>
+          <p:cNvSpPr>
+            <a:spLocks noGrp="1"/>
+          </p:cNvSpPr>
+          <p:nvPr>
+            <p:ph type="title"/>
+          </p:nvPr>
+        </p:nvSpPr>
+        <p:spPr/>
+        <p:txBody>
+          <a:bodyPr/>
+          <a:lstStyle/>
+          <a:p>
+            <a:r>
+              <a:rPr lang="en-US" dirty="0"/>
+              <a:t>Lessons learnt </a:t>
+            </a:r>
+          </a:p>
+        </p:txBody>
+      </p:sp>
+      <p:sp>
+        <p:nvSpPr>
+          <p:cNvPr id="3" name="Content Placeholder 2">
+            <a:extLst>
+              <a:ext uri="{FF2B5EF4-FFF2-40B4-BE49-F238E27FC236}">
+                <a16:creationId xmlns:a16="http://schemas.microsoft.com/office/drawing/2014/main" id="{BEC8BDDB-FD44-4EB6-BE27-4A708B75BDAB}"/>
+              </a:ext>
+            </a:extLst>
+          </p:cNvPr>
+          <p:cNvSpPr>
+            <a:spLocks noGrp="1"/>
+          </p:cNvSpPr>
+          <p:nvPr>
+            <p:ph idx="1"/>
+          </p:nvPr>
+        </p:nvSpPr>
+        <p:spPr/>
+        <p:txBody>
+          <a:bodyPr/>
+          <a:lstStyle/>
+          <a:p>
             <a:endParaRPr lang="en-US" dirty="0"/>
           </a:p>
         </p:txBody>
@@ -4704,6 +4849,369 @@
     <p:extLst>
       <p:ext uri="{BB962C8B-B14F-4D97-AF65-F5344CB8AC3E}">
         <p14:creationId xmlns:p14="http://schemas.microsoft.com/office/powerpoint/2010/main" val="1639100815"/>
+      </p:ext>
+    </p:extLst>
+  </p:cSld>
+  <p:clrMapOvr>
+    <a:masterClrMapping/>
+  </p:clrMapOvr>
+</p:sld>
+</file>
+
+<file path=ppt/slides/slide17.xml><?xml version="1.0" encoding="utf-8"?>
+<p:sld xmlns:a="http://schemas.openxmlformats.org/drawingml/2006/main" xmlns:r="http://schemas.openxmlformats.org/officeDocument/2006/relationships" xmlns:p="http://schemas.openxmlformats.org/presentationml/2006/main">
+  <p:cSld>
+    <p:spTree>
+      <p:nvGrpSpPr>
+        <p:cNvPr id="1" name=""/>
+        <p:cNvGrpSpPr/>
+        <p:nvPr/>
+      </p:nvGrpSpPr>
+      <p:grpSpPr>
+        <a:xfrm>
+          <a:off x="0" y="0"/>
+          <a:ext cx="0" cy="0"/>
+          <a:chOff x="0" y="0"/>
+          <a:chExt cx="0" cy="0"/>
+        </a:xfrm>
+      </p:grpSpPr>
+      <p:sp>
+        <p:nvSpPr>
+          <p:cNvPr id="2" name="Title 1">
+            <a:extLst>
+              <a:ext uri="{FF2B5EF4-FFF2-40B4-BE49-F238E27FC236}">
+                <a16:creationId xmlns:a16="http://schemas.microsoft.com/office/drawing/2014/main" id="{62B031C5-C960-5B4D-8E2C-2D0F0A1B9FA1}"/>
+              </a:ext>
+            </a:extLst>
+          </p:cNvPr>
+          <p:cNvSpPr>
+            <a:spLocks noGrp="1"/>
+          </p:cNvSpPr>
+          <p:nvPr>
+            <p:ph type="title"/>
+          </p:nvPr>
+        </p:nvSpPr>
+        <p:spPr/>
+        <p:txBody>
+          <a:bodyPr/>
+          <a:lstStyle/>
+          <a:p>
+            <a:endParaRPr lang="en-US"/>
+          </a:p>
+        </p:txBody>
+      </p:sp>
+      <p:sp>
+        <p:nvSpPr>
+          <p:cNvPr id="3" name="Content Placeholder 2">
+            <a:extLst>
+              <a:ext uri="{FF2B5EF4-FFF2-40B4-BE49-F238E27FC236}">
+                <a16:creationId xmlns:a16="http://schemas.microsoft.com/office/drawing/2014/main" id="{DBD9B124-9DE5-7043-8650-84022D10B125}"/>
+              </a:ext>
+            </a:extLst>
+          </p:cNvPr>
+          <p:cNvSpPr>
+            <a:spLocks noGrp="1"/>
+          </p:cNvSpPr>
+          <p:nvPr>
+            <p:ph idx="1"/>
+          </p:nvPr>
+        </p:nvSpPr>
+        <p:spPr/>
+        <p:txBody>
+          <a:bodyPr/>
+          <a:lstStyle/>
+          <a:p>
+            <a:endParaRPr lang="en-US"/>
+          </a:p>
+        </p:txBody>
+      </p:sp>
+    </p:spTree>
+    <p:extLst>
+      <p:ext uri="{BB962C8B-B14F-4D97-AF65-F5344CB8AC3E}">
+        <p14:creationId xmlns:p14="http://schemas.microsoft.com/office/powerpoint/2010/main" val="1611496846"/>
+      </p:ext>
+    </p:extLst>
+  </p:cSld>
+  <p:clrMapOvr>
+    <a:masterClrMapping/>
+  </p:clrMapOvr>
+</p:sld>
+</file>
+
+<file path=ppt/slides/slide18.xml><?xml version="1.0" encoding="utf-8"?>
+<p:sld xmlns:a="http://schemas.openxmlformats.org/drawingml/2006/main" xmlns:r="http://schemas.openxmlformats.org/officeDocument/2006/relationships" xmlns:p="http://schemas.openxmlformats.org/presentationml/2006/main">
+  <p:cSld>
+    <p:spTree>
+      <p:nvGrpSpPr>
+        <p:cNvPr id="1" name=""/>
+        <p:cNvGrpSpPr/>
+        <p:nvPr/>
+      </p:nvGrpSpPr>
+      <p:grpSpPr>
+        <a:xfrm>
+          <a:off x="0" y="0"/>
+          <a:ext cx="0" cy="0"/>
+          <a:chOff x="0" y="0"/>
+          <a:chExt cx="0" cy="0"/>
+        </a:xfrm>
+      </p:grpSpPr>
+      <p:sp>
+        <p:nvSpPr>
+          <p:cNvPr id="2" name="Title 1">
+            <a:extLst>
+              <a:ext uri="{FF2B5EF4-FFF2-40B4-BE49-F238E27FC236}">
+                <a16:creationId xmlns:a16="http://schemas.microsoft.com/office/drawing/2014/main" id="{BD461D94-0D0F-0348-95E5-2A357932C23B}"/>
+              </a:ext>
+            </a:extLst>
+          </p:cNvPr>
+          <p:cNvSpPr>
+            <a:spLocks noGrp="1"/>
+          </p:cNvSpPr>
+          <p:nvPr>
+            <p:ph type="title"/>
+          </p:nvPr>
+        </p:nvSpPr>
+        <p:spPr/>
+        <p:txBody>
+          <a:bodyPr/>
+          <a:lstStyle/>
+          <a:p>
+            <a:r>
+              <a:rPr lang="en-US" dirty="0"/>
+              <a:t>Nearby Amenities</a:t>
+            </a:r>
+          </a:p>
+        </p:txBody>
+      </p:sp>
+      <p:sp>
+        <p:nvSpPr>
+          <p:cNvPr id="3" name="Content Placeholder 2">
+            <a:extLst>
+              <a:ext uri="{FF2B5EF4-FFF2-40B4-BE49-F238E27FC236}">
+                <a16:creationId xmlns:a16="http://schemas.microsoft.com/office/drawing/2014/main" id="{0AA20437-69DD-8C47-91EE-5EC495E32373}"/>
+              </a:ext>
+            </a:extLst>
+          </p:cNvPr>
+          <p:cNvSpPr>
+            <a:spLocks noGrp="1"/>
+          </p:cNvSpPr>
+          <p:nvPr>
+            <p:ph idx="1"/>
+          </p:nvPr>
+        </p:nvSpPr>
+        <p:spPr>
+          <a:xfrm>
+            <a:off x="1097280" y="1845734"/>
+            <a:ext cx="10058400" cy="4463626"/>
+          </a:xfrm>
+        </p:spPr>
+        <p:txBody>
+          <a:bodyPr>
+            <a:normAutofit/>
+          </a:bodyPr>
+          <a:lstStyle/>
+          <a:p>
+            <a:r>
+              <a:rPr lang="en-US" sz="1800" dirty="0"/>
+              <a:t>  A. </a:t>
+            </a:r>
+            <a:r>
+              <a:rPr lang="en-US" sz="1800" b="1" i="1" dirty="0"/>
+              <a:t>Emergency Facilities </a:t>
+            </a:r>
+          </a:p>
+          <a:p>
+            <a:pPr lvl="1"/>
+            <a:r>
+              <a:rPr lang="en-US" dirty="0"/>
+              <a:t>How accessible are these facilities in case of mass emergency on/around sites for containing the situation and resuming business asap. Hospitals, Fire Stations, Doctors.</a:t>
+            </a:r>
+          </a:p>
+          <a:p>
+            <a:pPr marL="201168" lvl="1" indent="0">
+              <a:buNone/>
+            </a:pPr>
+            <a:r>
+              <a:rPr lang="en-US" dirty="0"/>
+              <a:t>B. </a:t>
+            </a:r>
+            <a:r>
+              <a:rPr lang="en-US" b="1" i="1" dirty="0"/>
+              <a:t>Accommodation </a:t>
+            </a:r>
+          </a:p>
+          <a:p>
+            <a:pPr lvl="1"/>
+            <a:r>
+              <a:rPr lang="en-US" dirty="0"/>
+              <a:t>Many executive employees travel from outside the city for few days a week and might need lodging facility as close to the company as possible. Also lot of local/not-local employees use vehicle for commute and will need parking nearby. Lodging, Parking.</a:t>
+            </a:r>
+          </a:p>
+          <a:p>
+            <a:pPr marL="201168" lvl="1" indent="0">
+              <a:buNone/>
+            </a:pPr>
+            <a:r>
+              <a:rPr lang="en-US" dirty="0"/>
+              <a:t>C. </a:t>
+            </a:r>
+            <a:r>
+              <a:rPr lang="en-US" b="1" i="1" dirty="0"/>
+              <a:t>Refreshments </a:t>
+            </a:r>
+          </a:p>
+          <a:p>
+            <a:pPr lvl="1"/>
+            <a:r>
+              <a:rPr lang="en-US" dirty="0"/>
+              <a:t>Basic Refreshment facilities. Café, Restaurants.</a:t>
+            </a:r>
+          </a:p>
+          <a:p>
+            <a:pPr marL="201168" lvl="1" indent="0">
+              <a:buNone/>
+            </a:pPr>
+            <a:r>
+              <a:rPr lang="en-US" dirty="0"/>
+              <a:t>D. </a:t>
+            </a:r>
+            <a:r>
+              <a:rPr lang="en-US" b="1" i="1" dirty="0"/>
+              <a:t>Basic Errands/appointments</a:t>
+            </a:r>
+          </a:p>
+          <a:p>
+            <a:pPr lvl="1"/>
+            <a:r>
+              <a:rPr lang="en-US" dirty="0"/>
+              <a:t>By large employees tend to take care of daily errands and appointments in lunch breaks or before/after work hours and prefer it to be as close to work as possible for obvious reasons. Super markets, Post Office, Doctor.</a:t>
+            </a:r>
+          </a:p>
+          <a:p>
+            <a:pPr marL="201168" lvl="1" indent="0">
+              <a:buNone/>
+            </a:pPr>
+            <a:r>
+              <a:rPr lang="en-US" dirty="0"/>
+              <a:t>E. </a:t>
+            </a:r>
+            <a:r>
+              <a:rPr lang="en-US" b="1" i="1" dirty="0"/>
+              <a:t>Fitness </a:t>
+            </a:r>
+          </a:p>
+          <a:p>
+            <a:pPr lvl="1"/>
+            <a:r>
+              <a:rPr lang="en-US" dirty="0"/>
+              <a:t>Fitness is top on priority list for a significant amount of employees now a days. Gym.</a:t>
+            </a:r>
+          </a:p>
+        </p:txBody>
+      </p:sp>
+    </p:spTree>
+    <p:extLst>
+      <p:ext uri="{BB962C8B-B14F-4D97-AF65-F5344CB8AC3E}">
+        <p14:creationId xmlns:p14="http://schemas.microsoft.com/office/powerpoint/2010/main" val="660619397"/>
+      </p:ext>
+    </p:extLst>
+  </p:cSld>
+  <p:clrMapOvr>
+    <a:masterClrMapping/>
+  </p:clrMapOvr>
+</p:sld>
+</file>
+
+<file path=ppt/slides/slide19.xml><?xml version="1.0" encoding="utf-8"?>
+<p:sld xmlns:a="http://schemas.openxmlformats.org/drawingml/2006/main" xmlns:r="http://schemas.openxmlformats.org/officeDocument/2006/relationships" xmlns:p="http://schemas.openxmlformats.org/presentationml/2006/main">
+  <p:cSld>
+    <p:spTree>
+      <p:nvGrpSpPr>
+        <p:cNvPr id="1" name=""/>
+        <p:cNvGrpSpPr/>
+        <p:nvPr/>
+      </p:nvGrpSpPr>
+      <p:grpSpPr>
+        <a:xfrm>
+          <a:off x="0" y="0"/>
+          <a:ext cx="0" cy="0"/>
+          <a:chOff x="0" y="0"/>
+          <a:chExt cx="0" cy="0"/>
+        </a:xfrm>
+      </p:grpSpPr>
+      <p:pic>
+        <p:nvPicPr>
+          <p:cNvPr id="5" name="Content Placeholder 4">
+            <a:extLst>
+              <a:ext uri="{FF2B5EF4-FFF2-40B4-BE49-F238E27FC236}">
+                <a16:creationId xmlns:a16="http://schemas.microsoft.com/office/drawing/2014/main" id="{E68C87D7-7462-FC4E-AD8D-476C5861BE45}"/>
+              </a:ext>
+            </a:extLst>
+          </p:cNvPr>
+          <p:cNvPicPr>
+            <a:picLocks noGrp="1" noChangeAspect="1"/>
+          </p:cNvPicPr>
+          <p:nvPr>
+            <p:ph idx="1"/>
+          </p:nvPr>
+        </p:nvPicPr>
+        <p:blipFill rotWithShape="1">
+          <a:blip r:embed="rId2">
+            <a:extLst>
+              <a:ext uri="{28A0092B-C50C-407E-A947-70E740481C1C}">
+                <a14:useLocalDpi xmlns:a14="http://schemas.microsoft.com/office/drawing/2010/main" val="0"/>
+              </a:ext>
+            </a:extLst>
+          </a:blip>
+          <a:srcRect b="5163"/>
+          <a:stretch/>
+        </p:blipFill>
+        <p:spPr>
+          <a:xfrm>
+            <a:off x="1497330" y="3371850"/>
+            <a:ext cx="8341355" cy="2948940"/>
+          </a:xfrm>
+        </p:spPr>
+      </p:pic>
+      <p:pic>
+        <p:nvPicPr>
+          <p:cNvPr id="10" name="Picture 9">
+            <a:extLst>
+              <a:ext uri="{FF2B5EF4-FFF2-40B4-BE49-F238E27FC236}">
+                <a16:creationId xmlns:a16="http://schemas.microsoft.com/office/drawing/2014/main" id="{68C90698-9174-B640-B74F-58469ECFAFB4}"/>
+              </a:ext>
+            </a:extLst>
+          </p:cNvPr>
+          <p:cNvPicPr>
+            <a:picLocks noChangeAspect="1"/>
+          </p:cNvPicPr>
+          <p:nvPr/>
+        </p:nvPicPr>
+        <p:blipFill rotWithShape="1">
+          <a:blip r:embed="rId3">
+            <a:extLst>
+              <a:ext uri="{28A0092B-C50C-407E-A947-70E740481C1C}">
+                <a14:useLocalDpi xmlns:a14="http://schemas.microsoft.com/office/drawing/2010/main" val="0"/>
+              </a:ext>
+            </a:extLst>
+          </a:blip>
+          <a:srcRect b="4789"/>
+          <a:stretch/>
+        </p:blipFill>
+        <p:spPr>
+          <a:xfrm>
+            <a:off x="1497330" y="0"/>
+            <a:ext cx="8469630" cy="3009085"/>
+          </a:xfrm>
+          <a:prstGeom prst="rect">
+            <a:avLst/>
+          </a:prstGeom>
+        </p:spPr>
+      </p:pic>
+    </p:spTree>
+    <p:extLst>
+      <p:ext uri="{BB962C8B-B14F-4D97-AF65-F5344CB8AC3E}">
+        <p14:creationId xmlns:p14="http://schemas.microsoft.com/office/powerpoint/2010/main" val="3344394509"/>
       </p:ext>
     </p:extLst>
   </p:cSld>
@@ -4730,12 +5238,48 @@
           <a:chExt cx="0" cy="0"/>
         </a:xfrm>
       </p:grpSpPr>
+      <p:pic>
+        <p:nvPicPr>
+          <p:cNvPr id="5" name="Picture 4">
+            <a:extLst>
+              <a:ext uri="{FF2B5EF4-FFF2-40B4-BE49-F238E27FC236}">
+                <a16:creationId xmlns:a16="http://schemas.microsoft.com/office/drawing/2014/main" id="{06C0ABB1-7187-094A-8DAB-40D99DA19870}"/>
+              </a:ext>
+            </a:extLst>
+          </p:cNvPr>
+          <p:cNvPicPr>
+            <a:picLocks noChangeAspect="1"/>
+          </p:cNvPicPr>
+          <p:nvPr/>
+        </p:nvPicPr>
+        <p:blipFill rotWithShape="1">
+          <a:blip r:embed="rId2">
+            <a:alphaModFix amt="15000"/>
+            <a:extLst>
+              <a:ext uri="{28A0092B-C50C-407E-A947-70E740481C1C}">
+                <a14:useLocalDpi xmlns:a14="http://schemas.microsoft.com/office/drawing/2010/main" val="0"/>
+              </a:ext>
+            </a:extLst>
+          </a:blip>
+          <a:srcRect l="13008" t="17665" r="9506" b="6167"/>
+          <a:stretch/>
+        </p:blipFill>
+        <p:spPr>
+          <a:xfrm>
+            <a:off x="502920" y="0"/>
+            <a:ext cx="11235690" cy="6217150"/>
+          </a:xfrm>
+          <a:prstGeom prst="rect">
+            <a:avLst/>
+          </a:prstGeom>
+        </p:spPr>
+      </p:pic>
       <p:sp>
         <p:nvSpPr>
           <p:cNvPr id="2" name="Title 1">
             <a:extLst>
               <a:ext uri="{FF2B5EF4-FFF2-40B4-BE49-F238E27FC236}">
-                <a16:creationId xmlns:a16="http://schemas.microsoft.com/office/drawing/2014/main" id="{390EB264-3883-41F9-BACB-285D2229980C}"/>
+                <a16:creationId xmlns:a16="http://schemas.microsoft.com/office/drawing/2014/main" id="{B41C06A5-EFAB-4E81-BE16-8703E062FAC9}"/>
               </a:ext>
             </a:extLst>
           </p:cNvPr>
@@ -4743,27 +5287,32 @@
             <a:spLocks noGrp="1"/>
           </p:cNvSpPr>
           <p:nvPr>
-            <p:ph type="title"/>
-          </p:nvPr>
-        </p:nvSpPr>
-        <p:spPr/>
+            <p:ph type="ctrTitle"/>
+          </p:nvPr>
+        </p:nvSpPr>
+        <p:spPr>
+          <a:xfrm>
+            <a:off x="1097280" y="758952"/>
+            <a:ext cx="10058400" cy="3566160"/>
+          </a:xfrm>
+        </p:spPr>
         <p:txBody>
           <a:bodyPr/>
           <a:lstStyle/>
           <a:p>
             <a:r>
               <a:rPr lang="en-US" dirty="0"/>
-              <a:t>The $5 Billion Question</a:t>
-            </a:r>
-          </a:p>
-        </p:txBody>
-      </p:sp>
-      <p:sp>
-        <p:nvSpPr>
-          <p:cNvPr id="3" name="Content Placeholder 2">
+              <a:t>Pick Me Amazon!</a:t>
+            </a:r>
+          </a:p>
+        </p:txBody>
+      </p:sp>
+      <p:sp>
+        <p:nvSpPr>
+          <p:cNvPr id="3" name="Subtitle 2">
             <a:extLst>
               <a:ext uri="{FF2B5EF4-FFF2-40B4-BE49-F238E27FC236}">
-                <a16:creationId xmlns:a16="http://schemas.microsoft.com/office/drawing/2014/main" id="{BEC8BDDB-FD44-4EB6-BE27-4A708B75BDAB}"/>
+                <a16:creationId xmlns:a16="http://schemas.microsoft.com/office/drawing/2014/main" id="{16514017-9304-4743-9F53-4DA92C050D17}"/>
               </a:ext>
             </a:extLst>
           </p:cNvPr>
@@ -4771,84 +5320,61 @@
             <a:spLocks noGrp="1"/>
           </p:cNvSpPr>
           <p:nvPr>
-            <p:ph idx="1"/>
-          </p:nvPr>
-        </p:nvSpPr>
-        <p:spPr>
-          <a:xfrm>
-            <a:off x="1084923" y="1845734"/>
-            <a:ext cx="10058400" cy="4023360"/>
-          </a:xfrm>
-        </p:spPr>
-        <p:txBody>
-          <a:bodyPr/>
-          <a:lstStyle/>
-          <a:p>
-            <a:pPr marL="0" indent="0">
-              <a:buNone/>
-            </a:pPr>
-            <a:r>
-              <a:rPr lang="en-US" sz="3200" dirty="0"/>
-              <a:t>Cities across the U.S are competing to attract Amazon’s second head quarters which would bring </a:t>
-            </a:r>
-            <a:r>
-              <a:rPr lang="en-US" sz="3200" b="1" dirty="0"/>
-              <a:t>50,000 jobs </a:t>
-            </a:r>
-            <a:r>
-              <a:rPr lang="en-US" sz="3200" dirty="0"/>
-              <a:t>and </a:t>
-            </a:r>
-            <a:r>
-              <a:rPr lang="en-US" sz="3200" b="1" dirty="0"/>
-              <a:t>$5 billion investment</a:t>
-            </a:r>
-            <a:r>
-              <a:rPr lang="en-US" sz="3200" dirty="0"/>
-              <a:t>. Out of the original 238 cities, 20 cities made it the final cut.</a:t>
-            </a:r>
-          </a:p>
-          <a:p>
-            <a:pPr marL="0" indent="0">
-              <a:buNone/>
-            </a:pPr>
-            <a:r>
-              <a:rPr lang="en-US" sz="3200" dirty="0"/>
-              <a:t>If Amazon were a person (</a:t>
-            </a:r>
-            <a:r>
-              <a:rPr lang="en-US" sz="3200" dirty="0">
-                <a:solidFill>
-                  <a:schemeClr val="accent1">
-                    <a:lumMod val="75000"/>
-                  </a:schemeClr>
-                </a:solidFill>
-              </a:rPr>
-              <a:t>Yes…corporations are people!) </a:t>
-            </a:r>
-            <a:r>
-              <a:rPr lang="en-US" sz="3200" dirty="0"/>
-              <a:t>which city should he choose? </a:t>
-            </a:r>
-          </a:p>
-          <a:p>
-            <a:pPr marL="0" indent="0">
-              <a:buNone/>
-            </a:pPr>
-            <a:r>
-              <a:rPr lang="en-US" sz="3200" dirty="0"/>
-              <a:t>We are here to help!</a:t>
-            </a:r>
-          </a:p>
-          <a:p>
-            <a:pPr marL="0" indent="0">
-              <a:buNone/>
-            </a:pPr>
-            <a:endParaRPr lang="en-US" dirty="0"/>
-          </a:p>
-          <a:p>
-            <a:endParaRPr lang="en-US" dirty="0"/>
-          </a:p>
+            <p:ph type="subTitle" idx="1"/>
+          </p:nvPr>
+        </p:nvSpPr>
+        <p:spPr>
+          <a:xfrm>
+            <a:off x="1100051" y="4455620"/>
+            <a:ext cx="10058400" cy="1143000"/>
+          </a:xfrm>
+        </p:spPr>
+        <p:txBody>
+          <a:bodyPr>
+            <a:normAutofit fontScale="92500"/>
+          </a:bodyPr>
+          <a:lstStyle/>
+          <a:p>
+            <a:r>
+              <a:rPr lang="en-US" sz="3000" b="1" dirty="0"/>
+              <a:t>Project 1 – UCB-DATA ANLYTICS BOOTCAMP</a:t>
+            </a:r>
+          </a:p>
+          <a:p>
+            <a:r>
+              <a:rPr lang="en-US" b="1" dirty="0"/>
+              <a:t>Guirlyn V Olivar, Helen LeAO, Indrani Kompella and Niyati Desai</a:t>
+            </a:r>
+          </a:p>
+        </p:txBody>
+      </p:sp>
+      <p:sp>
+        <p:nvSpPr>
+          <p:cNvPr id="6" name="TextBox 5">
+            <a:extLst>
+              <a:ext uri="{FF2B5EF4-FFF2-40B4-BE49-F238E27FC236}">
+                <a16:creationId xmlns:a16="http://schemas.microsoft.com/office/drawing/2014/main" id="{016AAC0F-C33A-034E-90E8-8BDFD51AC1BE}"/>
+              </a:ext>
+            </a:extLst>
+          </p:cNvPr>
+          <p:cNvSpPr txBox="1"/>
+          <p:nvPr/>
+        </p:nvSpPr>
+        <p:spPr>
+          <a:xfrm>
+            <a:off x="12070080" y="2743200"/>
+            <a:ext cx="184731" cy="369332"/>
+          </a:xfrm>
+          <a:prstGeom prst="rect">
+            <a:avLst/>
+          </a:prstGeom>
+          <a:noFill/>
+        </p:spPr>
+        <p:txBody>
+          <a:bodyPr wrap="none" rtlCol="0">
+            <a:spAutoFit/>
+          </a:bodyPr>
+          <a:lstStyle/>
           <a:p>
             <a:endParaRPr lang="en-US" dirty="0"/>
           </a:p>
@@ -4857,7 +5383,252 @@
     </p:spTree>
     <p:extLst>
       <p:ext uri="{BB962C8B-B14F-4D97-AF65-F5344CB8AC3E}">
-        <p14:creationId xmlns:p14="http://schemas.microsoft.com/office/powerpoint/2010/main" val="71064535"/>
+        <p14:creationId xmlns:p14="http://schemas.microsoft.com/office/powerpoint/2010/main" val="2713940244"/>
+      </p:ext>
+    </p:extLst>
+  </p:cSld>
+  <p:clrMapOvr>
+    <a:masterClrMapping/>
+  </p:clrMapOvr>
+</p:sld>
+</file>
+
+<file path=ppt/slides/slide20.xml><?xml version="1.0" encoding="utf-8"?>
+<p:sld xmlns:a="http://schemas.openxmlformats.org/drawingml/2006/main" xmlns:r="http://schemas.openxmlformats.org/officeDocument/2006/relationships" xmlns:p="http://schemas.openxmlformats.org/presentationml/2006/main">
+  <p:cSld>
+    <p:spTree>
+      <p:nvGrpSpPr>
+        <p:cNvPr id="1" name=""/>
+        <p:cNvGrpSpPr/>
+        <p:nvPr/>
+      </p:nvGrpSpPr>
+      <p:grpSpPr>
+        <a:xfrm>
+          <a:off x="0" y="0"/>
+          <a:ext cx="0" cy="0"/>
+          <a:chOff x="0" y="0"/>
+          <a:chExt cx="0" cy="0"/>
+        </a:xfrm>
+      </p:grpSpPr>
+      <p:pic>
+        <p:nvPicPr>
+          <p:cNvPr id="5" name="Content Placeholder 4">
+            <a:extLst>
+              <a:ext uri="{FF2B5EF4-FFF2-40B4-BE49-F238E27FC236}">
+                <a16:creationId xmlns:a16="http://schemas.microsoft.com/office/drawing/2014/main" id="{36B990E2-5C8A-CE4F-BA1B-9615A1BA1A1D}"/>
+              </a:ext>
+            </a:extLst>
+          </p:cNvPr>
+          <p:cNvPicPr>
+            <a:picLocks noGrp="1" noChangeAspect="1"/>
+          </p:cNvPicPr>
+          <p:nvPr>
+            <p:ph idx="1"/>
+          </p:nvPr>
+        </p:nvPicPr>
+        <p:blipFill rotWithShape="1">
+          <a:blip r:embed="rId2">
+            <a:extLst>
+              <a:ext uri="{28A0092B-C50C-407E-A947-70E740481C1C}">
+                <a14:useLocalDpi xmlns:a14="http://schemas.microsoft.com/office/drawing/2010/main" val="0"/>
+              </a:ext>
+            </a:extLst>
+          </a:blip>
+          <a:srcRect t="7541" b="6508"/>
+          <a:stretch/>
+        </p:blipFill>
+        <p:spPr>
+          <a:xfrm>
+            <a:off x="2155741" y="3636493"/>
+            <a:ext cx="8089879" cy="2594610"/>
+          </a:xfrm>
+        </p:spPr>
+      </p:pic>
+      <p:pic>
+        <p:nvPicPr>
+          <p:cNvPr id="7" name="Picture 6">
+            <a:extLst>
+              <a:ext uri="{FF2B5EF4-FFF2-40B4-BE49-F238E27FC236}">
+                <a16:creationId xmlns:a16="http://schemas.microsoft.com/office/drawing/2014/main" id="{F0B7390A-C610-2B43-8DC6-788A9A6E46F5}"/>
+              </a:ext>
+            </a:extLst>
+          </p:cNvPr>
+          <p:cNvPicPr>
+            <a:picLocks noChangeAspect="1"/>
+          </p:cNvPicPr>
+          <p:nvPr/>
+        </p:nvPicPr>
+        <p:blipFill rotWithShape="1">
+          <a:blip r:embed="rId3">
+            <a:extLst>
+              <a:ext uri="{28A0092B-C50C-407E-A947-70E740481C1C}">
+                <a14:useLocalDpi xmlns:a14="http://schemas.microsoft.com/office/drawing/2010/main" val="0"/>
+              </a:ext>
+            </a:extLst>
+          </a:blip>
+          <a:srcRect t="7157" r="-1893" b="5449"/>
+          <a:stretch/>
+        </p:blipFill>
+        <p:spPr>
+          <a:xfrm>
+            <a:off x="-1" y="1003783"/>
+            <a:ext cx="6905953" cy="2208047"/>
+          </a:xfrm>
+          <a:prstGeom prst="rect">
+            <a:avLst/>
+          </a:prstGeom>
+        </p:spPr>
+      </p:pic>
+      <p:pic>
+        <p:nvPicPr>
+          <p:cNvPr id="9" name="Picture 8">
+            <a:extLst>
+              <a:ext uri="{FF2B5EF4-FFF2-40B4-BE49-F238E27FC236}">
+                <a16:creationId xmlns:a16="http://schemas.microsoft.com/office/drawing/2014/main" id="{EB8C8D5D-5AF2-7D40-8967-2B74C36CFC4D}"/>
+              </a:ext>
+            </a:extLst>
+          </p:cNvPr>
+          <p:cNvPicPr>
+            <a:picLocks noChangeAspect="1"/>
+          </p:cNvPicPr>
+          <p:nvPr/>
+        </p:nvPicPr>
+        <p:blipFill rotWithShape="1">
+          <a:blip r:embed="rId4">
+            <a:extLst>
+              <a:ext uri="{28A0092B-C50C-407E-A947-70E740481C1C}">
+                <a14:useLocalDpi xmlns:a14="http://schemas.microsoft.com/office/drawing/2010/main" val="0"/>
+              </a:ext>
+            </a:extLst>
+          </a:blip>
+          <a:srcRect l="7238" t="11981" r="8057" b="6871"/>
+          <a:stretch/>
+        </p:blipFill>
+        <p:spPr>
+          <a:xfrm>
+            <a:off x="6767722" y="615163"/>
+            <a:ext cx="5416658" cy="2594610"/>
+          </a:xfrm>
+          <a:prstGeom prst="rect">
+            <a:avLst/>
+          </a:prstGeom>
+        </p:spPr>
+      </p:pic>
+      <p:sp>
+        <p:nvSpPr>
+          <p:cNvPr id="10" name="TextBox 9">
+            <a:extLst>
+              <a:ext uri="{FF2B5EF4-FFF2-40B4-BE49-F238E27FC236}">
+                <a16:creationId xmlns:a16="http://schemas.microsoft.com/office/drawing/2014/main" id="{0BA7F892-9743-8143-96D2-F33A666E5F12}"/>
+              </a:ext>
+            </a:extLst>
+          </p:cNvPr>
+          <p:cNvSpPr txBox="1"/>
+          <p:nvPr/>
+        </p:nvSpPr>
+        <p:spPr>
+          <a:xfrm>
+            <a:off x="8375012" y="338164"/>
+            <a:ext cx="2202078" cy="276999"/>
+          </a:xfrm>
+          <a:prstGeom prst="rect">
+            <a:avLst/>
+          </a:prstGeom>
+          <a:noFill/>
+        </p:spPr>
+        <p:txBody>
+          <a:bodyPr wrap="none" rtlCol="0">
+            <a:spAutoFit/>
+          </a:bodyPr>
+          <a:lstStyle/>
+          <a:p>
+            <a:r>
+              <a:rPr lang="en-US" sz="1200" b="1" dirty="0">
+                <a:latin typeface="Arial Rounded MT Bold" panose="020F0704030504030204" pitchFamily="34" charset="77"/>
+              </a:rPr>
+              <a:t>City Refreshments Ranking</a:t>
+            </a:r>
+          </a:p>
+        </p:txBody>
+      </p:sp>
+      <p:sp>
+        <p:nvSpPr>
+          <p:cNvPr id="11" name="TextBox 10">
+            <a:extLst>
+              <a:ext uri="{FF2B5EF4-FFF2-40B4-BE49-F238E27FC236}">
+                <a16:creationId xmlns:a16="http://schemas.microsoft.com/office/drawing/2014/main" id="{E4867827-C2BD-3A44-9CDA-CADE25064467}"/>
+              </a:ext>
+            </a:extLst>
+          </p:cNvPr>
+          <p:cNvSpPr txBox="1"/>
+          <p:nvPr/>
+        </p:nvSpPr>
+        <p:spPr>
+          <a:xfrm>
+            <a:off x="1257932" y="341974"/>
+            <a:ext cx="2043060" cy="276999"/>
+          </a:xfrm>
+          <a:prstGeom prst="rect">
+            <a:avLst/>
+          </a:prstGeom>
+          <a:noFill/>
+        </p:spPr>
+        <p:txBody>
+          <a:bodyPr wrap="none" rtlCol="0">
+            <a:spAutoFit/>
+          </a:bodyPr>
+          <a:lstStyle/>
+          <a:p>
+            <a:r>
+              <a:rPr lang="en-US" sz="1200" b="1" dirty="0">
+                <a:latin typeface="Arial Rounded MT Bold" panose="020F0704030504030204" pitchFamily="34" charset="77"/>
+              </a:rPr>
+              <a:t>City Gymnasium Ranking</a:t>
+            </a:r>
+          </a:p>
+        </p:txBody>
+      </p:sp>
+      <p:sp>
+        <p:nvSpPr>
+          <p:cNvPr id="12" name="TextBox 11">
+            <a:extLst>
+              <a:ext uri="{FF2B5EF4-FFF2-40B4-BE49-F238E27FC236}">
+                <a16:creationId xmlns:a16="http://schemas.microsoft.com/office/drawing/2014/main" id="{F9429A70-E256-964E-A767-948DBCB84358}"/>
+              </a:ext>
+            </a:extLst>
+          </p:cNvPr>
+          <p:cNvSpPr txBox="1"/>
+          <p:nvPr/>
+        </p:nvSpPr>
+        <p:spPr>
+          <a:xfrm>
+            <a:off x="4972682" y="3359494"/>
+            <a:ext cx="1758238" cy="276999"/>
+          </a:xfrm>
+          <a:prstGeom prst="rect">
+            <a:avLst/>
+          </a:prstGeom>
+          <a:noFill/>
+        </p:spPr>
+        <p:txBody>
+          <a:bodyPr wrap="none" rtlCol="0">
+            <a:spAutoFit/>
+          </a:bodyPr>
+          <a:lstStyle/>
+          <a:p>
+            <a:r>
+              <a:rPr lang="en-US" sz="1200" b="1" dirty="0">
+                <a:latin typeface="Arial Rounded MT Bold" panose="020F0704030504030204" pitchFamily="34" charset="77"/>
+              </a:rPr>
+              <a:t>City Errands Ranking</a:t>
+            </a:r>
+          </a:p>
+        </p:txBody>
+      </p:sp>
+    </p:spTree>
+    <p:extLst>
+      <p:ext uri="{BB962C8B-B14F-4D97-AF65-F5344CB8AC3E}">
+        <p14:creationId xmlns:p14="http://schemas.microsoft.com/office/powerpoint/2010/main" val="1367037543"/>
       </p:ext>
     </p:extLst>
   </p:cSld>
@@ -4907,7 +5678,7 @@
           <a:p>
             <a:r>
               <a:rPr lang="en-US" dirty="0"/>
-              <a:t>Amazon’s Selection Criteria</a:t>
+              <a:t>The $5 Billion Question</a:t>
             </a:r>
           </a:p>
         </p:txBody>
@@ -4930,166 +5701,88 @@
         </p:nvSpPr>
         <p:spPr>
           <a:xfrm>
-            <a:off x="1097280" y="1468057"/>
-            <a:ext cx="10802277" cy="4819135"/>
-          </a:xfrm>
-        </p:spPr>
-        <p:txBody>
-          <a:bodyPr>
-            <a:normAutofit/>
-          </a:bodyPr>
-          <a:lstStyle/>
-          <a:p>
-            <a:endParaRPr lang="en-US" dirty="0"/>
-          </a:p>
-          <a:p>
-            <a:pPr fontAlgn="base">
-              <a:spcBef>
-                <a:spcPts val="600"/>
-              </a:spcBef>
-              <a:spcAft>
-                <a:spcPts val="0"/>
-              </a:spcAft>
+            <a:off x="1084923" y="1845734"/>
+            <a:ext cx="10058400" cy="4023360"/>
+          </a:xfrm>
+        </p:spPr>
+        <p:txBody>
+          <a:bodyPr/>
+          <a:lstStyle/>
+          <a:p>
+            <a:pPr marL="0" indent="0">
+              <a:buNone/>
             </a:pPr>
             <a:r>
-              <a:rPr lang="en-US" sz="2400" b="1" dirty="0"/>
-              <a:t>Metropolitan areas with more than one million people.</a:t>
-            </a:r>
-          </a:p>
-          <a:p>
-            <a:pPr fontAlgn="base">
-              <a:spcBef>
-                <a:spcPts val="600"/>
-              </a:spcBef>
-              <a:spcAft>
-                <a:spcPts val="0"/>
-              </a:spcAft>
+              <a:rPr lang="en-US" sz="3200" dirty="0"/>
+              <a:t>Cities across the U.S are competing to attract Amazon’s second head quarters which would bring </a:t>
+            </a:r>
+            <a:r>
+              <a:rPr lang="en-US" sz="3200" b="1" dirty="0"/>
+              <a:t>50,000 jobs </a:t>
+            </a:r>
+            <a:r>
+              <a:rPr lang="en-US" sz="3200" dirty="0"/>
+              <a:t>and </a:t>
+            </a:r>
+            <a:r>
+              <a:rPr lang="en-US" sz="3200" b="1" dirty="0"/>
+              <a:t>$5 billion investment</a:t>
+            </a:r>
+            <a:r>
+              <a:rPr lang="en-US" sz="3200" dirty="0"/>
+              <a:t>. Out of the original 238 cities, 20 cities made it the final cut.</a:t>
+            </a:r>
+          </a:p>
+          <a:p>
+            <a:pPr marL="0" indent="0">
+              <a:buNone/>
             </a:pPr>
             <a:r>
-              <a:rPr lang="en-US" sz="2400" dirty="0"/>
-              <a:t> (Spoiler Alert : All the 20 shortlisted cities meet this criteria.)</a:t>
-            </a:r>
-          </a:p>
-          <a:p>
-            <a:pPr fontAlgn="base">
-              <a:spcBef>
-                <a:spcPts val="600"/>
-              </a:spcBef>
-              <a:spcAft>
-                <a:spcPts val="0"/>
-              </a:spcAft>
-            </a:pPr>
-            <a:endParaRPr lang="en-US" sz="2400" dirty="0"/>
-          </a:p>
-          <a:p>
-            <a:pPr fontAlgn="base">
-              <a:spcBef>
-                <a:spcPts val="600"/>
-              </a:spcBef>
-              <a:spcAft>
-                <a:spcPts val="0"/>
-              </a:spcAft>
-            </a:pPr>
-            <a:r>
-              <a:rPr lang="en-US" sz="2400" b="1" dirty="0"/>
-              <a:t>A stable and </a:t>
-            </a:r>
-            <a:r>
-              <a:rPr lang="en-US" sz="2400" b="1" i="1" dirty="0">
+              <a:rPr lang="en-US" sz="3200" dirty="0"/>
+              <a:t>If Amazon were a person (</a:t>
+            </a:r>
+            <a:r>
+              <a:rPr lang="en-US" sz="3200" dirty="0">
                 <a:solidFill>
                   <a:schemeClr val="accent1">
                     <a:lumMod val="75000"/>
                   </a:schemeClr>
                 </a:solidFill>
               </a:rPr>
-              <a:t>business-friendly </a:t>
-            </a:r>
-            <a:r>
-              <a:rPr lang="en-US" sz="2400" b="1" dirty="0"/>
-              <a:t>environment.</a:t>
-            </a:r>
-          </a:p>
-          <a:p>
-            <a:pPr fontAlgn="base">
-              <a:spcBef>
-                <a:spcPts val="600"/>
-              </a:spcBef>
-              <a:spcAft>
-                <a:spcPts val="0"/>
-              </a:spcAft>
+              <a:t>Yes…corporations are people!) </a:t>
+            </a:r>
+            <a:r>
+              <a:rPr lang="en-US" sz="3200" dirty="0"/>
+              <a:t>which city should he choose? </a:t>
+            </a:r>
+          </a:p>
+          <a:p>
+            <a:pPr marL="0" indent="0">
+              <a:buNone/>
             </a:pPr>
             <a:r>
-              <a:rPr lang="en-US" sz="2400" b="1" dirty="0"/>
-              <a:t>Communities that think big and creatively when considering locations and real estate options.</a:t>
-            </a:r>
-          </a:p>
-          <a:p>
-            <a:pPr marL="0" indent="0" fontAlgn="base">
-              <a:spcBef>
-                <a:spcPts val="600"/>
-              </a:spcBef>
-              <a:spcAft>
-                <a:spcPts val="0"/>
-              </a:spcAft>
+              <a:rPr lang="en-US" sz="3200" dirty="0"/>
+              <a:t>We are here to help!</a:t>
+            </a:r>
+          </a:p>
+          <a:p>
+            <a:pPr marL="0" indent="0">
               <a:buNone/>
             </a:pPr>
-            <a:r>
-              <a:rPr lang="en-US" sz="2400" dirty="0"/>
-              <a:t> Non quantifiable metrics. We assumed all the cities meet this criteria as well.</a:t>
-            </a:r>
-          </a:p>
-          <a:p>
-            <a:pPr marL="0" indent="0" fontAlgn="base">
-              <a:spcBef>
-                <a:spcPts val="600"/>
-              </a:spcBef>
-              <a:spcAft>
-                <a:spcPts val="0"/>
-              </a:spcAft>
-              <a:buNone/>
-            </a:pPr>
-            <a:endParaRPr lang="en-US" sz="2400" dirty="0"/>
-          </a:p>
-          <a:p>
-            <a:pPr fontAlgn="base">
-              <a:spcBef>
-                <a:spcPts val="600"/>
-              </a:spcBef>
-              <a:spcAft>
-                <a:spcPts val="0"/>
-              </a:spcAft>
-            </a:pPr>
-            <a:r>
-              <a:rPr lang="en-US" sz="2400" b="1" u="sng" dirty="0">
-                <a:solidFill>
-                  <a:schemeClr val="accent1">
-                    <a:lumMod val="50000"/>
-                  </a:schemeClr>
-                </a:solidFill>
-              </a:rPr>
-              <a:t>Urban or suburban locations with the potential to attract and retain strong technical talent.</a:t>
-            </a:r>
-          </a:p>
-          <a:p>
-            <a:pPr fontAlgn="base">
-              <a:spcBef>
-                <a:spcPts val="600"/>
-              </a:spcBef>
-              <a:spcAft>
-                <a:spcPts val="0"/>
-              </a:spcAft>
-            </a:pPr>
-            <a:r>
-              <a:rPr lang="en-US" sz="2400" dirty="0"/>
-              <a:t>Measurable Metrics. Criteria we used!</a:t>
-            </a:r>
+            <a:endParaRPr lang="en-US" dirty="0"/>
+          </a:p>
+          <a:p>
+            <a:endParaRPr lang="en-US" dirty="0"/>
+          </a:p>
+          <a:p>
+            <a:endParaRPr lang="en-US" dirty="0"/>
           </a:p>
         </p:txBody>
       </p:sp>
     </p:spTree>
     <p:extLst>
       <p:ext uri="{BB962C8B-B14F-4D97-AF65-F5344CB8AC3E}">
-        <p14:creationId xmlns:p14="http://schemas.microsoft.com/office/powerpoint/2010/main" val="3288892624"/>
+        <p14:creationId xmlns:p14="http://schemas.microsoft.com/office/powerpoint/2010/main" val="71064535"/>
       </p:ext>
     </p:extLst>
   </p:cSld>
@@ -5139,7 +5832,7 @@
           <a:p>
             <a:r>
               <a:rPr lang="en-US" dirty="0"/>
-              <a:t>Metrics Used/Questions Asked</a:t>
+              <a:t>Amazon’s Selection Criteria</a:t>
             </a:r>
           </a:p>
         </p:txBody>
@@ -5162,7 +5855,7 @@
         </p:nvSpPr>
         <p:spPr>
           <a:xfrm>
-            <a:off x="1036320" y="1752262"/>
+            <a:off x="1097280" y="1468057"/>
             <a:ext cx="10802277" cy="4819135"/>
           </a:xfrm>
         </p:spPr>
@@ -5172,121 +5865,156 @@
           </a:bodyPr>
           <a:lstStyle/>
           <a:p>
-            <a:pPr>
-              <a:buFont typeface="Wingdings" panose="05000000000000000000" pitchFamily="2" charset="2"/>
-              <a:buChar char="q"/>
+            <a:endParaRPr lang="en-US" dirty="0"/>
+          </a:p>
+          <a:p>
+            <a:pPr fontAlgn="base">
+              <a:spcBef>
+                <a:spcPts val="600"/>
+              </a:spcBef>
+              <a:spcAft>
+                <a:spcPts val="0"/>
+              </a:spcAft>
             </a:pPr>
             <a:r>
-              <a:rPr lang="en-US" dirty="0"/>
-              <a:t>Educated Talent Pool.</a:t>
-            </a:r>
-          </a:p>
-          <a:p>
-            <a:pPr>
-              <a:buFont typeface="Wingdings" panose="05000000000000000000" pitchFamily="2" charset="2"/>
-              <a:buChar char="q"/>
+              <a:rPr lang="en-US" sz="2400" b="1" dirty="0"/>
+              <a:t>Metropolitan areas with more than one million people.</a:t>
+            </a:r>
+          </a:p>
+          <a:p>
+            <a:pPr fontAlgn="base">
+              <a:spcBef>
+                <a:spcPts val="600"/>
+              </a:spcBef>
+              <a:spcAft>
+                <a:spcPts val="0"/>
+              </a:spcAft>
             </a:pPr>
             <a:r>
-              <a:rPr lang="en-US" dirty="0"/>
-              <a:t>Existing Labor Force in Technology, Business and Financial occupations. </a:t>
-            </a:r>
-          </a:p>
-          <a:p>
-            <a:pPr>
-              <a:buFont typeface="Wingdings" panose="05000000000000000000" pitchFamily="2" charset="2"/>
-              <a:buChar char="q"/>
+              <a:rPr lang="en-US" sz="2400" dirty="0"/>
+              <a:t> (Spoiler Alert : All the 20 shortlisted cities meet this criteria.)</a:t>
+            </a:r>
+          </a:p>
+          <a:p>
+            <a:pPr fontAlgn="base">
+              <a:spcBef>
+                <a:spcPts val="600"/>
+              </a:spcBef>
+              <a:spcAft>
+                <a:spcPts val="0"/>
+              </a:spcAft>
             </a:pPr>
-            <a:r>
-              <a:rPr lang="en-US" dirty="0"/>
-              <a:t>Diversity /Cultural Community Fit.  </a:t>
-            </a:r>
-          </a:p>
-          <a:p>
-            <a:pPr>
-              <a:buFont typeface="Wingdings" panose="05000000000000000000" pitchFamily="2" charset="2"/>
-              <a:buChar char="q"/>
+            <a:endParaRPr lang="en-US" sz="2400" dirty="0"/>
+          </a:p>
+          <a:p>
+            <a:pPr fontAlgn="base">
+              <a:spcBef>
+                <a:spcPts val="600"/>
+              </a:spcBef>
+              <a:spcAft>
+                <a:spcPts val="0"/>
+              </a:spcAft>
             </a:pPr>
             <a:r>
-              <a:rPr lang="en-US" dirty="0"/>
-              <a:t>Crime Index - How safe is your city?</a:t>
-            </a:r>
-          </a:p>
-          <a:p>
-            <a:pPr>
-              <a:buFont typeface="Wingdings" panose="05000000000000000000" pitchFamily="2" charset="2"/>
-              <a:buChar char="q"/>
+              <a:rPr lang="en-US" sz="2400" b="1" dirty="0"/>
+              <a:t>A stable and </a:t>
+            </a:r>
+            <a:r>
+              <a:rPr lang="en-US" sz="2400" b="1" i="1" dirty="0">
+                <a:solidFill>
+                  <a:schemeClr val="accent1">
+                    <a:lumMod val="75000"/>
+                  </a:schemeClr>
+                </a:solidFill>
+              </a:rPr>
+              <a:t>business-friendly </a:t>
+            </a:r>
+            <a:r>
+              <a:rPr lang="en-US" sz="2400" b="1" dirty="0"/>
+              <a:t>environment.</a:t>
+            </a:r>
+          </a:p>
+          <a:p>
+            <a:pPr fontAlgn="base">
+              <a:spcBef>
+                <a:spcPts val="600"/>
+              </a:spcBef>
+              <a:spcAft>
+                <a:spcPts val="0"/>
+              </a:spcAft>
             </a:pPr>
             <a:r>
-              <a:rPr lang="en-US" dirty="0"/>
-              <a:t>Schools and Colleges -  Does your city have good schools? Do your city have institutions of higher education?</a:t>
-            </a:r>
-          </a:p>
-          <a:p>
-            <a:pPr>
-              <a:buFont typeface="Wingdings" panose="05000000000000000000" pitchFamily="2" charset="2"/>
-              <a:buChar char="q"/>
+              <a:rPr lang="en-US" sz="2400" b="1" dirty="0"/>
+              <a:t>Communities that think big and creatively when considering locations and real estate options.</a:t>
+            </a:r>
+          </a:p>
+          <a:p>
+            <a:pPr marL="0" indent="0" fontAlgn="base">
+              <a:spcBef>
+                <a:spcPts val="600"/>
+              </a:spcBef>
+              <a:spcAft>
+                <a:spcPts val="0"/>
+              </a:spcAft>
+              <a:buNone/>
             </a:pPr>
             <a:r>
-              <a:rPr lang="en-US" dirty="0"/>
-              <a:t>Housing Affordability .</a:t>
-            </a:r>
-          </a:p>
-          <a:p>
-            <a:pPr>
-              <a:buFont typeface="Wingdings" panose="05000000000000000000" pitchFamily="2" charset="2"/>
-              <a:buChar char="q"/>
+              <a:rPr lang="en-US" sz="2400" dirty="0"/>
+              <a:t> Non quantifiable metrics. We assumed all the cities meet this criteria as well.</a:t>
+            </a:r>
+          </a:p>
+          <a:p>
+            <a:pPr marL="0" indent="0" fontAlgn="base">
+              <a:spcBef>
+                <a:spcPts val="600"/>
+              </a:spcBef>
+              <a:spcAft>
+                <a:spcPts val="0"/>
+              </a:spcAft>
+              <a:buNone/>
             </a:pPr>
-            <a:r>
-              <a:rPr lang="en-US" dirty="0"/>
-              <a:t>Community/Quality of Life – What amenities does your city have to offer?</a:t>
-            </a:r>
-          </a:p>
-          <a:p>
-            <a:pPr>
-              <a:buFont typeface="Wingdings" panose="05000000000000000000" pitchFamily="2" charset="2"/>
-              <a:buChar char="q"/>
+            <a:endParaRPr lang="en-US" sz="2400" dirty="0"/>
+          </a:p>
+          <a:p>
+            <a:pPr fontAlgn="base">
+              <a:spcBef>
+                <a:spcPts val="600"/>
+              </a:spcBef>
+              <a:spcAft>
+                <a:spcPts val="0"/>
+              </a:spcAft>
             </a:pPr>
             <a:r>
-              <a:rPr lang="en-US" dirty="0"/>
-              <a:t> Transportation Options – Airport, Transit, Bike and Pedestrian accessibility.</a:t>
-            </a:r>
-          </a:p>
-          <a:p>
-            <a:pPr>
-              <a:buFont typeface="Wingdings" panose="05000000000000000000" pitchFamily="2" charset="2"/>
-              <a:buChar char="q"/>
+              <a:rPr lang="en-US" sz="2400" b="1" u="sng" dirty="0">
+                <a:solidFill>
+                  <a:schemeClr val="accent1">
+                    <a:lumMod val="50000"/>
+                  </a:schemeClr>
+                </a:solidFill>
+              </a:rPr>
+              <a:t>Urban or suburban locations with the potential to attract and retain strong technical talent.</a:t>
+            </a:r>
+          </a:p>
+          <a:p>
+            <a:pPr fontAlgn="base">
+              <a:spcBef>
+                <a:spcPts val="600"/>
+              </a:spcBef>
+              <a:spcAft>
+                <a:spcPts val="0"/>
+              </a:spcAft>
             </a:pPr>
             <a:r>
-              <a:rPr lang="en-US" dirty="0"/>
-              <a:t> Others : Climate, Pollution etc.</a:t>
-            </a:r>
-          </a:p>
-          <a:p>
-            <a:pPr>
-              <a:buFont typeface="Wingdings" panose="05000000000000000000" pitchFamily="2" charset="2"/>
-              <a:buChar char="q"/>
-            </a:pPr>
-            <a:endParaRPr lang="en-US" dirty="0"/>
-          </a:p>
-          <a:p>
-            <a:pPr>
-              <a:buFont typeface="Wingdings" panose="05000000000000000000" pitchFamily="2" charset="2"/>
-              <a:buChar char="q"/>
-            </a:pPr>
-            <a:endParaRPr lang="en-US" dirty="0"/>
-          </a:p>
-          <a:p>
-            <a:pPr marL="0" indent="0">
-              <a:buNone/>
-            </a:pPr>
-            <a:endParaRPr lang="en-US" dirty="0"/>
+              <a:rPr lang="en-US" sz="2400" dirty="0"/>
+              <a:t>Measurable Metrics. Criteria we used!</a:t>
+            </a:r>
           </a:p>
         </p:txBody>
       </p:sp>
     </p:spTree>
     <p:extLst>
       <p:ext uri="{BB962C8B-B14F-4D97-AF65-F5344CB8AC3E}">
-        <p14:creationId xmlns:p14="http://schemas.microsoft.com/office/powerpoint/2010/main" val="2944506561"/>
+        <p14:creationId xmlns:p14="http://schemas.microsoft.com/office/powerpoint/2010/main" val="3288892624"/>
       </p:ext>
     </p:extLst>
   </p:cSld>
@@ -5336,7 +6064,7 @@
           <a:p>
             <a:r>
               <a:rPr lang="en-US" dirty="0"/>
-              <a:t>Metrics At The City Level</a:t>
+              <a:t>Metrics Used/Questions Asked</a:t>
             </a:r>
           </a:p>
         </p:txBody>
@@ -5359,7 +6087,7 @@
         </p:nvSpPr>
         <p:spPr>
           <a:xfrm>
-            <a:off x="1097280" y="2038865"/>
+            <a:off x="1036320" y="1752262"/>
             <a:ext cx="10802277" cy="4819135"/>
           </a:xfrm>
         </p:spPr>
@@ -5374,11 +6102,7 @@
               <a:buChar char="q"/>
             </a:pPr>
             <a:r>
-              <a:rPr lang="en-US" sz="3200" dirty="0">
-                <a:solidFill>
-                  <a:schemeClr val="tx1"/>
-                </a:solidFill>
-              </a:rPr>
+              <a:rPr lang="en-US" dirty="0"/>
               <a:t>Educated Talent Pool.</a:t>
             </a:r>
           </a:p>
@@ -5388,11 +6112,7 @@
               <a:buChar char="q"/>
             </a:pPr>
             <a:r>
-              <a:rPr lang="en-US" sz="3200" dirty="0">
-                <a:solidFill>
-                  <a:schemeClr val="tx1"/>
-                </a:solidFill>
-              </a:rPr>
+              <a:rPr lang="en-US" dirty="0"/>
               <a:t>Existing Labor Force in Technology, Business and Financial occupations. </a:t>
             </a:r>
           </a:p>
@@ -5402,11 +6122,7 @@
               <a:buChar char="q"/>
             </a:pPr>
             <a:r>
-              <a:rPr lang="en-US" sz="3200" dirty="0">
-                <a:solidFill>
-                  <a:schemeClr val="tx1"/>
-                </a:solidFill>
-              </a:rPr>
+              <a:rPr lang="en-US" dirty="0"/>
               <a:t>Diversity /Cultural Community Fit.  </a:t>
             </a:r>
           </a:p>
@@ -5416,12 +6132,8 @@
               <a:buChar char="q"/>
             </a:pPr>
             <a:r>
-              <a:rPr lang="en-US" sz="3200" dirty="0">
-                <a:solidFill>
-                  <a:schemeClr val="tx1"/>
-                </a:solidFill>
-              </a:rPr>
-              <a:t>Crime Index.</a:t>
+              <a:rPr lang="en-US" dirty="0"/>
+              <a:t>Crime Index - How safe is your city?</a:t>
             </a:r>
           </a:p>
           <a:p>
@@ -5430,12 +6142,8 @@
               <a:buChar char="q"/>
             </a:pPr>
             <a:r>
-              <a:rPr lang="en-US" sz="3200" dirty="0">
-                <a:solidFill>
-                  <a:schemeClr val="tx1"/>
-                </a:solidFill>
-              </a:rPr>
-              <a:t>Housing Affordability.</a:t>
+              <a:rPr lang="en-US" dirty="0"/>
+              <a:t>Schools and Colleges -  Does your city have good schools? Do your city have institutions of higher education?</a:t>
             </a:r>
           </a:p>
           <a:p>
@@ -5444,11 +6152,37 @@
               <a:buChar char="q"/>
             </a:pPr>
             <a:r>
-              <a:rPr lang="en-US" sz="3200" dirty="0">
-                <a:solidFill>
-                  <a:schemeClr val="tx1"/>
-                </a:solidFill>
-              </a:rPr>
+              <a:rPr lang="en-US" dirty="0"/>
+              <a:t>Housing Affordability .</a:t>
+            </a:r>
+          </a:p>
+          <a:p>
+            <a:pPr>
+              <a:buFont typeface="Wingdings" panose="05000000000000000000" pitchFamily="2" charset="2"/>
+              <a:buChar char="q"/>
+            </a:pPr>
+            <a:r>
+              <a:rPr lang="en-US" dirty="0"/>
+              <a:t>Community/Quality of Life – What amenities does your city have to offer?</a:t>
+            </a:r>
+          </a:p>
+          <a:p>
+            <a:pPr>
+              <a:buFont typeface="Wingdings" panose="05000000000000000000" pitchFamily="2" charset="2"/>
+              <a:buChar char="q"/>
+            </a:pPr>
+            <a:r>
+              <a:rPr lang="en-US" dirty="0"/>
+              <a:t> Transportation Options – Airport, Transit, Bike and Pedestrian accessibility.</a:t>
+            </a:r>
+          </a:p>
+          <a:p>
+            <a:pPr>
+              <a:buFont typeface="Wingdings" panose="05000000000000000000" pitchFamily="2" charset="2"/>
+              <a:buChar char="q"/>
+            </a:pPr>
+            <a:r>
+              <a:rPr lang="en-US" dirty="0"/>
               <a:t> Others : Climate, Pollution etc.</a:t>
             </a:r>
           </a:p>
@@ -5477,7 +6211,7 @@
     </p:spTree>
     <p:extLst>
       <p:ext uri="{BB962C8B-B14F-4D97-AF65-F5344CB8AC3E}">
-        <p14:creationId xmlns:p14="http://schemas.microsoft.com/office/powerpoint/2010/main" val="3770134055"/>
+        <p14:creationId xmlns:p14="http://schemas.microsoft.com/office/powerpoint/2010/main" val="2944506561"/>
       </p:ext>
     </p:extLst>
   </p:cSld>
@@ -5527,7 +6261,7 @@
           <a:p>
             <a:r>
               <a:rPr lang="en-US" dirty="0"/>
-              <a:t>Metrics At The Site Level</a:t>
+              <a:t>Metrics At The City Level</a:t>
             </a:r>
           </a:p>
         </p:txBody>
@@ -5550,7 +6284,7 @@
         </p:nvSpPr>
         <p:spPr>
           <a:xfrm>
-            <a:off x="1097280" y="2382457"/>
+            <a:off x="1097280" y="2038865"/>
             <a:ext cx="10802277" cy="4819135"/>
           </a:xfrm>
         </p:spPr>
@@ -5570,7 +6304,7 @@
                   <a:schemeClr val="tx1"/>
                 </a:solidFill>
               </a:rPr>
-              <a:t>Schools and Colleges.</a:t>
+              <a:t>Educated Talent Pool.</a:t>
             </a:r>
           </a:p>
           <a:p>
@@ -5584,7 +6318,7 @@
                   <a:schemeClr val="tx1"/>
                 </a:solidFill>
               </a:rPr>
-              <a:t>Community/Quality of Life/Amenities. </a:t>
+              <a:t>Existing Labor Force in Technology, Business and Financial occupations. </a:t>
             </a:r>
           </a:p>
           <a:p>
@@ -5598,30 +6332,77 @@
                   <a:schemeClr val="tx1"/>
                 </a:solidFill>
               </a:rPr>
-              <a:t>Transportation Options.</a:t>
-            </a:r>
-          </a:p>
-          <a:p>
-            <a:pPr marL="0" indent="0">
-              <a:buNone/>
+              <a:t>Diversity /Cultural Community Fit.  </a:t>
+            </a:r>
+          </a:p>
+          <a:p>
+            <a:pPr>
+              <a:buFont typeface="Wingdings" panose="05000000000000000000" pitchFamily="2" charset="2"/>
+              <a:buChar char="q"/>
+            </a:pPr>
+            <a:r>
+              <a:rPr lang="en-US" sz="3200" dirty="0">
+                <a:solidFill>
+                  <a:schemeClr val="tx1"/>
+                </a:solidFill>
+              </a:rPr>
+              <a:t>Crime Index.</a:t>
+            </a:r>
+          </a:p>
+          <a:p>
+            <a:pPr>
+              <a:buFont typeface="Wingdings" panose="05000000000000000000" pitchFamily="2" charset="2"/>
+              <a:buChar char="q"/>
+            </a:pPr>
+            <a:r>
+              <a:rPr lang="en-US" sz="3200" dirty="0">
+                <a:solidFill>
+                  <a:schemeClr val="tx1"/>
+                </a:solidFill>
+              </a:rPr>
+              <a:t>Housing Affordability.</a:t>
+            </a:r>
+          </a:p>
+          <a:p>
+            <a:pPr>
+              <a:buFont typeface="Wingdings" panose="05000000000000000000" pitchFamily="2" charset="2"/>
+              <a:buChar char="q"/>
+            </a:pPr>
+            <a:r>
+              <a:rPr lang="en-US" sz="3200" dirty="0">
+                <a:solidFill>
+                  <a:schemeClr val="tx1"/>
+                </a:solidFill>
+              </a:rPr>
+              <a:t> Others : Climate, Pollution etc.</a:t>
+            </a:r>
+          </a:p>
+          <a:p>
+            <a:pPr>
+              <a:buFont typeface="Wingdings" panose="05000000000000000000" pitchFamily="2" charset="2"/>
+              <a:buChar char="q"/>
             </a:pPr>
             <a:endParaRPr lang="en-US" dirty="0"/>
           </a:p>
           <a:p>
+            <a:pPr>
+              <a:buFont typeface="Wingdings" panose="05000000000000000000" pitchFamily="2" charset="2"/>
+              <a:buChar char="q"/>
+            </a:pPr>
+            <a:endParaRPr lang="en-US" dirty="0"/>
+          </a:p>
+          <a:p>
             <a:pPr marL="0" indent="0">
               <a:buNone/>
             </a:pPr>
-            <a:r>
-              <a:rPr lang="en-US" dirty="0"/>
-              <a:t>Note: The data is analyzed at the site level and aggregated at the city level in the final analysis.</a:t>
-            </a:r>
+            <a:endParaRPr lang="en-US" dirty="0"/>
           </a:p>
         </p:txBody>
       </p:sp>
     </p:spTree>
     <p:extLst>
       <p:ext uri="{BB962C8B-B14F-4D97-AF65-F5344CB8AC3E}">
-        <p14:creationId xmlns:p14="http://schemas.microsoft.com/office/powerpoint/2010/main" val="28752783"/>
+        <p14:creationId xmlns:p14="http://schemas.microsoft.com/office/powerpoint/2010/main" val="3770134055"/>
       </p:ext>
     </p:extLst>
   </p:cSld>
@@ -5671,7 +6452,7 @@
           <a:p>
             <a:r>
               <a:rPr lang="en-US" dirty="0"/>
-              <a:t>Primary Data Sources</a:t>
+              <a:t>Metrics At The Site Level</a:t>
             </a:r>
           </a:p>
         </p:txBody>
@@ -5692,7 +6473,12 @@
             <p:ph idx="1"/>
           </p:nvPr>
         </p:nvSpPr>
-        <p:spPr/>
+        <p:spPr>
+          <a:xfrm>
+            <a:off x="1097280" y="2382457"/>
+            <a:ext cx="10802277" cy="4819135"/>
+          </a:xfrm>
+        </p:spPr>
         <p:txBody>
           <a:bodyPr>
             <a:normAutofit/>
@@ -5701,41 +6487,58 @@
           <a:p>
             <a:pPr>
               <a:buFont typeface="Wingdings" panose="05000000000000000000" pitchFamily="2" charset="2"/>
-              <a:buChar char="§"/>
+              <a:buChar char="q"/>
             </a:pPr>
             <a:r>
-              <a:rPr lang="en-US" sz="3200" dirty="0"/>
-              <a:t> Census API : 2016 American Community 5 Year Survey</a:t>
+              <a:rPr lang="en-US" sz="3200" dirty="0">
+                <a:solidFill>
+                  <a:schemeClr val="tx1"/>
+                </a:solidFill>
+              </a:rPr>
+              <a:t>Schools and Colleges.</a:t>
             </a:r>
           </a:p>
           <a:p>
             <a:pPr>
               <a:buFont typeface="Wingdings" panose="05000000000000000000" pitchFamily="2" charset="2"/>
-              <a:buChar char="§"/>
+              <a:buChar char="q"/>
             </a:pPr>
             <a:r>
-              <a:rPr lang="en-US" sz="3200" dirty="0"/>
-              <a:t> Greater Schools API</a:t>
+              <a:rPr lang="en-US" sz="3200" dirty="0">
+                <a:solidFill>
+                  <a:schemeClr val="tx1"/>
+                </a:solidFill>
+              </a:rPr>
+              <a:t>Community/Quality of Life/Amenities. </a:t>
             </a:r>
           </a:p>
           <a:p>
             <a:pPr>
               <a:buFont typeface="Wingdings" panose="05000000000000000000" pitchFamily="2" charset="2"/>
-              <a:buChar char="§"/>
+              <a:buChar char="q"/>
             </a:pPr>
             <a:r>
-              <a:rPr lang="en-US" sz="3200" dirty="0"/>
-              <a:t> Google API </a:t>
-            </a:r>
-          </a:p>
-          <a:p>
-            <a:pPr>
-              <a:buFont typeface="Wingdings" panose="05000000000000000000" pitchFamily="2" charset="2"/>
-              <a:buChar char="§"/>
+              <a:rPr lang="en-US" sz="3200" dirty="0">
+                <a:solidFill>
+                  <a:schemeClr val="tx1"/>
+                </a:solidFill>
+              </a:rPr>
+              <a:t>Transportation Options.</a:t>
+            </a:r>
+          </a:p>
+          <a:p>
+            <a:pPr marL="0" indent="0">
+              <a:buNone/>
             </a:pPr>
-            <a:r>
-              <a:rPr lang="en-US" sz="3200" dirty="0"/>
-              <a:t>Walk Score API</a:t>
+            <a:endParaRPr lang="en-US" dirty="0"/>
+          </a:p>
+          <a:p>
+            <a:pPr marL="0" indent="0">
+              <a:buNone/>
+            </a:pPr>
+            <a:r>
+              <a:rPr lang="en-US" dirty="0"/>
+              <a:t>Note: The data is analyzed at the site level and aggregated at the city level in the final analysis.</a:t>
             </a:r>
           </a:p>
         </p:txBody>
@@ -5743,7 +6546,7 @@
     </p:spTree>
     <p:extLst>
       <p:ext uri="{BB962C8B-B14F-4D97-AF65-F5344CB8AC3E}">
-        <p14:creationId xmlns:p14="http://schemas.microsoft.com/office/powerpoint/2010/main" val="2596179842"/>
+        <p14:creationId xmlns:p14="http://schemas.microsoft.com/office/powerpoint/2010/main" val="28752783"/>
       </p:ext>
     </p:extLst>
   </p:cSld>
@@ -5786,6 +6589,128 @@
             <p:ph type="title"/>
           </p:nvPr>
         </p:nvSpPr>
+        <p:spPr/>
+        <p:txBody>
+          <a:bodyPr/>
+          <a:lstStyle/>
+          <a:p>
+            <a:r>
+              <a:rPr lang="en-US" dirty="0"/>
+              <a:t>Primary Data Sources</a:t>
+            </a:r>
+          </a:p>
+        </p:txBody>
+      </p:sp>
+      <p:sp>
+        <p:nvSpPr>
+          <p:cNvPr id="3" name="Content Placeholder 2">
+            <a:extLst>
+              <a:ext uri="{FF2B5EF4-FFF2-40B4-BE49-F238E27FC236}">
+                <a16:creationId xmlns:a16="http://schemas.microsoft.com/office/drawing/2014/main" id="{BEC8BDDB-FD44-4EB6-BE27-4A708B75BDAB}"/>
+              </a:ext>
+            </a:extLst>
+          </p:cNvPr>
+          <p:cNvSpPr>
+            <a:spLocks noGrp="1"/>
+          </p:cNvSpPr>
+          <p:nvPr>
+            <p:ph idx="1"/>
+          </p:nvPr>
+        </p:nvSpPr>
+        <p:spPr/>
+        <p:txBody>
+          <a:bodyPr>
+            <a:normAutofit/>
+          </a:bodyPr>
+          <a:lstStyle/>
+          <a:p>
+            <a:pPr>
+              <a:buFont typeface="Wingdings" panose="05000000000000000000" pitchFamily="2" charset="2"/>
+              <a:buChar char="§"/>
+            </a:pPr>
+            <a:r>
+              <a:rPr lang="en-US" sz="3200" dirty="0"/>
+              <a:t> Census API : 2016 American Community 5 Year Survey</a:t>
+            </a:r>
+          </a:p>
+          <a:p>
+            <a:pPr>
+              <a:buFont typeface="Wingdings" panose="05000000000000000000" pitchFamily="2" charset="2"/>
+              <a:buChar char="§"/>
+            </a:pPr>
+            <a:r>
+              <a:rPr lang="en-US" sz="3200" dirty="0"/>
+              <a:t> Greater Schools API</a:t>
+            </a:r>
+          </a:p>
+          <a:p>
+            <a:pPr>
+              <a:buFont typeface="Wingdings" panose="05000000000000000000" pitchFamily="2" charset="2"/>
+              <a:buChar char="§"/>
+            </a:pPr>
+            <a:r>
+              <a:rPr lang="en-US" sz="3200" dirty="0"/>
+              <a:t> Google API </a:t>
+            </a:r>
+          </a:p>
+          <a:p>
+            <a:pPr>
+              <a:buFont typeface="Wingdings" panose="05000000000000000000" pitchFamily="2" charset="2"/>
+              <a:buChar char="§"/>
+            </a:pPr>
+            <a:r>
+              <a:rPr lang="en-US" sz="3200" dirty="0"/>
+              <a:t>Walk Score API</a:t>
+            </a:r>
+          </a:p>
+        </p:txBody>
+      </p:sp>
+    </p:spTree>
+    <p:extLst>
+      <p:ext uri="{BB962C8B-B14F-4D97-AF65-F5344CB8AC3E}">
+        <p14:creationId xmlns:p14="http://schemas.microsoft.com/office/powerpoint/2010/main" val="2596179842"/>
+      </p:ext>
+    </p:extLst>
+  </p:cSld>
+  <p:clrMapOvr>
+    <a:masterClrMapping/>
+  </p:clrMapOvr>
+</p:sld>
+</file>
+
+<file path=ppt/slides/slide9.xml><?xml version="1.0" encoding="utf-8"?>
+<p:sld xmlns:a="http://schemas.openxmlformats.org/drawingml/2006/main" xmlns:r="http://schemas.openxmlformats.org/officeDocument/2006/relationships" xmlns:p="http://schemas.openxmlformats.org/presentationml/2006/main">
+  <p:cSld>
+    <p:spTree>
+      <p:nvGrpSpPr>
+        <p:cNvPr id="1" name=""/>
+        <p:cNvGrpSpPr/>
+        <p:nvPr/>
+      </p:nvGrpSpPr>
+      <p:grpSpPr>
+        <a:xfrm>
+          <a:off x="0" y="0"/>
+          <a:ext cx="0" cy="0"/>
+          <a:chOff x="0" y="0"/>
+          <a:chExt cx="0" cy="0"/>
+        </a:xfrm>
+      </p:grpSpPr>
+      <p:sp>
+        <p:nvSpPr>
+          <p:cNvPr id="2" name="Title 1">
+            <a:extLst>
+              <a:ext uri="{FF2B5EF4-FFF2-40B4-BE49-F238E27FC236}">
+                <a16:creationId xmlns:a16="http://schemas.microsoft.com/office/drawing/2014/main" id="{390EB264-3883-41F9-BACB-285D2229980C}"/>
+              </a:ext>
+            </a:extLst>
+          </p:cNvPr>
+          <p:cNvSpPr>
+            <a:spLocks noGrp="1"/>
+          </p:cNvSpPr>
+          <p:nvPr>
+            <p:ph type="title"/>
+          </p:nvPr>
+        </p:nvSpPr>
         <p:spPr>
           <a:xfrm>
             <a:off x="1097280" y="286603"/>
@@ -5886,146 +6811,6 @@
     <p:extLst>
       <p:ext uri="{BB962C8B-B14F-4D97-AF65-F5344CB8AC3E}">
         <p14:creationId xmlns:p14="http://schemas.microsoft.com/office/powerpoint/2010/main" val="3259915787"/>
-      </p:ext>
-    </p:extLst>
-  </p:cSld>
-  <p:clrMapOvr>
-    <a:masterClrMapping/>
-  </p:clrMapOvr>
-</p:sld>
-</file>
-
-<file path=ppt/slides/slide9.xml><?xml version="1.0" encoding="utf-8"?>
-<p:sld xmlns:a="http://schemas.openxmlformats.org/drawingml/2006/main" xmlns:r="http://schemas.openxmlformats.org/officeDocument/2006/relationships" xmlns:p="http://schemas.openxmlformats.org/presentationml/2006/main">
-  <p:cSld>
-    <p:spTree>
-      <p:nvGrpSpPr>
-        <p:cNvPr id="1" name=""/>
-        <p:cNvGrpSpPr/>
-        <p:nvPr/>
-      </p:nvGrpSpPr>
-      <p:grpSpPr>
-        <a:xfrm>
-          <a:off x="0" y="0"/>
-          <a:ext cx="0" cy="0"/>
-          <a:chOff x="0" y="0"/>
-          <a:chExt cx="0" cy="0"/>
-        </a:xfrm>
-      </p:grpSpPr>
-      <p:sp>
-        <p:nvSpPr>
-          <p:cNvPr id="2" name="Title 1">
-            <a:extLst>
-              <a:ext uri="{FF2B5EF4-FFF2-40B4-BE49-F238E27FC236}">
-                <a16:creationId xmlns:a16="http://schemas.microsoft.com/office/drawing/2014/main" id="{390EB264-3883-41F9-BACB-285D2229980C}"/>
-              </a:ext>
-            </a:extLst>
-          </p:cNvPr>
-          <p:cNvSpPr>
-            <a:spLocks noGrp="1"/>
-          </p:cNvSpPr>
-          <p:nvPr>
-            <p:ph type="title"/>
-          </p:nvPr>
-        </p:nvSpPr>
-        <p:spPr>
-          <a:xfrm>
-            <a:off x="1066799" y="-376048"/>
-            <a:ext cx="10058400" cy="1450757"/>
-          </a:xfrm>
-        </p:spPr>
-        <p:txBody>
-          <a:bodyPr/>
-          <a:lstStyle/>
-          <a:p>
-            <a:r>
-              <a:rPr lang="en-US" dirty="0"/>
-              <a:t>Talent Pool - Education</a:t>
-            </a:r>
-          </a:p>
-        </p:txBody>
-      </p:sp>
-      <p:pic>
-        <p:nvPicPr>
-          <p:cNvPr id="9" name="Picture 8">
-            <a:extLst>
-              <a:ext uri="{FF2B5EF4-FFF2-40B4-BE49-F238E27FC236}">
-                <a16:creationId xmlns:a16="http://schemas.microsoft.com/office/drawing/2014/main" id="{207048A4-7E15-4A7A-83D4-7F393FDAE879}"/>
-              </a:ext>
-            </a:extLst>
-          </p:cNvPr>
-          <p:cNvPicPr>
-            <a:picLocks noChangeAspect="1"/>
-          </p:cNvPicPr>
-          <p:nvPr/>
-        </p:nvPicPr>
-        <p:blipFill>
-          <a:blip r:embed="rId2">
-            <a:extLst>
-              <a:ext uri="{28A0092B-C50C-407E-A947-70E740481C1C}">
-                <a14:useLocalDpi xmlns:a14="http://schemas.microsoft.com/office/drawing/2010/main" val="0"/>
-              </a:ext>
-            </a:extLst>
-          </a:blip>
-          <a:stretch>
-            <a:fillRect/>
-          </a:stretch>
-        </p:blipFill>
-        <p:spPr>
-          <a:xfrm>
-            <a:off x="766118" y="1161535"/>
-            <a:ext cx="10730874" cy="4993085"/>
-          </a:xfrm>
-          <a:prstGeom prst="rect">
-            <a:avLst/>
-          </a:prstGeom>
-        </p:spPr>
-      </p:pic>
-      <p:cxnSp>
-        <p:nvCxnSpPr>
-          <p:cNvPr id="8" name="Straight Connector 7">
-            <a:extLst>
-              <a:ext uri="{FF2B5EF4-FFF2-40B4-BE49-F238E27FC236}">
-                <a16:creationId xmlns:a16="http://schemas.microsoft.com/office/drawing/2014/main" id="{D5D2E2BC-8AFC-496A-8DAF-5CC075C390DF}"/>
-              </a:ext>
-            </a:extLst>
-          </p:cNvPr>
-          <p:cNvCxnSpPr/>
-          <p:nvPr/>
-        </p:nvCxnSpPr>
-        <p:spPr>
-          <a:xfrm>
-            <a:off x="1186248" y="963827"/>
-            <a:ext cx="9069860" cy="0"/>
-          </a:xfrm>
-          <a:prstGeom prst="line">
-            <a:avLst/>
-          </a:prstGeom>
-          <a:ln>
-            <a:solidFill>
-              <a:srgbClr val="7030A0"/>
-            </a:solidFill>
-          </a:ln>
-        </p:spPr>
-        <p:style>
-          <a:lnRef idx="1">
-            <a:schemeClr val="accent1"/>
-          </a:lnRef>
-          <a:fillRef idx="0">
-            <a:schemeClr val="accent1"/>
-          </a:fillRef>
-          <a:effectRef idx="0">
-            <a:schemeClr val="accent1"/>
-          </a:effectRef>
-          <a:fontRef idx="minor">
-            <a:schemeClr val="tx1"/>
-          </a:fontRef>
-        </p:style>
-      </p:cxnSp>
-    </p:spTree>
-    <p:extLst>
-      <p:ext uri="{BB962C8B-B14F-4D97-AF65-F5344CB8AC3E}">
-        <p14:creationId xmlns:p14="http://schemas.microsoft.com/office/powerpoint/2010/main" val="732841463"/>
       </p:ext>
     </p:extLst>
   </p:cSld>

</xml_diff>

<commit_message>
add housing and schools data
</commit_message>
<xml_diff>
--- a/Project1_Presentation.pptx
+++ b/Project1_Presentation.pptx
@@ -21,10 +21,13 @@
     <p:sldId id="265" r:id="rId15"/>
     <p:sldId id="263" r:id="rId16"/>
     <p:sldId id="264" r:id="rId17"/>
-    <p:sldId id="274" r:id="rId18"/>
-    <p:sldId id="275" r:id="rId19"/>
-    <p:sldId id="261" r:id="rId20"/>
-    <p:sldId id="277" r:id="rId21"/>
+    <p:sldId id="285" r:id="rId18"/>
+    <p:sldId id="283" r:id="rId19"/>
+    <p:sldId id="280" r:id="rId20"/>
+    <p:sldId id="281" r:id="rId21"/>
+    <p:sldId id="275" r:id="rId22"/>
+    <p:sldId id="261" r:id="rId23"/>
+    <p:sldId id="277" r:id="rId24"/>
   </p:sldIdLst>
   <p:sldSz cx="12192000" cy="6858000"/>
   <p:notesSz cx="6858000" cy="9144000"/>
@@ -4880,7 +4883,7 @@
           <p:cNvPr id="2" name="Title 1">
             <a:extLst>
               <a:ext uri="{FF2B5EF4-FFF2-40B4-BE49-F238E27FC236}">
-                <a16:creationId xmlns:a16="http://schemas.microsoft.com/office/drawing/2014/main" id="{62B031C5-C960-5B4D-8E2C-2D0F0A1B9FA1}"/>
+                <a16:creationId xmlns:a16="http://schemas.microsoft.com/office/drawing/2014/main" id="{390EB264-3883-41F9-BACB-285D2229980C}"/>
               </a:ext>
             </a:extLst>
           </p:cNvPr>
@@ -4891,44 +4894,130 @@
             <p:ph type="title"/>
           </p:nvPr>
         </p:nvSpPr>
-        <p:spPr/>
-        <p:txBody>
-          <a:bodyPr/>
-          <a:lstStyle/>
-          <a:p>
-            <a:endParaRPr lang="en-US"/>
-          </a:p>
-        </p:txBody>
-      </p:sp>
-      <p:sp>
-        <p:nvSpPr>
-          <p:cNvPr id="3" name="Content Placeholder 2">
+        <p:spPr>
+          <a:xfrm>
+            <a:off x="1097280" y="286603"/>
+            <a:ext cx="10058400" cy="702409"/>
+          </a:xfrm>
+        </p:spPr>
+        <p:txBody>
+          <a:bodyPr>
+            <a:normAutofit fontScale="90000"/>
+          </a:bodyPr>
+          <a:lstStyle/>
+          <a:p>
+            <a:r>
+              <a:rPr lang="en-US" dirty="0"/>
+              <a:t>Housing affordability</a:t>
+            </a:r>
+          </a:p>
+        </p:txBody>
+      </p:sp>
+      <p:cxnSp>
+        <p:nvCxnSpPr>
+          <p:cNvPr id="8" name="Straight Connector 7">
             <a:extLst>
               <a:ext uri="{FF2B5EF4-FFF2-40B4-BE49-F238E27FC236}">
-                <a16:creationId xmlns:a16="http://schemas.microsoft.com/office/drawing/2014/main" id="{DBD9B124-9DE5-7043-8650-84022D10B125}"/>
+                <a16:creationId xmlns:a16="http://schemas.microsoft.com/office/drawing/2014/main" id="{6C869F70-ECD7-49B6-9EB0-C6173F280BD5}"/>
               </a:ext>
             </a:extLst>
           </p:cNvPr>
-          <p:cNvSpPr>
-            <a:spLocks noGrp="1"/>
-          </p:cNvSpPr>
-          <p:nvPr>
-            <p:ph idx="1"/>
-          </p:nvPr>
-        </p:nvSpPr>
-        <p:spPr/>
-        <p:txBody>
-          <a:bodyPr/>
-          <a:lstStyle/>
-          <a:p>
-            <a:endParaRPr lang="en-US"/>
-          </a:p>
-        </p:txBody>
-      </p:sp>
+          <p:cNvCxnSpPr/>
+          <p:nvPr/>
+        </p:nvCxnSpPr>
+        <p:spPr>
+          <a:xfrm>
+            <a:off x="1186248" y="963827"/>
+            <a:ext cx="9069860" cy="0"/>
+          </a:xfrm>
+          <a:prstGeom prst="line">
+            <a:avLst/>
+          </a:prstGeom>
+          <a:ln>
+            <a:solidFill>
+              <a:srgbClr val="7030A0"/>
+            </a:solidFill>
+          </a:ln>
+        </p:spPr>
+        <p:style>
+          <a:lnRef idx="1">
+            <a:schemeClr val="accent1"/>
+          </a:lnRef>
+          <a:fillRef idx="0">
+            <a:schemeClr val="accent1"/>
+          </a:fillRef>
+          <a:effectRef idx="0">
+            <a:schemeClr val="accent1"/>
+          </a:effectRef>
+          <a:fontRef idx="minor">
+            <a:schemeClr val="tx1"/>
+          </a:fontRef>
+        </p:style>
+      </p:cxnSp>
+      <p:pic>
+        <p:nvPicPr>
+          <p:cNvPr id="9" name="Content Placeholder 4">
+            <a:extLst>
+              <a:ext uri="{FF2B5EF4-FFF2-40B4-BE49-F238E27FC236}">
+                <a16:creationId xmlns:a16="http://schemas.microsoft.com/office/drawing/2014/main" id="{316CE2C2-1100-5141-936B-5BEA13C03286}"/>
+              </a:ext>
+            </a:extLst>
+          </p:cNvPr>
+          <p:cNvPicPr>
+            <a:picLocks noChangeAspect="1"/>
+          </p:cNvPicPr>
+          <p:nvPr/>
+        </p:nvPicPr>
+        <p:blipFill>
+          <a:blip r:embed="rId2"/>
+          <a:stretch>
+            <a:fillRect/>
+          </a:stretch>
+        </p:blipFill>
+        <p:spPr>
+          <a:xfrm>
+            <a:off x="6048704" y="1541147"/>
+            <a:ext cx="5690560" cy="3556600"/>
+          </a:xfrm>
+          <a:prstGeom prst="rect">
+            <a:avLst/>
+          </a:prstGeom>
+        </p:spPr>
+      </p:pic>
+      <p:pic>
+        <p:nvPicPr>
+          <p:cNvPr id="10" name="Picture 9">
+            <a:extLst>
+              <a:ext uri="{FF2B5EF4-FFF2-40B4-BE49-F238E27FC236}">
+                <a16:creationId xmlns:a16="http://schemas.microsoft.com/office/drawing/2014/main" id="{37B027CB-7464-4445-9FB7-0BFC631ADCE8}"/>
+              </a:ext>
+            </a:extLst>
+          </p:cNvPr>
+          <p:cNvPicPr>
+            <a:picLocks noChangeAspect="1"/>
+          </p:cNvPicPr>
+          <p:nvPr/>
+        </p:nvPicPr>
+        <p:blipFill>
+          <a:blip r:embed="rId3"/>
+          <a:stretch>
+            <a:fillRect/>
+          </a:stretch>
+        </p:blipFill>
+        <p:spPr>
+          <a:xfrm>
+            <a:off x="624760" y="1541147"/>
+            <a:ext cx="5232007" cy="3556600"/>
+          </a:xfrm>
+          <a:prstGeom prst="rect">
+            <a:avLst/>
+          </a:prstGeom>
+        </p:spPr>
+      </p:pic>
     </p:spTree>
     <p:extLst>
       <p:ext uri="{BB962C8B-B14F-4D97-AF65-F5344CB8AC3E}">
-        <p14:creationId xmlns:p14="http://schemas.microsoft.com/office/powerpoint/2010/main" val="1611496846"/>
+        <p14:creationId xmlns:p14="http://schemas.microsoft.com/office/powerpoint/2010/main" val="3191176588"/>
       </p:ext>
     </p:extLst>
   </p:cSld>
@@ -4960,7 +5049,7 @@
           <p:cNvPr id="2" name="Title 1">
             <a:extLst>
               <a:ext uri="{FF2B5EF4-FFF2-40B4-BE49-F238E27FC236}">
-                <a16:creationId xmlns:a16="http://schemas.microsoft.com/office/drawing/2014/main" id="{BD461D94-0D0F-0348-95E5-2A357932C23B}"/>
+                <a16:creationId xmlns:a16="http://schemas.microsoft.com/office/drawing/2014/main" id="{390EB264-3883-41F9-BACB-285D2229980C}"/>
               </a:ext>
             </a:extLst>
           </p:cNvPr>
@@ -4971,148 +5060,130 @@
             <p:ph type="title"/>
           </p:nvPr>
         </p:nvSpPr>
-        <p:spPr/>
-        <p:txBody>
-          <a:bodyPr/>
+        <p:spPr>
+          <a:xfrm>
+            <a:off x="1097280" y="286603"/>
+            <a:ext cx="10058400" cy="702409"/>
+          </a:xfrm>
+        </p:spPr>
+        <p:txBody>
+          <a:bodyPr>
+            <a:normAutofit fontScale="90000"/>
+          </a:bodyPr>
           <a:lstStyle/>
           <a:p>
             <a:r>
               <a:rPr lang="en-US" dirty="0"/>
-              <a:t>Nearby Amenities</a:t>
-            </a:r>
-          </a:p>
-        </p:txBody>
-      </p:sp>
-      <p:sp>
-        <p:nvSpPr>
-          <p:cNvPr id="3" name="Content Placeholder 2">
+              <a:t>Schools and College Ratings </a:t>
+            </a:r>
+          </a:p>
+        </p:txBody>
+      </p:sp>
+      <p:cxnSp>
+        <p:nvCxnSpPr>
+          <p:cNvPr id="4" name="Straight Connector 3">
             <a:extLst>
               <a:ext uri="{FF2B5EF4-FFF2-40B4-BE49-F238E27FC236}">
-                <a16:creationId xmlns:a16="http://schemas.microsoft.com/office/drawing/2014/main" id="{0AA20437-69DD-8C47-91EE-5EC495E32373}"/>
+                <a16:creationId xmlns:a16="http://schemas.microsoft.com/office/drawing/2014/main" id="{8FECCD07-FFA9-4129-95C2-D2F2CF8AD354}"/>
               </a:ext>
             </a:extLst>
           </p:cNvPr>
-          <p:cNvSpPr>
-            <a:spLocks noGrp="1"/>
-          </p:cNvSpPr>
-          <p:nvPr>
-            <p:ph idx="1"/>
-          </p:nvPr>
-        </p:nvSpPr>
-        <p:spPr>
-          <a:xfrm>
-            <a:off x="1097280" y="1845734"/>
-            <a:ext cx="10058400" cy="4463626"/>
-          </a:xfrm>
-        </p:spPr>
-        <p:txBody>
-          <a:bodyPr>
-            <a:normAutofit/>
-          </a:bodyPr>
-          <a:lstStyle/>
-          <a:p>
-            <a:r>
-              <a:rPr lang="en-US" sz="1800" dirty="0"/>
-              <a:t>  A. </a:t>
-            </a:r>
-            <a:r>
-              <a:rPr lang="en-US" sz="1800" b="1" i="1" dirty="0"/>
-              <a:t>Emergency Facilities </a:t>
-            </a:r>
-          </a:p>
-          <a:p>
-            <a:pPr lvl="1"/>
-            <a:r>
-              <a:rPr lang="en-US" dirty="0"/>
-              <a:t>How accessible are these facilities in case of mass emergency on/around sites for containing the situation and resuming business asap. Hospitals, Fire Stations, Doctors.</a:t>
-            </a:r>
-          </a:p>
-          <a:p>
-            <a:pPr marL="201168" lvl="1" indent="0">
-              <a:buNone/>
-            </a:pPr>
-            <a:r>
-              <a:rPr lang="en-US" dirty="0"/>
-              <a:t>B. </a:t>
-            </a:r>
-            <a:r>
-              <a:rPr lang="en-US" b="1" i="1" dirty="0"/>
-              <a:t>Accommodation </a:t>
-            </a:r>
-          </a:p>
-          <a:p>
-            <a:pPr lvl="1"/>
-            <a:r>
-              <a:rPr lang="en-US" dirty="0"/>
-              <a:t>Many executive employees travel from outside the city for few days a week and might need lodging facility as close to the company as possible. Also lot of local/not-local employees use vehicle for commute and will need parking nearby. Lodging, Parking.</a:t>
-            </a:r>
-          </a:p>
-          <a:p>
-            <a:pPr marL="201168" lvl="1" indent="0">
-              <a:buNone/>
-            </a:pPr>
-            <a:r>
-              <a:rPr lang="en-US" dirty="0"/>
-              <a:t>C. </a:t>
-            </a:r>
-            <a:r>
-              <a:rPr lang="en-US" b="1" i="1" dirty="0"/>
-              <a:t>Refreshments </a:t>
-            </a:r>
-          </a:p>
-          <a:p>
-            <a:pPr lvl="1"/>
-            <a:r>
-              <a:rPr lang="en-US" dirty="0"/>
-              <a:t>Basic Refreshment facilities. Café, Restaurants.</a:t>
-            </a:r>
-          </a:p>
-          <a:p>
-            <a:pPr marL="201168" lvl="1" indent="0">
-              <a:buNone/>
-            </a:pPr>
-            <a:r>
-              <a:rPr lang="en-US" dirty="0"/>
-              <a:t>D. </a:t>
-            </a:r>
-            <a:r>
-              <a:rPr lang="en-US" b="1" i="1" dirty="0"/>
-              <a:t>Basic Errands/appointments</a:t>
-            </a:r>
-          </a:p>
-          <a:p>
-            <a:pPr lvl="1"/>
-            <a:r>
-              <a:rPr lang="en-US" dirty="0"/>
-              <a:t>By large employees tend to take care of daily errands and appointments in lunch breaks or before/after work hours and prefer it to be as close to work as possible for obvious reasons. Super markets, Post Office, Doctor.</a:t>
-            </a:r>
-          </a:p>
-          <a:p>
-            <a:pPr marL="201168" lvl="1" indent="0">
-              <a:buNone/>
-            </a:pPr>
-            <a:r>
-              <a:rPr lang="en-US" dirty="0"/>
-              <a:t>E. </a:t>
-            </a:r>
-            <a:r>
-              <a:rPr lang="en-US" b="1" i="1" dirty="0"/>
-              <a:t>Fitness </a:t>
-            </a:r>
-          </a:p>
-          <a:p>
-            <a:pPr lvl="1"/>
-            <a:r>
-              <a:rPr lang="en-US" dirty="0"/>
-              <a:t>Fitness is top on priority list for a significant amount of employees now a days. Gym.</a:t>
-            </a:r>
-          </a:p>
-        </p:txBody>
-      </p:sp>
+          <p:cNvCxnSpPr/>
+          <p:nvPr/>
+        </p:nvCxnSpPr>
+        <p:spPr>
+          <a:xfrm>
+            <a:off x="1248032" y="902043"/>
+            <a:ext cx="9069860" cy="0"/>
+          </a:xfrm>
+          <a:prstGeom prst="line">
+            <a:avLst/>
+          </a:prstGeom>
+          <a:ln>
+            <a:solidFill>
+              <a:srgbClr val="7030A0"/>
+            </a:solidFill>
+          </a:ln>
+        </p:spPr>
+        <p:style>
+          <a:lnRef idx="1">
+            <a:schemeClr val="accent1"/>
+          </a:lnRef>
+          <a:fillRef idx="0">
+            <a:schemeClr val="accent1"/>
+          </a:fillRef>
+          <a:effectRef idx="0">
+            <a:schemeClr val="accent1"/>
+          </a:effectRef>
+          <a:fontRef idx="minor">
+            <a:schemeClr val="tx1"/>
+          </a:fontRef>
+        </p:style>
+      </p:cxnSp>
+      <p:pic>
+        <p:nvPicPr>
+          <p:cNvPr id="9" name="Content Placeholder 4">
+            <a:extLst>
+              <a:ext uri="{FF2B5EF4-FFF2-40B4-BE49-F238E27FC236}">
+                <a16:creationId xmlns:a16="http://schemas.microsoft.com/office/drawing/2014/main" id="{698DF2E5-2099-9844-9B45-EA0859950015}"/>
+              </a:ext>
+            </a:extLst>
+          </p:cNvPr>
+          <p:cNvPicPr>
+            <a:picLocks noChangeAspect="1"/>
+          </p:cNvPicPr>
+          <p:nvPr/>
+        </p:nvPicPr>
+        <p:blipFill>
+          <a:blip r:embed="rId2"/>
+          <a:stretch>
+            <a:fillRect/>
+          </a:stretch>
+        </p:blipFill>
+        <p:spPr>
+          <a:xfrm>
+            <a:off x="378346" y="1869606"/>
+            <a:ext cx="6022454" cy="3207879"/>
+          </a:xfrm>
+          <a:prstGeom prst="rect">
+            <a:avLst/>
+          </a:prstGeom>
+        </p:spPr>
+      </p:pic>
+      <p:pic>
+        <p:nvPicPr>
+          <p:cNvPr id="10" name="Picture 9">
+            <a:extLst>
+              <a:ext uri="{FF2B5EF4-FFF2-40B4-BE49-F238E27FC236}">
+                <a16:creationId xmlns:a16="http://schemas.microsoft.com/office/drawing/2014/main" id="{49913E3E-1338-2C43-9C9A-8AD5280CEF7A}"/>
+              </a:ext>
+            </a:extLst>
+          </p:cNvPr>
+          <p:cNvPicPr>
+            <a:picLocks noChangeAspect="1"/>
+          </p:cNvPicPr>
+          <p:nvPr/>
+        </p:nvPicPr>
+        <p:blipFill>
+          <a:blip r:embed="rId3"/>
+          <a:stretch>
+            <a:fillRect/>
+          </a:stretch>
+        </p:blipFill>
+        <p:spPr>
+          <a:xfrm>
+            <a:off x="6126480" y="1926607"/>
+            <a:ext cx="6094181" cy="3150877"/>
+          </a:xfrm>
+          <a:prstGeom prst="rect">
+            <a:avLst/>
+          </a:prstGeom>
+        </p:spPr>
+      </p:pic>
     </p:spTree>
     <p:extLst>
       <p:ext uri="{BB962C8B-B14F-4D97-AF65-F5344CB8AC3E}">
-        <p14:creationId xmlns:p14="http://schemas.microsoft.com/office/powerpoint/2010/main" val="660619397"/>
+        <p14:creationId xmlns:p14="http://schemas.microsoft.com/office/powerpoint/2010/main" val="512218618"/>
       </p:ext>
     </p:extLst>
   </p:cSld>
@@ -5139,79 +5210,305 @@
           <a:chExt cx="0" cy="0"/>
         </a:xfrm>
       </p:grpSpPr>
-      <p:pic>
-        <p:nvPicPr>
-          <p:cNvPr id="5" name="Content Placeholder 4">
+      <p:sp>
+        <p:nvSpPr>
+          <p:cNvPr id="2" name="Title 1">
             <a:extLst>
               <a:ext uri="{FF2B5EF4-FFF2-40B4-BE49-F238E27FC236}">
-                <a16:creationId xmlns:a16="http://schemas.microsoft.com/office/drawing/2014/main" id="{E68C87D7-7462-FC4E-AD8D-476C5861BE45}"/>
+                <a16:creationId xmlns:a16="http://schemas.microsoft.com/office/drawing/2014/main" id="{390EB264-3883-41F9-BACB-285D2229980C}"/>
               </a:ext>
             </a:extLst>
           </p:cNvPr>
-          <p:cNvPicPr>
-            <a:picLocks noGrp="1" noChangeAspect="1"/>
-          </p:cNvPicPr>
-          <p:nvPr>
-            <p:ph idx="1"/>
-          </p:nvPr>
-        </p:nvPicPr>
-        <p:blipFill rotWithShape="1">
-          <a:blip r:embed="rId2">
-            <a:extLst>
-              <a:ext uri="{28A0092B-C50C-407E-A947-70E740481C1C}">
-                <a14:useLocalDpi xmlns:a14="http://schemas.microsoft.com/office/drawing/2010/main" val="0"/>
-              </a:ext>
-            </a:extLst>
-          </a:blip>
-          <a:srcRect b="5163"/>
-          <a:stretch/>
-        </p:blipFill>
-        <p:spPr>
-          <a:xfrm>
-            <a:off x="1497330" y="3371850"/>
-            <a:ext cx="8341355" cy="2948940"/>
-          </a:xfrm>
-        </p:spPr>
-      </p:pic>
-      <p:pic>
-        <p:nvPicPr>
-          <p:cNvPr id="10" name="Picture 9">
+          <p:cNvSpPr>
+            <a:spLocks noGrp="1"/>
+          </p:cNvSpPr>
+          <p:nvPr>
+            <p:ph type="title"/>
+          </p:nvPr>
+        </p:nvSpPr>
+        <p:spPr/>
+        <p:txBody>
+          <a:bodyPr/>
+          <a:lstStyle/>
+          <a:p>
+            <a:r>
+              <a:rPr lang="en-US" dirty="0"/>
+              <a:t>Findings </a:t>
+            </a:r>
+          </a:p>
+        </p:txBody>
+      </p:sp>
+      <p:sp>
+        <p:nvSpPr>
+          <p:cNvPr id="4" name="TextBox 3">
             <a:extLst>
               <a:ext uri="{FF2B5EF4-FFF2-40B4-BE49-F238E27FC236}">
-                <a16:creationId xmlns:a16="http://schemas.microsoft.com/office/drawing/2014/main" id="{68C90698-9174-B640-B74F-58469ECFAFB4}"/>
+                <a16:creationId xmlns:a16="http://schemas.microsoft.com/office/drawing/2014/main" id="{8B6D276C-B2CA-BF4E-8EC8-2BE0DA1C262E}"/>
               </a:ext>
             </a:extLst>
           </p:cNvPr>
-          <p:cNvPicPr>
-            <a:picLocks noChangeAspect="1"/>
-          </p:cNvPicPr>
+          <p:cNvSpPr txBox="1"/>
           <p:nvPr/>
-        </p:nvPicPr>
-        <p:blipFill rotWithShape="1">
-          <a:blip r:embed="rId3">
-            <a:extLst>
-              <a:ext uri="{28A0092B-C50C-407E-A947-70E740481C1C}">
-                <a14:useLocalDpi xmlns:a14="http://schemas.microsoft.com/office/drawing/2010/main" val="0"/>
-              </a:ext>
-            </a:extLst>
-          </a:blip>
-          <a:srcRect b="4789"/>
-          <a:stretch/>
-        </p:blipFill>
-        <p:spPr>
-          <a:xfrm>
-            <a:off x="1497330" y="0"/>
-            <a:ext cx="8469630" cy="3009085"/>
+        </p:nvSpPr>
+        <p:spPr>
+          <a:xfrm>
+            <a:off x="991114" y="1899260"/>
+            <a:ext cx="4527184" cy="4985980"/>
           </a:xfrm>
           <a:prstGeom prst="rect">
             <a:avLst/>
           </a:prstGeom>
-        </p:spPr>
-      </p:pic>
+          <a:noFill/>
+        </p:spPr>
+        <p:txBody>
+          <a:bodyPr wrap="square" rtlCol="0">
+            <a:spAutoFit/>
+          </a:bodyPr>
+          <a:lstStyle/>
+          <a:p>
+            <a:r>
+              <a:rPr lang="en-US" b="1" dirty="0"/>
+              <a:t>Home ownership and rent</a:t>
+            </a:r>
+          </a:p>
+          <a:p>
+            <a:r>
+              <a:rPr lang="en-US" dirty="0"/>
+              <a:t>API: used Census 2016 data</a:t>
+            </a:r>
+          </a:p>
+          <a:p>
+            <a:r>
+              <a:rPr lang="en-US" dirty="0"/>
+              <a:t>Process: </a:t>
+            </a:r>
+          </a:p>
+          <a:p>
+            <a:pPr marL="285750" indent="-285750">
+              <a:buFont typeface="Arial" panose="020B0604020202020204" pitchFamily="34" charset="0"/>
+              <a:buChar char="•"/>
+            </a:pPr>
+            <a:r>
+              <a:rPr lang="en-US" dirty="0"/>
+              <a:t>Collected median data for housing cost and income by City (defined as Locations in the Census data)</a:t>
+            </a:r>
+          </a:p>
+          <a:p>
+            <a:pPr marL="285750" indent="-285750">
+              <a:buFont typeface="Arial" panose="020B0604020202020204" pitchFamily="34" charset="0"/>
+              <a:buChar char="•"/>
+            </a:pPr>
+            <a:r>
+              <a:rPr lang="en-US" dirty="0"/>
+              <a:t>Defined estimate for affordability as housing cost / income. The lower the value the better the location.</a:t>
+            </a:r>
+          </a:p>
+          <a:p>
+            <a:r>
+              <a:rPr lang="en-US" dirty="0"/>
+              <a:t>Results: Consistent trend of home ownership and rent costs. Raleigh, Austin, and Washington ranked top 3</a:t>
+            </a:r>
+          </a:p>
+          <a:p>
+            <a:endParaRPr lang="en-US" dirty="0"/>
+          </a:p>
+          <a:p>
+            <a:r>
+              <a:rPr lang="en-US" sz="1200" dirty="0"/>
+              <a:t>Notebook: </a:t>
+            </a:r>
+            <a:r>
+              <a:rPr lang="en-US" sz="1200" dirty="0">
+                <a:hlinkClick r:id="rId2"/>
+              </a:rPr>
+              <a:t>https://github.com/indranik/BC_Project1/blob/master/HousingSchools/housing_results.ipynb</a:t>
+            </a:r>
+            <a:endParaRPr lang="en-US" sz="1200" dirty="0"/>
+          </a:p>
+          <a:p>
+            <a:endParaRPr lang="en-US" dirty="0"/>
+          </a:p>
+          <a:p>
+            <a:endParaRPr lang="en-US" dirty="0"/>
+          </a:p>
+        </p:txBody>
+      </p:sp>
+      <p:sp>
+        <p:nvSpPr>
+          <p:cNvPr id="5" name="TextBox 4">
+            <a:extLst>
+              <a:ext uri="{FF2B5EF4-FFF2-40B4-BE49-F238E27FC236}">
+                <a16:creationId xmlns:a16="http://schemas.microsoft.com/office/drawing/2014/main" id="{3BA14653-B2B1-CD45-8B17-02CC1E3ABB40}"/>
+              </a:ext>
+            </a:extLst>
+          </p:cNvPr>
+          <p:cNvSpPr txBox="1"/>
+          <p:nvPr/>
+        </p:nvSpPr>
+        <p:spPr>
+          <a:xfrm>
+            <a:off x="6429043" y="1899260"/>
+            <a:ext cx="4604402" cy="2031325"/>
+          </a:xfrm>
+          <a:prstGeom prst="rect">
+            <a:avLst/>
+          </a:prstGeom>
+          <a:noFill/>
+        </p:spPr>
+        <p:txBody>
+          <a:bodyPr wrap="none" rtlCol="0">
+            <a:spAutoFit/>
+          </a:bodyPr>
+          <a:lstStyle/>
+          <a:p>
+            <a:r>
+              <a:rPr lang="en-US" b="1" dirty="0"/>
+              <a:t>Nearby K-12 schools for site location</a:t>
+            </a:r>
+          </a:p>
+          <a:p>
+            <a:r>
+              <a:rPr lang="en-US" dirty="0"/>
+              <a:t>API: Great Schools API</a:t>
+            </a:r>
+          </a:p>
+          <a:p>
+            <a:r>
+              <a:rPr lang="en-US" dirty="0"/>
+              <a:t>Using: State and zip code information</a:t>
+            </a:r>
+          </a:p>
+          <a:p>
+            <a:r>
+              <a:rPr lang="en-US" dirty="0"/>
+              <a:t>Process: Average school rating per city and sort</a:t>
+            </a:r>
+          </a:p>
+          <a:p>
+            <a:r>
+              <a:rPr lang="en-US" dirty="0"/>
+              <a:t>Results: Austin, LA, Atlanta ranked higher</a:t>
+            </a:r>
+          </a:p>
+          <a:p>
+            <a:endParaRPr lang="en-US" dirty="0"/>
+          </a:p>
+          <a:p>
+            <a:endParaRPr lang="en-US" dirty="0"/>
+          </a:p>
+        </p:txBody>
+      </p:sp>
+      <p:sp>
+        <p:nvSpPr>
+          <p:cNvPr id="6" name="TextBox 5">
+            <a:extLst>
+              <a:ext uri="{FF2B5EF4-FFF2-40B4-BE49-F238E27FC236}">
+                <a16:creationId xmlns:a16="http://schemas.microsoft.com/office/drawing/2014/main" id="{A9AC4C7E-AEF8-EB43-BBAF-9297C2872E05}"/>
+              </a:ext>
+            </a:extLst>
+          </p:cNvPr>
+          <p:cNvSpPr txBox="1"/>
+          <p:nvPr/>
+        </p:nvSpPr>
+        <p:spPr>
+          <a:xfrm>
+            <a:off x="6429043" y="3584560"/>
+            <a:ext cx="4420762" cy="1754326"/>
+          </a:xfrm>
+          <a:prstGeom prst="rect">
+            <a:avLst/>
+          </a:prstGeom>
+          <a:noFill/>
+        </p:spPr>
+        <p:txBody>
+          <a:bodyPr wrap="none" rtlCol="0">
+            <a:spAutoFit/>
+          </a:bodyPr>
+          <a:lstStyle/>
+          <a:p>
+            <a:r>
+              <a:rPr lang="en-US" b="1" dirty="0"/>
+              <a:t>Nearby Colleges for site location</a:t>
+            </a:r>
+          </a:p>
+          <a:p>
+            <a:r>
+              <a:rPr lang="en-US" dirty="0"/>
+              <a:t>API: Google Search</a:t>
+            </a:r>
+          </a:p>
+          <a:p>
+            <a:r>
+              <a:rPr lang="en-US" dirty="0"/>
+              <a:t>Using: Latitude and Longitude information</a:t>
+            </a:r>
+          </a:p>
+          <a:p>
+            <a:r>
+              <a:rPr lang="en-US" dirty="0"/>
+              <a:t>Process: Average site ratings per city and sort</a:t>
+            </a:r>
+          </a:p>
+          <a:p>
+            <a:r>
+              <a:rPr lang="en-US" dirty="0"/>
+              <a:t>Results: Raleigh, LA, Atlanta ranked higher</a:t>
+            </a:r>
+          </a:p>
+          <a:p>
+            <a:endParaRPr lang="en-US" dirty="0"/>
+          </a:p>
+        </p:txBody>
+      </p:sp>
+      <p:sp>
+        <p:nvSpPr>
+          <p:cNvPr id="8" name="TextBox 7">
+            <a:extLst>
+              <a:ext uri="{FF2B5EF4-FFF2-40B4-BE49-F238E27FC236}">
+                <a16:creationId xmlns:a16="http://schemas.microsoft.com/office/drawing/2014/main" id="{01D08F11-1D2E-1D45-85FC-54676BCAE248}"/>
+              </a:ext>
+            </a:extLst>
+          </p:cNvPr>
+          <p:cNvSpPr txBox="1"/>
+          <p:nvPr/>
+        </p:nvSpPr>
+        <p:spPr>
+          <a:xfrm>
+            <a:off x="6506392" y="5456994"/>
+            <a:ext cx="5008669" cy="923330"/>
+          </a:xfrm>
+          <a:prstGeom prst="rect">
+            <a:avLst/>
+          </a:prstGeom>
+          <a:noFill/>
+        </p:spPr>
+        <p:txBody>
+          <a:bodyPr wrap="square" rtlCol="0">
+            <a:spAutoFit/>
+          </a:bodyPr>
+          <a:lstStyle/>
+          <a:p>
+            <a:r>
+              <a:rPr lang="en-US" sz="1200" dirty="0"/>
+              <a:t>Notebook: </a:t>
+            </a:r>
+            <a:r>
+              <a:rPr lang="en-US" sz="1200" dirty="0">
+                <a:hlinkClick r:id="rId3"/>
+              </a:rPr>
+              <a:t>https://github.com/indranik/BC_Project1/blob/master/HousingSchools/schools_results.ipynb</a:t>
+            </a:r>
+            <a:endParaRPr lang="en-US" sz="1200" dirty="0"/>
+          </a:p>
+          <a:p>
+            <a:endParaRPr lang="en-US" dirty="0"/>
+          </a:p>
+        </p:txBody>
+      </p:sp>
     </p:spTree>
     <p:extLst>
       <p:ext uri="{BB962C8B-B14F-4D97-AF65-F5344CB8AC3E}">
-        <p14:creationId xmlns:p14="http://schemas.microsoft.com/office/powerpoint/2010/main" val="3344394509"/>
+        <p14:creationId xmlns:p14="http://schemas.microsoft.com/office/powerpoint/2010/main" val="4004922827"/>
       </p:ext>
     </p:extLst>
   </p:cSld>
@@ -5394,6 +5691,372 @@
 </file>
 
 <file path=ppt/slides/slide20.xml><?xml version="1.0" encoding="utf-8"?>
+<p:sld xmlns:a="http://schemas.openxmlformats.org/drawingml/2006/main" xmlns:r="http://schemas.openxmlformats.org/officeDocument/2006/relationships" xmlns:p="http://schemas.openxmlformats.org/presentationml/2006/main">
+  <p:cSld>
+    <p:spTree>
+      <p:nvGrpSpPr>
+        <p:cNvPr id="1" name=""/>
+        <p:cNvGrpSpPr/>
+        <p:nvPr/>
+      </p:nvGrpSpPr>
+      <p:grpSpPr>
+        <a:xfrm>
+          <a:off x="0" y="0"/>
+          <a:ext cx="0" cy="0"/>
+          <a:chOff x="0" y="0"/>
+          <a:chExt cx="0" cy="0"/>
+        </a:xfrm>
+      </p:grpSpPr>
+      <p:sp>
+        <p:nvSpPr>
+          <p:cNvPr id="2" name="Title 1">
+            <a:extLst>
+              <a:ext uri="{FF2B5EF4-FFF2-40B4-BE49-F238E27FC236}">
+                <a16:creationId xmlns:a16="http://schemas.microsoft.com/office/drawing/2014/main" id="{390EB264-3883-41F9-BACB-285D2229980C}"/>
+              </a:ext>
+            </a:extLst>
+          </p:cNvPr>
+          <p:cNvSpPr>
+            <a:spLocks noGrp="1"/>
+          </p:cNvSpPr>
+          <p:nvPr>
+            <p:ph type="title"/>
+          </p:nvPr>
+        </p:nvSpPr>
+        <p:spPr/>
+        <p:txBody>
+          <a:bodyPr/>
+          <a:lstStyle/>
+          <a:p>
+            <a:r>
+              <a:rPr lang="en-US" dirty="0"/>
+              <a:t>Lessons learnt </a:t>
+            </a:r>
+          </a:p>
+        </p:txBody>
+      </p:sp>
+      <p:sp>
+        <p:nvSpPr>
+          <p:cNvPr id="3" name="Content Placeholder 2">
+            <a:extLst>
+              <a:ext uri="{FF2B5EF4-FFF2-40B4-BE49-F238E27FC236}">
+                <a16:creationId xmlns:a16="http://schemas.microsoft.com/office/drawing/2014/main" id="{BEC8BDDB-FD44-4EB6-BE27-4A708B75BDAB}"/>
+              </a:ext>
+            </a:extLst>
+          </p:cNvPr>
+          <p:cNvSpPr>
+            <a:spLocks noGrp="1"/>
+          </p:cNvSpPr>
+          <p:nvPr>
+            <p:ph idx="1"/>
+          </p:nvPr>
+        </p:nvSpPr>
+        <p:spPr/>
+        <p:txBody>
+          <a:bodyPr/>
+          <a:lstStyle/>
+          <a:p>
+            <a:endParaRPr lang="en-US" dirty="0"/>
+          </a:p>
+        </p:txBody>
+      </p:sp>
+    </p:spTree>
+    <p:extLst>
+      <p:ext uri="{BB962C8B-B14F-4D97-AF65-F5344CB8AC3E}">
+        <p14:creationId xmlns:p14="http://schemas.microsoft.com/office/powerpoint/2010/main" val="2977691450"/>
+      </p:ext>
+    </p:extLst>
+  </p:cSld>
+  <p:clrMapOvr>
+    <a:masterClrMapping/>
+  </p:clrMapOvr>
+</p:sld>
+</file>
+
+<file path=ppt/slides/slide21.xml><?xml version="1.0" encoding="utf-8"?>
+<p:sld xmlns:a="http://schemas.openxmlformats.org/drawingml/2006/main" xmlns:r="http://schemas.openxmlformats.org/officeDocument/2006/relationships" xmlns:p="http://schemas.openxmlformats.org/presentationml/2006/main">
+  <p:cSld>
+    <p:spTree>
+      <p:nvGrpSpPr>
+        <p:cNvPr id="1" name=""/>
+        <p:cNvGrpSpPr/>
+        <p:nvPr/>
+      </p:nvGrpSpPr>
+      <p:grpSpPr>
+        <a:xfrm>
+          <a:off x="0" y="0"/>
+          <a:ext cx="0" cy="0"/>
+          <a:chOff x="0" y="0"/>
+          <a:chExt cx="0" cy="0"/>
+        </a:xfrm>
+      </p:grpSpPr>
+      <p:sp>
+        <p:nvSpPr>
+          <p:cNvPr id="2" name="Title 1">
+            <a:extLst>
+              <a:ext uri="{FF2B5EF4-FFF2-40B4-BE49-F238E27FC236}">
+                <a16:creationId xmlns:a16="http://schemas.microsoft.com/office/drawing/2014/main" id="{BD461D94-0D0F-0348-95E5-2A357932C23B}"/>
+              </a:ext>
+            </a:extLst>
+          </p:cNvPr>
+          <p:cNvSpPr>
+            <a:spLocks noGrp="1"/>
+          </p:cNvSpPr>
+          <p:nvPr>
+            <p:ph type="title"/>
+          </p:nvPr>
+        </p:nvSpPr>
+        <p:spPr/>
+        <p:txBody>
+          <a:bodyPr/>
+          <a:lstStyle/>
+          <a:p>
+            <a:r>
+              <a:rPr lang="en-US" dirty="0"/>
+              <a:t>Nearby Amenities</a:t>
+            </a:r>
+          </a:p>
+        </p:txBody>
+      </p:sp>
+      <p:sp>
+        <p:nvSpPr>
+          <p:cNvPr id="3" name="Content Placeholder 2">
+            <a:extLst>
+              <a:ext uri="{FF2B5EF4-FFF2-40B4-BE49-F238E27FC236}">
+                <a16:creationId xmlns:a16="http://schemas.microsoft.com/office/drawing/2014/main" id="{0AA20437-69DD-8C47-91EE-5EC495E32373}"/>
+              </a:ext>
+            </a:extLst>
+          </p:cNvPr>
+          <p:cNvSpPr>
+            <a:spLocks noGrp="1"/>
+          </p:cNvSpPr>
+          <p:nvPr>
+            <p:ph idx="1"/>
+          </p:nvPr>
+        </p:nvSpPr>
+        <p:spPr>
+          <a:xfrm>
+            <a:off x="1097280" y="1845734"/>
+            <a:ext cx="10058400" cy="4463626"/>
+          </a:xfrm>
+        </p:spPr>
+        <p:txBody>
+          <a:bodyPr>
+            <a:normAutofit/>
+          </a:bodyPr>
+          <a:lstStyle/>
+          <a:p>
+            <a:r>
+              <a:rPr lang="en-US" sz="1800" dirty="0"/>
+              <a:t>  A. </a:t>
+            </a:r>
+            <a:r>
+              <a:rPr lang="en-US" sz="1800" b="1" i="1" dirty="0"/>
+              <a:t>Emergency Facilities </a:t>
+            </a:r>
+          </a:p>
+          <a:p>
+            <a:pPr lvl="1"/>
+            <a:r>
+              <a:rPr lang="en-US" dirty="0"/>
+              <a:t>How accessible are these facilities in case of mass emergency on/around sites for containing the situation and resuming business asap. Hospitals, Fire Stations, Doctors.</a:t>
+            </a:r>
+          </a:p>
+          <a:p>
+            <a:pPr marL="201168" lvl="1" indent="0">
+              <a:buNone/>
+            </a:pPr>
+            <a:r>
+              <a:rPr lang="en-US" dirty="0"/>
+              <a:t>B. </a:t>
+            </a:r>
+            <a:r>
+              <a:rPr lang="en-US" b="1" i="1" dirty="0"/>
+              <a:t>Accommodation </a:t>
+            </a:r>
+          </a:p>
+          <a:p>
+            <a:pPr lvl="1"/>
+            <a:r>
+              <a:rPr lang="en-US" dirty="0"/>
+              <a:t>Many executive employees travel from outside the city for few days a week and might need lodging facility as close to the company as possible. Also lot of local/not-local employees use vehicle for commute and will need parking nearby. Lodging, Parking.</a:t>
+            </a:r>
+          </a:p>
+          <a:p>
+            <a:pPr marL="201168" lvl="1" indent="0">
+              <a:buNone/>
+            </a:pPr>
+            <a:r>
+              <a:rPr lang="en-US" dirty="0"/>
+              <a:t>C. </a:t>
+            </a:r>
+            <a:r>
+              <a:rPr lang="en-US" b="1" i="1" dirty="0"/>
+              <a:t>Refreshments </a:t>
+            </a:r>
+          </a:p>
+          <a:p>
+            <a:pPr lvl="1"/>
+            <a:r>
+              <a:rPr lang="en-US" dirty="0"/>
+              <a:t>Basic Refreshment facilities. Café, Restaurants.</a:t>
+            </a:r>
+          </a:p>
+          <a:p>
+            <a:pPr marL="201168" lvl="1" indent="0">
+              <a:buNone/>
+            </a:pPr>
+            <a:r>
+              <a:rPr lang="en-US" dirty="0"/>
+              <a:t>D. </a:t>
+            </a:r>
+            <a:r>
+              <a:rPr lang="en-US" b="1" i="1" dirty="0"/>
+              <a:t>Basic Errands/appointments</a:t>
+            </a:r>
+          </a:p>
+          <a:p>
+            <a:pPr lvl="1"/>
+            <a:r>
+              <a:rPr lang="en-US" dirty="0"/>
+              <a:t>By large employees tend to take care of daily errands and appointments in lunch breaks or before/after work hours and prefer it to be as close to work as possible for obvious reasons. Super markets, Post Office, Doctor.</a:t>
+            </a:r>
+          </a:p>
+          <a:p>
+            <a:pPr marL="201168" lvl="1" indent="0">
+              <a:buNone/>
+            </a:pPr>
+            <a:r>
+              <a:rPr lang="en-US" dirty="0"/>
+              <a:t>E. </a:t>
+            </a:r>
+            <a:r>
+              <a:rPr lang="en-US" b="1" i="1" dirty="0"/>
+              <a:t>Fitness </a:t>
+            </a:r>
+          </a:p>
+          <a:p>
+            <a:pPr lvl="1"/>
+            <a:r>
+              <a:rPr lang="en-US" dirty="0"/>
+              <a:t>Fitness is top on priority list for a significant amount of employees now a days. Gym.</a:t>
+            </a:r>
+          </a:p>
+        </p:txBody>
+      </p:sp>
+    </p:spTree>
+    <p:extLst>
+      <p:ext uri="{BB962C8B-B14F-4D97-AF65-F5344CB8AC3E}">
+        <p14:creationId xmlns:p14="http://schemas.microsoft.com/office/powerpoint/2010/main" val="660619397"/>
+      </p:ext>
+    </p:extLst>
+  </p:cSld>
+  <p:clrMapOvr>
+    <a:masterClrMapping/>
+  </p:clrMapOvr>
+</p:sld>
+</file>
+
+<file path=ppt/slides/slide22.xml><?xml version="1.0" encoding="utf-8"?>
+<p:sld xmlns:a="http://schemas.openxmlformats.org/drawingml/2006/main" xmlns:r="http://schemas.openxmlformats.org/officeDocument/2006/relationships" xmlns:p="http://schemas.openxmlformats.org/presentationml/2006/main">
+  <p:cSld>
+    <p:spTree>
+      <p:nvGrpSpPr>
+        <p:cNvPr id="1" name=""/>
+        <p:cNvGrpSpPr/>
+        <p:nvPr/>
+      </p:nvGrpSpPr>
+      <p:grpSpPr>
+        <a:xfrm>
+          <a:off x="0" y="0"/>
+          <a:ext cx="0" cy="0"/>
+          <a:chOff x="0" y="0"/>
+          <a:chExt cx="0" cy="0"/>
+        </a:xfrm>
+      </p:grpSpPr>
+      <p:pic>
+        <p:nvPicPr>
+          <p:cNvPr id="5" name="Content Placeholder 4">
+            <a:extLst>
+              <a:ext uri="{FF2B5EF4-FFF2-40B4-BE49-F238E27FC236}">
+                <a16:creationId xmlns:a16="http://schemas.microsoft.com/office/drawing/2014/main" id="{E68C87D7-7462-FC4E-AD8D-476C5861BE45}"/>
+              </a:ext>
+            </a:extLst>
+          </p:cNvPr>
+          <p:cNvPicPr>
+            <a:picLocks noGrp="1" noChangeAspect="1"/>
+          </p:cNvPicPr>
+          <p:nvPr>
+            <p:ph idx="1"/>
+          </p:nvPr>
+        </p:nvPicPr>
+        <p:blipFill rotWithShape="1">
+          <a:blip r:embed="rId2">
+            <a:extLst>
+              <a:ext uri="{28A0092B-C50C-407E-A947-70E740481C1C}">
+                <a14:useLocalDpi xmlns:a14="http://schemas.microsoft.com/office/drawing/2010/main" val="0"/>
+              </a:ext>
+            </a:extLst>
+          </a:blip>
+          <a:srcRect b="5163"/>
+          <a:stretch/>
+        </p:blipFill>
+        <p:spPr>
+          <a:xfrm>
+            <a:off x="1497330" y="3371850"/>
+            <a:ext cx="8341355" cy="2948940"/>
+          </a:xfrm>
+        </p:spPr>
+      </p:pic>
+      <p:pic>
+        <p:nvPicPr>
+          <p:cNvPr id="10" name="Picture 9">
+            <a:extLst>
+              <a:ext uri="{FF2B5EF4-FFF2-40B4-BE49-F238E27FC236}">
+                <a16:creationId xmlns:a16="http://schemas.microsoft.com/office/drawing/2014/main" id="{68C90698-9174-B640-B74F-58469ECFAFB4}"/>
+              </a:ext>
+            </a:extLst>
+          </p:cNvPr>
+          <p:cNvPicPr>
+            <a:picLocks noChangeAspect="1"/>
+          </p:cNvPicPr>
+          <p:nvPr/>
+        </p:nvPicPr>
+        <p:blipFill rotWithShape="1">
+          <a:blip r:embed="rId3">
+            <a:extLst>
+              <a:ext uri="{28A0092B-C50C-407E-A947-70E740481C1C}">
+                <a14:useLocalDpi xmlns:a14="http://schemas.microsoft.com/office/drawing/2010/main" val="0"/>
+              </a:ext>
+            </a:extLst>
+          </a:blip>
+          <a:srcRect b="4789"/>
+          <a:stretch/>
+        </p:blipFill>
+        <p:spPr>
+          <a:xfrm>
+            <a:off x="1497330" y="0"/>
+            <a:ext cx="8469630" cy="3009085"/>
+          </a:xfrm>
+          <a:prstGeom prst="rect">
+            <a:avLst/>
+          </a:prstGeom>
+        </p:spPr>
+      </p:pic>
+    </p:spTree>
+    <p:extLst>
+      <p:ext uri="{BB962C8B-B14F-4D97-AF65-F5344CB8AC3E}">
+        <p14:creationId xmlns:p14="http://schemas.microsoft.com/office/powerpoint/2010/main" val="3344394509"/>
+      </p:ext>
+    </p:extLst>
+  </p:cSld>
+  <p:clrMapOvr>
+    <a:masterClrMapping/>
+  </p:clrMapOvr>
+</p:sld>
+</file>
+
+<file path=ppt/slides/slide23.xml><?xml version="1.0" encoding="utf-8"?>
 <p:sld xmlns:a="http://schemas.openxmlformats.org/drawingml/2006/main" xmlns:r="http://schemas.openxmlformats.org/officeDocument/2006/relationships" xmlns:p="http://schemas.openxmlformats.org/presentationml/2006/main">
   <p:cSld>
     <p:spTree>

</xml_diff>

<commit_message>
Added env index slide to ppt
</commit_message>
<xml_diff>
--- a/Project1_Presentation.pptx
+++ b/Project1_Presentation.pptx
@@ -28,6 +28,7 @@
     <p:sldId id="275" r:id="rId22"/>
     <p:sldId id="261" r:id="rId23"/>
     <p:sldId id="277" r:id="rId24"/>
+    <p:sldId id="286" r:id="rId25"/>
   </p:sldIdLst>
   <p:sldSz cx="12192000" cy="6858000"/>
   <p:notesSz cx="6858000" cy="9144000"/>
@@ -6301,6 +6302,71 @@
 </p:sld>
 </file>
 
+<file path=ppt/slides/slide24.xml><?xml version="1.0" encoding="utf-8"?>
+<p:sld xmlns:a="http://schemas.openxmlformats.org/drawingml/2006/main" xmlns:r="http://schemas.openxmlformats.org/officeDocument/2006/relationships" xmlns:p="http://schemas.openxmlformats.org/presentationml/2006/main">
+  <p:cSld>
+    <p:spTree>
+      <p:nvGrpSpPr>
+        <p:cNvPr id="1" name=""/>
+        <p:cNvGrpSpPr/>
+        <p:nvPr/>
+      </p:nvGrpSpPr>
+      <p:grpSpPr>
+        <a:xfrm>
+          <a:off x="0" y="0"/>
+          <a:ext cx="0" cy="0"/>
+          <a:chOff x="0" y="0"/>
+          <a:chExt cx="0" cy="0"/>
+        </a:xfrm>
+      </p:grpSpPr>
+      <p:pic>
+        <p:nvPicPr>
+          <p:cNvPr id="5" name="Content Placeholder 4">
+            <a:extLst>
+              <a:ext uri="{FF2B5EF4-FFF2-40B4-BE49-F238E27FC236}">
+                <a16:creationId xmlns:a16="http://schemas.microsoft.com/office/drawing/2014/main" id="{2F3CA2CF-0E33-C941-BF0A-AED6E92427F2}"/>
+              </a:ext>
+            </a:extLst>
+          </p:cNvPr>
+          <p:cNvPicPr>
+            <a:picLocks noGrp="1" noChangeAspect="1"/>
+          </p:cNvPicPr>
+          <p:nvPr>
+            <p:ph idx="1"/>
+          </p:nvPr>
+        </p:nvPicPr>
+        <p:blipFill>
+          <a:blip r:embed="rId2">
+            <a:extLst>
+              <a:ext uri="{28A0092B-C50C-407E-A947-70E740481C1C}">
+                <a14:useLocalDpi xmlns:a14="http://schemas.microsoft.com/office/drawing/2010/main" val="0"/>
+              </a:ext>
+            </a:extLst>
+          </a:blip>
+          <a:stretch>
+            <a:fillRect/>
+          </a:stretch>
+        </p:blipFill>
+        <p:spPr>
+          <a:xfrm>
+            <a:off x="1119823" y="1402506"/>
+            <a:ext cx="10058400" cy="3355759"/>
+          </a:xfrm>
+        </p:spPr>
+      </p:pic>
+    </p:spTree>
+    <p:extLst>
+      <p:ext uri="{BB962C8B-B14F-4D97-AF65-F5344CB8AC3E}">
+        <p14:creationId xmlns:p14="http://schemas.microsoft.com/office/powerpoint/2010/main" val="3746184928"/>
+      </p:ext>
+    </p:extLst>
+  </p:cSld>
+  <p:clrMapOvr>
+    <a:masterClrMapping/>
+  </p:clrMapOvr>
+</p:sld>
+</file>
+
 <file path=ppt/slides/slide3.xml><?xml version="1.0" encoding="utf-8"?>
 <p:sld xmlns:a="http://schemas.openxmlformats.org/drawingml/2006/main" xmlns:r="http://schemas.openxmlformats.org/officeDocument/2006/relationships" xmlns:p="http://schemas.openxmlformats.org/presentationml/2006/main">
   <p:cSld>

</xml_diff>

<commit_message>
Added amazon city and sites slide to ppt
</commit_message>
<xml_diff>
--- a/Project1_Presentation.pptx
+++ b/Project1_Presentation.pptx
@@ -5,9 +5,9 @@
     <p:sldMasterId id="2147483660" r:id="rId1"/>
   </p:sldMasterIdLst>
   <p:sldIdLst>
-    <p:sldId id="256" r:id="rId2"/>
-    <p:sldId id="273" r:id="rId3"/>
-    <p:sldId id="257" r:id="rId4"/>
+    <p:sldId id="273" r:id="rId2"/>
+    <p:sldId id="257" r:id="rId3"/>
+    <p:sldId id="288" r:id="rId4"/>
     <p:sldId id="259" r:id="rId5"/>
     <p:sldId id="260" r:id="rId6"/>
     <p:sldId id="267" r:id="rId7"/>
@@ -3832,6 +3832,42 @@
           <a:chExt cx="0" cy="0"/>
         </a:xfrm>
       </p:grpSpPr>
+      <p:pic>
+        <p:nvPicPr>
+          <p:cNvPr id="5" name="Picture 4">
+            <a:extLst>
+              <a:ext uri="{FF2B5EF4-FFF2-40B4-BE49-F238E27FC236}">
+                <a16:creationId xmlns:a16="http://schemas.microsoft.com/office/drawing/2014/main" id="{06C0ABB1-7187-094A-8DAB-40D99DA19870}"/>
+              </a:ext>
+            </a:extLst>
+          </p:cNvPr>
+          <p:cNvPicPr>
+            <a:picLocks noChangeAspect="1"/>
+          </p:cNvPicPr>
+          <p:nvPr/>
+        </p:nvPicPr>
+        <p:blipFill rotWithShape="1">
+          <a:blip r:embed="rId2">
+            <a:alphaModFix amt="15000"/>
+            <a:extLst>
+              <a:ext uri="{28A0092B-C50C-407E-A947-70E740481C1C}">
+                <a14:useLocalDpi xmlns:a14="http://schemas.microsoft.com/office/drawing/2010/main" val="0"/>
+              </a:ext>
+            </a:extLst>
+          </a:blip>
+          <a:srcRect l="13008" t="17665" r="9506" b="6167"/>
+          <a:stretch/>
+        </p:blipFill>
+        <p:spPr>
+          <a:xfrm>
+            <a:off x="502920" y="0"/>
+            <a:ext cx="11235690" cy="6217150"/>
+          </a:xfrm>
+          <a:prstGeom prst="rect">
+            <a:avLst/>
+          </a:prstGeom>
+        </p:spPr>
+      </p:pic>
       <p:sp>
         <p:nvSpPr>
           <p:cNvPr id="2" name="Title 1">
@@ -3848,7 +3884,12 @@
             <p:ph type="ctrTitle"/>
           </p:nvPr>
         </p:nvSpPr>
-        <p:spPr/>
+        <p:spPr>
+          <a:xfrm>
+            <a:off x="1097280" y="758952"/>
+            <a:ext cx="10058400" cy="3566160"/>
+          </a:xfrm>
+        </p:spPr>
         <p:txBody>
           <a:bodyPr/>
           <a:lstStyle/>
@@ -3876,7 +3917,12 @@
             <p:ph type="subTitle" idx="1"/>
           </p:nvPr>
         </p:nvSpPr>
-        <p:spPr/>
+        <p:spPr>
+          <a:xfrm>
+            <a:off x="1100051" y="4455620"/>
+            <a:ext cx="10058400" cy="1143000"/>
+          </a:xfrm>
+        </p:spPr>
         <p:txBody>
           <a:bodyPr>
             <a:normAutofit fontScale="92500"/>
@@ -3885,65 +3931,53 @@
           <a:p>
             <a:r>
               <a:rPr lang="en-US" sz="3000" b="1" dirty="0"/>
-              <a:t>Project 1 – UCB-DATA ANLYTICS BOOTCAMP, 2018</a:t>
-            </a:r>
-          </a:p>
-          <a:p>
-            <a:r>
-              <a:rPr lang="en-US" b="1" dirty="0" err="1"/>
-              <a:t>Guirlyn</a:t>
-            </a:r>
+              <a:t>Project 1 – UCB-DATA ANLYTICS BOOTCAMP</a:t>
+            </a:r>
+          </a:p>
+          <a:p>
             <a:r>
               <a:rPr lang="en-US" b="1" dirty="0"/>
-              <a:t> V </a:t>
-            </a:r>
-            <a:r>
-              <a:rPr lang="en-US" b="1" dirty="0" err="1"/>
-              <a:t>Olivar</a:t>
-            </a:r>
-            <a:r>
-              <a:rPr lang="en-US" b="1" dirty="0"/>
-              <a:t>, Helen </a:t>
-            </a:r>
-            <a:r>
-              <a:rPr lang="en-US" b="1" dirty="0" err="1"/>
-              <a:t>LeAO</a:t>
-            </a:r>
-            <a:r>
-              <a:rPr lang="en-US" b="1" dirty="0"/>
-              <a:t>, </a:t>
-            </a:r>
-            <a:r>
-              <a:rPr lang="en-US" b="1" dirty="0" err="1"/>
-              <a:t>Indrani</a:t>
-            </a:r>
-            <a:r>
-              <a:rPr lang="en-US" b="1" dirty="0"/>
-              <a:t> </a:t>
-            </a:r>
-            <a:r>
-              <a:rPr lang="en-US" b="1" dirty="0" err="1"/>
-              <a:t>Kompella</a:t>
-            </a:r>
-            <a:r>
-              <a:rPr lang="en-US" b="1" dirty="0"/>
-              <a:t> and </a:t>
-            </a:r>
-            <a:r>
-              <a:rPr lang="en-US" b="1" dirty="0" err="1"/>
-              <a:t>Niyati</a:t>
-            </a:r>
-            <a:r>
-              <a:rPr lang="en-US" b="1" dirty="0"/>
-              <a:t> Desai</a:t>
-            </a:r>
+              <a:t>Guirlyn V Olivar, Helen LeAO, Indrani Kompella and Niyati Desai</a:t>
+            </a:r>
+          </a:p>
+        </p:txBody>
+      </p:sp>
+      <p:sp>
+        <p:nvSpPr>
+          <p:cNvPr id="6" name="TextBox 5">
+            <a:extLst>
+              <a:ext uri="{FF2B5EF4-FFF2-40B4-BE49-F238E27FC236}">
+                <a16:creationId xmlns:a16="http://schemas.microsoft.com/office/drawing/2014/main" id="{016AAC0F-C33A-034E-90E8-8BDFD51AC1BE}"/>
+              </a:ext>
+            </a:extLst>
+          </p:cNvPr>
+          <p:cNvSpPr txBox="1"/>
+          <p:nvPr/>
+        </p:nvSpPr>
+        <p:spPr>
+          <a:xfrm>
+            <a:off x="12070080" y="2743200"/>
+            <a:ext cx="184731" cy="369332"/>
+          </a:xfrm>
+          <a:prstGeom prst="rect">
+            <a:avLst/>
+          </a:prstGeom>
+          <a:noFill/>
+        </p:spPr>
+        <p:txBody>
+          <a:bodyPr wrap="none" rtlCol="0">
+            <a:spAutoFit/>
+          </a:bodyPr>
+          <a:lstStyle/>
+          <a:p>
+            <a:endParaRPr lang="en-US" dirty="0"/>
           </a:p>
         </p:txBody>
       </p:sp>
     </p:spTree>
     <p:extLst>
       <p:ext uri="{BB962C8B-B14F-4D97-AF65-F5344CB8AC3E}">
-        <p14:creationId xmlns:p14="http://schemas.microsoft.com/office/powerpoint/2010/main" val="4098212711"/>
+        <p14:creationId xmlns:p14="http://schemas.microsoft.com/office/powerpoint/2010/main" val="2713940244"/>
       </p:ext>
     </p:extLst>
   </p:cSld>
@@ -5536,48 +5570,12 @@
           <a:chExt cx="0" cy="0"/>
         </a:xfrm>
       </p:grpSpPr>
-      <p:pic>
-        <p:nvPicPr>
-          <p:cNvPr id="5" name="Picture 4">
+      <p:sp>
+        <p:nvSpPr>
+          <p:cNvPr id="2" name="Title 1">
             <a:extLst>
               <a:ext uri="{FF2B5EF4-FFF2-40B4-BE49-F238E27FC236}">
-                <a16:creationId xmlns:a16="http://schemas.microsoft.com/office/drawing/2014/main" id="{06C0ABB1-7187-094A-8DAB-40D99DA19870}"/>
-              </a:ext>
-            </a:extLst>
-          </p:cNvPr>
-          <p:cNvPicPr>
-            <a:picLocks noChangeAspect="1"/>
-          </p:cNvPicPr>
-          <p:nvPr/>
-        </p:nvPicPr>
-        <p:blipFill rotWithShape="1">
-          <a:blip r:embed="rId2">
-            <a:alphaModFix amt="15000"/>
-            <a:extLst>
-              <a:ext uri="{28A0092B-C50C-407E-A947-70E740481C1C}">
-                <a14:useLocalDpi xmlns:a14="http://schemas.microsoft.com/office/drawing/2010/main" val="0"/>
-              </a:ext>
-            </a:extLst>
-          </a:blip>
-          <a:srcRect l="13008" t="17665" r="9506" b="6167"/>
-          <a:stretch/>
-        </p:blipFill>
-        <p:spPr>
-          <a:xfrm>
-            <a:off x="502920" y="0"/>
-            <a:ext cx="11235690" cy="6217150"/>
-          </a:xfrm>
-          <a:prstGeom prst="rect">
-            <a:avLst/>
-          </a:prstGeom>
-        </p:spPr>
-      </p:pic>
-      <p:sp>
-        <p:nvSpPr>
-          <p:cNvPr id="2" name="Title 1">
-            <a:extLst>
-              <a:ext uri="{FF2B5EF4-FFF2-40B4-BE49-F238E27FC236}">
-                <a16:creationId xmlns:a16="http://schemas.microsoft.com/office/drawing/2014/main" id="{B41C06A5-EFAB-4E81-BE16-8703E062FAC9}"/>
+                <a16:creationId xmlns:a16="http://schemas.microsoft.com/office/drawing/2014/main" id="{390EB264-3883-41F9-BACB-285D2229980C}"/>
               </a:ext>
             </a:extLst>
           </p:cNvPr>
@@ -5585,32 +5583,27 @@
             <a:spLocks noGrp="1"/>
           </p:cNvSpPr>
           <p:nvPr>
-            <p:ph type="ctrTitle"/>
+            <p:ph type="title"/>
           </p:nvPr>
         </p:nvSpPr>
-        <p:spPr>
-          <a:xfrm>
-            <a:off x="1097280" y="758952"/>
-            <a:ext cx="10058400" cy="3566160"/>
-          </a:xfrm>
-        </p:spPr>
+        <p:spPr/>
         <p:txBody>
           <a:bodyPr/>
           <a:lstStyle/>
           <a:p>
             <a:r>
               <a:rPr lang="en-US" dirty="0"/>
-              <a:t>Pick Me Amazon!</a:t>
-            </a:r>
-          </a:p>
-        </p:txBody>
-      </p:sp>
-      <p:sp>
-        <p:nvSpPr>
-          <p:cNvPr id="3" name="Subtitle 2">
+              <a:t>The $5 Billion Question</a:t>
+            </a:r>
+          </a:p>
+        </p:txBody>
+      </p:sp>
+      <p:sp>
+        <p:nvSpPr>
+          <p:cNvPr id="3" name="Content Placeholder 2">
             <a:extLst>
               <a:ext uri="{FF2B5EF4-FFF2-40B4-BE49-F238E27FC236}">
-                <a16:creationId xmlns:a16="http://schemas.microsoft.com/office/drawing/2014/main" id="{16514017-9304-4743-9F53-4DA92C050D17}"/>
+                <a16:creationId xmlns:a16="http://schemas.microsoft.com/office/drawing/2014/main" id="{BEC8BDDB-FD44-4EB6-BE27-4A708B75BDAB}"/>
               </a:ext>
             </a:extLst>
           </p:cNvPr>
@@ -5618,61 +5611,84 @@
             <a:spLocks noGrp="1"/>
           </p:cNvSpPr>
           <p:nvPr>
-            <p:ph type="subTitle" idx="1"/>
+            <p:ph idx="1"/>
           </p:nvPr>
         </p:nvSpPr>
         <p:spPr>
           <a:xfrm>
-            <a:off x="1100051" y="4455620"/>
-            <a:ext cx="10058400" cy="1143000"/>
-          </a:xfrm>
-        </p:spPr>
-        <p:txBody>
-          <a:bodyPr>
-            <a:normAutofit fontScale="92500"/>
-          </a:bodyPr>
+            <a:off x="1084923" y="1845734"/>
+            <a:ext cx="10058400" cy="4023360"/>
+          </a:xfrm>
+        </p:spPr>
+        <p:txBody>
+          <a:bodyPr/>
           <a:lstStyle/>
           <a:p>
-            <a:r>
-              <a:rPr lang="en-US" sz="3000" b="1" dirty="0"/>
-              <a:t>Project 1 – UCB-DATA ANLYTICS BOOTCAMP</a:t>
-            </a:r>
-          </a:p>
-          <a:p>
-            <a:r>
-              <a:rPr lang="en-US" b="1" dirty="0"/>
-              <a:t>Guirlyn V Olivar, Helen LeAO, Indrani Kompella and Niyati Desai</a:t>
-            </a:r>
-          </a:p>
-        </p:txBody>
-      </p:sp>
-      <p:sp>
-        <p:nvSpPr>
-          <p:cNvPr id="6" name="TextBox 5">
-            <a:extLst>
-              <a:ext uri="{FF2B5EF4-FFF2-40B4-BE49-F238E27FC236}">
-                <a16:creationId xmlns:a16="http://schemas.microsoft.com/office/drawing/2014/main" id="{016AAC0F-C33A-034E-90E8-8BDFD51AC1BE}"/>
-              </a:ext>
-            </a:extLst>
-          </p:cNvPr>
-          <p:cNvSpPr txBox="1"/>
-          <p:nvPr/>
-        </p:nvSpPr>
-        <p:spPr>
-          <a:xfrm>
-            <a:off x="12070080" y="2743200"/>
-            <a:ext cx="184731" cy="369332"/>
-          </a:xfrm>
-          <a:prstGeom prst="rect">
-            <a:avLst/>
-          </a:prstGeom>
-          <a:noFill/>
-        </p:spPr>
-        <p:txBody>
-          <a:bodyPr wrap="none" rtlCol="0">
-            <a:spAutoFit/>
-          </a:bodyPr>
-          <a:lstStyle/>
+            <a:pPr marL="0" indent="0">
+              <a:buNone/>
+            </a:pPr>
+            <a:r>
+              <a:rPr lang="en-US" sz="3200" dirty="0"/>
+              <a:t>Cities across the U.S are competing to attract Amazon’s second head quarters which would bring </a:t>
+            </a:r>
+            <a:r>
+              <a:rPr lang="en-US" sz="3200" b="1" dirty="0"/>
+              <a:t>50,000 jobs </a:t>
+            </a:r>
+            <a:r>
+              <a:rPr lang="en-US" sz="3200" dirty="0"/>
+              <a:t>and </a:t>
+            </a:r>
+            <a:r>
+              <a:rPr lang="en-US" sz="3200" b="1" dirty="0"/>
+              <a:t>$5 billion investment</a:t>
+            </a:r>
+            <a:r>
+              <a:rPr lang="en-US" sz="3200" dirty="0"/>
+              <a:t>. Out of the original 238 cities, 20 cities made it the final cut.</a:t>
+            </a:r>
+          </a:p>
+          <a:p>
+            <a:pPr marL="0" indent="0">
+              <a:buNone/>
+            </a:pPr>
+            <a:r>
+              <a:rPr lang="en-US" sz="3200" dirty="0"/>
+              <a:t>If Amazon were a person (</a:t>
+            </a:r>
+            <a:r>
+              <a:rPr lang="en-US" sz="3200" dirty="0">
+                <a:solidFill>
+                  <a:schemeClr val="accent1">
+                    <a:lumMod val="75000"/>
+                  </a:schemeClr>
+                </a:solidFill>
+              </a:rPr>
+              <a:t>Yes…corporations are people!) </a:t>
+            </a:r>
+            <a:r>
+              <a:rPr lang="en-US" sz="3200" dirty="0"/>
+              <a:t>which city should he choose? </a:t>
+            </a:r>
+          </a:p>
+          <a:p>
+            <a:pPr marL="0" indent="0">
+              <a:buNone/>
+            </a:pPr>
+            <a:r>
+              <a:rPr lang="en-US" sz="3200" dirty="0"/>
+              <a:t>We are here to help!</a:t>
+            </a:r>
+          </a:p>
+          <a:p>
+            <a:pPr marL="0" indent="0">
+              <a:buNone/>
+            </a:pPr>
+            <a:endParaRPr lang="en-US" dirty="0"/>
+          </a:p>
+          <a:p>
+            <a:endParaRPr lang="en-US" dirty="0"/>
+          </a:p>
           <a:p>
             <a:endParaRPr lang="en-US" dirty="0"/>
           </a:p>
@@ -5681,7 +5697,7 @@
     </p:spTree>
     <p:extLst>
       <p:ext uri="{BB962C8B-B14F-4D97-AF65-F5344CB8AC3E}">
-        <p14:creationId xmlns:p14="http://schemas.microsoft.com/office/powerpoint/2010/main" val="2713940244"/>
+        <p14:creationId xmlns:p14="http://schemas.microsoft.com/office/powerpoint/2010/main" val="71064535"/>
       </p:ext>
     </p:extLst>
   </p:cSld>
@@ -6384,12 +6400,491 @@
           <a:chExt cx="0" cy="0"/>
         </a:xfrm>
       </p:grpSpPr>
-      <p:sp>
-        <p:nvSpPr>
-          <p:cNvPr id="2" name="Title 1">
+      <p:pic>
+        <p:nvPicPr>
+          <p:cNvPr id="4" name="Picture 3">
             <a:extLst>
               <a:ext uri="{FF2B5EF4-FFF2-40B4-BE49-F238E27FC236}">
-                <a16:creationId xmlns:a16="http://schemas.microsoft.com/office/drawing/2014/main" id="{390EB264-3883-41F9-BACB-285D2229980C}"/>
+                <a16:creationId xmlns:a16="http://schemas.microsoft.com/office/drawing/2014/main" id="{E2779FA5-5EF9-9A41-965D-68A1479EFCCB}"/>
+              </a:ext>
+            </a:extLst>
+          </p:cNvPr>
+          <p:cNvPicPr>
+            <a:picLocks noChangeAspect="1"/>
+          </p:cNvPicPr>
+          <p:nvPr/>
+        </p:nvPicPr>
+        <p:blipFill rotWithShape="1">
+          <a:blip r:embed="rId2">
+            <a:alphaModFix/>
+            <a:extLst>
+              <a:ext uri="{BEBA8EAE-BF5A-486C-A8C5-ECC9F3942E4B}">
+                <a14:imgProps xmlns:a14="http://schemas.microsoft.com/office/drawing/2010/main">
+                  <a14:imgLayer r:embed="rId3">
+                    <a14:imgEffect>
+                      <a14:artisticTexturizer/>
+                    </a14:imgEffect>
+                  </a14:imgLayer>
+                </a14:imgProps>
+              </a:ext>
+              <a:ext uri="{28A0092B-C50C-407E-A947-70E740481C1C}">
+                <a14:useLocalDpi xmlns:a14="http://schemas.microsoft.com/office/drawing/2010/main" val="0"/>
+              </a:ext>
+            </a:extLst>
+          </a:blip>
+          <a:srcRect l="13008" t="17665" r="9506" b="6167"/>
+          <a:stretch/>
+        </p:blipFill>
+        <p:spPr>
+          <a:xfrm>
+            <a:off x="377189" y="2205990"/>
+            <a:ext cx="6403483" cy="3543300"/>
+          </a:xfrm>
+          <a:prstGeom prst="rect">
+            <a:avLst/>
+          </a:prstGeom>
+        </p:spPr>
+      </p:pic>
+      <p:sp>
+        <p:nvSpPr>
+          <p:cNvPr id="6" name="Rounded Rectangle 5">
+            <a:extLst>
+              <a:ext uri="{FF2B5EF4-FFF2-40B4-BE49-F238E27FC236}">
+                <a16:creationId xmlns:a16="http://schemas.microsoft.com/office/drawing/2014/main" id="{C868F23D-7E28-9C45-9298-F89E72BA9012}"/>
+              </a:ext>
+            </a:extLst>
+          </p:cNvPr>
+          <p:cNvSpPr/>
+          <p:nvPr/>
+        </p:nvSpPr>
+        <p:spPr>
+          <a:xfrm>
+            <a:off x="400050" y="3977640"/>
+            <a:ext cx="1028700" cy="445770"/>
+          </a:xfrm>
+          <a:prstGeom prst="roundRect">
+            <a:avLst/>
+          </a:prstGeom>
+          <a:noFill/>
+          <a:ln w="28575">
+            <a:solidFill>
+              <a:srgbClr val="FF0000"/>
+            </a:solidFill>
+          </a:ln>
+        </p:spPr>
+        <p:style>
+          <a:lnRef idx="2">
+            <a:schemeClr val="accent1">
+              <a:shade val="50000"/>
+            </a:schemeClr>
+          </a:lnRef>
+          <a:fillRef idx="1">
+            <a:schemeClr val="accent1"/>
+          </a:fillRef>
+          <a:effectRef idx="0">
+            <a:schemeClr val="accent1"/>
+          </a:effectRef>
+          <a:fontRef idx="minor">
+            <a:schemeClr val="lt1"/>
+          </a:fontRef>
+        </p:style>
+        <p:txBody>
+          <a:bodyPr rot="0" spcFirstLastPara="0" vertOverflow="overflow" horzOverflow="overflow" vert="horz" wrap="square" lIns="91440" tIns="45720" rIns="91440" bIns="45720" numCol="1" spcCol="0" rtlCol="0" fromWordArt="0" anchor="ctr" anchorCtr="0" forceAA="0" compatLnSpc="1">
+            <a:prstTxWarp prst="textNoShape">
+              <a:avLst/>
+            </a:prstTxWarp>
+            <a:noAutofit/>
+          </a:bodyPr>
+          <a:lstStyle/>
+          <a:p>
+            <a:pPr algn="ctr"/>
+            <a:endParaRPr lang="en-US" b="1" dirty="0">
+              <a:ln w="28575">
+                <a:solidFill>
+                  <a:schemeClr val="accent2"/>
+                </a:solidFill>
+                <a:prstDash val="solid"/>
+              </a:ln>
+              <a:solidFill>
+                <a:schemeClr val="accent2">
+                  <a:lumMod val="40000"/>
+                  <a:lumOff val="60000"/>
+                </a:schemeClr>
+              </a:solidFill>
+            </a:endParaRPr>
+          </a:p>
+        </p:txBody>
+      </p:sp>
+      <p:sp>
+        <p:nvSpPr>
+          <p:cNvPr id="7" name="Rounded Rectangle 6">
+            <a:extLst>
+              <a:ext uri="{FF2B5EF4-FFF2-40B4-BE49-F238E27FC236}">
+                <a16:creationId xmlns:a16="http://schemas.microsoft.com/office/drawing/2014/main" id="{18567B45-9C55-D848-855C-8AF8B95234A4}"/>
+              </a:ext>
+            </a:extLst>
+          </p:cNvPr>
+          <p:cNvSpPr/>
+          <p:nvPr/>
+        </p:nvSpPr>
+        <p:spPr>
+          <a:xfrm>
+            <a:off x="2823210" y="5006340"/>
+            <a:ext cx="754380" cy="422910"/>
+          </a:xfrm>
+          <a:prstGeom prst="roundRect">
+            <a:avLst/>
+          </a:prstGeom>
+          <a:noFill/>
+          <a:ln w="28575">
+            <a:solidFill>
+              <a:srgbClr val="FF0000"/>
+            </a:solidFill>
+          </a:ln>
+        </p:spPr>
+        <p:style>
+          <a:lnRef idx="2">
+            <a:schemeClr val="accent1">
+              <a:shade val="50000"/>
+            </a:schemeClr>
+          </a:lnRef>
+          <a:fillRef idx="1">
+            <a:schemeClr val="accent1"/>
+          </a:fillRef>
+          <a:effectRef idx="0">
+            <a:schemeClr val="accent1"/>
+          </a:effectRef>
+          <a:fontRef idx="minor">
+            <a:schemeClr val="lt1"/>
+          </a:fontRef>
+        </p:style>
+        <p:txBody>
+          <a:bodyPr rtlCol="0" anchor="ctr"/>
+          <a:lstStyle/>
+          <a:p>
+            <a:pPr algn="ctr"/>
+            <a:endParaRPr lang="en-US" b="1" dirty="0"/>
+          </a:p>
+        </p:txBody>
+      </p:sp>
+      <p:sp>
+        <p:nvSpPr>
+          <p:cNvPr id="8" name="Rounded Rectangle 7">
+            <a:extLst>
+              <a:ext uri="{FF2B5EF4-FFF2-40B4-BE49-F238E27FC236}">
+                <a16:creationId xmlns:a16="http://schemas.microsoft.com/office/drawing/2014/main" id="{427E7169-13F5-FF40-86D0-C1853555A2F2}"/>
+              </a:ext>
+            </a:extLst>
+          </p:cNvPr>
+          <p:cNvSpPr/>
+          <p:nvPr/>
+        </p:nvSpPr>
+        <p:spPr>
+          <a:xfrm>
+            <a:off x="4389120" y="4480560"/>
+            <a:ext cx="674370" cy="441960"/>
+          </a:xfrm>
+          <a:prstGeom prst="roundRect">
+            <a:avLst/>
+          </a:prstGeom>
+          <a:noFill/>
+          <a:ln w="28575">
+            <a:solidFill>
+              <a:srgbClr val="FF0000"/>
+            </a:solidFill>
+          </a:ln>
+        </p:spPr>
+        <p:style>
+          <a:lnRef idx="2">
+            <a:schemeClr val="accent1">
+              <a:shade val="50000"/>
+            </a:schemeClr>
+          </a:lnRef>
+          <a:fillRef idx="1">
+            <a:schemeClr val="accent1"/>
+          </a:fillRef>
+          <a:effectRef idx="0">
+            <a:schemeClr val="accent1"/>
+          </a:effectRef>
+          <a:fontRef idx="minor">
+            <a:schemeClr val="lt1"/>
+          </a:fontRef>
+        </p:style>
+        <p:txBody>
+          <a:bodyPr rtlCol="0" anchor="ctr"/>
+          <a:lstStyle/>
+          <a:p>
+            <a:pPr algn="ctr"/>
+            <a:endParaRPr lang="en-US" b="1" dirty="0"/>
+          </a:p>
+        </p:txBody>
+      </p:sp>
+      <p:sp>
+        <p:nvSpPr>
+          <p:cNvPr id="10" name="Rounded Rectangle 9">
+            <a:extLst>
+              <a:ext uri="{FF2B5EF4-FFF2-40B4-BE49-F238E27FC236}">
+                <a16:creationId xmlns:a16="http://schemas.microsoft.com/office/drawing/2014/main" id="{E19F02C3-EACF-BE47-957A-0DBF584A231F}"/>
+              </a:ext>
+            </a:extLst>
+          </p:cNvPr>
+          <p:cNvSpPr/>
+          <p:nvPr/>
+        </p:nvSpPr>
+        <p:spPr>
+          <a:xfrm>
+            <a:off x="3549015" y="3265170"/>
+            <a:ext cx="840105" cy="375285"/>
+          </a:xfrm>
+          <a:prstGeom prst="roundRect">
+            <a:avLst/>
+          </a:prstGeom>
+          <a:noFill/>
+          <a:ln w="28575">
+            <a:solidFill>
+              <a:srgbClr val="FF0000"/>
+            </a:solidFill>
+          </a:ln>
+        </p:spPr>
+        <p:style>
+          <a:lnRef idx="2">
+            <a:schemeClr val="accent1">
+              <a:shade val="50000"/>
+            </a:schemeClr>
+          </a:lnRef>
+          <a:fillRef idx="1">
+            <a:schemeClr val="accent1"/>
+          </a:fillRef>
+          <a:effectRef idx="0">
+            <a:schemeClr val="accent1"/>
+          </a:effectRef>
+          <a:fontRef idx="minor">
+            <a:schemeClr val="lt1"/>
+          </a:fontRef>
+        </p:style>
+        <p:txBody>
+          <a:bodyPr rtlCol="0" anchor="ctr"/>
+          <a:lstStyle/>
+          <a:p>
+            <a:pPr algn="ctr"/>
+            <a:endParaRPr lang="en-US" b="1" dirty="0"/>
+          </a:p>
+        </p:txBody>
+      </p:sp>
+      <p:sp>
+        <p:nvSpPr>
+          <p:cNvPr id="11" name="Rounded Rectangle 10">
+            <a:extLst>
+              <a:ext uri="{FF2B5EF4-FFF2-40B4-BE49-F238E27FC236}">
+                <a16:creationId xmlns:a16="http://schemas.microsoft.com/office/drawing/2014/main" id="{CF7BA0B2-946D-F049-8742-0F89AE7BDCFC}"/>
+              </a:ext>
+            </a:extLst>
+          </p:cNvPr>
+          <p:cNvSpPr/>
+          <p:nvPr/>
+        </p:nvSpPr>
+        <p:spPr>
+          <a:xfrm>
+            <a:off x="4960619" y="4046220"/>
+            <a:ext cx="628651" cy="434340"/>
+          </a:xfrm>
+          <a:prstGeom prst="roundRect">
+            <a:avLst/>
+          </a:prstGeom>
+          <a:noFill/>
+          <a:ln w="28575">
+            <a:solidFill>
+              <a:srgbClr val="FF0000"/>
+            </a:solidFill>
+          </a:ln>
+        </p:spPr>
+        <p:style>
+          <a:lnRef idx="2">
+            <a:schemeClr val="accent1">
+              <a:shade val="50000"/>
+            </a:schemeClr>
+          </a:lnRef>
+          <a:fillRef idx="1">
+            <a:schemeClr val="accent1"/>
+          </a:fillRef>
+          <a:effectRef idx="0">
+            <a:schemeClr val="accent1"/>
+          </a:effectRef>
+          <a:fontRef idx="minor">
+            <a:schemeClr val="lt1"/>
+          </a:fontRef>
+        </p:style>
+        <p:txBody>
+          <a:bodyPr rtlCol="0" anchor="ctr"/>
+          <a:lstStyle/>
+          <a:p>
+            <a:pPr algn="ctr"/>
+            <a:endParaRPr lang="en-US" b="1" dirty="0"/>
+          </a:p>
+        </p:txBody>
+      </p:sp>
+      <p:sp>
+        <p:nvSpPr>
+          <p:cNvPr id="12" name="Rounded Rectangle 11">
+            <a:extLst>
+              <a:ext uri="{FF2B5EF4-FFF2-40B4-BE49-F238E27FC236}">
+                <a16:creationId xmlns:a16="http://schemas.microsoft.com/office/drawing/2014/main" id="{B57D6BF0-48C7-EA44-B4A9-876C47084D9A}"/>
+              </a:ext>
+            </a:extLst>
+          </p:cNvPr>
+          <p:cNvSpPr/>
+          <p:nvPr/>
+        </p:nvSpPr>
+        <p:spPr>
+          <a:xfrm>
+            <a:off x="5622186" y="3265170"/>
+            <a:ext cx="618596" cy="285750"/>
+          </a:xfrm>
+          <a:prstGeom prst="roundRect">
+            <a:avLst/>
+          </a:prstGeom>
+          <a:noFill/>
+          <a:ln w="28575">
+            <a:solidFill>
+              <a:srgbClr val="FF0000"/>
+            </a:solidFill>
+          </a:ln>
+        </p:spPr>
+        <p:style>
+          <a:lnRef idx="2">
+            <a:schemeClr val="accent1">
+              <a:shade val="50000"/>
+            </a:schemeClr>
+          </a:lnRef>
+          <a:fillRef idx="1">
+            <a:schemeClr val="accent1"/>
+          </a:fillRef>
+          <a:effectRef idx="0">
+            <a:schemeClr val="accent1"/>
+          </a:effectRef>
+          <a:fontRef idx="minor">
+            <a:schemeClr val="lt1"/>
+          </a:fontRef>
+        </p:style>
+        <p:txBody>
+          <a:bodyPr rtlCol="0" anchor="ctr"/>
+          <a:lstStyle/>
+          <a:p>
+            <a:pPr algn="ctr"/>
+            <a:endParaRPr lang="en-US" b="1" dirty="0"/>
+          </a:p>
+        </p:txBody>
+      </p:sp>
+      <p:sp>
+        <p:nvSpPr>
+          <p:cNvPr id="13" name="Rounded Rectangle 12">
+            <a:extLst>
+              <a:ext uri="{FF2B5EF4-FFF2-40B4-BE49-F238E27FC236}">
+                <a16:creationId xmlns:a16="http://schemas.microsoft.com/office/drawing/2014/main" id="{E13F878A-E707-8042-A7A4-BE28A16829BC}"/>
+              </a:ext>
+            </a:extLst>
+          </p:cNvPr>
+          <p:cNvSpPr/>
+          <p:nvPr/>
+        </p:nvSpPr>
+        <p:spPr>
+          <a:xfrm>
+            <a:off x="5859852" y="2910840"/>
+            <a:ext cx="734905" cy="311467"/>
+          </a:xfrm>
+          <a:prstGeom prst="roundRect">
+            <a:avLst/>
+          </a:prstGeom>
+          <a:noFill/>
+          <a:ln w="28575">
+            <a:solidFill>
+              <a:srgbClr val="FF0000"/>
+            </a:solidFill>
+          </a:ln>
+        </p:spPr>
+        <p:style>
+          <a:lnRef idx="2">
+            <a:schemeClr val="accent1">
+              <a:shade val="50000"/>
+            </a:schemeClr>
+          </a:lnRef>
+          <a:fillRef idx="1">
+            <a:schemeClr val="accent1"/>
+          </a:fillRef>
+          <a:effectRef idx="0">
+            <a:schemeClr val="accent1"/>
+          </a:effectRef>
+          <a:fontRef idx="minor">
+            <a:schemeClr val="lt1"/>
+          </a:fontRef>
+        </p:style>
+        <p:txBody>
+          <a:bodyPr rtlCol="0" anchor="ctr"/>
+          <a:lstStyle/>
+          <a:p>
+            <a:pPr algn="ctr"/>
+            <a:endParaRPr lang="en-US" b="1" dirty="0"/>
+          </a:p>
+        </p:txBody>
+      </p:sp>
+      <p:sp>
+        <p:nvSpPr>
+          <p:cNvPr id="14" name="Rounded Rectangle 13">
+            <a:extLst>
+              <a:ext uri="{FF2B5EF4-FFF2-40B4-BE49-F238E27FC236}">
+                <a16:creationId xmlns:a16="http://schemas.microsoft.com/office/drawing/2014/main" id="{6CDCA84B-8DA6-9C40-AB5E-7DABFEB984C9}"/>
+              </a:ext>
+            </a:extLst>
+          </p:cNvPr>
+          <p:cNvSpPr/>
+          <p:nvPr/>
+        </p:nvSpPr>
+        <p:spPr>
+          <a:xfrm>
+            <a:off x="5622186" y="3829050"/>
+            <a:ext cx="618595" cy="217170"/>
+          </a:xfrm>
+          <a:prstGeom prst="roundRect">
+            <a:avLst/>
+          </a:prstGeom>
+          <a:noFill/>
+          <a:ln w="28575">
+            <a:solidFill>
+              <a:srgbClr val="FF0000"/>
+            </a:solidFill>
+          </a:ln>
+        </p:spPr>
+        <p:style>
+          <a:lnRef idx="2">
+            <a:schemeClr val="accent1">
+              <a:shade val="50000"/>
+            </a:schemeClr>
+          </a:lnRef>
+          <a:fillRef idx="1">
+            <a:schemeClr val="accent1"/>
+          </a:fillRef>
+          <a:effectRef idx="0">
+            <a:schemeClr val="accent1"/>
+          </a:effectRef>
+          <a:fontRef idx="minor">
+            <a:schemeClr val="lt1"/>
+          </a:fontRef>
+        </p:style>
+        <p:txBody>
+          <a:bodyPr rtlCol="0" anchor="ctr"/>
+          <a:lstStyle/>
+          <a:p>
+            <a:pPr algn="ctr"/>
+            <a:endParaRPr lang="en-US" b="1" dirty="0"/>
+          </a:p>
+        </p:txBody>
+      </p:sp>
+      <p:sp>
+        <p:nvSpPr>
+          <p:cNvPr id="15" name="Title 1">
+            <a:extLst>
+              <a:ext uri="{FF2B5EF4-FFF2-40B4-BE49-F238E27FC236}">
+                <a16:creationId xmlns:a16="http://schemas.microsoft.com/office/drawing/2014/main" id="{1975EE10-2358-5741-8600-3800647F7FF9}"/>
               </a:ext>
             </a:extLst>
           </p:cNvPr>
@@ -6400,118 +6895,1968 @@
             <p:ph type="title"/>
           </p:nvPr>
         </p:nvSpPr>
-        <p:spPr/>
-        <p:txBody>
-          <a:bodyPr/>
+        <p:spPr>
+          <a:xfrm>
+            <a:off x="1097280" y="286603"/>
+            <a:ext cx="10058400" cy="1450757"/>
+          </a:xfrm>
+        </p:spPr>
+        <p:txBody>
+          <a:bodyPr>
+            <a:normAutofit/>
+          </a:bodyPr>
           <a:lstStyle/>
           <a:p>
             <a:r>
-              <a:rPr lang="en-US" dirty="0"/>
-              <a:t>The $5 Billion Question</a:t>
-            </a:r>
-          </a:p>
-        </p:txBody>
-      </p:sp>
-      <p:sp>
-        <p:nvSpPr>
-          <p:cNvPr id="3" name="Content Placeholder 2">
+              <a:rPr lang="en-US" sz="4000" dirty="0"/>
+              <a:t>Amazon Cities &amp; Sites</a:t>
+            </a:r>
+          </a:p>
+        </p:txBody>
+      </p:sp>
+      <p:graphicFrame>
+        <p:nvGraphicFramePr>
+          <p:cNvPr id="16" name="Table 15">
             <a:extLst>
               <a:ext uri="{FF2B5EF4-FFF2-40B4-BE49-F238E27FC236}">
-                <a16:creationId xmlns:a16="http://schemas.microsoft.com/office/drawing/2014/main" id="{BEC8BDDB-FD44-4EB6-BE27-4A708B75BDAB}"/>
+                <a16:creationId xmlns:a16="http://schemas.microsoft.com/office/drawing/2014/main" id="{271ED836-7974-044F-AE59-38A3981622EA}"/>
               </a:ext>
             </a:extLst>
           </p:cNvPr>
-          <p:cNvSpPr>
-            <a:spLocks noGrp="1"/>
-          </p:cNvSpPr>
-          <p:nvPr>
-            <p:ph idx="1"/>
-          </p:nvPr>
-        </p:nvSpPr>
-        <p:spPr>
-          <a:xfrm>
-            <a:off x="1084923" y="1845734"/>
-            <a:ext cx="10058400" cy="4023360"/>
-          </a:xfrm>
-        </p:spPr>
-        <p:txBody>
-          <a:bodyPr/>
-          <a:lstStyle/>
-          <a:p>
-            <a:pPr marL="0" indent="0">
-              <a:buNone/>
-            </a:pPr>
-            <a:r>
-              <a:rPr lang="en-US" sz="3200" dirty="0"/>
-              <a:t>Cities across the U.S are competing to attract Amazon’s second head quarters which would bring </a:t>
-            </a:r>
-            <a:r>
-              <a:rPr lang="en-US" sz="3200" b="1" dirty="0"/>
-              <a:t>50,000 jobs </a:t>
-            </a:r>
-            <a:r>
-              <a:rPr lang="en-US" sz="3200" dirty="0"/>
-              <a:t>and </a:t>
-            </a:r>
-            <a:r>
-              <a:rPr lang="en-US" sz="3200" b="1" dirty="0"/>
-              <a:t>$5 billion investment</a:t>
-            </a:r>
-            <a:r>
-              <a:rPr lang="en-US" sz="3200" dirty="0"/>
-              <a:t>. Out of the original 238 cities, 20 cities made it the final cut.</a:t>
-            </a:r>
-          </a:p>
-          <a:p>
-            <a:pPr marL="0" indent="0">
-              <a:buNone/>
-            </a:pPr>
-            <a:r>
-              <a:rPr lang="en-US" sz="3200" dirty="0"/>
-              <a:t>If Amazon were a person (</a:t>
-            </a:r>
-            <a:r>
-              <a:rPr lang="en-US" sz="3200" dirty="0">
-                <a:solidFill>
-                  <a:schemeClr val="accent1">
-                    <a:lumMod val="75000"/>
-                  </a:schemeClr>
-                </a:solidFill>
-              </a:rPr>
-              <a:t>Yes…corporations are people!) </a:t>
-            </a:r>
-            <a:r>
-              <a:rPr lang="en-US" sz="3200" dirty="0"/>
-              <a:t>which city should he choose? </a:t>
-            </a:r>
-          </a:p>
-          <a:p>
-            <a:pPr marL="0" indent="0">
-              <a:buNone/>
-            </a:pPr>
-            <a:r>
-              <a:rPr lang="en-US" sz="3200" dirty="0"/>
-              <a:t>We are here to help!</a:t>
-            </a:r>
-          </a:p>
-          <a:p>
-            <a:pPr marL="0" indent="0">
-              <a:buNone/>
-            </a:pPr>
-            <a:endParaRPr lang="en-US" dirty="0"/>
-          </a:p>
-          <a:p>
-            <a:endParaRPr lang="en-US" dirty="0"/>
-          </a:p>
-          <a:p>
-            <a:endParaRPr lang="en-US" dirty="0"/>
-          </a:p>
-        </p:txBody>
-      </p:sp>
+          <p:cNvGraphicFramePr>
+            <a:graphicFrameLocks noGrp="1"/>
+          </p:cNvGraphicFramePr>
+          <p:nvPr/>
+        </p:nvGraphicFramePr>
+        <p:xfrm>
+          <a:off x="7244080" y="1962150"/>
+          <a:ext cx="2402840" cy="762000"/>
+        </p:xfrm>
+        <a:graphic>
+          <a:graphicData uri="http://schemas.openxmlformats.org/drawingml/2006/table">
+            <a:tbl>
+              <a:tblPr>
+                <a:tableStyleId>{74C1A8A3-306A-4EB7-A6B1-4F7E0EB9C5D6}</a:tableStyleId>
+              </a:tblPr>
+              <a:tblGrid>
+                <a:gridCol w="2402840">
+                  <a:extLst>
+                    <a:ext uri="{9D8B030D-6E8A-4147-A177-3AD203B41FA5}">
+                      <a16:colId xmlns:a16="http://schemas.microsoft.com/office/drawing/2014/main" val="4085062394"/>
+                    </a:ext>
+                  </a:extLst>
+                </a:gridCol>
+              </a:tblGrid>
+              <a:tr h="190500">
+                <a:tc>
+                  <a:txBody>
+                    <a:bodyPr/>
+                    <a:lstStyle/>
+                    <a:p>
+                      <a:pPr algn="l" fontAlgn="b"/>
+                      <a:r>
+                        <a:rPr lang="en-US" sz="1100" u="none" strike="noStrike" dirty="0">
+                          <a:effectLst/>
+                        </a:rPr>
+                        <a:t>Nationals Park/ D.C United Stadium</a:t>
+                      </a:r>
+                      <a:endParaRPr lang="en-US" sz="1100" b="0" i="0" u="none" strike="noStrike" dirty="0">
+                        <a:solidFill>
+                          <a:srgbClr val="000000"/>
+                        </a:solidFill>
+                        <a:effectLst/>
+                        <a:latin typeface="Calibri" panose="020F0502020204030204" pitchFamily="34" charset="0"/>
+                      </a:endParaRPr>
+                    </a:p>
+                  </a:txBody>
+                  <a:tcPr marL="9525" marR="9525" marT="9525" marB="0" anchor="b"/>
+                </a:tc>
+                <a:extLst>
+                  <a:ext uri="{0D108BD9-81ED-4DB2-BD59-A6C34878D82A}">
+                    <a16:rowId xmlns:a16="http://schemas.microsoft.com/office/drawing/2014/main" val="3894580338"/>
+                  </a:ext>
+                </a:extLst>
+              </a:tr>
+              <a:tr h="190500">
+                <a:tc>
+                  <a:txBody>
+                    <a:bodyPr/>
+                    <a:lstStyle/>
+                    <a:p>
+                      <a:pPr algn="l" fontAlgn="b"/>
+                      <a:r>
+                        <a:rPr lang="en-US" sz="1100" u="none" strike="noStrike" dirty="0">
+                          <a:effectLst/>
+                        </a:rPr>
+                        <a:t>Union Station</a:t>
+                      </a:r>
+                      <a:endParaRPr lang="en-US" sz="1100" b="0" i="0" u="none" strike="noStrike" dirty="0">
+                        <a:solidFill>
+                          <a:srgbClr val="000000"/>
+                        </a:solidFill>
+                        <a:effectLst/>
+                        <a:latin typeface="Calibri" panose="020F0502020204030204" pitchFamily="34" charset="0"/>
+                      </a:endParaRPr>
+                    </a:p>
+                  </a:txBody>
+                  <a:tcPr marL="9525" marR="9525" marT="9525" marB="0" anchor="b"/>
+                </a:tc>
+                <a:extLst>
+                  <a:ext uri="{0D108BD9-81ED-4DB2-BD59-A6C34878D82A}">
+                    <a16:rowId xmlns:a16="http://schemas.microsoft.com/office/drawing/2014/main" val="1535375954"/>
+                  </a:ext>
+                </a:extLst>
+              </a:tr>
+              <a:tr h="190500">
+                <a:tc>
+                  <a:txBody>
+                    <a:bodyPr/>
+                    <a:lstStyle/>
+                    <a:p>
+                      <a:pPr algn="l" fontAlgn="b"/>
+                      <a:r>
+                        <a:rPr lang="en-US" sz="1100" u="none" strike="noStrike" dirty="0">
+                          <a:effectLst/>
+                        </a:rPr>
+                        <a:t>Hill-East Neighborhood</a:t>
+                      </a:r>
+                      <a:endParaRPr lang="en-US" sz="1100" b="0" i="0" u="none" strike="noStrike" dirty="0">
+                        <a:solidFill>
+                          <a:srgbClr val="000000"/>
+                        </a:solidFill>
+                        <a:effectLst/>
+                        <a:latin typeface="Calibri" panose="020F0502020204030204" pitchFamily="34" charset="0"/>
+                      </a:endParaRPr>
+                    </a:p>
+                  </a:txBody>
+                  <a:tcPr marL="9525" marR="9525" marT="9525" marB="0" anchor="b"/>
+                </a:tc>
+                <a:extLst>
+                  <a:ext uri="{0D108BD9-81ED-4DB2-BD59-A6C34878D82A}">
+                    <a16:rowId xmlns:a16="http://schemas.microsoft.com/office/drawing/2014/main" val="4175138412"/>
+                  </a:ext>
+                </a:extLst>
+              </a:tr>
+              <a:tr h="190500">
+                <a:tc>
+                  <a:txBody>
+                    <a:bodyPr/>
+                    <a:lstStyle/>
+                    <a:p>
+                      <a:pPr algn="l" fontAlgn="b"/>
+                      <a:r>
+                        <a:rPr lang="en-US" sz="1100" u="none" strike="noStrike" dirty="0">
+                          <a:effectLst/>
+                        </a:rPr>
+                        <a:t>Shaw-Howard University Area</a:t>
+                      </a:r>
+                      <a:endParaRPr lang="en-US" sz="1100" b="0" i="0" u="none" strike="noStrike" dirty="0">
+                        <a:solidFill>
+                          <a:srgbClr val="000000"/>
+                        </a:solidFill>
+                        <a:effectLst/>
+                        <a:latin typeface="Calibri" panose="020F0502020204030204" pitchFamily="34" charset="0"/>
+                      </a:endParaRPr>
+                    </a:p>
+                  </a:txBody>
+                  <a:tcPr marL="9525" marR="9525" marT="9525" marB="0" anchor="b"/>
+                </a:tc>
+                <a:extLst>
+                  <a:ext uri="{0D108BD9-81ED-4DB2-BD59-A6C34878D82A}">
+                    <a16:rowId xmlns:a16="http://schemas.microsoft.com/office/drawing/2014/main" val="2320197904"/>
+                  </a:ext>
+                </a:extLst>
+              </a:tr>
+            </a:tbl>
+          </a:graphicData>
+        </a:graphic>
+      </p:graphicFrame>
+      <p:graphicFrame>
+        <p:nvGraphicFramePr>
+          <p:cNvPr id="17" name="Table 16">
+            <a:extLst>
+              <a:ext uri="{FF2B5EF4-FFF2-40B4-BE49-F238E27FC236}">
+                <a16:creationId xmlns:a16="http://schemas.microsoft.com/office/drawing/2014/main" id="{6BA55B50-EC05-B841-A185-7709EF6233DB}"/>
+              </a:ext>
+            </a:extLst>
+          </p:cNvPr>
+          <p:cNvGraphicFramePr>
+            <a:graphicFrameLocks noGrp="1"/>
+          </p:cNvGraphicFramePr>
+          <p:nvPr/>
+        </p:nvGraphicFramePr>
+        <p:xfrm>
+          <a:off x="7232650" y="1758315"/>
+          <a:ext cx="2414270" cy="192405"/>
+        </p:xfrm>
+        <a:graphic>
+          <a:graphicData uri="http://schemas.openxmlformats.org/drawingml/2006/table">
+            <a:tbl>
+              <a:tblPr>
+                <a:tableStyleId>{46F890A9-2807-4EBB-B81D-B2AA78EC7F39}</a:tableStyleId>
+              </a:tblPr>
+              <a:tblGrid>
+                <a:gridCol w="2414270">
+                  <a:extLst>
+                    <a:ext uri="{9D8B030D-6E8A-4147-A177-3AD203B41FA5}">
+                      <a16:colId xmlns:a16="http://schemas.microsoft.com/office/drawing/2014/main" val="1321473835"/>
+                    </a:ext>
+                  </a:extLst>
+                </a:gridCol>
+              </a:tblGrid>
+              <a:tr h="190500">
+                <a:tc>
+                  <a:txBody>
+                    <a:bodyPr/>
+                    <a:lstStyle/>
+                    <a:p>
+                      <a:pPr algn="l" fontAlgn="b"/>
+                      <a:r>
+                        <a:rPr lang="en-US" sz="1200" b="1" u="none" strike="noStrike" dirty="0">
+                          <a:effectLst/>
+                        </a:rPr>
+                        <a:t>Washington DC</a:t>
+                      </a:r>
+                      <a:endParaRPr lang="en-US" sz="1200" b="1" i="0" u="none" strike="noStrike" dirty="0">
+                        <a:solidFill>
+                          <a:srgbClr val="000000"/>
+                        </a:solidFill>
+                        <a:effectLst/>
+                        <a:latin typeface="Calibri" panose="020F0502020204030204" pitchFamily="34" charset="0"/>
+                      </a:endParaRPr>
+                    </a:p>
+                  </a:txBody>
+                  <a:tcPr marL="9525" marR="9525" marT="9525" marB="0" anchor="b"/>
+                </a:tc>
+                <a:extLst>
+                  <a:ext uri="{0D108BD9-81ED-4DB2-BD59-A6C34878D82A}">
+                    <a16:rowId xmlns:a16="http://schemas.microsoft.com/office/drawing/2014/main" val="2296783644"/>
+                  </a:ext>
+                </a:extLst>
+              </a:tr>
+            </a:tbl>
+          </a:graphicData>
+        </a:graphic>
+      </p:graphicFrame>
+      <p:graphicFrame>
+        <p:nvGraphicFramePr>
+          <p:cNvPr id="18" name="Table 17">
+            <a:extLst>
+              <a:ext uri="{FF2B5EF4-FFF2-40B4-BE49-F238E27FC236}">
+                <a16:creationId xmlns:a16="http://schemas.microsoft.com/office/drawing/2014/main" id="{0388C506-B1BC-2E4A-9532-68CB342255BF}"/>
+              </a:ext>
+            </a:extLst>
+          </p:cNvPr>
+          <p:cNvGraphicFramePr>
+            <a:graphicFrameLocks noGrp="1"/>
+          </p:cNvGraphicFramePr>
+          <p:nvPr/>
+        </p:nvGraphicFramePr>
+        <p:xfrm>
+          <a:off x="7244080" y="2970847"/>
+          <a:ext cx="2402840" cy="571500"/>
+        </p:xfrm>
+        <a:graphic>
+          <a:graphicData uri="http://schemas.openxmlformats.org/drawingml/2006/table">
+            <a:tbl>
+              <a:tblPr>
+                <a:tableStyleId>{2A488322-F2BA-4B5B-9748-0D474271808F}</a:tableStyleId>
+              </a:tblPr>
+              <a:tblGrid>
+                <a:gridCol w="2402840">
+                  <a:extLst>
+                    <a:ext uri="{9D8B030D-6E8A-4147-A177-3AD203B41FA5}">
+                      <a16:colId xmlns:a16="http://schemas.microsoft.com/office/drawing/2014/main" val="1655709826"/>
+                    </a:ext>
+                  </a:extLst>
+                </a:gridCol>
+              </a:tblGrid>
+              <a:tr h="190500">
+                <a:tc>
+                  <a:txBody>
+                    <a:bodyPr/>
+                    <a:lstStyle/>
+                    <a:p>
+                      <a:pPr algn="l" fontAlgn="b"/>
+                      <a:r>
+                        <a:rPr lang="en-US" sz="1100" u="none" strike="noStrike" dirty="0">
+                          <a:effectLst/>
+                        </a:rPr>
+                        <a:t>Warner Center West San Fernando Valley</a:t>
+                      </a:r>
+                      <a:endParaRPr lang="en-US" sz="1100" b="0" i="0" u="none" strike="noStrike" dirty="0">
+                        <a:solidFill>
+                          <a:srgbClr val="000000"/>
+                        </a:solidFill>
+                        <a:effectLst/>
+                        <a:latin typeface="Calibri" panose="020F0502020204030204" pitchFamily="34" charset="0"/>
+                      </a:endParaRPr>
+                    </a:p>
+                  </a:txBody>
+                  <a:tcPr marL="9525" marR="9525" marT="9525" marB="0" anchor="b"/>
+                </a:tc>
+                <a:extLst>
+                  <a:ext uri="{0D108BD9-81ED-4DB2-BD59-A6C34878D82A}">
+                    <a16:rowId xmlns:a16="http://schemas.microsoft.com/office/drawing/2014/main" val="786698291"/>
+                  </a:ext>
+                </a:extLst>
+              </a:tr>
+              <a:tr h="190500">
+                <a:tc>
+                  <a:txBody>
+                    <a:bodyPr/>
+                    <a:lstStyle/>
+                    <a:p>
+                      <a:pPr algn="l" fontAlgn="b"/>
+                      <a:r>
+                        <a:rPr lang="en-US" sz="1100" u="none" strike="noStrike">
+                          <a:effectLst/>
+                        </a:rPr>
+                        <a:t>New Hall Ranch Santa Clarita Valley</a:t>
+                      </a:r>
+                      <a:endParaRPr lang="en-US" sz="1100" b="0" i="0" u="none" strike="noStrike">
+                        <a:solidFill>
+                          <a:srgbClr val="000000"/>
+                        </a:solidFill>
+                        <a:effectLst/>
+                        <a:latin typeface="Calibri" panose="020F0502020204030204" pitchFamily="34" charset="0"/>
+                      </a:endParaRPr>
+                    </a:p>
+                  </a:txBody>
+                  <a:tcPr marL="9525" marR="9525" marT="9525" marB="0" anchor="b"/>
+                </a:tc>
+                <a:extLst>
+                  <a:ext uri="{0D108BD9-81ED-4DB2-BD59-A6C34878D82A}">
+                    <a16:rowId xmlns:a16="http://schemas.microsoft.com/office/drawing/2014/main" val="1410711032"/>
+                  </a:ext>
+                </a:extLst>
+              </a:tr>
+              <a:tr h="190500">
+                <a:tc>
+                  <a:txBody>
+                    <a:bodyPr/>
+                    <a:lstStyle/>
+                    <a:p>
+                      <a:pPr algn="l" fontAlgn="b"/>
+                      <a:r>
+                        <a:rPr lang="en-US" sz="1100" u="none" strike="noStrike" dirty="0">
+                          <a:effectLst/>
+                        </a:rPr>
+                        <a:t>Pomona Fairplex</a:t>
+                      </a:r>
+                      <a:endParaRPr lang="en-US" sz="1100" b="0" i="0" u="none" strike="noStrike" dirty="0">
+                        <a:solidFill>
+                          <a:srgbClr val="000000"/>
+                        </a:solidFill>
+                        <a:effectLst/>
+                        <a:latin typeface="Calibri" panose="020F0502020204030204" pitchFamily="34" charset="0"/>
+                      </a:endParaRPr>
+                    </a:p>
+                  </a:txBody>
+                  <a:tcPr marL="9525" marR="9525" marT="9525" marB="0" anchor="b"/>
+                </a:tc>
+                <a:extLst>
+                  <a:ext uri="{0D108BD9-81ED-4DB2-BD59-A6C34878D82A}">
+                    <a16:rowId xmlns:a16="http://schemas.microsoft.com/office/drawing/2014/main" val="3237096790"/>
+                  </a:ext>
+                </a:extLst>
+              </a:tr>
+            </a:tbl>
+          </a:graphicData>
+        </a:graphic>
+      </p:graphicFrame>
+      <p:graphicFrame>
+        <p:nvGraphicFramePr>
+          <p:cNvPr id="19" name="Table 18">
+            <a:extLst>
+              <a:ext uri="{FF2B5EF4-FFF2-40B4-BE49-F238E27FC236}">
+                <a16:creationId xmlns:a16="http://schemas.microsoft.com/office/drawing/2014/main" id="{F5B041D8-BB24-DB40-9A54-6453A8ADD681}"/>
+              </a:ext>
+            </a:extLst>
+          </p:cNvPr>
+          <p:cNvGraphicFramePr>
+            <a:graphicFrameLocks noGrp="1"/>
+          </p:cNvGraphicFramePr>
+          <p:nvPr/>
+        </p:nvGraphicFramePr>
+        <p:xfrm>
+          <a:off x="7257696" y="2758439"/>
+          <a:ext cx="2389223" cy="192405"/>
+        </p:xfrm>
+        <a:graphic>
+          <a:graphicData uri="http://schemas.openxmlformats.org/drawingml/2006/table">
+            <a:tbl>
+              <a:tblPr>
+                <a:tableStyleId>{46F890A9-2807-4EBB-B81D-B2AA78EC7F39}</a:tableStyleId>
+              </a:tblPr>
+              <a:tblGrid>
+                <a:gridCol w="2389223">
+                  <a:extLst>
+                    <a:ext uri="{9D8B030D-6E8A-4147-A177-3AD203B41FA5}">
+                      <a16:colId xmlns:a16="http://schemas.microsoft.com/office/drawing/2014/main" val="682814544"/>
+                    </a:ext>
+                  </a:extLst>
+                </a:gridCol>
+              </a:tblGrid>
+              <a:tr h="190500">
+                <a:tc>
+                  <a:txBody>
+                    <a:bodyPr/>
+                    <a:lstStyle/>
+                    <a:p>
+                      <a:pPr algn="l" fontAlgn="b"/>
+                      <a:r>
+                        <a:rPr lang="en-US" sz="1200" b="1" u="none" strike="noStrike" dirty="0">
+                          <a:effectLst/>
+                        </a:rPr>
+                        <a:t>Los Angeles</a:t>
+                      </a:r>
+                      <a:endParaRPr lang="en-US" sz="1200" b="1" i="0" u="none" strike="noStrike" dirty="0">
+                        <a:solidFill>
+                          <a:srgbClr val="000000"/>
+                        </a:solidFill>
+                        <a:effectLst/>
+                        <a:latin typeface="Calibri" panose="020F0502020204030204" pitchFamily="34" charset="0"/>
+                      </a:endParaRPr>
+                    </a:p>
+                  </a:txBody>
+                  <a:tcPr marL="9525" marR="9525" marT="9525" marB="0" anchor="b"/>
+                </a:tc>
+                <a:extLst>
+                  <a:ext uri="{0D108BD9-81ED-4DB2-BD59-A6C34878D82A}">
+                    <a16:rowId xmlns:a16="http://schemas.microsoft.com/office/drawing/2014/main" val="3480209066"/>
+                  </a:ext>
+                </a:extLst>
+              </a:tr>
+            </a:tbl>
+          </a:graphicData>
+        </a:graphic>
+      </p:graphicFrame>
+      <p:graphicFrame>
+        <p:nvGraphicFramePr>
+          <p:cNvPr id="21" name="Table 20">
+            <a:extLst>
+              <a:ext uri="{FF2B5EF4-FFF2-40B4-BE49-F238E27FC236}">
+                <a16:creationId xmlns:a16="http://schemas.microsoft.com/office/drawing/2014/main" id="{E4CBFE8C-8AE0-9F4F-B150-72D1E178AAF5}"/>
+              </a:ext>
+            </a:extLst>
+          </p:cNvPr>
+          <p:cNvGraphicFramePr>
+            <a:graphicFrameLocks noGrp="1"/>
+          </p:cNvGraphicFramePr>
+          <p:nvPr/>
+        </p:nvGraphicFramePr>
+        <p:xfrm>
+          <a:off x="9792969" y="2962275"/>
+          <a:ext cx="2311401" cy="762000"/>
+        </p:xfrm>
+        <a:graphic>
+          <a:graphicData uri="http://schemas.openxmlformats.org/drawingml/2006/table">
+            <a:tbl>
+              <a:tblPr>
+                <a:tableStyleId>{74C1A8A3-306A-4EB7-A6B1-4F7E0EB9C5D6}</a:tableStyleId>
+              </a:tblPr>
+              <a:tblGrid>
+                <a:gridCol w="2311401">
+                  <a:extLst>
+                    <a:ext uri="{9D8B030D-6E8A-4147-A177-3AD203B41FA5}">
+                      <a16:colId xmlns:a16="http://schemas.microsoft.com/office/drawing/2014/main" val="57641559"/>
+                    </a:ext>
+                  </a:extLst>
+                </a:gridCol>
+              </a:tblGrid>
+              <a:tr h="190500">
+                <a:tc>
+                  <a:txBody>
+                    <a:bodyPr/>
+                    <a:lstStyle/>
+                    <a:p>
+                      <a:pPr algn="l" fontAlgn="b"/>
+                      <a:r>
+                        <a:rPr lang="en-US" sz="1100" u="none" strike="noStrike" dirty="0">
+                          <a:effectLst/>
+                        </a:rPr>
+                        <a:t>Hudson Yards</a:t>
+                      </a:r>
+                      <a:endParaRPr lang="en-US" sz="1100" b="0" i="0" u="none" strike="noStrike" dirty="0">
+                        <a:solidFill>
+                          <a:srgbClr val="000000"/>
+                        </a:solidFill>
+                        <a:effectLst/>
+                        <a:latin typeface="Calibri" panose="020F0502020204030204" pitchFamily="34" charset="0"/>
+                      </a:endParaRPr>
+                    </a:p>
+                  </a:txBody>
+                  <a:tcPr marL="9525" marR="9525" marT="9525" marB="0" anchor="b"/>
+                </a:tc>
+                <a:extLst>
+                  <a:ext uri="{0D108BD9-81ED-4DB2-BD59-A6C34878D82A}">
+                    <a16:rowId xmlns:a16="http://schemas.microsoft.com/office/drawing/2014/main" val="646902361"/>
+                  </a:ext>
+                </a:extLst>
+              </a:tr>
+              <a:tr h="190500">
+                <a:tc>
+                  <a:txBody>
+                    <a:bodyPr/>
+                    <a:lstStyle/>
+                    <a:p>
+                      <a:pPr algn="l" fontAlgn="b"/>
+                      <a:r>
+                        <a:rPr lang="en-US" sz="1100" u="none" strike="noStrike" dirty="0">
+                          <a:effectLst/>
+                        </a:rPr>
+                        <a:t>Long Island City</a:t>
+                      </a:r>
+                      <a:endParaRPr lang="en-US" sz="1100" b="0" i="0" u="none" strike="noStrike" dirty="0">
+                        <a:solidFill>
+                          <a:srgbClr val="000000"/>
+                        </a:solidFill>
+                        <a:effectLst/>
+                        <a:latin typeface="Calibri" panose="020F0502020204030204" pitchFamily="34" charset="0"/>
+                      </a:endParaRPr>
+                    </a:p>
+                  </a:txBody>
+                  <a:tcPr marL="9525" marR="9525" marT="9525" marB="0" anchor="b"/>
+                </a:tc>
+                <a:extLst>
+                  <a:ext uri="{0D108BD9-81ED-4DB2-BD59-A6C34878D82A}">
+                    <a16:rowId xmlns:a16="http://schemas.microsoft.com/office/drawing/2014/main" val="690122257"/>
+                  </a:ext>
+                </a:extLst>
+              </a:tr>
+              <a:tr h="190500">
+                <a:tc>
+                  <a:txBody>
+                    <a:bodyPr/>
+                    <a:lstStyle/>
+                    <a:p>
+                      <a:pPr algn="l" fontAlgn="b"/>
+                      <a:r>
+                        <a:rPr lang="en-US" sz="1100" u="none" strike="noStrike" dirty="0">
+                          <a:effectLst/>
+                        </a:rPr>
+                        <a:t>Brooklyn Tech Triangle</a:t>
+                      </a:r>
+                      <a:endParaRPr lang="en-US" sz="1100" b="0" i="0" u="none" strike="noStrike" dirty="0">
+                        <a:solidFill>
+                          <a:srgbClr val="000000"/>
+                        </a:solidFill>
+                        <a:effectLst/>
+                        <a:latin typeface="Calibri" panose="020F0502020204030204" pitchFamily="34" charset="0"/>
+                      </a:endParaRPr>
+                    </a:p>
+                  </a:txBody>
+                  <a:tcPr marL="9525" marR="9525" marT="9525" marB="0" anchor="b"/>
+                </a:tc>
+                <a:extLst>
+                  <a:ext uri="{0D108BD9-81ED-4DB2-BD59-A6C34878D82A}">
+                    <a16:rowId xmlns:a16="http://schemas.microsoft.com/office/drawing/2014/main" val="3089689822"/>
+                  </a:ext>
+                </a:extLst>
+              </a:tr>
+              <a:tr h="190500">
+                <a:tc>
+                  <a:txBody>
+                    <a:bodyPr/>
+                    <a:lstStyle/>
+                    <a:p>
+                      <a:pPr algn="l" fontAlgn="b"/>
+                      <a:r>
+                        <a:rPr lang="en-US" sz="1100" u="none" strike="noStrike" dirty="0">
+                          <a:effectLst/>
+                        </a:rPr>
+                        <a:t>Financial District</a:t>
+                      </a:r>
+                      <a:endParaRPr lang="en-US" sz="1100" b="0" i="0" u="none" strike="noStrike" dirty="0">
+                        <a:solidFill>
+                          <a:srgbClr val="000000"/>
+                        </a:solidFill>
+                        <a:effectLst/>
+                        <a:latin typeface="Calibri" panose="020F0502020204030204" pitchFamily="34" charset="0"/>
+                      </a:endParaRPr>
+                    </a:p>
+                  </a:txBody>
+                  <a:tcPr marL="9525" marR="9525" marT="9525" marB="0" anchor="b"/>
+                </a:tc>
+                <a:extLst>
+                  <a:ext uri="{0D108BD9-81ED-4DB2-BD59-A6C34878D82A}">
+                    <a16:rowId xmlns:a16="http://schemas.microsoft.com/office/drawing/2014/main" val="1683936632"/>
+                  </a:ext>
+                </a:extLst>
+              </a:tr>
+            </a:tbl>
+          </a:graphicData>
+        </a:graphic>
+      </p:graphicFrame>
+      <p:graphicFrame>
+        <p:nvGraphicFramePr>
+          <p:cNvPr id="22" name="Table 21">
+            <a:extLst>
+              <a:ext uri="{FF2B5EF4-FFF2-40B4-BE49-F238E27FC236}">
+                <a16:creationId xmlns:a16="http://schemas.microsoft.com/office/drawing/2014/main" id="{A6CB4C8C-32C8-B140-81B5-1822097423CB}"/>
+              </a:ext>
+            </a:extLst>
+          </p:cNvPr>
+          <p:cNvGraphicFramePr>
+            <a:graphicFrameLocks noGrp="1"/>
+          </p:cNvGraphicFramePr>
+          <p:nvPr/>
+        </p:nvGraphicFramePr>
+        <p:xfrm>
+          <a:off x="7244080" y="4777740"/>
+          <a:ext cx="2402840" cy="1524000"/>
+        </p:xfrm>
+        <a:graphic>
+          <a:graphicData uri="http://schemas.openxmlformats.org/drawingml/2006/table">
+            <a:tbl>
+              <a:tblPr>
+                <a:tableStyleId>{74C1A8A3-306A-4EB7-A6B1-4F7E0EB9C5D6}</a:tableStyleId>
+              </a:tblPr>
+              <a:tblGrid>
+                <a:gridCol w="2402840">
+                  <a:extLst>
+                    <a:ext uri="{9D8B030D-6E8A-4147-A177-3AD203B41FA5}">
+                      <a16:colId xmlns:a16="http://schemas.microsoft.com/office/drawing/2014/main" val="2010620723"/>
+                    </a:ext>
+                  </a:extLst>
+                </a:gridCol>
+              </a:tblGrid>
+              <a:tr h="190500">
+                <a:tc>
+                  <a:txBody>
+                    <a:bodyPr/>
+                    <a:lstStyle/>
+                    <a:p>
+                      <a:pPr algn="l" fontAlgn="b"/>
+                      <a:r>
+                        <a:rPr lang="en-US" sz="1100" u="none" strike="noStrike">
+                          <a:effectLst/>
+                        </a:rPr>
+                        <a:t>Lincoln Yards</a:t>
+                      </a:r>
+                      <a:endParaRPr lang="en-US" sz="1100" b="0" i="0" u="none" strike="noStrike">
+                        <a:solidFill>
+                          <a:srgbClr val="000000"/>
+                        </a:solidFill>
+                        <a:effectLst/>
+                        <a:latin typeface="Calibri" panose="020F0502020204030204" pitchFamily="34" charset="0"/>
+                      </a:endParaRPr>
+                    </a:p>
+                  </a:txBody>
+                  <a:tcPr marL="9525" marR="9525" marT="9525" marB="0" anchor="b"/>
+                </a:tc>
+                <a:extLst>
+                  <a:ext uri="{0D108BD9-81ED-4DB2-BD59-A6C34878D82A}">
+                    <a16:rowId xmlns:a16="http://schemas.microsoft.com/office/drawing/2014/main" val="2251178306"/>
+                  </a:ext>
+                </a:extLst>
+              </a:tr>
+              <a:tr h="190500">
+                <a:tc>
+                  <a:txBody>
+                    <a:bodyPr/>
+                    <a:lstStyle/>
+                    <a:p>
+                      <a:pPr algn="l" fontAlgn="b"/>
+                      <a:r>
+                        <a:rPr lang="en-US" sz="1100" u="none" strike="noStrike" dirty="0">
+                          <a:effectLst/>
+                        </a:rPr>
+                        <a:t>The River District</a:t>
+                      </a:r>
+                      <a:endParaRPr lang="en-US" sz="1100" b="0" i="0" u="none" strike="noStrike" dirty="0">
+                        <a:solidFill>
+                          <a:srgbClr val="000000"/>
+                        </a:solidFill>
+                        <a:effectLst/>
+                        <a:latin typeface="Calibri" panose="020F0502020204030204" pitchFamily="34" charset="0"/>
+                      </a:endParaRPr>
+                    </a:p>
+                  </a:txBody>
+                  <a:tcPr marL="9525" marR="9525" marT="9525" marB="0" anchor="b"/>
+                </a:tc>
+                <a:extLst>
+                  <a:ext uri="{0D108BD9-81ED-4DB2-BD59-A6C34878D82A}">
+                    <a16:rowId xmlns:a16="http://schemas.microsoft.com/office/drawing/2014/main" val="2150021558"/>
+                  </a:ext>
+                </a:extLst>
+              </a:tr>
+              <a:tr h="190500">
+                <a:tc>
+                  <a:txBody>
+                    <a:bodyPr/>
+                    <a:lstStyle/>
+                    <a:p>
+                      <a:pPr algn="l" fontAlgn="b"/>
+                      <a:r>
+                        <a:rPr lang="en-US" sz="1100" u="none" strike="noStrike" dirty="0">
+                          <a:effectLst/>
+                        </a:rPr>
+                        <a:t>Futton Market</a:t>
+                      </a:r>
+                      <a:endParaRPr lang="en-US" sz="1100" b="0" i="0" u="none" strike="noStrike" dirty="0">
+                        <a:solidFill>
+                          <a:srgbClr val="000000"/>
+                        </a:solidFill>
+                        <a:effectLst/>
+                        <a:latin typeface="Calibri" panose="020F0502020204030204" pitchFamily="34" charset="0"/>
+                      </a:endParaRPr>
+                    </a:p>
+                  </a:txBody>
+                  <a:tcPr marL="9525" marR="9525" marT="9525" marB="0" anchor="b"/>
+                </a:tc>
+                <a:extLst>
+                  <a:ext uri="{0D108BD9-81ED-4DB2-BD59-A6C34878D82A}">
+                    <a16:rowId xmlns:a16="http://schemas.microsoft.com/office/drawing/2014/main" val="1907460893"/>
+                  </a:ext>
+                </a:extLst>
+              </a:tr>
+              <a:tr h="190500">
+                <a:tc>
+                  <a:txBody>
+                    <a:bodyPr/>
+                    <a:lstStyle/>
+                    <a:p>
+                      <a:pPr algn="l" fontAlgn="b"/>
+                      <a:r>
+                        <a:rPr lang="en-US" sz="1100" u="none" strike="noStrike" dirty="0">
+                          <a:effectLst/>
+                        </a:rPr>
+                        <a:t>City Center Campus</a:t>
+                      </a:r>
+                      <a:endParaRPr lang="en-US" sz="1100" b="0" i="0" u="none" strike="noStrike" dirty="0">
+                        <a:solidFill>
+                          <a:srgbClr val="000000"/>
+                        </a:solidFill>
+                        <a:effectLst/>
+                        <a:latin typeface="Calibri" panose="020F0502020204030204" pitchFamily="34" charset="0"/>
+                      </a:endParaRPr>
+                    </a:p>
+                  </a:txBody>
+                  <a:tcPr marL="9525" marR="9525" marT="9525" marB="0" anchor="b"/>
+                </a:tc>
+                <a:extLst>
+                  <a:ext uri="{0D108BD9-81ED-4DB2-BD59-A6C34878D82A}">
+                    <a16:rowId xmlns:a16="http://schemas.microsoft.com/office/drawing/2014/main" val="417561810"/>
+                  </a:ext>
+                </a:extLst>
+              </a:tr>
+              <a:tr h="190500">
+                <a:tc>
+                  <a:txBody>
+                    <a:bodyPr/>
+                    <a:lstStyle/>
+                    <a:p>
+                      <a:pPr algn="l" fontAlgn="b"/>
+                      <a:r>
+                        <a:rPr lang="en-US" sz="1100" u="none" strike="noStrike">
+                          <a:effectLst/>
+                        </a:rPr>
+                        <a:t>The Downtown District</a:t>
+                      </a:r>
+                      <a:endParaRPr lang="en-US" sz="1100" b="0" i="0" u="none" strike="noStrike">
+                        <a:solidFill>
+                          <a:srgbClr val="000000"/>
+                        </a:solidFill>
+                        <a:effectLst/>
+                        <a:latin typeface="Calibri" panose="020F0502020204030204" pitchFamily="34" charset="0"/>
+                      </a:endParaRPr>
+                    </a:p>
+                  </a:txBody>
+                  <a:tcPr marL="9525" marR="9525" marT="9525" marB="0" anchor="b"/>
+                </a:tc>
+                <a:extLst>
+                  <a:ext uri="{0D108BD9-81ED-4DB2-BD59-A6C34878D82A}">
+                    <a16:rowId xmlns:a16="http://schemas.microsoft.com/office/drawing/2014/main" val="3087885508"/>
+                  </a:ext>
+                </a:extLst>
+              </a:tr>
+              <a:tr h="190500">
+                <a:tc>
+                  <a:txBody>
+                    <a:bodyPr/>
+                    <a:lstStyle/>
+                    <a:p>
+                      <a:pPr algn="l" fontAlgn="b"/>
+                      <a:r>
+                        <a:rPr lang="en-US" sz="1100" u="none" strike="noStrike">
+                          <a:effectLst/>
+                        </a:rPr>
+                        <a:t>The Illinois Medical District</a:t>
+                      </a:r>
+                      <a:endParaRPr lang="en-US" sz="1100" b="0" i="0" u="none" strike="noStrike">
+                        <a:solidFill>
+                          <a:srgbClr val="000000"/>
+                        </a:solidFill>
+                        <a:effectLst/>
+                        <a:latin typeface="Calibri" panose="020F0502020204030204" pitchFamily="34" charset="0"/>
+                      </a:endParaRPr>
+                    </a:p>
+                  </a:txBody>
+                  <a:tcPr marL="9525" marR="9525" marT="9525" marB="0" anchor="b"/>
+                </a:tc>
+                <a:extLst>
+                  <a:ext uri="{0D108BD9-81ED-4DB2-BD59-A6C34878D82A}">
+                    <a16:rowId xmlns:a16="http://schemas.microsoft.com/office/drawing/2014/main" val="2547303377"/>
+                  </a:ext>
+                </a:extLst>
+              </a:tr>
+              <a:tr h="190500">
+                <a:tc>
+                  <a:txBody>
+                    <a:bodyPr/>
+                    <a:lstStyle/>
+                    <a:p>
+                      <a:pPr algn="l" fontAlgn="b"/>
+                      <a:r>
+                        <a:rPr lang="en-US" sz="1100" u="none" strike="noStrike">
+                          <a:effectLst/>
+                        </a:rPr>
+                        <a:t>The 78</a:t>
+                      </a:r>
+                      <a:endParaRPr lang="en-US" sz="1100" b="0" i="0" u="none" strike="noStrike">
+                        <a:solidFill>
+                          <a:srgbClr val="000000"/>
+                        </a:solidFill>
+                        <a:effectLst/>
+                        <a:latin typeface="Calibri" panose="020F0502020204030204" pitchFamily="34" charset="0"/>
+                      </a:endParaRPr>
+                    </a:p>
+                  </a:txBody>
+                  <a:tcPr marL="9525" marR="9525" marT="9525" marB="0" anchor="b"/>
+                </a:tc>
+                <a:extLst>
+                  <a:ext uri="{0D108BD9-81ED-4DB2-BD59-A6C34878D82A}">
+                    <a16:rowId xmlns:a16="http://schemas.microsoft.com/office/drawing/2014/main" val="614566106"/>
+                  </a:ext>
+                </a:extLst>
+              </a:tr>
+              <a:tr h="190500">
+                <a:tc>
+                  <a:txBody>
+                    <a:bodyPr/>
+                    <a:lstStyle/>
+                    <a:p>
+                      <a:pPr algn="l" fontAlgn="b"/>
+                      <a:r>
+                        <a:rPr lang="en-US" sz="1100" u="none" strike="noStrike" dirty="0">
+                          <a:effectLst/>
+                        </a:rPr>
+                        <a:t>Burnham Lakefront</a:t>
+                      </a:r>
+                      <a:endParaRPr lang="en-US" sz="1100" b="0" i="0" u="none" strike="noStrike" dirty="0">
+                        <a:solidFill>
+                          <a:srgbClr val="000000"/>
+                        </a:solidFill>
+                        <a:effectLst/>
+                        <a:latin typeface="Calibri" panose="020F0502020204030204" pitchFamily="34" charset="0"/>
+                      </a:endParaRPr>
+                    </a:p>
+                  </a:txBody>
+                  <a:tcPr marL="9525" marR="9525" marT="9525" marB="0" anchor="b"/>
+                </a:tc>
+                <a:extLst>
+                  <a:ext uri="{0D108BD9-81ED-4DB2-BD59-A6C34878D82A}">
+                    <a16:rowId xmlns:a16="http://schemas.microsoft.com/office/drawing/2014/main" val="4275934924"/>
+                  </a:ext>
+                </a:extLst>
+              </a:tr>
+            </a:tbl>
+          </a:graphicData>
+        </a:graphic>
+      </p:graphicFrame>
+      <p:graphicFrame>
+        <p:nvGraphicFramePr>
+          <p:cNvPr id="23" name="Table 22">
+            <a:extLst>
+              <a:ext uri="{FF2B5EF4-FFF2-40B4-BE49-F238E27FC236}">
+                <a16:creationId xmlns:a16="http://schemas.microsoft.com/office/drawing/2014/main" id="{FA6BBC98-8416-0B43-B180-EB828EDDAFF0}"/>
+              </a:ext>
+            </a:extLst>
+          </p:cNvPr>
+          <p:cNvGraphicFramePr>
+            <a:graphicFrameLocks noGrp="1"/>
+          </p:cNvGraphicFramePr>
+          <p:nvPr/>
+        </p:nvGraphicFramePr>
+        <p:xfrm>
+          <a:off x="9792970" y="3977739"/>
+          <a:ext cx="2311400" cy="571500"/>
+        </p:xfrm>
+        <a:graphic>
+          <a:graphicData uri="http://schemas.openxmlformats.org/drawingml/2006/table">
+            <a:tbl>
+              <a:tblPr>
+                <a:tableStyleId>{74C1A8A3-306A-4EB7-A6B1-4F7E0EB9C5D6}</a:tableStyleId>
+              </a:tblPr>
+              <a:tblGrid>
+                <a:gridCol w="2311400">
+                  <a:extLst>
+                    <a:ext uri="{9D8B030D-6E8A-4147-A177-3AD203B41FA5}">
+                      <a16:colId xmlns:a16="http://schemas.microsoft.com/office/drawing/2014/main" val="1204892567"/>
+                    </a:ext>
+                  </a:extLst>
+                </a:gridCol>
+              </a:tblGrid>
+              <a:tr h="190500">
+                <a:tc>
+                  <a:txBody>
+                    <a:bodyPr/>
+                    <a:lstStyle/>
+                    <a:p>
+                      <a:pPr algn="l" fontAlgn="b"/>
+                      <a:r>
+                        <a:rPr lang="en-US" sz="1100" u="none" strike="noStrike" dirty="0">
+                          <a:effectLst/>
+                        </a:rPr>
+                        <a:t>Research Triangle Park</a:t>
+                      </a:r>
+                      <a:endParaRPr lang="en-US" sz="1100" b="0" i="0" u="none" strike="noStrike" dirty="0">
+                        <a:solidFill>
+                          <a:srgbClr val="000000"/>
+                        </a:solidFill>
+                        <a:effectLst/>
+                        <a:latin typeface="Calibri" panose="020F0502020204030204" pitchFamily="34" charset="0"/>
+                      </a:endParaRPr>
+                    </a:p>
+                  </a:txBody>
+                  <a:tcPr marL="9525" marR="9525" marT="9525" marB="0" anchor="b"/>
+                </a:tc>
+                <a:extLst>
+                  <a:ext uri="{0D108BD9-81ED-4DB2-BD59-A6C34878D82A}">
+                    <a16:rowId xmlns:a16="http://schemas.microsoft.com/office/drawing/2014/main" val="1724798008"/>
+                  </a:ext>
+                </a:extLst>
+              </a:tr>
+              <a:tr h="190500">
+                <a:tc>
+                  <a:txBody>
+                    <a:bodyPr/>
+                    <a:lstStyle/>
+                    <a:p>
+                      <a:pPr algn="l" fontAlgn="b"/>
+                      <a:r>
+                        <a:rPr lang="en-US" sz="1100" u="none" strike="noStrike" dirty="0">
+                          <a:effectLst/>
+                        </a:rPr>
+                        <a:t>Chatham Park</a:t>
+                      </a:r>
+                      <a:endParaRPr lang="en-US" sz="1100" b="0" i="0" u="none" strike="noStrike" dirty="0">
+                        <a:solidFill>
+                          <a:srgbClr val="000000"/>
+                        </a:solidFill>
+                        <a:effectLst/>
+                        <a:latin typeface="Calibri" panose="020F0502020204030204" pitchFamily="34" charset="0"/>
+                      </a:endParaRPr>
+                    </a:p>
+                  </a:txBody>
+                  <a:tcPr marL="9525" marR="9525" marT="9525" marB="0" anchor="b"/>
+                </a:tc>
+                <a:extLst>
+                  <a:ext uri="{0D108BD9-81ED-4DB2-BD59-A6C34878D82A}">
+                    <a16:rowId xmlns:a16="http://schemas.microsoft.com/office/drawing/2014/main" val="48040782"/>
+                  </a:ext>
+                </a:extLst>
+              </a:tr>
+              <a:tr h="190500">
+                <a:tc>
+                  <a:txBody>
+                    <a:bodyPr/>
+                    <a:lstStyle/>
+                    <a:p>
+                      <a:pPr algn="l" fontAlgn="b"/>
+                      <a:r>
+                        <a:rPr lang="en-US" sz="1100" u="none" strike="noStrike" dirty="0">
+                          <a:effectLst/>
+                        </a:rPr>
+                        <a:t>Warehouse District</a:t>
+                      </a:r>
+                      <a:endParaRPr lang="en-US" sz="1100" b="0" i="0" u="none" strike="noStrike" dirty="0">
+                        <a:solidFill>
+                          <a:srgbClr val="000000"/>
+                        </a:solidFill>
+                        <a:effectLst/>
+                        <a:latin typeface="Calibri" panose="020F0502020204030204" pitchFamily="34" charset="0"/>
+                      </a:endParaRPr>
+                    </a:p>
+                  </a:txBody>
+                  <a:tcPr marL="9525" marR="9525" marT="9525" marB="0" anchor="b"/>
+                </a:tc>
+                <a:extLst>
+                  <a:ext uri="{0D108BD9-81ED-4DB2-BD59-A6C34878D82A}">
+                    <a16:rowId xmlns:a16="http://schemas.microsoft.com/office/drawing/2014/main" val="217234477"/>
+                  </a:ext>
+                </a:extLst>
+              </a:tr>
+            </a:tbl>
+          </a:graphicData>
+        </a:graphic>
+      </p:graphicFrame>
+      <p:graphicFrame>
+        <p:nvGraphicFramePr>
+          <p:cNvPr id="24" name="Table 23">
+            <a:extLst>
+              <a:ext uri="{FF2B5EF4-FFF2-40B4-BE49-F238E27FC236}">
+                <a16:creationId xmlns:a16="http://schemas.microsoft.com/office/drawing/2014/main" id="{E0340131-BB34-6741-902A-1DA8185E0625}"/>
+              </a:ext>
+            </a:extLst>
+          </p:cNvPr>
+          <p:cNvGraphicFramePr>
+            <a:graphicFrameLocks noGrp="1"/>
+          </p:cNvGraphicFramePr>
+          <p:nvPr/>
+        </p:nvGraphicFramePr>
+        <p:xfrm>
+          <a:off x="9781540" y="1957288"/>
+          <a:ext cx="2322830" cy="762000"/>
+        </p:xfrm>
+        <a:graphic>
+          <a:graphicData uri="http://schemas.openxmlformats.org/drawingml/2006/table">
+            <a:tbl>
+              <a:tblPr>
+                <a:tableStyleId>{74C1A8A3-306A-4EB7-A6B1-4F7E0EB9C5D6}</a:tableStyleId>
+              </a:tblPr>
+              <a:tblGrid>
+                <a:gridCol w="2322830">
+                  <a:extLst>
+                    <a:ext uri="{9D8B030D-6E8A-4147-A177-3AD203B41FA5}">
+                      <a16:colId xmlns:a16="http://schemas.microsoft.com/office/drawing/2014/main" val="680901911"/>
+                    </a:ext>
+                  </a:extLst>
+                </a:gridCol>
+              </a:tblGrid>
+              <a:tr h="190500">
+                <a:tc>
+                  <a:txBody>
+                    <a:bodyPr/>
+                    <a:lstStyle/>
+                    <a:p>
+                      <a:pPr algn="l" fontAlgn="b"/>
+                      <a:r>
+                        <a:rPr lang="en-US" sz="1100" u="none" strike="noStrike" dirty="0">
+                          <a:effectLst/>
+                        </a:rPr>
+                        <a:t>Downtown Atlanta</a:t>
+                      </a:r>
+                      <a:endParaRPr lang="en-US" sz="1100" b="0" i="0" u="none" strike="noStrike" dirty="0">
+                        <a:solidFill>
+                          <a:srgbClr val="000000"/>
+                        </a:solidFill>
+                        <a:effectLst/>
+                        <a:latin typeface="Calibri" panose="020F0502020204030204" pitchFamily="34" charset="0"/>
+                      </a:endParaRPr>
+                    </a:p>
+                  </a:txBody>
+                  <a:tcPr marL="9525" marR="9525" marT="9525" marB="0" anchor="b"/>
+                </a:tc>
+                <a:extLst>
+                  <a:ext uri="{0D108BD9-81ED-4DB2-BD59-A6C34878D82A}">
+                    <a16:rowId xmlns:a16="http://schemas.microsoft.com/office/drawing/2014/main" val="382838366"/>
+                  </a:ext>
+                </a:extLst>
+              </a:tr>
+              <a:tr h="190500">
+                <a:tc>
+                  <a:txBody>
+                    <a:bodyPr/>
+                    <a:lstStyle/>
+                    <a:p>
+                      <a:pPr algn="l" fontAlgn="b"/>
+                      <a:r>
+                        <a:rPr lang="en-US" sz="1100" u="none" strike="noStrike" dirty="0">
+                          <a:effectLst/>
+                        </a:rPr>
+                        <a:t>Midtown</a:t>
+                      </a:r>
+                      <a:endParaRPr lang="en-US" sz="1100" b="0" i="0" u="none" strike="noStrike" dirty="0">
+                        <a:solidFill>
+                          <a:srgbClr val="000000"/>
+                        </a:solidFill>
+                        <a:effectLst/>
+                        <a:latin typeface="Calibri" panose="020F0502020204030204" pitchFamily="34" charset="0"/>
+                      </a:endParaRPr>
+                    </a:p>
+                  </a:txBody>
+                  <a:tcPr marL="9525" marR="9525" marT="9525" marB="0" anchor="b"/>
+                </a:tc>
+                <a:extLst>
+                  <a:ext uri="{0D108BD9-81ED-4DB2-BD59-A6C34878D82A}">
+                    <a16:rowId xmlns:a16="http://schemas.microsoft.com/office/drawing/2014/main" val="1361885839"/>
+                  </a:ext>
+                </a:extLst>
+              </a:tr>
+              <a:tr h="190500">
+                <a:tc>
+                  <a:txBody>
+                    <a:bodyPr/>
+                    <a:lstStyle/>
+                    <a:p>
+                      <a:pPr algn="l" fontAlgn="b"/>
+                      <a:r>
+                        <a:rPr lang="en-US" sz="1100" u="none" strike="noStrike" dirty="0">
+                          <a:effectLst/>
+                        </a:rPr>
+                        <a:t>Former GM plant</a:t>
+                      </a:r>
+                      <a:endParaRPr lang="en-US" sz="1100" b="0" i="0" u="none" strike="noStrike" dirty="0">
+                        <a:solidFill>
+                          <a:srgbClr val="000000"/>
+                        </a:solidFill>
+                        <a:effectLst/>
+                        <a:latin typeface="Calibri" panose="020F0502020204030204" pitchFamily="34" charset="0"/>
+                      </a:endParaRPr>
+                    </a:p>
+                  </a:txBody>
+                  <a:tcPr marL="9525" marR="9525" marT="9525" marB="0" anchor="b"/>
+                </a:tc>
+                <a:extLst>
+                  <a:ext uri="{0D108BD9-81ED-4DB2-BD59-A6C34878D82A}">
+                    <a16:rowId xmlns:a16="http://schemas.microsoft.com/office/drawing/2014/main" val="2941785282"/>
+                  </a:ext>
+                </a:extLst>
+              </a:tr>
+              <a:tr h="190500">
+                <a:tc>
+                  <a:txBody>
+                    <a:bodyPr/>
+                    <a:lstStyle/>
+                    <a:p>
+                      <a:pPr algn="l" fontAlgn="b"/>
+                      <a:r>
+                        <a:rPr lang="en-US" sz="1100" u="none" strike="noStrike" dirty="0">
+                          <a:effectLst/>
+                        </a:rPr>
+                        <a:t>The High Street Site</a:t>
+                      </a:r>
+                      <a:endParaRPr lang="en-US" sz="1100" b="0" i="0" u="none" strike="noStrike" dirty="0">
+                        <a:solidFill>
+                          <a:srgbClr val="000000"/>
+                        </a:solidFill>
+                        <a:effectLst/>
+                        <a:latin typeface="Calibri" panose="020F0502020204030204" pitchFamily="34" charset="0"/>
+                      </a:endParaRPr>
+                    </a:p>
+                  </a:txBody>
+                  <a:tcPr marL="9525" marR="9525" marT="9525" marB="0" anchor="b"/>
+                </a:tc>
+                <a:extLst>
+                  <a:ext uri="{0D108BD9-81ED-4DB2-BD59-A6C34878D82A}">
+                    <a16:rowId xmlns:a16="http://schemas.microsoft.com/office/drawing/2014/main" val="1374660608"/>
+                  </a:ext>
+                </a:extLst>
+              </a:tr>
+            </a:tbl>
+          </a:graphicData>
+        </a:graphic>
+      </p:graphicFrame>
+      <p:graphicFrame>
+        <p:nvGraphicFramePr>
+          <p:cNvPr id="25" name="Table 24">
+            <a:extLst>
+              <a:ext uri="{FF2B5EF4-FFF2-40B4-BE49-F238E27FC236}">
+                <a16:creationId xmlns:a16="http://schemas.microsoft.com/office/drawing/2014/main" id="{7FFF5CCA-C272-DB47-9C25-971CFED1A4EF}"/>
+              </a:ext>
+            </a:extLst>
+          </p:cNvPr>
+          <p:cNvGraphicFramePr>
+            <a:graphicFrameLocks noGrp="1"/>
+          </p:cNvGraphicFramePr>
+          <p:nvPr/>
+        </p:nvGraphicFramePr>
+        <p:xfrm>
+          <a:off x="9781540" y="4787164"/>
+          <a:ext cx="2322830" cy="1333500"/>
+        </p:xfrm>
+        <a:graphic>
+          <a:graphicData uri="http://schemas.openxmlformats.org/drawingml/2006/table">
+            <a:tbl>
+              <a:tblPr>
+                <a:tableStyleId>{74C1A8A3-306A-4EB7-A6B1-4F7E0EB9C5D6}</a:tableStyleId>
+              </a:tblPr>
+              <a:tblGrid>
+                <a:gridCol w="2322830">
+                  <a:extLst>
+                    <a:ext uri="{9D8B030D-6E8A-4147-A177-3AD203B41FA5}">
+                      <a16:colId xmlns:a16="http://schemas.microsoft.com/office/drawing/2014/main" val="1772296632"/>
+                    </a:ext>
+                  </a:extLst>
+                </a:gridCol>
+              </a:tblGrid>
+              <a:tr h="190500">
+                <a:tc>
+                  <a:txBody>
+                    <a:bodyPr/>
+                    <a:lstStyle/>
+                    <a:p>
+                      <a:pPr algn="l" fontAlgn="b"/>
+                      <a:r>
+                        <a:rPr lang="en-US" sz="1100" u="none" strike="noStrike">
+                          <a:effectLst/>
+                        </a:rPr>
+                        <a:t>American-Statesman </a:t>
+                      </a:r>
+                      <a:endParaRPr lang="en-US" sz="1100" b="0" i="0" u="none" strike="noStrike">
+                        <a:solidFill>
+                          <a:srgbClr val="000000"/>
+                        </a:solidFill>
+                        <a:effectLst/>
+                        <a:latin typeface="Calibri" panose="020F0502020204030204" pitchFamily="34" charset="0"/>
+                      </a:endParaRPr>
+                    </a:p>
+                  </a:txBody>
+                  <a:tcPr marL="9525" marR="9525" marT="9525" marB="0" anchor="b"/>
+                </a:tc>
+                <a:extLst>
+                  <a:ext uri="{0D108BD9-81ED-4DB2-BD59-A6C34878D82A}">
+                    <a16:rowId xmlns:a16="http://schemas.microsoft.com/office/drawing/2014/main" val="1023929927"/>
+                  </a:ext>
+                </a:extLst>
+              </a:tr>
+              <a:tr h="190500">
+                <a:tc>
+                  <a:txBody>
+                    <a:bodyPr/>
+                    <a:lstStyle/>
+                    <a:p>
+                      <a:pPr algn="l" fontAlgn="b"/>
+                      <a:r>
+                        <a:rPr lang="en-US" sz="1100" u="none" strike="noStrike" dirty="0">
+                          <a:effectLst/>
+                        </a:rPr>
+                        <a:t>Eightfold</a:t>
+                      </a:r>
+                      <a:endParaRPr lang="en-US" sz="1100" b="0" i="0" u="none" strike="noStrike" dirty="0">
+                        <a:solidFill>
+                          <a:srgbClr val="000000"/>
+                        </a:solidFill>
+                        <a:effectLst/>
+                        <a:latin typeface="Calibri" panose="020F0502020204030204" pitchFamily="34" charset="0"/>
+                      </a:endParaRPr>
+                    </a:p>
+                  </a:txBody>
+                  <a:tcPr marL="9525" marR="9525" marT="9525" marB="0" anchor="b"/>
+                </a:tc>
+                <a:extLst>
+                  <a:ext uri="{0D108BD9-81ED-4DB2-BD59-A6C34878D82A}">
+                    <a16:rowId xmlns:a16="http://schemas.microsoft.com/office/drawing/2014/main" val="2632738260"/>
+                  </a:ext>
+                </a:extLst>
+              </a:tr>
+              <a:tr h="190500">
+                <a:tc>
+                  <a:txBody>
+                    <a:bodyPr/>
+                    <a:lstStyle/>
+                    <a:p>
+                      <a:pPr algn="l" fontAlgn="b"/>
+                      <a:r>
+                        <a:rPr lang="en-US" sz="1100" u="none" strike="noStrike" dirty="0">
+                          <a:effectLst/>
+                        </a:rPr>
+                        <a:t>Former 3M site</a:t>
+                      </a:r>
+                      <a:endParaRPr lang="en-US" sz="1100" b="0" i="0" u="none" strike="noStrike" dirty="0">
+                        <a:solidFill>
+                          <a:srgbClr val="000000"/>
+                        </a:solidFill>
+                        <a:effectLst/>
+                        <a:latin typeface="Calibri" panose="020F0502020204030204" pitchFamily="34" charset="0"/>
+                      </a:endParaRPr>
+                    </a:p>
+                  </a:txBody>
+                  <a:tcPr marL="9525" marR="9525" marT="9525" marB="0" anchor="b"/>
+                </a:tc>
+                <a:extLst>
+                  <a:ext uri="{0D108BD9-81ED-4DB2-BD59-A6C34878D82A}">
+                    <a16:rowId xmlns:a16="http://schemas.microsoft.com/office/drawing/2014/main" val="3815130043"/>
+                  </a:ext>
+                </a:extLst>
+              </a:tr>
+              <a:tr h="190500">
+                <a:tc>
+                  <a:txBody>
+                    <a:bodyPr/>
+                    <a:lstStyle/>
+                    <a:p>
+                      <a:pPr algn="l" fontAlgn="b"/>
+                      <a:r>
+                        <a:rPr lang="en-US" sz="1100" u="none" strike="noStrike" dirty="0">
+                          <a:effectLst/>
+                        </a:rPr>
+                        <a:t>The Domain</a:t>
+                      </a:r>
+                      <a:endParaRPr lang="en-US" sz="1100" b="0" i="0" u="none" strike="noStrike" dirty="0">
+                        <a:solidFill>
+                          <a:srgbClr val="000000"/>
+                        </a:solidFill>
+                        <a:effectLst/>
+                        <a:latin typeface="Calibri" panose="020F0502020204030204" pitchFamily="34" charset="0"/>
+                      </a:endParaRPr>
+                    </a:p>
+                  </a:txBody>
+                  <a:tcPr marL="9525" marR="9525" marT="9525" marB="0" anchor="b"/>
+                </a:tc>
+                <a:extLst>
+                  <a:ext uri="{0D108BD9-81ED-4DB2-BD59-A6C34878D82A}">
+                    <a16:rowId xmlns:a16="http://schemas.microsoft.com/office/drawing/2014/main" val="3553420962"/>
+                  </a:ext>
+                </a:extLst>
+              </a:tr>
+              <a:tr h="190500">
+                <a:tc>
+                  <a:txBody>
+                    <a:bodyPr/>
+                    <a:lstStyle/>
+                    <a:p>
+                      <a:pPr algn="l" fontAlgn="b"/>
+                      <a:r>
+                        <a:rPr lang="en-US" sz="1100" u="none" strike="noStrike" dirty="0">
+                          <a:effectLst/>
+                        </a:rPr>
+                        <a:t>Bardmoor Campus</a:t>
+                      </a:r>
+                      <a:endParaRPr lang="en-US" sz="1100" b="0" i="0" u="none" strike="noStrike" dirty="0">
+                        <a:solidFill>
+                          <a:srgbClr val="000000"/>
+                        </a:solidFill>
+                        <a:effectLst/>
+                        <a:latin typeface="Calibri" panose="020F0502020204030204" pitchFamily="34" charset="0"/>
+                      </a:endParaRPr>
+                    </a:p>
+                  </a:txBody>
+                  <a:tcPr marL="9525" marR="9525" marT="9525" marB="0" anchor="b"/>
+                </a:tc>
+                <a:extLst>
+                  <a:ext uri="{0D108BD9-81ED-4DB2-BD59-A6C34878D82A}">
+                    <a16:rowId xmlns:a16="http://schemas.microsoft.com/office/drawing/2014/main" val="2031047528"/>
+                  </a:ext>
+                </a:extLst>
+              </a:tr>
+              <a:tr h="190500">
+                <a:tc>
+                  <a:txBody>
+                    <a:bodyPr/>
+                    <a:lstStyle/>
+                    <a:p>
+                      <a:pPr algn="l" fontAlgn="b"/>
+                      <a:r>
+                        <a:rPr lang="en-US" sz="1100" u="none" strike="noStrike" dirty="0">
+                          <a:effectLst/>
+                        </a:rPr>
+                        <a:t>Robinson Ranch</a:t>
+                      </a:r>
+                      <a:endParaRPr lang="en-US" sz="1100" b="0" i="0" u="none" strike="noStrike" dirty="0">
+                        <a:solidFill>
+                          <a:srgbClr val="000000"/>
+                        </a:solidFill>
+                        <a:effectLst/>
+                        <a:latin typeface="Calibri" panose="020F0502020204030204" pitchFamily="34" charset="0"/>
+                      </a:endParaRPr>
+                    </a:p>
+                  </a:txBody>
+                  <a:tcPr marL="9525" marR="9525" marT="9525" marB="0" anchor="b"/>
+                </a:tc>
+                <a:extLst>
+                  <a:ext uri="{0D108BD9-81ED-4DB2-BD59-A6C34878D82A}">
+                    <a16:rowId xmlns:a16="http://schemas.microsoft.com/office/drawing/2014/main" val="3486433966"/>
+                  </a:ext>
+                </a:extLst>
+              </a:tr>
+              <a:tr h="190500">
+                <a:tc>
+                  <a:txBody>
+                    <a:bodyPr/>
+                    <a:lstStyle/>
+                    <a:p>
+                      <a:pPr algn="l" fontAlgn="b"/>
+                      <a:r>
+                        <a:rPr lang="en-US" sz="1100" u="none" strike="noStrike" dirty="0">
+                          <a:effectLst/>
+                        </a:rPr>
+                        <a:t>Project Catalyst</a:t>
+                      </a:r>
+                      <a:endParaRPr lang="en-US" sz="1100" b="0" i="0" u="none" strike="noStrike" dirty="0">
+                        <a:solidFill>
+                          <a:srgbClr val="000000"/>
+                        </a:solidFill>
+                        <a:effectLst/>
+                        <a:latin typeface="Calibri" panose="020F0502020204030204" pitchFamily="34" charset="0"/>
+                      </a:endParaRPr>
+                    </a:p>
+                  </a:txBody>
+                  <a:tcPr marL="9525" marR="9525" marT="9525" marB="0" anchor="b"/>
+                </a:tc>
+                <a:extLst>
+                  <a:ext uri="{0D108BD9-81ED-4DB2-BD59-A6C34878D82A}">
+                    <a16:rowId xmlns:a16="http://schemas.microsoft.com/office/drawing/2014/main" val="826265374"/>
+                  </a:ext>
+                </a:extLst>
+              </a:tr>
+            </a:tbl>
+          </a:graphicData>
+        </a:graphic>
+      </p:graphicFrame>
+      <p:graphicFrame>
+        <p:nvGraphicFramePr>
+          <p:cNvPr id="26" name="Table 25">
+            <a:extLst>
+              <a:ext uri="{FF2B5EF4-FFF2-40B4-BE49-F238E27FC236}">
+                <a16:creationId xmlns:a16="http://schemas.microsoft.com/office/drawing/2014/main" id="{05A61EBE-65B1-DE40-9C26-79E0FF313F20}"/>
+              </a:ext>
+            </a:extLst>
+          </p:cNvPr>
+          <p:cNvGraphicFramePr>
+            <a:graphicFrameLocks noGrp="1"/>
+          </p:cNvGraphicFramePr>
+          <p:nvPr/>
+        </p:nvGraphicFramePr>
+        <p:xfrm>
+          <a:off x="7244080" y="3789044"/>
+          <a:ext cx="2402840" cy="762000"/>
+        </p:xfrm>
+        <a:graphic>
+          <a:graphicData uri="http://schemas.openxmlformats.org/drawingml/2006/table">
+            <a:tbl>
+              <a:tblPr>
+                <a:tableStyleId>{74C1A8A3-306A-4EB7-A6B1-4F7E0EB9C5D6}</a:tableStyleId>
+              </a:tblPr>
+              <a:tblGrid>
+                <a:gridCol w="2402840">
+                  <a:extLst>
+                    <a:ext uri="{9D8B030D-6E8A-4147-A177-3AD203B41FA5}">
+                      <a16:colId xmlns:a16="http://schemas.microsoft.com/office/drawing/2014/main" val="850786229"/>
+                    </a:ext>
+                  </a:extLst>
+                </a:gridCol>
+              </a:tblGrid>
+              <a:tr h="190500">
+                <a:tc>
+                  <a:txBody>
+                    <a:bodyPr/>
+                    <a:lstStyle/>
+                    <a:p>
+                      <a:pPr algn="l" fontAlgn="b"/>
+                      <a:r>
+                        <a:rPr lang="en-US" sz="1100" u="none" strike="noStrike" dirty="0">
+                          <a:effectLst/>
+                        </a:rPr>
+                        <a:t>Suffolk Downs</a:t>
+                      </a:r>
+                      <a:endParaRPr lang="en-US" sz="1100" b="0" i="0" u="none" strike="noStrike" dirty="0">
+                        <a:solidFill>
+                          <a:srgbClr val="000000"/>
+                        </a:solidFill>
+                        <a:effectLst/>
+                        <a:latin typeface="Calibri" panose="020F0502020204030204" pitchFamily="34" charset="0"/>
+                      </a:endParaRPr>
+                    </a:p>
+                  </a:txBody>
+                  <a:tcPr marL="9525" marR="9525" marT="9525" marB="0" anchor="b"/>
+                </a:tc>
+                <a:extLst>
+                  <a:ext uri="{0D108BD9-81ED-4DB2-BD59-A6C34878D82A}">
+                    <a16:rowId xmlns:a16="http://schemas.microsoft.com/office/drawing/2014/main" val="709752000"/>
+                  </a:ext>
+                </a:extLst>
+              </a:tr>
+              <a:tr h="190500">
+                <a:tc>
+                  <a:txBody>
+                    <a:bodyPr/>
+                    <a:lstStyle/>
+                    <a:p>
+                      <a:pPr algn="l" fontAlgn="b"/>
+                      <a:r>
+                        <a:rPr lang="en-US" sz="1100" u="none" strike="noStrike" dirty="0">
+                          <a:effectLst/>
+                        </a:rPr>
+                        <a:t>South Boston Waterfront</a:t>
+                      </a:r>
+                      <a:endParaRPr lang="en-US" sz="1100" b="0" i="0" u="none" strike="noStrike" dirty="0">
+                        <a:solidFill>
+                          <a:srgbClr val="000000"/>
+                        </a:solidFill>
+                        <a:effectLst/>
+                        <a:latin typeface="Calibri" panose="020F0502020204030204" pitchFamily="34" charset="0"/>
+                      </a:endParaRPr>
+                    </a:p>
+                  </a:txBody>
+                  <a:tcPr marL="9525" marR="9525" marT="9525" marB="0" anchor="b"/>
+                </a:tc>
+                <a:extLst>
+                  <a:ext uri="{0D108BD9-81ED-4DB2-BD59-A6C34878D82A}">
+                    <a16:rowId xmlns:a16="http://schemas.microsoft.com/office/drawing/2014/main" val="1439740037"/>
+                  </a:ext>
+                </a:extLst>
+              </a:tr>
+              <a:tr h="190500">
+                <a:tc>
+                  <a:txBody>
+                    <a:bodyPr/>
+                    <a:lstStyle/>
+                    <a:p>
+                      <a:pPr algn="l" fontAlgn="b"/>
+                      <a:r>
+                        <a:rPr lang="en-US" sz="1100" u="none" strike="noStrike" dirty="0">
+                          <a:effectLst/>
+                        </a:rPr>
+                        <a:t>Downtown</a:t>
+                      </a:r>
+                      <a:endParaRPr lang="en-US" sz="1100" b="0" i="0" u="none" strike="noStrike" dirty="0">
+                        <a:solidFill>
+                          <a:srgbClr val="000000"/>
+                        </a:solidFill>
+                        <a:effectLst/>
+                        <a:latin typeface="Calibri" panose="020F0502020204030204" pitchFamily="34" charset="0"/>
+                      </a:endParaRPr>
+                    </a:p>
+                  </a:txBody>
+                  <a:tcPr marL="9525" marR="9525" marT="9525" marB="0" anchor="b"/>
+                </a:tc>
+                <a:extLst>
+                  <a:ext uri="{0D108BD9-81ED-4DB2-BD59-A6C34878D82A}">
+                    <a16:rowId xmlns:a16="http://schemas.microsoft.com/office/drawing/2014/main" val="3641115420"/>
+                  </a:ext>
+                </a:extLst>
+              </a:tr>
+              <a:tr h="190500">
+                <a:tc>
+                  <a:txBody>
+                    <a:bodyPr/>
+                    <a:lstStyle/>
+                    <a:p>
+                      <a:pPr algn="l" fontAlgn="b"/>
+                      <a:r>
+                        <a:rPr lang="en-US" sz="1100" u="none" strike="noStrike" dirty="0">
+                          <a:effectLst/>
+                        </a:rPr>
+                        <a:t>South End</a:t>
+                      </a:r>
+                      <a:endParaRPr lang="en-US" sz="1100" b="0" i="0" u="none" strike="noStrike" dirty="0">
+                        <a:solidFill>
+                          <a:srgbClr val="000000"/>
+                        </a:solidFill>
+                        <a:effectLst/>
+                        <a:latin typeface="Calibri" panose="020F0502020204030204" pitchFamily="34" charset="0"/>
+                      </a:endParaRPr>
+                    </a:p>
+                  </a:txBody>
+                  <a:tcPr marL="9525" marR="9525" marT="9525" marB="0" anchor="b"/>
+                </a:tc>
+                <a:extLst>
+                  <a:ext uri="{0D108BD9-81ED-4DB2-BD59-A6C34878D82A}">
+                    <a16:rowId xmlns:a16="http://schemas.microsoft.com/office/drawing/2014/main" val="2954385309"/>
+                  </a:ext>
+                </a:extLst>
+              </a:tr>
+            </a:tbl>
+          </a:graphicData>
+        </a:graphic>
+      </p:graphicFrame>
+      <p:graphicFrame>
+        <p:nvGraphicFramePr>
+          <p:cNvPr id="27" name="Table 26">
+            <a:extLst>
+              <a:ext uri="{FF2B5EF4-FFF2-40B4-BE49-F238E27FC236}">
+                <a16:creationId xmlns:a16="http://schemas.microsoft.com/office/drawing/2014/main" id="{BB0AB6AF-F641-DA40-AF1F-17EA1AF36FE3}"/>
+              </a:ext>
+            </a:extLst>
+          </p:cNvPr>
+          <p:cNvGraphicFramePr>
+            <a:graphicFrameLocks noGrp="1"/>
+          </p:cNvGraphicFramePr>
+          <p:nvPr/>
+        </p:nvGraphicFramePr>
+        <p:xfrm>
+          <a:off x="7244079" y="3569493"/>
+          <a:ext cx="2402839" cy="192405"/>
+        </p:xfrm>
+        <a:graphic>
+          <a:graphicData uri="http://schemas.openxmlformats.org/drawingml/2006/table">
+            <a:tbl>
+              <a:tblPr>
+                <a:tableStyleId>{46F890A9-2807-4EBB-B81D-B2AA78EC7F39}</a:tableStyleId>
+              </a:tblPr>
+              <a:tblGrid>
+                <a:gridCol w="2402839">
+                  <a:extLst>
+                    <a:ext uri="{9D8B030D-6E8A-4147-A177-3AD203B41FA5}">
+                      <a16:colId xmlns:a16="http://schemas.microsoft.com/office/drawing/2014/main" val="682814544"/>
+                    </a:ext>
+                  </a:extLst>
+                </a:gridCol>
+              </a:tblGrid>
+              <a:tr h="190500">
+                <a:tc>
+                  <a:txBody>
+                    <a:bodyPr/>
+                    <a:lstStyle/>
+                    <a:p>
+                      <a:pPr algn="l" fontAlgn="b"/>
+                      <a:r>
+                        <a:rPr lang="en-US" sz="1200" b="1" u="none" strike="noStrike" dirty="0">
+                          <a:effectLst/>
+                        </a:rPr>
+                        <a:t>Boston</a:t>
+                      </a:r>
+                      <a:endParaRPr lang="en-US" sz="1200" b="1" i="0" u="none" strike="noStrike" dirty="0">
+                        <a:solidFill>
+                          <a:srgbClr val="000000"/>
+                        </a:solidFill>
+                        <a:effectLst/>
+                        <a:latin typeface="Calibri" panose="020F0502020204030204" pitchFamily="34" charset="0"/>
+                      </a:endParaRPr>
+                    </a:p>
+                  </a:txBody>
+                  <a:tcPr marL="9525" marR="9525" marT="9525" marB="0" anchor="b"/>
+                </a:tc>
+                <a:extLst>
+                  <a:ext uri="{0D108BD9-81ED-4DB2-BD59-A6C34878D82A}">
+                    <a16:rowId xmlns:a16="http://schemas.microsoft.com/office/drawing/2014/main" val="3480209066"/>
+                  </a:ext>
+                </a:extLst>
+              </a:tr>
+            </a:tbl>
+          </a:graphicData>
+        </a:graphic>
+      </p:graphicFrame>
+      <p:graphicFrame>
+        <p:nvGraphicFramePr>
+          <p:cNvPr id="28" name="Table 27">
+            <a:extLst>
+              <a:ext uri="{FF2B5EF4-FFF2-40B4-BE49-F238E27FC236}">
+                <a16:creationId xmlns:a16="http://schemas.microsoft.com/office/drawing/2014/main" id="{00DDCEAA-12B5-644A-8D5E-9C2363398F01}"/>
+              </a:ext>
+            </a:extLst>
+          </p:cNvPr>
+          <p:cNvGraphicFramePr>
+            <a:graphicFrameLocks noGrp="1"/>
+          </p:cNvGraphicFramePr>
+          <p:nvPr/>
+        </p:nvGraphicFramePr>
+        <p:xfrm>
+          <a:off x="7246266" y="4571047"/>
+          <a:ext cx="2400651" cy="192405"/>
+        </p:xfrm>
+        <a:graphic>
+          <a:graphicData uri="http://schemas.openxmlformats.org/drawingml/2006/table">
+            <a:tbl>
+              <a:tblPr>
+                <a:tableStyleId>{46F890A9-2807-4EBB-B81D-B2AA78EC7F39}</a:tableStyleId>
+              </a:tblPr>
+              <a:tblGrid>
+                <a:gridCol w="2400651">
+                  <a:extLst>
+                    <a:ext uri="{9D8B030D-6E8A-4147-A177-3AD203B41FA5}">
+                      <a16:colId xmlns:a16="http://schemas.microsoft.com/office/drawing/2014/main" val="682814544"/>
+                    </a:ext>
+                  </a:extLst>
+                </a:gridCol>
+              </a:tblGrid>
+              <a:tr h="190500">
+                <a:tc>
+                  <a:txBody>
+                    <a:bodyPr/>
+                    <a:lstStyle/>
+                    <a:p>
+                      <a:pPr algn="l" fontAlgn="b"/>
+                      <a:r>
+                        <a:rPr lang="en-US" sz="1200" b="1" u="none" strike="noStrike" dirty="0">
+                          <a:effectLst/>
+                        </a:rPr>
+                        <a:t>Chicago</a:t>
+                      </a:r>
+                      <a:endParaRPr lang="en-US" sz="1200" b="1" i="0" u="none" strike="noStrike" dirty="0">
+                        <a:solidFill>
+                          <a:srgbClr val="000000"/>
+                        </a:solidFill>
+                        <a:effectLst/>
+                        <a:latin typeface="Calibri" panose="020F0502020204030204" pitchFamily="34" charset="0"/>
+                      </a:endParaRPr>
+                    </a:p>
+                  </a:txBody>
+                  <a:tcPr marL="9525" marR="9525" marT="9525" marB="0" anchor="b"/>
+                </a:tc>
+                <a:extLst>
+                  <a:ext uri="{0D108BD9-81ED-4DB2-BD59-A6C34878D82A}">
+                    <a16:rowId xmlns:a16="http://schemas.microsoft.com/office/drawing/2014/main" val="3480209066"/>
+                  </a:ext>
+                </a:extLst>
+              </a:tr>
+            </a:tbl>
+          </a:graphicData>
+        </a:graphic>
+      </p:graphicFrame>
+      <p:graphicFrame>
+        <p:nvGraphicFramePr>
+          <p:cNvPr id="29" name="Table 28">
+            <a:extLst>
+              <a:ext uri="{FF2B5EF4-FFF2-40B4-BE49-F238E27FC236}">
+                <a16:creationId xmlns:a16="http://schemas.microsoft.com/office/drawing/2014/main" id="{63ED3AD4-AF60-764B-BF56-82443DF64FA8}"/>
+              </a:ext>
+            </a:extLst>
+          </p:cNvPr>
+          <p:cNvGraphicFramePr>
+            <a:graphicFrameLocks noGrp="1"/>
+          </p:cNvGraphicFramePr>
+          <p:nvPr/>
+        </p:nvGraphicFramePr>
+        <p:xfrm>
+          <a:off x="9781539" y="1756261"/>
+          <a:ext cx="2322829" cy="192405"/>
+        </p:xfrm>
+        <a:graphic>
+          <a:graphicData uri="http://schemas.openxmlformats.org/drawingml/2006/table">
+            <a:tbl>
+              <a:tblPr>
+                <a:tableStyleId>{46F890A9-2807-4EBB-B81D-B2AA78EC7F39}</a:tableStyleId>
+              </a:tblPr>
+              <a:tblGrid>
+                <a:gridCol w="2322829">
+                  <a:extLst>
+                    <a:ext uri="{9D8B030D-6E8A-4147-A177-3AD203B41FA5}">
+                      <a16:colId xmlns:a16="http://schemas.microsoft.com/office/drawing/2014/main" val="1321473835"/>
+                    </a:ext>
+                  </a:extLst>
+                </a:gridCol>
+              </a:tblGrid>
+              <a:tr h="190500">
+                <a:tc>
+                  <a:txBody>
+                    <a:bodyPr/>
+                    <a:lstStyle/>
+                    <a:p>
+                      <a:pPr algn="l" fontAlgn="b"/>
+                      <a:r>
+                        <a:rPr lang="en-US" sz="1200" b="1" u="none" strike="noStrike" dirty="0">
+                          <a:effectLst/>
+                        </a:rPr>
+                        <a:t>Atlanta</a:t>
+                      </a:r>
+                      <a:endParaRPr lang="en-US" sz="1200" b="1" i="0" u="none" strike="noStrike" dirty="0">
+                        <a:solidFill>
+                          <a:srgbClr val="000000"/>
+                        </a:solidFill>
+                        <a:effectLst/>
+                        <a:latin typeface="Calibri" panose="020F0502020204030204" pitchFamily="34" charset="0"/>
+                      </a:endParaRPr>
+                    </a:p>
+                  </a:txBody>
+                  <a:tcPr marL="9525" marR="9525" marT="9525" marB="0" anchor="b"/>
+                </a:tc>
+                <a:extLst>
+                  <a:ext uri="{0D108BD9-81ED-4DB2-BD59-A6C34878D82A}">
+                    <a16:rowId xmlns:a16="http://schemas.microsoft.com/office/drawing/2014/main" val="2296783644"/>
+                  </a:ext>
+                </a:extLst>
+              </a:tr>
+            </a:tbl>
+          </a:graphicData>
+        </a:graphic>
+      </p:graphicFrame>
+      <p:graphicFrame>
+        <p:nvGraphicFramePr>
+          <p:cNvPr id="30" name="Table 29">
+            <a:extLst>
+              <a:ext uri="{FF2B5EF4-FFF2-40B4-BE49-F238E27FC236}">
+                <a16:creationId xmlns:a16="http://schemas.microsoft.com/office/drawing/2014/main" id="{1C75648F-E57C-564E-8E01-AA8C5B1E7921}"/>
+              </a:ext>
+            </a:extLst>
+          </p:cNvPr>
+          <p:cNvGraphicFramePr>
+            <a:graphicFrameLocks noGrp="1"/>
+          </p:cNvGraphicFramePr>
+          <p:nvPr/>
+        </p:nvGraphicFramePr>
+        <p:xfrm>
+          <a:off x="9800236" y="2750393"/>
+          <a:ext cx="2304133" cy="192405"/>
+        </p:xfrm>
+        <a:graphic>
+          <a:graphicData uri="http://schemas.openxmlformats.org/drawingml/2006/table">
+            <a:tbl>
+              <a:tblPr>
+                <a:tableStyleId>{46F890A9-2807-4EBB-B81D-B2AA78EC7F39}</a:tableStyleId>
+              </a:tblPr>
+              <a:tblGrid>
+                <a:gridCol w="2304133">
+                  <a:extLst>
+                    <a:ext uri="{9D8B030D-6E8A-4147-A177-3AD203B41FA5}">
+                      <a16:colId xmlns:a16="http://schemas.microsoft.com/office/drawing/2014/main" val="682814544"/>
+                    </a:ext>
+                  </a:extLst>
+                </a:gridCol>
+              </a:tblGrid>
+              <a:tr h="190500">
+                <a:tc>
+                  <a:txBody>
+                    <a:bodyPr/>
+                    <a:lstStyle/>
+                    <a:p>
+                      <a:pPr algn="l" fontAlgn="b"/>
+                      <a:r>
+                        <a:rPr lang="en-US" sz="1200" b="1" u="none" strike="noStrike" dirty="0">
+                          <a:effectLst/>
+                        </a:rPr>
+                        <a:t>New York</a:t>
+                      </a:r>
+                      <a:endParaRPr lang="en-US" sz="1200" b="1" i="0" u="none" strike="noStrike" dirty="0">
+                        <a:solidFill>
+                          <a:srgbClr val="000000"/>
+                        </a:solidFill>
+                        <a:effectLst/>
+                        <a:latin typeface="Calibri" panose="020F0502020204030204" pitchFamily="34" charset="0"/>
+                      </a:endParaRPr>
+                    </a:p>
+                  </a:txBody>
+                  <a:tcPr marL="9525" marR="9525" marT="9525" marB="0" anchor="b"/>
+                </a:tc>
+                <a:extLst>
+                  <a:ext uri="{0D108BD9-81ED-4DB2-BD59-A6C34878D82A}">
+                    <a16:rowId xmlns:a16="http://schemas.microsoft.com/office/drawing/2014/main" val="3480209066"/>
+                  </a:ext>
+                </a:extLst>
+              </a:tr>
+            </a:tbl>
+          </a:graphicData>
+        </a:graphic>
+      </p:graphicFrame>
+      <p:graphicFrame>
+        <p:nvGraphicFramePr>
+          <p:cNvPr id="31" name="Table 30">
+            <a:extLst>
+              <a:ext uri="{FF2B5EF4-FFF2-40B4-BE49-F238E27FC236}">
+                <a16:creationId xmlns:a16="http://schemas.microsoft.com/office/drawing/2014/main" id="{45E7FC35-4FFD-2746-BE22-58558E64F129}"/>
+              </a:ext>
+            </a:extLst>
+          </p:cNvPr>
+          <p:cNvGraphicFramePr>
+            <a:graphicFrameLocks noGrp="1"/>
+          </p:cNvGraphicFramePr>
+          <p:nvPr/>
+        </p:nvGraphicFramePr>
+        <p:xfrm>
+          <a:off x="9781540" y="3759317"/>
+          <a:ext cx="2322830" cy="192405"/>
+        </p:xfrm>
+        <a:graphic>
+          <a:graphicData uri="http://schemas.openxmlformats.org/drawingml/2006/table">
+            <a:tbl>
+              <a:tblPr>
+                <a:tableStyleId>{46F890A9-2807-4EBB-B81D-B2AA78EC7F39}</a:tableStyleId>
+              </a:tblPr>
+              <a:tblGrid>
+                <a:gridCol w="2322830">
+                  <a:extLst>
+                    <a:ext uri="{9D8B030D-6E8A-4147-A177-3AD203B41FA5}">
+                      <a16:colId xmlns:a16="http://schemas.microsoft.com/office/drawing/2014/main" val="682814544"/>
+                    </a:ext>
+                  </a:extLst>
+                </a:gridCol>
+              </a:tblGrid>
+              <a:tr h="190500">
+                <a:tc>
+                  <a:txBody>
+                    <a:bodyPr/>
+                    <a:lstStyle/>
+                    <a:p>
+                      <a:pPr algn="l" fontAlgn="b"/>
+                      <a:r>
+                        <a:rPr lang="en-US" sz="1200" b="1" u="none" strike="noStrike" dirty="0">
+                          <a:effectLst/>
+                        </a:rPr>
+                        <a:t>Raleigh</a:t>
+                      </a:r>
+                      <a:endParaRPr lang="en-US" sz="1200" b="1" i="0" u="none" strike="noStrike" dirty="0">
+                        <a:solidFill>
+                          <a:srgbClr val="000000"/>
+                        </a:solidFill>
+                        <a:effectLst/>
+                        <a:latin typeface="Calibri" panose="020F0502020204030204" pitchFamily="34" charset="0"/>
+                      </a:endParaRPr>
+                    </a:p>
+                  </a:txBody>
+                  <a:tcPr marL="9525" marR="9525" marT="9525" marB="0" anchor="b"/>
+                </a:tc>
+                <a:extLst>
+                  <a:ext uri="{0D108BD9-81ED-4DB2-BD59-A6C34878D82A}">
+                    <a16:rowId xmlns:a16="http://schemas.microsoft.com/office/drawing/2014/main" val="3480209066"/>
+                  </a:ext>
+                </a:extLst>
+              </a:tr>
+            </a:tbl>
+          </a:graphicData>
+        </a:graphic>
+      </p:graphicFrame>
+      <p:graphicFrame>
+        <p:nvGraphicFramePr>
+          <p:cNvPr id="33" name="Table 32">
+            <a:extLst>
+              <a:ext uri="{FF2B5EF4-FFF2-40B4-BE49-F238E27FC236}">
+                <a16:creationId xmlns:a16="http://schemas.microsoft.com/office/drawing/2014/main" id="{30554AF1-6BA1-C848-8F62-BECA2E66AD5C}"/>
+              </a:ext>
+            </a:extLst>
+          </p:cNvPr>
+          <p:cNvGraphicFramePr>
+            <a:graphicFrameLocks noGrp="1"/>
+          </p:cNvGraphicFramePr>
+          <p:nvPr/>
+        </p:nvGraphicFramePr>
+        <p:xfrm>
+          <a:off x="9770286" y="4585335"/>
+          <a:ext cx="2334084" cy="192405"/>
+        </p:xfrm>
+        <a:graphic>
+          <a:graphicData uri="http://schemas.openxmlformats.org/drawingml/2006/table">
+            <a:tbl>
+              <a:tblPr>
+                <a:tableStyleId>{46F890A9-2807-4EBB-B81D-B2AA78EC7F39}</a:tableStyleId>
+              </a:tblPr>
+              <a:tblGrid>
+                <a:gridCol w="2334084">
+                  <a:extLst>
+                    <a:ext uri="{9D8B030D-6E8A-4147-A177-3AD203B41FA5}">
+                      <a16:colId xmlns:a16="http://schemas.microsoft.com/office/drawing/2014/main" val="682814544"/>
+                    </a:ext>
+                  </a:extLst>
+                </a:gridCol>
+              </a:tblGrid>
+              <a:tr h="190500">
+                <a:tc>
+                  <a:txBody>
+                    <a:bodyPr/>
+                    <a:lstStyle/>
+                    <a:p>
+                      <a:pPr algn="l" fontAlgn="b"/>
+                      <a:r>
+                        <a:rPr lang="en-US" sz="1200" b="1" i="0" u="none" strike="noStrike" dirty="0">
+                          <a:solidFill>
+                            <a:srgbClr val="000000"/>
+                          </a:solidFill>
+                          <a:effectLst/>
+                          <a:latin typeface="Calibri" panose="020F0502020204030204" pitchFamily="34" charset="0"/>
+                        </a:rPr>
+                        <a:t>Austin</a:t>
+                      </a:r>
+                    </a:p>
+                  </a:txBody>
+                  <a:tcPr marL="9525" marR="9525" marT="9525" marB="0" anchor="b"/>
+                </a:tc>
+                <a:extLst>
+                  <a:ext uri="{0D108BD9-81ED-4DB2-BD59-A6C34878D82A}">
+                    <a16:rowId xmlns:a16="http://schemas.microsoft.com/office/drawing/2014/main" val="3480209066"/>
+                  </a:ext>
+                </a:extLst>
+              </a:tr>
+            </a:tbl>
+          </a:graphicData>
+        </a:graphic>
+      </p:graphicFrame>
     </p:spTree>
     <p:extLst>
       <p:ext uri="{BB962C8B-B14F-4D97-AF65-F5344CB8AC3E}">
-        <p14:creationId xmlns:p14="http://schemas.microsoft.com/office/powerpoint/2010/main" val="71064535"/>
+        <p14:creationId xmlns:p14="http://schemas.microsoft.com/office/powerpoint/2010/main" val="377542841"/>
       </p:ext>
     </p:extLst>
   </p:cSld>

</xml_diff>

<commit_message>
add slide for overall ranking
</commit_message>
<xml_diff>
--- a/Project1_Presentation.pptx
+++ b/Project1_Presentation.pptx
@@ -31,6 +31,7 @@
     <p:sldId id="286" r:id="rId25"/>
     <p:sldId id="289" r:id="rId26"/>
     <p:sldId id="290" r:id="rId27"/>
+    <p:sldId id="291" r:id="rId28"/>
   </p:sldIdLst>
   <p:sldSz cx="12192000" cy="6858000"/>
   <p:notesSz cx="6858000" cy="9144000"/>
@@ -363,7 +364,7 @@
           <a:p>
             <a:fld id="{F70A646C-22A8-4D69-ACFD-CD88A31D50DB}" type="datetimeFigureOut">
               <a:rPr lang="en-US" smtClean="0"/>
-              <a:t>4/3/2018</a:t>
+              <a:t>4/3/18</a:t>
             </a:fld>
             <a:endParaRPr lang="en-US"/>
           </a:p>
@@ -571,7 +572,7 @@
           <a:p>
             <a:fld id="{F70A646C-22A8-4D69-ACFD-CD88A31D50DB}" type="datetimeFigureOut">
               <a:rPr lang="en-US" smtClean="0"/>
-              <a:t>4/3/2018</a:t>
+              <a:t>4/3/18</a:t>
             </a:fld>
             <a:endParaRPr lang="en-US"/>
           </a:p>
@@ -827,7 +828,7 @@
           <a:p>
             <a:fld id="{F70A646C-22A8-4D69-ACFD-CD88A31D50DB}" type="datetimeFigureOut">
               <a:rPr lang="en-US" smtClean="0"/>
-              <a:t>4/3/2018</a:t>
+              <a:t>4/3/18</a:t>
             </a:fld>
             <a:endParaRPr lang="en-US"/>
           </a:p>
@@ -1001,7 +1002,7 @@
           <a:p>
             <a:fld id="{F70A646C-22A8-4D69-ACFD-CD88A31D50DB}" type="datetimeFigureOut">
               <a:rPr lang="en-US" smtClean="0"/>
-              <a:t>4/3/2018</a:t>
+              <a:t>4/3/18</a:t>
             </a:fld>
             <a:endParaRPr lang="en-US"/>
           </a:p>
@@ -1344,7 +1345,7 @@
           <a:p>
             <a:fld id="{F70A646C-22A8-4D69-ACFD-CD88A31D50DB}" type="datetimeFigureOut">
               <a:rPr lang="en-US" smtClean="0"/>
-              <a:t>4/3/2018</a:t>
+              <a:t>4/3/18</a:t>
             </a:fld>
             <a:endParaRPr lang="en-US"/>
           </a:p>
@@ -1619,7 +1620,7 @@
           <a:p>
             <a:fld id="{F70A646C-22A8-4D69-ACFD-CD88A31D50DB}" type="datetimeFigureOut">
               <a:rPr lang="en-US" smtClean="0"/>
-              <a:t>4/3/2018</a:t>
+              <a:t>4/3/18</a:t>
             </a:fld>
             <a:endParaRPr lang="en-US"/>
           </a:p>
@@ -1998,7 +1999,7 @@
           <a:p>
             <a:fld id="{F70A646C-22A8-4D69-ACFD-CD88A31D50DB}" type="datetimeFigureOut">
               <a:rPr lang="en-US" smtClean="0"/>
-              <a:t>4/3/2018</a:t>
+              <a:t>4/3/18</a:t>
             </a:fld>
             <a:endParaRPr lang="en-US"/>
           </a:p>
@@ -2116,7 +2117,7 @@
           <a:p>
             <a:fld id="{F70A646C-22A8-4D69-ACFD-CD88A31D50DB}" type="datetimeFigureOut">
               <a:rPr lang="en-US" smtClean="0"/>
-              <a:t>4/3/2018</a:t>
+              <a:t>4/3/18</a:t>
             </a:fld>
             <a:endParaRPr lang="en-US"/>
           </a:p>
@@ -2287,7 +2288,7 @@
           <a:p>
             <a:fld id="{F70A646C-22A8-4D69-ACFD-CD88A31D50DB}" type="datetimeFigureOut">
               <a:rPr lang="en-US" smtClean="0"/>
-              <a:t>4/3/2018</a:t>
+              <a:t>4/3/18</a:t>
             </a:fld>
             <a:endParaRPr lang="en-US"/>
           </a:p>
@@ -2641,7 +2642,7 @@
           <a:p>
             <a:fld id="{F70A646C-22A8-4D69-ACFD-CD88A31D50DB}" type="datetimeFigureOut">
               <a:rPr lang="en-US" smtClean="0"/>
-              <a:t>4/3/2018</a:t>
+              <a:t>4/3/18</a:t>
             </a:fld>
             <a:endParaRPr lang="en-US"/>
           </a:p>
@@ -3023,7 +3024,7 @@
           <a:p>
             <a:fld id="{F70A646C-22A8-4D69-ACFD-CD88A31D50DB}" type="datetimeFigureOut">
               <a:rPr lang="en-US" smtClean="0"/>
-              <a:t>4/3/2018</a:t>
+              <a:t>4/3/18</a:t>
             </a:fld>
             <a:endParaRPr lang="en-US"/>
           </a:p>
@@ -3310,7 +3311,7 @@
           <a:p>
             <a:fld id="{F70A646C-22A8-4D69-ACFD-CD88A31D50DB}" type="datetimeFigureOut">
               <a:rPr lang="en-US" smtClean="0"/>
-              <a:t>4/3/2018</a:t>
+              <a:t>4/3/18</a:t>
             </a:fld>
             <a:endParaRPr lang="en-US"/>
           </a:p>
@@ -6425,10 +6426,9 @@
           <a:lstStyle/>
           <a:p>
             <a:r>
-              <a:rPr lang="en-US" sz="3200" dirty="0" smtClean="0"/>
+              <a:rPr lang="en-US" sz="3200" dirty="0"/>
               <a:t>Walk/Bike/Transit Score</a:t>
             </a:r>
-            <a:endParaRPr lang="en-US" sz="3200" dirty="0"/>
           </a:p>
         </p:txBody>
       </p:sp>
@@ -6523,10 +6523,9 @@
           </a:lstStyle>
           <a:p>
             <a:r>
-              <a:rPr lang="en-US" sz="2400" dirty="0" smtClean="0"/>
+              <a:rPr lang="en-US" sz="2400" dirty="0"/>
               <a:t>Amazon wants to be less car-dependent</a:t>
             </a:r>
-            <a:endParaRPr lang="en-US" sz="2400" dirty="0"/>
           </a:p>
         </p:txBody>
       </p:sp>
@@ -6583,7 +6582,7 @@
           <a:lstStyle/>
           <a:p>
             <a:r>
-              <a:rPr lang="en-US" sz="1400" dirty="0" smtClean="0"/>
+              <a:rPr lang="en-US" sz="1400" dirty="0"/>
               <a:t>To determine if having a high transit score is favored over walk or bike score or vice versa. The score has been weighted by Amazon current modes of commute </a:t>
             </a:r>
           </a:p>
@@ -6592,7 +6591,7 @@
           </a:p>
           <a:p>
             <a:r>
-              <a:rPr lang="en-US" sz="1400" dirty="0" smtClean="0"/>
+              <a:rPr lang="en-US" sz="1400" dirty="0"/>
               <a:t>Current Amazon workforce commute in Seattle split*:</a:t>
             </a:r>
           </a:p>
@@ -6602,7 +6601,7 @@
               <a:buChar char="•"/>
             </a:pPr>
             <a:r>
-              <a:rPr lang="en-US" sz="1200" dirty="0" smtClean="0"/>
+              <a:rPr lang="en-US" sz="1200" dirty="0"/>
               <a:t>20% of workers walk to work</a:t>
             </a:r>
           </a:p>
@@ -6613,11 +6612,7 @@
             </a:pPr>
             <a:r>
               <a:rPr lang="en-US" sz="1200" dirty="0"/>
-              <a:t>12% of workers bike to </a:t>
-            </a:r>
-            <a:r>
-              <a:rPr lang="en-US" sz="1200" dirty="0" smtClean="0"/>
-              <a:t>work</a:t>
+              <a:t>12% of workers bike to work</a:t>
             </a:r>
           </a:p>
           <a:p>
@@ -6626,7 +6621,7 @@
               <a:buChar char="•"/>
             </a:pPr>
             <a:r>
-              <a:rPr lang="en-US" sz="1200" dirty="0" smtClean="0"/>
+              <a:rPr lang="en-US" sz="1200" dirty="0"/>
               <a:t>47% of workers take public transit</a:t>
             </a:r>
           </a:p>
@@ -6662,30 +6657,23 @@
               <a:rPr lang="en-US" sz="1100" dirty="0">
                 <a:hlinkClick r:id="rId3"/>
               </a:rPr>
-              <a:t>https://www.seattletimes.com/seattle-news/transportation/as-jobs-grow-in-downtown-seattle-workers-turn-more-to-transit</a:t>
-            </a:r>
-            <a:r>
-              <a:rPr lang="en-US" sz="1100" dirty="0" smtClean="0">
-                <a:hlinkClick r:id="rId3"/>
-              </a:rPr>
-              <a:t>/</a:t>
-            </a:r>
-            <a:endParaRPr lang="en-US" sz="1100" dirty="0" smtClean="0"/>
-          </a:p>
-          <a:p>
-            <a:r>
-              <a:rPr lang="en-US" sz="1100" dirty="0" smtClean="0"/>
+              <a:t>https://www.seattletimes.com/seattle-news/transportation/as-jobs-grow-in-downtown-seattle-workers-turn-more-to-transit/</a:t>
+            </a:r>
+            <a:endParaRPr lang="en-US" sz="1100" dirty="0"/>
+          </a:p>
+          <a:p>
+            <a:r>
+              <a:rPr lang="en-US" sz="1100" dirty="0"/>
               <a:t>**API source: </a:t>
             </a:r>
             <a:r>
-              <a:rPr lang="en-US" sz="1100" dirty="0" err="1" smtClean="0"/>
+              <a:rPr lang="en-US" sz="1100" dirty="0" err="1"/>
               <a:t>Redfin</a:t>
             </a:r>
             <a:r>
-              <a:rPr lang="en-US" sz="1100" dirty="0" smtClean="0"/>
+              <a:rPr lang="en-US" sz="1100" dirty="0"/>
               <a:t> walk, bike, and transit score where higher is better</a:t>
             </a:r>
-            <a:endParaRPr lang="en-US" sz="1100" dirty="0"/>
           </a:p>
         </p:txBody>
       </p:sp>
@@ -6733,10 +6721,9 @@
                     <a:p>
                       <a:pPr algn="ctr"/>
                       <a:r>
-                        <a:rPr lang="en-US" dirty="0" smtClean="0"/>
+                        <a:rPr lang="en-US" dirty="0"/>
                         <a:t>New York Top Sites</a:t>
                       </a:r>
-                      <a:endParaRPr lang="en-US" dirty="0"/>
                     </a:p>
                   </a:txBody>
                   <a:tcPr/>
@@ -6765,10 +6752,9 @@
                     <a:p>
                       <a:pPr algn="ctr"/>
                       <a:r>
-                        <a:rPr lang="en-US" sz="1400" dirty="0" smtClean="0"/>
+                        <a:rPr lang="en-US" sz="1400" dirty="0"/>
                         <a:t>Hudson Yards</a:t>
                       </a:r>
-                      <a:endParaRPr lang="en-US" sz="1400" dirty="0"/>
                     </a:p>
                   </a:txBody>
                   <a:tcPr anchor="ctr"/>
@@ -6796,14 +6782,14 @@
                         <a:defRPr/>
                       </a:pPr>
                       <a:r>
-                        <a:rPr lang="en-US" sz="1400" dirty="0" smtClean="0"/>
+                        <a:rPr lang="en-US" sz="1400" dirty="0"/>
                         <a:t>Brooklyn</a:t>
                       </a:r>
                       <a:r>
-                        <a:rPr lang="en-US" sz="1400" baseline="0" dirty="0" smtClean="0"/>
+                        <a:rPr lang="en-US" sz="1400" baseline="0" dirty="0"/>
                         <a:t> Tech Triangles</a:t>
                       </a:r>
-                      <a:endParaRPr lang="en-US" sz="1400" dirty="0" smtClean="0"/>
+                      <a:endParaRPr lang="en-US" sz="1400" dirty="0"/>
                     </a:p>
                   </a:txBody>
                   <a:tcPr anchor="ctr"/>
@@ -6841,7 +6827,7 @@
           <a:lstStyle/>
           <a:p>
             <a:r>
-              <a:rPr lang="en-US" sz="1400" b="1" dirty="0" err="1" smtClean="0">
+              <a:rPr lang="en-US" sz="1400" b="1" dirty="0" err="1">
                 <a:solidFill>
                   <a:srgbClr val="C00000"/>
                 </a:solidFill>
@@ -6849,10 +6835,10 @@
               <a:t>Redfin</a:t>
             </a:r>
             <a:r>
-              <a:rPr lang="en-US" sz="1400" dirty="0" smtClean="0"/>
+              <a:rPr lang="en-US" sz="1400" dirty="0"/>
               <a:t> (API source of the scores) categories these top NY sites as</a:t>
             </a:r>
-            <a:endParaRPr lang="en-US" sz="1200" dirty="0" smtClean="0"/>
+            <a:endParaRPr lang="en-US" sz="1200" dirty="0"/>
           </a:p>
         </p:txBody>
       </p:sp>
@@ -6880,14 +6866,14 @@
           <a:p>
             <a:pPr algn="ctr"/>
             <a:r>
-              <a:rPr lang="en-US" sz="1400" dirty="0" smtClean="0"/>
+              <a:rPr lang="en-US" sz="1400" dirty="0"/>
               <a:t>Walker’s Paradise (Daily errands do not require a car)</a:t>
             </a:r>
           </a:p>
           <a:p>
             <a:pPr algn="ctr"/>
             <a:r>
-              <a:rPr lang="en-US" sz="1400" dirty="0" smtClean="0"/>
+              <a:rPr lang="en-US" sz="1400" dirty="0"/>
               <a:t>Rider’s Paradise (World-class public transportation)</a:t>
             </a:r>
           </a:p>
@@ -6895,21 +6881,17 @@
             <a:pPr algn="ctr"/>
             <a:r>
               <a:rPr lang="en-US" sz="1400" dirty="0"/>
-              <a:t>V</a:t>
-            </a:r>
-            <a:r>
-              <a:rPr lang="en-US" sz="1400" dirty="0" smtClean="0"/>
-              <a:t>ery </a:t>
-            </a:r>
-            <a:r>
-              <a:rPr lang="en-US" sz="1400" dirty="0" err="1" smtClean="0"/>
+              <a:t>Very </a:t>
+            </a:r>
+            <a:r>
+              <a:rPr lang="en-US" sz="1400" dirty="0" err="1"/>
               <a:t>Bikeable</a:t>
             </a:r>
             <a:r>
-              <a:rPr lang="en-US" sz="1400" dirty="0" smtClean="0"/>
+              <a:rPr lang="en-US" sz="1400" dirty="0"/>
               <a:t> (Biking is convenient for most trips)</a:t>
             </a:r>
-            <a:endParaRPr lang="en-US" sz="1200" dirty="0" smtClean="0"/>
+            <a:endParaRPr lang="en-US" sz="1200" dirty="0"/>
           </a:p>
         </p:txBody>
       </p:sp>
@@ -6964,13 +6946,6 @@
   <p:clrMapOvr>
     <a:masterClrMapping/>
   </p:clrMapOvr>
-  <p:timing>
-    <p:tnLst>
-      <p:par>
-        <p:cTn id="1" dur="indefinite" restart="never" nodeType="tmRoot"/>
-      </p:par>
-    </p:tnLst>
-  </p:timing>
 </p:sld>
 </file>
 
@@ -7014,10 +6989,9 @@
           <a:lstStyle/>
           <a:p>
             <a:r>
-              <a:rPr lang="en-US" sz="3200" dirty="0" smtClean="0"/>
+              <a:rPr lang="en-US" sz="3200" dirty="0"/>
               <a:t>Airport Score</a:t>
             </a:r>
-            <a:endParaRPr lang="en-US" sz="3200" dirty="0"/>
           </a:p>
         </p:txBody>
       </p:sp>
@@ -7112,10 +7086,9 @@
           </a:lstStyle>
           <a:p>
             <a:r>
-              <a:rPr lang="en-US" sz="2400" dirty="0" smtClean="0"/>
+              <a:rPr lang="en-US" sz="2400" dirty="0"/>
               <a:t>Amazon wants HQ2  to have airport access to major cities</a:t>
             </a:r>
-            <a:endParaRPr lang="en-US" sz="2400" dirty="0"/>
           </a:p>
         </p:txBody>
       </p:sp>
@@ -7143,14 +7116,14 @@
           <a:p>
             <a:pPr algn="ctr"/>
             <a:r>
-              <a:rPr lang="en-US" sz="1400" dirty="0" smtClean="0"/>
+              <a:rPr lang="en-US" sz="1400" dirty="0"/>
               <a:t>Number of airports were determined if airports were within 30 miles of the sites’ address.</a:t>
             </a:r>
           </a:p>
           <a:p>
             <a:pPr algn="ctr"/>
             <a:r>
-              <a:rPr lang="en-US" sz="1400" dirty="0" smtClean="0">
+              <a:rPr lang="en-US" sz="1400" dirty="0">
                 <a:solidFill>
                   <a:schemeClr val="accent1"/>
                 </a:solidFill>
@@ -7158,10 +7131,10 @@
               <a:t> Note: </a:t>
             </a:r>
             <a:r>
-              <a:rPr lang="en-US" sz="1400" dirty="0" smtClean="0"/>
+              <a:rPr lang="en-US" sz="1400" dirty="0"/>
               <a:t>This is ranking is biased towards larger area cities.</a:t>
             </a:r>
-            <a:endParaRPr lang="en-US" sz="1200" dirty="0" smtClean="0"/>
+            <a:endParaRPr lang="en-US" sz="1200" dirty="0"/>
           </a:p>
         </p:txBody>
       </p:sp>
@@ -7223,10 +7196,9 @@
                     <a:p>
                       <a:pPr algn="ctr"/>
                       <a:r>
-                        <a:rPr lang="en-US" sz="1400" dirty="0" smtClean="0"/>
+                        <a:rPr lang="en-US" sz="1400" dirty="0"/>
                         <a:t>Ranking</a:t>
                       </a:r>
-                      <a:endParaRPr lang="en-US" sz="1400" dirty="0"/>
                     </a:p>
                   </a:txBody>
                   <a:tcPr anchor="ctr"/>
@@ -7238,10 +7210,9 @@
                     <a:p>
                       <a:pPr algn="ctr"/>
                       <a:r>
-                        <a:rPr lang="en-US" sz="1400" dirty="0" smtClean="0"/>
+                        <a:rPr lang="en-US" sz="1400" dirty="0"/>
                         <a:t>Cities</a:t>
                       </a:r>
-                      <a:endParaRPr lang="en-US" sz="1400" dirty="0"/>
                     </a:p>
                   </a:txBody>
                   <a:tcPr anchor="ctr"/>
@@ -7253,10 +7224,9 @@
                     <a:p>
                       <a:pPr algn="ctr"/>
                       <a:r>
-                        <a:rPr lang="en-US" sz="1400" dirty="0" smtClean="0"/>
+                        <a:rPr lang="en-US" sz="1400" dirty="0"/>
                         <a:t># of Airports</a:t>
                       </a:r>
-                      <a:endParaRPr lang="en-US" sz="1400" dirty="0"/>
                     </a:p>
                   </a:txBody>
                   <a:tcPr anchor="ctr"/>
@@ -7268,11 +7238,11 @@
                     <a:p>
                       <a:pPr algn="ctr"/>
                       <a:r>
-                        <a:rPr lang="en-US" sz="1400" dirty="0" smtClean="0"/>
+                        <a:rPr lang="en-US" sz="1400" dirty="0"/>
                         <a:t># of International</a:t>
                       </a:r>
                       <a:r>
-                        <a:rPr lang="en-US" sz="1400" baseline="0" dirty="0" smtClean="0"/>
+                        <a:rPr lang="en-US" sz="1400" baseline="0" dirty="0"/>
                         <a:t> Airports</a:t>
                       </a:r>
                       <a:endParaRPr lang="en-US" sz="1400" dirty="0"/>
@@ -7294,10 +7264,9 @@
                     <a:p>
                       <a:pPr algn="ctr"/>
                       <a:r>
-                        <a:rPr lang="en-US" sz="1400" dirty="0" smtClean="0"/>
+                        <a:rPr lang="en-US" sz="1400" dirty="0"/>
                         <a:t>1</a:t>
                       </a:r>
-                      <a:endParaRPr lang="en-US" sz="1400" dirty="0"/>
                     </a:p>
                   </a:txBody>
                   <a:tcPr/>
@@ -7308,10 +7277,9 @@
                     <a:lstStyle/>
                     <a:p>
                       <a:r>
-                        <a:rPr lang="en-US" sz="1400" dirty="0" smtClean="0"/>
+                        <a:rPr lang="en-US" sz="1400" dirty="0"/>
                         <a:t>Los Angeles</a:t>
                       </a:r>
-                      <a:endParaRPr lang="en-US" sz="1400" dirty="0"/>
                     </a:p>
                   </a:txBody>
                   <a:tcPr/>
@@ -7323,10 +7291,9 @@
                     <a:p>
                       <a:pPr algn="ctr"/>
                       <a:r>
-                        <a:rPr lang="en-US" sz="1400" dirty="0" smtClean="0"/>
+                        <a:rPr lang="en-US" sz="1400" dirty="0"/>
                         <a:t>20</a:t>
                       </a:r>
-                      <a:endParaRPr lang="en-US" sz="1400" dirty="0"/>
                     </a:p>
                   </a:txBody>
                   <a:tcPr/>
@@ -7338,10 +7305,9 @@
                     <a:p>
                       <a:pPr algn="ctr"/>
                       <a:r>
-                        <a:rPr lang="en-US" sz="1400" dirty="0" smtClean="0"/>
+                        <a:rPr lang="en-US" sz="1400" dirty="0"/>
                         <a:t>3</a:t>
                       </a:r>
-                      <a:endParaRPr lang="en-US" sz="1400" dirty="0"/>
                     </a:p>
                   </a:txBody>
                   <a:tcPr/>
@@ -7360,10 +7326,9 @@
                     <a:p>
                       <a:pPr algn="ctr"/>
                       <a:r>
-                        <a:rPr lang="en-US" sz="1400" dirty="0" smtClean="0"/>
+                        <a:rPr lang="en-US" sz="1400" dirty="0"/>
                         <a:t>2</a:t>
                       </a:r>
-                      <a:endParaRPr lang="en-US" sz="1400" dirty="0"/>
                     </a:p>
                   </a:txBody>
                   <a:tcPr/>
@@ -7374,7 +7339,7 @@
                     <a:lstStyle/>
                     <a:p>
                       <a:r>
-                        <a:rPr lang="en-US" sz="1400" dirty="0" smtClean="0"/>
+                        <a:rPr lang="en-US" sz="1400" dirty="0"/>
                         <a:t>Chicago</a:t>
                       </a:r>
                     </a:p>
@@ -7388,10 +7353,9 @@
                     <a:p>
                       <a:pPr algn="ctr"/>
                       <a:r>
-                        <a:rPr lang="en-US" sz="1400" dirty="0" smtClean="0"/>
+                        <a:rPr lang="en-US" sz="1400" dirty="0"/>
                         <a:t>10</a:t>
                       </a:r>
-                      <a:endParaRPr lang="en-US" sz="1400" dirty="0"/>
                     </a:p>
                   </a:txBody>
                   <a:tcPr/>
@@ -7403,10 +7367,9 @@
                     <a:p>
                       <a:pPr algn="ctr"/>
                       <a:r>
-                        <a:rPr lang="en-US" sz="1400" dirty="0" smtClean="0"/>
+                        <a:rPr lang="en-US" sz="1400" dirty="0"/>
                         <a:t>3</a:t>
                       </a:r>
-                      <a:endParaRPr lang="en-US" sz="1400" dirty="0"/>
                     </a:p>
                   </a:txBody>
                   <a:tcPr/>
@@ -7425,10 +7388,9 @@
                     <a:p>
                       <a:pPr algn="ctr"/>
                       <a:r>
-                        <a:rPr lang="en-US" sz="1400" dirty="0" smtClean="0"/>
+                        <a:rPr lang="en-US" sz="1400" dirty="0"/>
                         <a:t>3</a:t>
                       </a:r>
-                      <a:endParaRPr lang="en-US" sz="1400" dirty="0"/>
                     </a:p>
                   </a:txBody>
                   <a:tcPr/>
@@ -7439,10 +7401,9 @@
                     <a:lstStyle/>
                     <a:p>
                       <a:r>
-                        <a:rPr lang="en-US" sz="1400" dirty="0" smtClean="0"/>
+                        <a:rPr lang="en-US" sz="1400" dirty="0"/>
                         <a:t>Atlanta</a:t>
                       </a:r>
-                      <a:endParaRPr lang="en-US" sz="1400" dirty="0"/>
                     </a:p>
                   </a:txBody>
                   <a:tcPr/>
@@ -7454,10 +7415,9 @@
                     <a:p>
                       <a:pPr algn="ctr"/>
                       <a:r>
-                        <a:rPr lang="en-US" sz="1400" dirty="0" smtClean="0"/>
+                        <a:rPr lang="en-US" sz="1400" dirty="0"/>
                         <a:t>10</a:t>
                       </a:r>
-                      <a:endParaRPr lang="en-US" sz="1400" dirty="0"/>
                     </a:p>
                   </a:txBody>
                   <a:tcPr/>
@@ -7469,10 +7429,9 @@
                     <a:p>
                       <a:pPr algn="ctr"/>
                       <a:r>
-                        <a:rPr lang="en-US" sz="1400" dirty="0" smtClean="0"/>
+                        <a:rPr lang="en-US" sz="1400" dirty="0"/>
                         <a:t>2</a:t>
                       </a:r>
-                      <a:endParaRPr lang="en-US" sz="1400" dirty="0"/>
                     </a:p>
                   </a:txBody>
                   <a:tcPr/>
@@ -7491,10 +7450,9 @@
                     <a:p>
                       <a:pPr algn="ctr"/>
                       <a:r>
-                        <a:rPr lang="en-US" sz="1400" dirty="0" smtClean="0"/>
+                        <a:rPr lang="en-US" sz="1400" dirty="0"/>
                         <a:t>3</a:t>
                       </a:r>
-                      <a:endParaRPr lang="en-US" sz="1400" dirty="0"/>
                     </a:p>
                   </a:txBody>
                   <a:tcPr/>
@@ -7505,10 +7463,9 @@
                     <a:lstStyle/>
                     <a:p>
                       <a:r>
-                        <a:rPr lang="en-US" sz="1400" dirty="0" smtClean="0"/>
+                        <a:rPr lang="en-US" sz="1400" dirty="0"/>
                         <a:t>New York</a:t>
                       </a:r>
-                      <a:endParaRPr lang="en-US" sz="1400" dirty="0"/>
                     </a:p>
                   </a:txBody>
                   <a:tcPr/>
@@ -7520,10 +7477,9 @@
                     <a:p>
                       <a:pPr algn="ctr"/>
                       <a:r>
-                        <a:rPr lang="en-US" sz="1400" dirty="0" smtClean="0"/>
+                        <a:rPr lang="en-US" sz="1400" dirty="0"/>
                         <a:t>10</a:t>
                       </a:r>
-                      <a:endParaRPr lang="en-US" sz="1400" dirty="0"/>
                     </a:p>
                   </a:txBody>
                   <a:tcPr/>
@@ -7535,10 +7491,9 @@
                     <a:p>
                       <a:pPr algn="ctr"/>
                       <a:r>
-                        <a:rPr lang="en-US" sz="1400" dirty="0" smtClean="0"/>
+                        <a:rPr lang="en-US" sz="1400" dirty="0"/>
                         <a:t>2</a:t>
                       </a:r>
-                      <a:endParaRPr lang="en-US" sz="1400" dirty="0"/>
                     </a:p>
                   </a:txBody>
                   <a:tcPr/>
@@ -7557,10 +7512,9 @@
                     <a:p>
                       <a:pPr algn="ctr"/>
                       <a:r>
-                        <a:rPr lang="en-US" sz="1400" dirty="0" smtClean="0"/>
+                        <a:rPr lang="en-US" sz="1400" dirty="0"/>
                         <a:t>4</a:t>
                       </a:r>
-                      <a:endParaRPr lang="en-US" sz="1400" dirty="0"/>
                     </a:p>
                   </a:txBody>
                   <a:tcPr/>
@@ -7571,7 +7525,7 @@
                     <a:lstStyle/>
                     <a:p>
                       <a:r>
-                        <a:rPr lang="en-US" sz="1400" dirty="0" smtClean="0"/>
+                        <a:rPr lang="en-US" sz="1400" dirty="0"/>
                         <a:t>Washington DC</a:t>
                       </a:r>
                     </a:p>
@@ -7585,10 +7539,9 @@
                     <a:p>
                       <a:pPr algn="ctr"/>
                       <a:r>
-                        <a:rPr lang="en-US" sz="1400" dirty="0" smtClean="0"/>
+                        <a:rPr lang="en-US" sz="1400" dirty="0"/>
                         <a:t>9</a:t>
                       </a:r>
-                      <a:endParaRPr lang="en-US" sz="1400" dirty="0"/>
                     </a:p>
                   </a:txBody>
                   <a:tcPr/>
@@ -7600,10 +7553,9 @@
                     <a:p>
                       <a:pPr algn="ctr"/>
                       <a:r>
-                        <a:rPr lang="en-US" sz="1400" dirty="0" smtClean="0"/>
+                        <a:rPr lang="en-US" sz="1400" dirty="0"/>
                         <a:t>2</a:t>
                       </a:r>
-                      <a:endParaRPr lang="en-US" sz="1400" dirty="0"/>
                     </a:p>
                   </a:txBody>
                   <a:tcPr/>
@@ -7622,10 +7574,9 @@
                     <a:p>
                       <a:pPr algn="ctr"/>
                       <a:r>
-                        <a:rPr lang="en-US" sz="1400" dirty="0" smtClean="0"/>
+                        <a:rPr lang="en-US" sz="1400" dirty="0"/>
                         <a:t>5</a:t>
                       </a:r>
-                      <a:endParaRPr lang="en-US" sz="1400" dirty="0"/>
                     </a:p>
                   </a:txBody>
                   <a:tcPr/>
@@ -7636,10 +7587,9 @@
                     <a:lstStyle/>
                     <a:p>
                       <a:r>
-                        <a:rPr lang="en-US" sz="1400" dirty="0" smtClean="0"/>
+                        <a:rPr lang="en-US" sz="1400" dirty="0"/>
                         <a:t>Austin</a:t>
                       </a:r>
-                      <a:endParaRPr lang="en-US" sz="1400" dirty="0"/>
                     </a:p>
                   </a:txBody>
                   <a:tcPr/>
@@ -7651,10 +7601,9 @@
                     <a:p>
                       <a:pPr algn="ctr"/>
                       <a:r>
-                        <a:rPr lang="en-US" sz="1400" dirty="0" smtClean="0"/>
+                        <a:rPr lang="en-US" sz="1400" dirty="0"/>
                         <a:t>9</a:t>
                       </a:r>
-                      <a:endParaRPr lang="en-US" sz="1400" dirty="0"/>
                     </a:p>
                   </a:txBody>
                   <a:tcPr/>
@@ -7666,10 +7615,9 @@
                     <a:p>
                       <a:pPr algn="ctr"/>
                       <a:r>
-                        <a:rPr lang="en-US" sz="1400" dirty="0" smtClean="0"/>
+                        <a:rPr lang="en-US" sz="1400" dirty="0"/>
                         <a:t>1</a:t>
                       </a:r>
-                      <a:endParaRPr lang="en-US" sz="1400" dirty="0"/>
                     </a:p>
                   </a:txBody>
                   <a:tcPr/>
@@ -7688,10 +7636,9 @@
                     <a:p>
                       <a:pPr algn="ctr"/>
                       <a:r>
-                        <a:rPr lang="en-US" sz="1400" dirty="0" smtClean="0"/>
+                        <a:rPr lang="en-US" sz="1400" dirty="0"/>
                         <a:t>6</a:t>
                       </a:r>
-                      <a:endParaRPr lang="en-US" sz="1400" dirty="0"/>
                     </a:p>
                   </a:txBody>
                   <a:tcPr/>
@@ -7702,10 +7649,9 @@
                     <a:lstStyle/>
                     <a:p>
                       <a:r>
-                        <a:rPr lang="en-US" sz="1400" dirty="0" smtClean="0"/>
+                        <a:rPr lang="en-US" sz="1400" dirty="0"/>
                         <a:t>Raleigh</a:t>
                       </a:r>
-                      <a:endParaRPr lang="en-US" sz="1400" dirty="0"/>
                     </a:p>
                   </a:txBody>
                   <a:tcPr/>
@@ -7717,10 +7663,9 @@
                     <a:p>
                       <a:pPr algn="ctr"/>
                       <a:r>
-                        <a:rPr lang="en-US" sz="1400" dirty="0" smtClean="0"/>
+                        <a:rPr lang="en-US" sz="1400" dirty="0"/>
                         <a:t>6</a:t>
                       </a:r>
-                      <a:endParaRPr lang="en-US" sz="1400" dirty="0"/>
                     </a:p>
                   </a:txBody>
                   <a:tcPr/>
@@ -7732,10 +7677,9 @@
                     <a:p>
                       <a:pPr algn="ctr"/>
                       <a:r>
-                        <a:rPr lang="en-US" sz="1400" dirty="0" smtClean="0"/>
+                        <a:rPr lang="en-US" sz="1400" dirty="0"/>
                         <a:t>1</a:t>
                       </a:r>
-                      <a:endParaRPr lang="en-US" sz="1400" dirty="0"/>
                     </a:p>
                   </a:txBody>
                   <a:tcPr/>
@@ -7754,10 +7698,9 @@
                     <a:p>
                       <a:pPr algn="ctr"/>
                       <a:r>
-                        <a:rPr lang="en-US" sz="1400" dirty="0" smtClean="0"/>
+                        <a:rPr lang="en-US" sz="1400" dirty="0"/>
                         <a:t>7</a:t>
                       </a:r>
-                      <a:endParaRPr lang="en-US" sz="1400" dirty="0"/>
                     </a:p>
                   </a:txBody>
                   <a:tcPr/>
@@ -7768,10 +7711,9 @@
                     <a:lstStyle/>
                     <a:p>
                       <a:r>
-                        <a:rPr lang="en-US" sz="1400" dirty="0" smtClean="0"/>
+                        <a:rPr lang="en-US" sz="1400" dirty="0"/>
                         <a:t>Boston</a:t>
                       </a:r>
-                      <a:endParaRPr lang="en-US" sz="1400" dirty="0"/>
                     </a:p>
                   </a:txBody>
                   <a:tcPr/>
@@ -7783,10 +7725,9 @@
                     <a:p>
                       <a:pPr algn="ctr"/>
                       <a:r>
-                        <a:rPr lang="en-US" sz="1400" dirty="0" smtClean="0"/>
+                        <a:rPr lang="en-US" sz="1400" dirty="0"/>
                         <a:t>5</a:t>
                       </a:r>
-                      <a:endParaRPr lang="en-US" sz="1400" dirty="0"/>
                     </a:p>
                   </a:txBody>
                   <a:tcPr/>
@@ -7798,10 +7739,9 @@
                     <a:p>
                       <a:pPr algn="ctr"/>
                       <a:r>
-                        <a:rPr lang="en-US" sz="1400" dirty="0" smtClean="0"/>
+                        <a:rPr lang="en-US" sz="1400" dirty="0"/>
                         <a:t>1</a:t>
                       </a:r>
-                      <a:endParaRPr lang="en-US" sz="1400" dirty="0"/>
                     </a:p>
                   </a:txBody>
                   <a:tcPr/>
@@ -7910,10 +7850,10 @@
           <a:p>
             <a:pPr algn="ctr"/>
             <a:r>
-              <a:rPr lang="en-US" sz="1400" dirty="0" smtClean="0"/>
+              <a:rPr lang="en-US" sz="1400" dirty="0"/>
               <a:t>Los Angeles : 66 miles between 2 furthest international airport</a:t>
             </a:r>
-            <a:endParaRPr lang="en-US" sz="1200" dirty="0" smtClean="0"/>
+            <a:endParaRPr lang="en-US" sz="1200" dirty="0"/>
           </a:p>
         </p:txBody>
       </p:sp>
@@ -7970,10 +7910,10 @@
           <a:p>
             <a:pPr algn="ctr"/>
             <a:r>
-              <a:rPr lang="en-US" sz="1400" dirty="0" smtClean="0"/>
+              <a:rPr lang="en-US" sz="1400" dirty="0"/>
               <a:t>Chicago: 24 miles between 2 furthest international airport</a:t>
             </a:r>
-            <a:endParaRPr lang="en-US" sz="1200" dirty="0" smtClean="0"/>
+            <a:endParaRPr lang="en-US" sz="1200" dirty="0"/>
           </a:p>
         </p:txBody>
       </p:sp>
@@ -7987,13 +7927,730 @@
   <p:clrMapOvr>
     <a:masterClrMapping/>
   </p:clrMapOvr>
-  <p:timing>
-    <p:tnLst>
-      <p:par>
-        <p:cTn id="1" dur="indefinite" restart="never" nodeType="tmRoot"/>
-      </p:par>
-    </p:tnLst>
-  </p:timing>
+</p:sld>
+</file>
+
+<file path=ppt/slides/slide27.xml><?xml version="1.0" encoding="utf-8"?>
+<p:sld xmlns:a="http://schemas.openxmlformats.org/drawingml/2006/main" xmlns:r="http://schemas.openxmlformats.org/officeDocument/2006/relationships" xmlns:p="http://schemas.openxmlformats.org/presentationml/2006/main">
+  <p:cSld>
+    <p:spTree>
+      <p:nvGrpSpPr>
+        <p:cNvPr id="1" name=""/>
+        <p:cNvGrpSpPr/>
+        <p:nvPr/>
+      </p:nvGrpSpPr>
+      <p:grpSpPr>
+        <a:xfrm>
+          <a:off x="0" y="0"/>
+          <a:ext cx="0" cy="0"/>
+          <a:chOff x="0" y="0"/>
+          <a:chExt cx="0" cy="0"/>
+        </a:xfrm>
+      </p:grpSpPr>
+      <p:sp>
+        <p:nvSpPr>
+          <p:cNvPr id="2" name="Title 1">
+            <a:extLst>
+              <a:ext uri="{FF2B5EF4-FFF2-40B4-BE49-F238E27FC236}">
+                <a16:creationId xmlns:a16="http://schemas.microsoft.com/office/drawing/2014/main" id="{390EB264-3883-41F9-BACB-285D2229980C}"/>
+              </a:ext>
+            </a:extLst>
+          </p:cNvPr>
+          <p:cNvSpPr>
+            <a:spLocks noGrp="1"/>
+          </p:cNvSpPr>
+          <p:nvPr>
+            <p:ph type="title"/>
+          </p:nvPr>
+        </p:nvSpPr>
+        <p:spPr>
+          <a:xfrm>
+            <a:off x="1097280" y="286603"/>
+            <a:ext cx="10058400" cy="702409"/>
+          </a:xfrm>
+        </p:spPr>
+        <p:txBody>
+          <a:bodyPr>
+            <a:normAutofit fontScale="90000"/>
+          </a:bodyPr>
+          <a:lstStyle/>
+          <a:p>
+            <a:r>
+              <a:rPr lang="en-US" dirty="0"/>
+              <a:t>Overall City Ranking </a:t>
+            </a:r>
+          </a:p>
+        </p:txBody>
+      </p:sp>
+      <p:cxnSp>
+        <p:nvCxnSpPr>
+          <p:cNvPr id="4" name="Straight Connector 3">
+            <a:extLst>
+              <a:ext uri="{FF2B5EF4-FFF2-40B4-BE49-F238E27FC236}">
+                <a16:creationId xmlns:a16="http://schemas.microsoft.com/office/drawing/2014/main" id="{8FECCD07-FFA9-4129-95C2-D2F2CF8AD354}"/>
+              </a:ext>
+            </a:extLst>
+          </p:cNvPr>
+          <p:cNvCxnSpPr/>
+          <p:nvPr/>
+        </p:nvCxnSpPr>
+        <p:spPr>
+          <a:xfrm>
+            <a:off x="1248032" y="902043"/>
+            <a:ext cx="9069860" cy="0"/>
+          </a:xfrm>
+          <a:prstGeom prst="line">
+            <a:avLst/>
+          </a:prstGeom>
+          <a:ln>
+            <a:solidFill>
+              <a:srgbClr val="7030A0"/>
+            </a:solidFill>
+          </a:ln>
+        </p:spPr>
+        <p:style>
+          <a:lnRef idx="1">
+            <a:schemeClr val="accent1"/>
+          </a:lnRef>
+          <a:fillRef idx="0">
+            <a:schemeClr val="accent1"/>
+          </a:fillRef>
+          <a:effectRef idx="0">
+            <a:schemeClr val="accent1"/>
+          </a:effectRef>
+          <a:fontRef idx="minor">
+            <a:schemeClr val="tx1"/>
+          </a:fontRef>
+        </p:style>
+      </p:cxnSp>
+      <p:sp>
+        <p:nvSpPr>
+          <p:cNvPr id="13" name="TextBox 12">
+            <a:extLst>
+              <a:ext uri="{FF2B5EF4-FFF2-40B4-BE49-F238E27FC236}">
+                <a16:creationId xmlns:a16="http://schemas.microsoft.com/office/drawing/2014/main" id="{2F54B774-97D6-374E-AF3C-3039E753E6FE}"/>
+              </a:ext>
+            </a:extLst>
+          </p:cNvPr>
+          <p:cNvSpPr txBox="1"/>
+          <p:nvPr/>
+        </p:nvSpPr>
+        <p:spPr>
+          <a:xfrm>
+            <a:off x="290363" y="1235120"/>
+            <a:ext cx="2162580" cy="369332"/>
+          </a:xfrm>
+          <a:prstGeom prst="rect">
+            <a:avLst/>
+          </a:prstGeom>
+          <a:noFill/>
+        </p:spPr>
+        <p:txBody>
+          <a:bodyPr wrap="none" rtlCol="0">
+            <a:spAutoFit/>
+          </a:bodyPr>
+          <a:lstStyle/>
+          <a:p>
+            <a:r>
+              <a:rPr lang="en-US" dirty="0"/>
+              <a:t>Unweighted rankings</a:t>
+            </a:r>
+          </a:p>
+        </p:txBody>
+      </p:sp>
+      <p:sp>
+        <p:nvSpPr>
+          <p:cNvPr id="14" name="TextBox 13">
+            <a:extLst>
+              <a:ext uri="{FF2B5EF4-FFF2-40B4-BE49-F238E27FC236}">
+                <a16:creationId xmlns:a16="http://schemas.microsoft.com/office/drawing/2014/main" id="{2A70FE4E-E05B-FB42-88DC-7CBDC43B4C5C}"/>
+              </a:ext>
+            </a:extLst>
+          </p:cNvPr>
+          <p:cNvSpPr txBox="1"/>
+          <p:nvPr/>
+        </p:nvSpPr>
+        <p:spPr>
+          <a:xfrm>
+            <a:off x="5942987" y="1184314"/>
+            <a:ext cx="1928541" cy="369332"/>
+          </a:xfrm>
+          <a:prstGeom prst="rect">
+            <a:avLst/>
+          </a:prstGeom>
+          <a:noFill/>
+        </p:spPr>
+        <p:txBody>
+          <a:bodyPr wrap="none" rtlCol="0">
+            <a:spAutoFit/>
+          </a:bodyPr>
+          <a:lstStyle/>
+          <a:p>
+            <a:r>
+              <a:rPr lang="en-US" dirty="0"/>
+              <a:t>Weighted rankings</a:t>
+            </a:r>
+          </a:p>
+        </p:txBody>
+      </p:sp>
+      <p:pic>
+        <p:nvPicPr>
+          <p:cNvPr id="20" name="Picture 19">
+            <a:extLst>
+              <a:ext uri="{FF2B5EF4-FFF2-40B4-BE49-F238E27FC236}">
+                <a16:creationId xmlns:a16="http://schemas.microsoft.com/office/drawing/2014/main" id="{56FED822-01A1-C34D-B232-2F3BEEEAB583}"/>
+              </a:ext>
+            </a:extLst>
+          </p:cNvPr>
+          <p:cNvPicPr>
+            <a:picLocks noChangeAspect="1"/>
+          </p:cNvPicPr>
+          <p:nvPr/>
+        </p:nvPicPr>
+        <p:blipFill>
+          <a:blip r:embed="rId2">
+            <a:extLst>
+              <a:ext uri="{28A0092B-C50C-407E-A947-70E740481C1C}">
+                <a14:useLocalDpi xmlns:a14="http://schemas.microsoft.com/office/drawing/2010/main" val="0"/>
+              </a:ext>
+            </a:extLst>
+          </a:blip>
+          <a:stretch>
+            <a:fillRect/>
+          </a:stretch>
+        </p:blipFill>
+        <p:spPr>
+          <a:xfrm>
+            <a:off x="67962" y="1816697"/>
+            <a:ext cx="5715000" cy="3378200"/>
+          </a:xfrm>
+          <a:prstGeom prst="rect">
+            <a:avLst/>
+          </a:prstGeom>
+        </p:spPr>
+      </p:pic>
+      <p:pic>
+        <p:nvPicPr>
+          <p:cNvPr id="22" name="Picture 21">
+            <a:extLst>
+              <a:ext uri="{FF2B5EF4-FFF2-40B4-BE49-F238E27FC236}">
+                <a16:creationId xmlns:a16="http://schemas.microsoft.com/office/drawing/2014/main" id="{87DB4B76-8273-3240-8423-0EB6764E41F0}"/>
+              </a:ext>
+            </a:extLst>
+          </p:cNvPr>
+          <p:cNvPicPr>
+            <a:picLocks noChangeAspect="1"/>
+          </p:cNvPicPr>
+          <p:nvPr/>
+        </p:nvPicPr>
+        <p:blipFill>
+          <a:blip r:embed="rId3">
+            <a:extLst>
+              <a:ext uri="{28A0092B-C50C-407E-A947-70E740481C1C}">
+                <a14:useLocalDpi xmlns:a14="http://schemas.microsoft.com/office/drawing/2010/main" val="0"/>
+              </a:ext>
+            </a:extLst>
+          </a:blip>
+          <a:stretch>
+            <a:fillRect/>
+          </a:stretch>
+        </p:blipFill>
+        <p:spPr>
+          <a:xfrm>
+            <a:off x="5942987" y="1816697"/>
+            <a:ext cx="5715000" cy="3378200"/>
+          </a:xfrm>
+          <a:prstGeom prst="rect">
+            <a:avLst/>
+          </a:prstGeom>
+        </p:spPr>
+      </p:pic>
+      <p:sp>
+        <p:nvSpPr>
+          <p:cNvPr id="3" name="TextBox 2">
+            <a:extLst>
+              <a:ext uri="{FF2B5EF4-FFF2-40B4-BE49-F238E27FC236}">
+                <a16:creationId xmlns:a16="http://schemas.microsoft.com/office/drawing/2014/main" id="{81242773-C5FC-5E41-8856-1AE0382D8DFE}"/>
+              </a:ext>
+            </a:extLst>
+          </p:cNvPr>
+          <p:cNvSpPr txBox="1"/>
+          <p:nvPr/>
+        </p:nvSpPr>
+        <p:spPr>
+          <a:xfrm>
+            <a:off x="364005" y="5194897"/>
+            <a:ext cx="1007648" cy="369332"/>
+          </a:xfrm>
+          <a:prstGeom prst="rect">
+            <a:avLst/>
+          </a:prstGeom>
+          <a:noFill/>
+        </p:spPr>
+        <p:txBody>
+          <a:bodyPr wrap="none" rtlCol="0">
+            <a:spAutoFit/>
+          </a:bodyPr>
+          <a:lstStyle/>
+          <a:p>
+            <a:pPr fontAlgn="base"/>
+            <a:r>
+              <a:rPr lang="en-US" dirty="0"/>
+              <a:t>Weights:</a:t>
+            </a:r>
+          </a:p>
+        </p:txBody>
+      </p:sp>
+      <p:graphicFrame>
+        <p:nvGraphicFramePr>
+          <p:cNvPr id="5" name="Table 4">
+            <a:extLst>
+              <a:ext uri="{FF2B5EF4-FFF2-40B4-BE49-F238E27FC236}">
+                <a16:creationId xmlns:a16="http://schemas.microsoft.com/office/drawing/2014/main" id="{99093762-A168-364A-B7A1-E1CAA9B9AC46}"/>
+              </a:ext>
+            </a:extLst>
+          </p:cNvPr>
+          <p:cNvGraphicFramePr>
+            <a:graphicFrameLocks noGrp="1"/>
+          </p:cNvGraphicFramePr>
+          <p:nvPr/>
+        </p:nvGraphicFramePr>
+        <p:xfrm>
+          <a:off x="556591" y="5592362"/>
+          <a:ext cx="11101392" cy="640080"/>
+        </p:xfrm>
+        <a:graphic>
+          <a:graphicData uri="http://schemas.openxmlformats.org/drawingml/2006/table">
+            <a:tbl>
+              <a:tblPr firstRow="1" bandRow="1">
+                <a:tableStyleId>{5C22544A-7EE6-4342-B048-85BDC9FD1C3A}</a:tableStyleId>
+              </a:tblPr>
+              <a:tblGrid>
+                <a:gridCol w="925116">
+                  <a:extLst>
+                    <a:ext uri="{9D8B030D-6E8A-4147-A177-3AD203B41FA5}">
+                      <a16:colId xmlns:a16="http://schemas.microsoft.com/office/drawing/2014/main" val="2099015565"/>
+                    </a:ext>
+                  </a:extLst>
+                </a:gridCol>
+                <a:gridCol w="925116">
+                  <a:extLst>
+                    <a:ext uri="{9D8B030D-6E8A-4147-A177-3AD203B41FA5}">
+                      <a16:colId xmlns:a16="http://schemas.microsoft.com/office/drawing/2014/main" val="1131645849"/>
+                    </a:ext>
+                  </a:extLst>
+                </a:gridCol>
+                <a:gridCol w="925116">
+                  <a:extLst>
+                    <a:ext uri="{9D8B030D-6E8A-4147-A177-3AD203B41FA5}">
+                      <a16:colId xmlns:a16="http://schemas.microsoft.com/office/drawing/2014/main" val="2979348466"/>
+                    </a:ext>
+                  </a:extLst>
+                </a:gridCol>
+                <a:gridCol w="925116">
+                  <a:extLst>
+                    <a:ext uri="{9D8B030D-6E8A-4147-A177-3AD203B41FA5}">
+                      <a16:colId xmlns:a16="http://schemas.microsoft.com/office/drawing/2014/main" val="3871454820"/>
+                    </a:ext>
+                  </a:extLst>
+                </a:gridCol>
+                <a:gridCol w="925116">
+                  <a:extLst>
+                    <a:ext uri="{9D8B030D-6E8A-4147-A177-3AD203B41FA5}">
+                      <a16:colId xmlns:a16="http://schemas.microsoft.com/office/drawing/2014/main" val="1076730244"/>
+                    </a:ext>
+                  </a:extLst>
+                </a:gridCol>
+                <a:gridCol w="925116">
+                  <a:extLst>
+                    <a:ext uri="{9D8B030D-6E8A-4147-A177-3AD203B41FA5}">
+                      <a16:colId xmlns:a16="http://schemas.microsoft.com/office/drawing/2014/main" val="3173180166"/>
+                    </a:ext>
+                  </a:extLst>
+                </a:gridCol>
+                <a:gridCol w="925116">
+                  <a:extLst>
+                    <a:ext uri="{9D8B030D-6E8A-4147-A177-3AD203B41FA5}">
+                      <a16:colId xmlns:a16="http://schemas.microsoft.com/office/drawing/2014/main" val="205725656"/>
+                    </a:ext>
+                  </a:extLst>
+                </a:gridCol>
+                <a:gridCol w="925116">
+                  <a:extLst>
+                    <a:ext uri="{9D8B030D-6E8A-4147-A177-3AD203B41FA5}">
+                      <a16:colId xmlns:a16="http://schemas.microsoft.com/office/drawing/2014/main" val="2271480319"/>
+                    </a:ext>
+                  </a:extLst>
+                </a:gridCol>
+                <a:gridCol w="925116">
+                  <a:extLst>
+                    <a:ext uri="{9D8B030D-6E8A-4147-A177-3AD203B41FA5}">
+                      <a16:colId xmlns:a16="http://schemas.microsoft.com/office/drawing/2014/main" val="3484716283"/>
+                    </a:ext>
+                  </a:extLst>
+                </a:gridCol>
+                <a:gridCol w="925116">
+                  <a:extLst>
+                    <a:ext uri="{9D8B030D-6E8A-4147-A177-3AD203B41FA5}">
+                      <a16:colId xmlns:a16="http://schemas.microsoft.com/office/drawing/2014/main" val="3882757151"/>
+                    </a:ext>
+                  </a:extLst>
+                </a:gridCol>
+                <a:gridCol w="925116">
+                  <a:extLst>
+                    <a:ext uri="{9D8B030D-6E8A-4147-A177-3AD203B41FA5}">
+                      <a16:colId xmlns:a16="http://schemas.microsoft.com/office/drawing/2014/main" val="4187639300"/>
+                    </a:ext>
+                  </a:extLst>
+                </a:gridCol>
+                <a:gridCol w="925116">
+                  <a:extLst>
+                    <a:ext uri="{9D8B030D-6E8A-4147-A177-3AD203B41FA5}">
+                      <a16:colId xmlns:a16="http://schemas.microsoft.com/office/drawing/2014/main" val="1901181437"/>
+                    </a:ext>
+                  </a:extLst>
+                </a:gridCol>
+              </a:tblGrid>
+              <a:tr h="370840">
+                <a:tc>
+                  <a:txBody>
+                    <a:bodyPr/>
+                    <a:lstStyle/>
+                    <a:p>
+                      <a:r>
+                        <a:rPr lang="en-US" sz="1000" dirty="0"/>
+                        <a:t>House Own Affordability</a:t>
+                      </a:r>
+                    </a:p>
+                  </a:txBody>
+                  <a:tcPr/>
+                </a:tc>
+                <a:tc>
+                  <a:txBody>
+                    <a:bodyPr/>
+                    <a:lstStyle/>
+                    <a:p>
+                      <a:r>
+                        <a:rPr lang="en-US" sz="1000" dirty="0"/>
+                        <a:t>Rent Affordability</a:t>
+                      </a:r>
+                    </a:p>
+                  </a:txBody>
+                  <a:tcPr/>
+                </a:tc>
+                <a:tc>
+                  <a:txBody>
+                    <a:bodyPr/>
+                    <a:lstStyle/>
+                    <a:p>
+                      <a:r>
+                        <a:rPr lang="en-US" sz="1000" dirty="0"/>
+                        <a:t>Education Attainment</a:t>
+                      </a:r>
+                    </a:p>
+                  </a:txBody>
+                  <a:tcPr/>
+                </a:tc>
+                <a:tc>
+                  <a:txBody>
+                    <a:bodyPr/>
+                    <a:lstStyle/>
+                    <a:p>
+                      <a:r>
+                        <a:rPr lang="en-US" sz="1000" dirty="0"/>
+                        <a:t>School</a:t>
+                      </a:r>
+                    </a:p>
+                  </a:txBody>
+                  <a:tcPr/>
+                </a:tc>
+                <a:tc>
+                  <a:txBody>
+                    <a:bodyPr/>
+                    <a:lstStyle/>
+                    <a:p>
+                      <a:r>
+                        <a:rPr lang="en-US" sz="1000" dirty="0"/>
+                        <a:t>College</a:t>
+                      </a:r>
+                    </a:p>
+                  </a:txBody>
+                  <a:tcPr/>
+                </a:tc>
+                <a:tc>
+                  <a:txBody>
+                    <a:bodyPr/>
+                    <a:lstStyle/>
+                    <a:p>
+                      <a:r>
+                        <a:rPr lang="en-US" sz="1000" dirty="0"/>
+                        <a:t>Technical Pool</a:t>
+                      </a:r>
+                    </a:p>
+                  </a:txBody>
+                  <a:tcPr/>
+                </a:tc>
+                <a:tc>
+                  <a:txBody>
+                    <a:bodyPr/>
+                    <a:lstStyle/>
+                    <a:p>
+                      <a:r>
+                        <a:rPr lang="en-US" sz="1000" dirty="0"/>
+                        <a:t>Walk/Transit</a:t>
+                      </a:r>
+                    </a:p>
+                  </a:txBody>
+                  <a:tcPr/>
+                </a:tc>
+                <a:tc>
+                  <a:txBody>
+                    <a:bodyPr/>
+                    <a:lstStyle/>
+                    <a:p>
+                      <a:r>
+                        <a:rPr lang="en-US" sz="1000" dirty="0"/>
+                        <a:t>Airport</a:t>
+                      </a:r>
+                    </a:p>
+                  </a:txBody>
+                  <a:tcPr/>
+                </a:tc>
+                <a:tc>
+                  <a:txBody>
+                    <a:bodyPr/>
+                    <a:lstStyle/>
+                    <a:p>
+                      <a:r>
+                        <a:rPr lang="en-US" sz="1000" dirty="0"/>
+                        <a:t>Amenities</a:t>
+                      </a:r>
+                    </a:p>
+                  </a:txBody>
+                  <a:tcPr/>
+                </a:tc>
+                <a:tc>
+                  <a:txBody>
+                    <a:bodyPr/>
+                    <a:lstStyle/>
+                    <a:p>
+                      <a:r>
+                        <a:rPr lang="en-US" sz="1000" dirty="0"/>
+                        <a:t>Crime</a:t>
+                      </a:r>
+                    </a:p>
+                  </a:txBody>
+                  <a:tcPr/>
+                </a:tc>
+                <a:tc>
+                  <a:txBody>
+                    <a:bodyPr/>
+                    <a:lstStyle/>
+                    <a:p>
+                      <a:r>
+                        <a:rPr lang="en-US" sz="1000" dirty="0"/>
+                        <a:t>Climate</a:t>
+                      </a:r>
+                    </a:p>
+                  </a:txBody>
+                  <a:tcPr/>
+                </a:tc>
+                <a:tc>
+                  <a:txBody>
+                    <a:bodyPr/>
+                    <a:lstStyle/>
+                    <a:p>
+                      <a:r>
+                        <a:rPr lang="en-US" sz="1000" dirty="0"/>
+                        <a:t>Pollution</a:t>
+                      </a:r>
+                    </a:p>
+                  </a:txBody>
+                  <a:tcPr/>
+                </a:tc>
+                <a:extLst>
+                  <a:ext uri="{0D108BD9-81ED-4DB2-BD59-A6C34878D82A}">
+                    <a16:rowId xmlns:a16="http://schemas.microsoft.com/office/drawing/2014/main" val="3296182698"/>
+                  </a:ext>
+                </a:extLst>
+              </a:tr>
+              <a:tr h="157618">
+                <a:tc>
+                  <a:txBody>
+                    <a:bodyPr/>
+                    <a:lstStyle/>
+                    <a:p>
+                      <a:r>
+                        <a:rPr lang="en-US" sz="1000" dirty="0"/>
+                        <a:t>3</a:t>
+                      </a:r>
+                    </a:p>
+                  </a:txBody>
+                  <a:tcPr/>
+                </a:tc>
+                <a:tc>
+                  <a:txBody>
+                    <a:bodyPr/>
+                    <a:lstStyle/>
+                    <a:p>
+                      <a:r>
+                        <a:rPr lang="en-US" sz="1000" dirty="0"/>
+                        <a:t>2</a:t>
+                      </a:r>
+                    </a:p>
+                  </a:txBody>
+                  <a:tcPr/>
+                </a:tc>
+                <a:tc>
+                  <a:txBody>
+                    <a:bodyPr/>
+                    <a:lstStyle/>
+                    <a:p>
+                      <a:r>
+                        <a:rPr lang="en-US" sz="1000" dirty="0"/>
+                        <a:t>2</a:t>
+                      </a:r>
+                    </a:p>
+                  </a:txBody>
+                  <a:tcPr/>
+                </a:tc>
+                <a:tc>
+                  <a:txBody>
+                    <a:bodyPr/>
+                    <a:lstStyle/>
+                    <a:p>
+                      <a:r>
+                        <a:rPr lang="en-US" sz="1000" dirty="0"/>
+                        <a:t>1</a:t>
+                      </a:r>
+                    </a:p>
+                  </a:txBody>
+                  <a:tcPr/>
+                </a:tc>
+                <a:tc>
+                  <a:txBody>
+                    <a:bodyPr/>
+                    <a:lstStyle/>
+                    <a:p>
+                      <a:r>
+                        <a:rPr lang="en-US" sz="1000" dirty="0"/>
+                        <a:t>2</a:t>
+                      </a:r>
+                    </a:p>
+                  </a:txBody>
+                  <a:tcPr/>
+                </a:tc>
+                <a:tc>
+                  <a:txBody>
+                    <a:bodyPr/>
+                    <a:lstStyle/>
+                    <a:p>
+                      <a:r>
+                        <a:rPr lang="en-US" sz="1000" dirty="0"/>
+                        <a:t>3</a:t>
+                      </a:r>
+                    </a:p>
+                  </a:txBody>
+                  <a:tcPr/>
+                </a:tc>
+                <a:tc>
+                  <a:txBody>
+                    <a:bodyPr/>
+                    <a:lstStyle/>
+                    <a:p>
+                      <a:r>
+                        <a:rPr lang="en-US" sz="1000" dirty="0"/>
+                        <a:t>2</a:t>
+                      </a:r>
+                    </a:p>
+                  </a:txBody>
+                  <a:tcPr/>
+                </a:tc>
+                <a:tc>
+                  <a:txBody>
+                    <a:bodyPr/>
+                    <a:lstStyle/>
+                    <a:p>
+                      <a:r>
+                        <a:rPr lang="en-US" sz="1000" dirty="0"/>
+                        <a:t>1</a:t>
+                      </a:r>
+                    </a:p>
+                  </a:txBody>
+                  <a:tcPr/>
+                </a:tc>
+                <a:tc>
+                  <a:txBody>
+                    <a:bodyPr/>
+                    <a:lstStyle/>
+                    <a:p>
+                      <a:r>
+                        <a:rPr lang="en-US" sz="1000" dirty="0"/>
+                        <a:t>2</a:t>
+                      </a:r>
+                    </a:p>
+                  </a:txBody>
+                  <a:tcPr/>
+                </a:tc>
+                <a:tc>
+                  <a:txBody>
+                    <a:bodyPr/>
+                    <a:lstStyle/>
+                    <a:p>
+                      <a:r>
+                        <a:rPr lang="en-US" sz="1000" dirty="0"/>
+                        <a:t>1</a:t>
+                      </a:r>
+                    </a:p>
+                  </a:txBody>
+                  <a:tcPr/>
+                </a:tc>
+                <a:tc>
+                  <a:txBody>
+                    <a:bodyPr/>
+                    <a:lstStyle/>
+                    <a:p>
+                      <a:r>
+                        <a:rPr lang="en-US" sz="1000" dirty="0"/>
+                        <a:t>1</a:t>
+                      </a:r>
+                    </a:p>
+                  </a:txBody>
+                  <a:tcPr/>
+                </a:tc>
+                <a:tc>
+                  <a:txBody>
+                    <a:bodyPr/>
+                    <a:lstStyle/>
+                    <a:p>
+                      <a:r>
+                        <a:rPr lang="en-US" sz="1000" dirty="0"/>
+                        <a:t>1</a:t>
+                      </a:r>
+                    </a:p>
+                  </a:txBody>
+                  <a:tcPr/>
+                </a:tc>
+                <a:extLst>
+                  <a:ext uri="{0D108BD9-81ED-4DB2-BD59-A6C34878D82A}">
+                    <a16:rowId xmlns:a16="http://schemas.microsoft.com/office/drawing/2014/main" val="3565520845"/>
+                  </a:ext>
+                </a:extLst>
+              </a:tr>
+            </a:tbl>
+          </a:graphicData>
+        </a:graphic>
+      </p:graphicFrame>
+    </p:spTree>
+    <p:extLst>
+      <p:ext uri="{BB962C8B-B14F-4D97-AF65-F5344CB8AC3E}">
+        <p14:creationId xmlns:p14="http://schemas.microsoft.com/office/powerpoint/2010/main" val="3576575517"/>
+      </p:ext>
+    </p:extLst>
+  </p:cSld>
+  <p:clrMapOvr>
+    <a:masterClrMapping/>
+  </p:clrMapOvr>
 </p:sld>
 </file>
 

</xml_diff>

<commit_message>
update overal ranking slide
</commit_message>
<xml_diff>
--- a/Project1_Presentation.pptx
+++ b/Project1_Presentation.pptx
@@ -31,7 +31,7 @@
     <p:sldId id="286" r:id="rId25"/>
     <p:sldId id="289" r:id="rId26"/>
     <p:sldId id="290" r:id="rId27"/>
-    <p:sldId id="291" r:id="rId28"/>
+    <p:sldId id="292" r:id="rId28"/>
   </p:sldIdLst>
   <p:sldSz cx="12192000" cy="6858000"/>
   <p:notesSz cx="6858000" cy="9144000"/>
@@ -8129,42 +8129,6 @@
           </a:prstGeom>
         </p:spPr>
       </p:pic>
-      <p:pic>
-        <p:nvPicPr>
-          <p:cNvPr id="22" name="Picture 21">
-            <a:extLst>
-              <a:ext uri="{FF2B5EF4-FFF2-40B4-BE49-F238E27FC236}">
-                <a16:creationId xmlns:a16="http://schemas.microsoft.com/office/drawing/2014/main" id="{87DB4B76-8273-3240-8423-0EB6764E41F0}"/>
-              </a:ext>
-            </a:extLst>
-          </p:cNvPr>
-          <p:cNvPicPr>
-            <a:picLocks noChangeAspect="1"/>
-          </p:cNvPicPr>
-          <p:nvPr/>
-        </p:nvPicPr>
-        <p:blipFill>
-          <a:blip r:embed="rId3">
-            <a:extLst>
-              <a:ext uri="{28A0092B-C50C-407E-A947-70E740481C1C}">
-                <a14:useLocalDpi xmlns:a14="http://schemas.microsoft.com/office/drawing/2010/main" val="0"/>
-              </a:ext>
-            </a:extLst>
-          </a:blip>
-          <a:stretch>
-            <a:fillRect/>
-          </a:stretch>
-        </p:blipFill>
-        <p:spPr>
-          <a:xfrm>
-            <a:off x="5942987" y="1816697"/>
-            <a:ext cx="5715000" cy="3378200"/>
-          </a:xfrm>
-          <a:prstGeom prst="rect">
-            <a:avLst/>
-          </a:prstGeom>
-        </p:spPr>
-      </p:pic>
       <p:sp>
         <p:nvSpPr>
           <p:cNvPr id="3" name="TextBox 2">
@@ -8217,7 +8181,7 @@
         </p:nvGraphicFramePr>
         <p:xfrm>
           <a:off x="556591" y="5592362"/>
-          <a:ext cx="11101392" cy="640080"/>
+          <a:ext cx="11101376" cy="487680"/>
         </p:xfrm>
         <a:graphic>
           <a:graphicData uri="http://schemas.openxmlformats.org/drawingml/2006/table">
@@ -8226,84 +8190,112 @@
                 <a:tableStyleId>{5C22544A-7EE6-4342-B048-85BDC9FD1C3A}</a:tableStyleId>
               </a:tblPr>
               <a:tblGrid>
-                <a:gridCol w="925116">
+                <a:gridCol w="693836">
                   <a:extLst>
                     <a:ext uri="{9D8B030D-6E8A-4147-A177-3AD203B41FA5}">
                       <a16:colId xmlns:a16="http://schemas.microsoft.com/office/drawing/2014/main" val="2099015565"/>
                     </a:ext>
                   </a:extLst>
                 </a:gridCol>
-                <a:gridCol w="925116">
+                <a:gridCol w="693836">
                   <a:extLst>
                     <a:ext uri="{9D8B030D-6E8A-4147-A177-3AD203B41FA5}">
                       <a16:colId xmlns:a16="http://schemas.microsoft.com/office/drawing/2014/main" val="1131645849"/>
                     </a:ext>
                   </a:extLst>
                 </a:gridCol>
-                <a:gridCol w="925116">
+                <a:gridCol w="693836">
                   <a:extLst>
                     <a:ext uri="{9D8B030D-6E8A-4147-A177-3AD203B41FA5}">
                       <a16:colId xmlns:a16="http://schemas.microsoft.com/office/drawing/2014/main" val="2979348466"/>
                     </a:ext>
                   </a:extLst>
                 </a:gridCol>
-                <a:gridCol w="925116">
+                <a:gridCol w="693836">
                   <a:extLst>
                     <a:ext uri="{9D8B030D-6E8A-4147-A177-3AD203B41FA5}">
                       <a16:colId xmlns:a16="http://schemas.microsoft.com/office/drawing/2014/main" val="3871454820"/>
                     </a:ext>
                   </a:extLst>
                 </a:gridCol>
-                <a:gridCol w="925116">
+                <a:gridCol w="693836">
                   <a:extLst>
                     <a:ext uri="{9D8B030D-6E8A-4147-A177-3AD203B41FA5}">
                       <a16:colId xmlns:a16="http://schemas.microsoft.com/office/drawing/2014/main" val="1076730244"/>
                     </a:ext>
                   </a:extLst>
                 </a:gridCol>
-                <a:gridCol w="925116">
+                <a:gridCol w="693836">
                   <a:extLst>
                     <a:ext uri="{9D8B030D-6E8A-4147-A177-3AD203B41FA5}">
                       <a16:colId xmlns:a16="http://schemas.microsoft.com/office/drawing/2014/main" val="3173180166"/>
                     </a:ext>
                   </a:extLst>
                 </a:gridCol>
-                <a:gridCol w="925116">
+                <a:gridCol w="693836">
                   <a:extLst>
                     <a:ext uri="{9D8B030D-6E8A-4147-A177-3AD203B41FA5}">
                       <a16:colId xmlns:a16="http://schemas.microsoft.com/office/drawing/2014/main" val="205725656"/>
                     </a:ext>
                   </a:extLst>
                 </a:gridCol>
-                <a:gridCol w="925116">
+                <a:gridCol w="693836">
                   <a:extLst>
                     <a:ext uri="{9D8B030D-6E8A-4147-A177-3AD203B41FA5}">
                       <a16:colId xmlns:a16="http://schemas.microsoft.com/office/drawing/2014/main" val="2271480319"/>
                     </a:ext>
                   </a:extLst>
                 </a:gridCol>
-                <a:gridCol w="925116">
+                <a:gridCol w="693836">
+                  <a:extLst>
+                    <a:ext uri="{9D8B030D-6E8A-4147-A177-3AD203B41FA5}">
+                      <a16:colId xmlns:a16="http://schemas.microsoft.com/office/drawing/2014/main" val="3504083037"/>
+                    </a:ext>
+                  </a:extLst>
+                </a:gridCol>
+                <a:gridCol w="693836">
+                  <a:extLst>
+                    <a:ext uri="{9D8B030D-6E8A-4147-A177-3AD203B41FA5}">
+                      <a16:colId xmlns:a16="http://schemas.microsoft.com/office/drawing/2014/main" val="295204535"/>
+                    </a:ext>
+                  </a:extLst>
+                </a:gridCol>
+                <a:gridCol w="693836">
+                  <a:extLst>
+                    <a:ext uri="{9D8B030D-6E8A-4147-A177-3AD203B41FA5}">
+                      <a16:colId xmlns:a16="http://schemas.microsoft.com/office/drawing/2014/main" val="420834283"/>
+                    </a:ext>
+                  </a:extLst>
+                </a:gridCol>
+                <a:gridCol w="627222">
+                  <a:extLst>
+                    <a:ext uri="{9D8B030D-6E8A-4147-A177-3AD203B41FA5}">
+                      <a16:colId xmlns:a16="http://schemas.microsoft.com/office/drawing/2014/main" val="4186120540"/>
+                    </a:ext>
+                  </a:extLst>
+                </a:gridCol>
+                <a:gridCol w="760450">
                   <a:extLst>
                     <a:ext uri="{9D8B030D-6E8A-4147-A177-3AD203B41FA5}">
                       <a16:colId xmlns:a16="http://schemas.microsoft.com/office/drawing/2014/main" val="3484716283"/>
                     </a:ext>
                   </a:extLst>
                 </a:gridCol>
-                <a:gridCol w="925116">
+                <a:gridCol w="693836">
                   <a:extLst>
                     <a:ext uri="{9D8B030D-6E8A-4147-A177-3AD203B41FA5}">
                       <a16:colId xmlns:a16="http://schemas.microsoft.com/office/drawing/2014/main" val="3882757151"/>
                     </a:ext>
                   </a:extLst>
                 </a:gridCol>
-                <a:gridCol w="925116">
+                <a:gridCol w="693836">
                   <a:extLst>
                     <a:ext uri="{9D8B030D-6E8A-4147-A177-3AD203B41FA5}">
                       <a16:colId xmlns:a16="http://schemas.microsoft.com/office/drawing/2014/main" val="4187639300"/>
                     </a:ext>
                   </a:extLst>
                 </a:gridCol>
-                <a:gridCol w="925116">
+                <a:gridCol w="693836">
                   <a:extLst>
                     <a:ext uri="{9D8B030D-6E8A-4147-A177-3AD203B41FA5}">
                       <a16:colId xmlns:a16="http://schemas.microsoft.com/office/drawing/2014/main" val="1901181437"/>
@@ -8311,7 +8303,7 @@
                   </a:extLst>
                 </a:gridCol>
               </a:tblGrid>
-              <a:tr h="370840">
+              <a:tr h="130645">
                 <a:tc>
                   <a:txBody>
                     <a:bodyPr/>
@@ -8319,7 +8311,7 @@
                     <a:p>
                       <a:r>
                         <a:rPr lang="en-US" sz="1000" dirty="0"/>
-                        <a:t>House Own Affordability</a:t>
+                        <a:t>House</a:t>
                       </a:r>
                     </a:p>
                   </a:txBody>
@@ -8332,7 +8324,7 @@
                     <a:p>
                       <a:r>
                         <a:rPr lang="en-US" sz="1000" dirty="0"/>
-                        <a:t>Rent Affordability</a:t>
+                        <a:t>Rent</a:t>
                       </a:r>
                     </a:p>
                   </a:txBody>
@@ -8345,7 +8337,7 @@
                     <a:p>
                       <a:r>
                         <a:rPr lang="en-US" sz="1000" dirty="0"/>
-                        <a:t>Education Attainment</a:t>
+                        <a:t>Ed Attain</a:t>
                       </a:r>
                     </a:p>
                   </a:txBody>
@@ -8384,7 +8376,7 @@
                     <a:p>
                       <a:r>
                         <a:rPr lang="en-US" sz="1000" dirty="0"/>
-                        <a:t>Technical Pool</a:t>
+                        <a:t>Tec Pool</a:t>
                       </a:r>
                     </a:p>
                   </a:txBody>
@@ -8397,7 +8389,7 @@
                     <a:p>
                       <a:r>
                         <a:rPr lang="en-US" sz="1000" dirty="0"/>
-                        <a:t>Walk/Transit</a:t>
+                        <a:t>Transit</a:t>
                       </a:r>
                     </a:p>
                   </a:txBody>
@@ -8421,9 +8413,89 @@
                     <a:bodyPr/>
                     <a:lstStyle/>
                     <a:p>
+                      <a:pPr algn="ctr" fontAlgn="b"/>
+                      <a:r>
+                        <a:rPr lang="en-US" sz="1000" b="1" i="0" u="none" strike="noStrike" dirty="0">
+                          <a:solidFill>
+                            <a:schemeClr val="bg1"/>
+                          </a:solidFill>
+                          <a:effectLst/>
+                          <a:latin typeface="+mn-lt"/>
+                        </a:rPr>
+                        <a:t>Rest</a:t>
+                      </a:r>
+                    </a:p>
+                  </a:txBody>
+                  <a:tcPr marL="9525" marR="9525" marT="9525" marB="0" anchor="ctr"/>
+                </a:tc>
+                <a:tc>
+                  <a:txBody>
+                    <a:bodyPr/>
+                    <a:lstStyle/>
+                    <a:p>
+                      <a:pPr algn="ctr" fontAlgn="b"/>
+                      <a:r>
+                        <a:rPr lang="en-US" sz="1000" b="1" i="0" u="none" strike="noStrike" dirty="0">
+                          <a:solidFill>
+                            <a:schemeClr val="bg1"/>
+                          </a:solidFill>
+                          <a:effectLst/>
+                          <a:latin typeface="+mn-lt"/>
+                        </a:rPr>
+                        <a:t>Hotels</a:t>
+                      </a:r>
+                    </a:p>
+                  </a:txBody>
+                  <a:tcPr marL="9525" marR="9525" marT="9525" marB="0" anchor="ctr"/>
+                </a:tc>
+                <a:tc>
+                  <a:txBody>
+                    <a:bodyPr/>
+                    <a:lstStyle/>
+                    <a:p>
+                      <a:pPr algn="ctr" fontAlgn="b"/>
+                      <a:r>
+                        <a:rPr lang="en-US" sz="1000" b="1" i="0" u="none" strike="noStrike" dirty="0">
+                          <a:solidFill>
+                            <a:schemeClr val="bg1"/>
+                          </a:solidFill>
+                          <a:effectLst/>
+                          <a:latin typeface="+mn-lt"/>
+                        </a:rPr>
+                        <a:t>Hospitals</a:t>
+                      </a:r>
+                    </a:p>
+                  </a:txBody>
+                  <a:tcPr marL="9525" marR="9525" marT="9525" marB="0" anchor="ctr"/>
+                </a:tc>
+                <a:tc>
+                  <a:txBody>
+                    <a:bodyPr/>
+                    <a:lstStyle/>
+                    <a:p>
+                      <a:pPr algn="ctr" fontAlgn="b"/>
+                      <a:r>
+                        <a:rPr lang="en-US" sz="1000" b="1" i="0" u="none" strike="noStrike" dirty="0">
+                          <a:solidFill>
+                            <a:schemeClr val="bg1"/>
+                          </a:solidFill>
+                          <a:effectLst/>
+                          <a:latin typeface="+mn-lt"/>
+                        </a:rPr>
+                        <a:t>Shops</a:t>
+                      </a:r>
+                    </a:p>
+                  </a:txBody>
+                  <a:tcPr marL="9525" marR="9525" marT="9525" marB="0" anchor="ctr"/>
+                </a:tc>
+                <a:tc>
+                  <a:txBody>
+                    <a:bodyPr/>
+                    <a:lstStyle/>
+                    <a:p>
                       <a:r>
                         <a:rPr lang="en-US" sz="1000" dirty="0"/>
-                        <a:t>Amenities</a:t>
+                        <a:t>Fitness</a:t>
                       </a:r>
                     </a:p>
                   </a:txBody>
@@ -8584,6 +8656,86 @@
                     <a:bodyPr/>
                     <a:lstStyle/>
                     <a:p>
+                      <a:pPr algn="l" fontAlgn="b"/>
+                      <a:r>
+                        <a:rPr lang="en-US" sz="1000" b="0" i="0" u="none" strike="noStrike" dirty="0">
+                          <a:solidFill>
+                            <a:srgbClr val="000000"/>
+                          </a:solidFill>
+                          <a:effectLst/>
+                          <a:latin typeface="+mn-lt"/>
+                        </a:rPr>
+                        <a:t> 0.25</a:t>
+                      </a:r>
+                    </a:p>
+                  </a:txBody>
+                  <a:tcPr marL="9525" marR="9525" marT="9525" marB="0" anchor="ctr"/>
+                </a:tc>
+                <a:tc>
+                  <a:txBody>
+                    <a:bodyPr/>
+                    <a:lstStyle/>
+                    <a:p>
+                      <a:pPr algn="l" fontAlgn="b"/>
+                      <a:r>
+                        <a:rPr lang="en-US" sz="1000" b="0" i="0" u="none" strike="noStrike" dirty="0">
+                          <a:solidFill>
+                            <a:srgbClr val="000000"/>
+                          </a:solidFill>
+                          <a:effectLst/>
+                          <a:latin typeface="+mn-lt"/>
+                        </a:rPr>
+                        <a:t> 0.75</a:t>
+                      </a:r>
+                    </a:p>
+                  </a:txBody>
+                  <a:tcPr marL="9525" marR="9525" marT="9525" marB="0" anchor="ctr"/>
+                </a:tc>
+                <a:tc>
+                  <a:txBody>
+                    <a:bodyPr/>
+                    <a:lstStyle/>
+                    <a:p>
+                      <a:pPr algn="l" fontAlgn="b"/>
+                      <a:r>
+                        <a:rPr lang="en-US" sz="1000" b="0" i="0" u="none" strike="noStrike" dirty="0">
+                          <a:solidFill>
+                            <a:srgbClr val="000000"/>
+                          </a:solidFill>
+                          <a:effectLst/>
+                          <a:latin typeface="+mn-lt"/>
+                        </a:rPr>
+                        <a:t> 0.5</a:t>
+                      </a:r>
+                    </a:p>
+                  </a:txBody>
+                  <a:tcPr marL="9525" marR="9525" marT="9525" marB="0" anchor="ctr"/>
+                </a:tc>
+                <a:tc>
+                  <a:txBody>
+                    <a:bodyPr/>
+                    <a:lstStyle/>
+                    <a:p>
+                      <a:pPr algn="l" fontAlgn="b"/>
+                      <a:r>
+                        <a:rPr lang="en-US" sz="1000" b="0" i="0" u="none" strike="noStrike" dirty="0">
+                          <a:solidFill>
+                            <a:srgbClr val="000000"/>
+                          </a:solidFill>
+                          <a:effectLst/>
+                          <a:latin typeface="+mn-lt"/>
+                        </a:rPr>
+                        <a:t> 0.25</a:t>
+                      </a:r>
+                    </a:p>
+                  </a:txBody>
+                  <a:tcPr marL="9525" marR="9525" marT="9525" marB="0" anchor="ctr"/>
+                </a:tc>
+                <a:tc>
+                  <a:txBody>
+                    <a:bodyPr/>
+                    <a:lstStyle/>
+                    <a:p>
                       <a:r>
                         <a:rPr lang="en-US" sz="1000" dirty="0"/>
                         <a:t>2</a:t>
@@ -8641,10 +8793,46 @@
           </a:graphicData>
         </a:graphic>
       </p:graphicFrame>
+      <p:pic>
+        <p:nvPicPr>
+          <p:cNvPr id="7" name="Picture 6">
+            <a:extLst>
+              <a:ext uri="{FF2B5EF4-FFF2-40B4-BE49-F238E27FC236}">
+                <a16:creationId xmlns:a16="http://schemas.microsoft.com/office/drawing/2014/main" id="{7FAF96FF-2589-214D-823A-8EACD8447428}"/>
+              </a:ext>
+            </a:extLst>
+          </p:cNvPr>
+          <p:cNvPicPr>
+            <a:picLocks noChangeAspect="1"/>
+          </p:cNvPicPr>
+          <p:nvPr/>
+        </p:nvPicPr>
+        <p:blipFill>
+          <a:blip r:embed="rId3">
+            <a:extLst>
+              <a:ext uri="{28A0092B-C50C-407E-A947-70E740481C1C}">
+                <a14:useLocalDpi xmlns:a14="http://schemas.microsoft.com/office/drawing/2010/main" val="0"/>
+              </a:ext>
+            </a:extLst>
+          </a:blip>
+          <a:stretch>
+            <a:fillRect/>
+          </a:stretch>
+        </p:blipFill>
+        <p:spPr>
+          <a:xfrm>
+            <a:off x="5942983" y="1809997"/>
+            <a:ext cx="5715000" cy="3378200"/>
+          </a:xfrm>
+          <a:prstGeom prst="rect">
+            <a:avLst/>
+          </a:prstGeom>
+        </p:spPr>
+      </p:pic>
     </p:spTree>
     <p:extLst>
       <p:ext uri="{BB962C8B-B14F-4D97-AF65-F5344CB8AC3E}">
-        <p14:creationId xmlns:p14="http://schemas.microsoft.com/office/powerpoint/2010/main" val="3576575517"/>
+        <p14:creationId xmlns:p14="http://schemas.microsoft.com/office/powerpoint/2010/main" val="3630619199"/>
       </p:ext>
     </p:extLst>
   </p:cSld>

</xml_diff>

<commit_message>
added info to env slide
</commit_message>
<xml_diff>
--- a/Project1_Presentation.pptx
+++ b/Project1_Presentation.pptx
@@ -28,7 +28,7 @@
     <p:sldId id="275" r:id="rId22"/>
     <p:sldId id="261" r:id="rId23"/>
     <p:sldId id="277" r:id="rId24"/>
-    <p:sldId id="286" r:id="rId25"/>
+    <p:sldId id="293" r:id="rId25"/>
     <p:sldId id="289" r:id="rId26"/>
     <p:sldId id="290" r:id="rId27"/>
     <p:sldId id="292" r:id="rId28"/>
@@ -6122,7 +6122,7 @@
         </p:blipFill>
         <p:spPr>
           <a:xfrm>
-            <a:off x="2155741" y="3636493"/>
+            <a:off x="18331" y="3533623"/>
             <a:ext cx="8089879" cy="2594610"/>
           </a:xfrm>
         </p:spPr>
@@ -6285,7 +6285,7 @@
         </p:nvSpPr>
         <p:spPr>
           <a:xfrm>
-            <a:off x="4972682" y="3359494"/>
+            <a:off x="2846702" y="3359494"/>
             <a:ext cx="1758238" cy="276999"/>
           </a:xfrm>
           <a:prstGeom prst="rect">
@@ -6368,15 +6368,254 @@
         </p:blipFill>
         <p:spPr>
           <a:xfrm>
-            <a:off x="1119823" y="1402506"/>
-            <a:ext cx="10058400" cy="3355759"/>
+            <a:off x="342583" y="3726180"/>
+            <a:ext cx="7478775" cy="2495125"/>
           </a:xfrm>
         </p:spPr>
       </p:pic>
+      <p:pic>
+        <p:nvPicPr>
+          <p:cNvPr id="3" name="Picture 2">
+            <a:extLst>
+              <a:ext uri="{FF2B5EF4-FFF2-40B4-BE49-F238E27FC236}">
+                <a16:creationId xmlns:a16="http://schemas.microsoft.com/office/drawing/2014/main" id="{C6EA60E2-3CE0-4146-9F66-992F611A7D2C}"/>
+              </a:ext>
+            </a:extLst>
+          </p:cNvPr>
+          <p:cNvPicPr>
+            <a:picLocks noChangeAspect="1"/>
+          </p:cNvPicPr>
+          <p:nvPr/>
+        </p:nvPicPr>
+        <p:blipFill>
+          <a:blip r:embed="rId3">
+            <a:extLst>
+              <a:ext uri="{28A0092B-C50C-407E-A947-70E740481C1C}">
+                <a14:useLocalDpi xmlns:a14="http://schemas.microsoft.com/office/drawing/2010/main" val="0"/>
+              </a:ext>
+            </a:extLst>
+          </a:blip>
+          <a:stretch>
+            <a:fillRect/>
+          </a:stretch>
+        </p:blipFill>
+        <p:spPr>
+          <a:xfrm>
+            <a:off x="6660742" y="196618"/>
+            <a:ext cx="5189842" cy="3712442"/>
+          </a:xfrm>
+          <a:prstGeom prst="rect">
+            <a:avLst/>
+          </a:prstGeom>
+          <a:ln>
+            <a:noFill/>
+          </a:ln>
+          <a:effectLst>
+            <a:outerShdw blurRad="190500" algn="tl" rotWithShape="0">
+              <a:srgbClr val="000000">
+                <a:alpha val="70000"/>
+              </a:srgbClr>
+            </a:outerShdw>
+          </a:effectLst>
+        </p:spPr>
+      </p:pic>
+      <p:sp>
+        <p:nvSpPr>
+          <p:cNvPr id="6" name="Title 1">
+            <a:extLst>
+              <a:ext uri="{FF2B5EF4-FFF2-40B4-BE49-F238E27FC236}">
+                <a16:creationId xmlns:a16="http://schemas.microsoft.com/office/drawing/2014/main" id="{F7AE8CE4-FE90-A745-8DB6-6765DD447C6B}"/>
+              </a:ext>
+            </a:extLst>
+          </p:cNvPr>
+          <p:cNvSpPr>
+            <a:spLocks noGrp="1"/>
+          </p:cNvSpPr>
+          <p:nvPr>
+            <p:ph type="title"/>
+          </p:nvPr>
+        </p:nvSpPr>
+        <p:spPr>
+          <a:xfrm>
+            <a:off x="1097280" y="286603"/>
+            <a:ext cx="10058400" cy="1450757"/>
+          </a:xfrm>
+        </p:spPr>
+        <p:txBody>
+          <a:bodyPr>
+            <a:normAutofit/>
+          </a:bodyPr>
+          <a:lstStyle/>
+          <a:p>
+            <a:r>
+              <a:rPr lang="en-US" sz="4000" dirty="0"/>
+              <a:t>Environment Index</a:t>
+            </a:r>
+          </a:p>
+        </p:txBody>
+      </p:sp>
+      <p:sp>
+        <p:nvSpPr>
+          <p:cNvPr id="4" name="TextBox 3">
+            <a:extLst>
+              <a:ext uri="{FF2B5EF4-FFF2-40B4-BE49-F238E27FC236}">
+                <a16:creationId xmlns:a16="http://schemas.microsoft.com/office/drawing/2014/main" id="{9A525359-E4B3-454A-8737-1535D75D2224}"/>
+              </a:ext>
+            </a:extLst>
+          </p:cNvPr>
+          <p:cNvSpPr txBox="1"/>
+          <p:nvPr/>
+        </p:nvSpPr>
+        <p:spPr>
+          <a:xfrm>
+            <a:off x="8401050" y="4423410"/>
+            <a:ext cx="3449534" cy="1661993"/>
+          </a:xfrm>
+          <a:prstGeom prst="rect">
+            <a:avLst/>
+          </a:prstGeom>
+          <a:solidFill>
+            <a:schemeClr val="accent5">
+              <a:lumMod val="20000"/>
+              <a:lumOff val="80000"/>
+            </a:schemeClr>
+          </a:solidFill>
+        </p:spPr>
+        <p:txBody>
+          <a:bodyPr wrap="none" rtlCol="0">
+            <a:spAutoFit/>
+          </a:bodyPr>
+          <a:lstStyle/>
+          <a:p>
+            <a:r>
+              <a:rPr lang="en-US" sz="1400" b="1" dirty="0"/>
+              <a:t>Observations</a:t>
+            </a:r>
+            <a:r>
+              <a:rPr lang="en-US" b="1" dirty="0"/>
+              <a:t>:</a:t>
+            </a:r>
+          </a:p>
+          <a:p>
+            <a:pPr marL="285750" indent="-285750">
+              <a:buFont typeface="Wingdings" pitchFamily="2" charset="2"/>
+              <a:buChar char="Ø"/>
+            </a:pPr>
+            <a:r>
+              <a:rPr lang="en-US" sz="1400" dirty="0"/>
+              <a:t>Most cities with higher Climate Index</a:t>
+            </a:r>
+          </a:p>
+          <a:p>
+            <a:r>
+              <a:rPr lang="en-US" sz="1400" dirty="0"/>
+              <a:t>       also tends to have a very high Pollution</a:t>
+            </a:r>
+          </a:p>
+          <a:p>
+            <a:r>
+              <a:rPr lang="en-US" sz="1400" dirty="0"/>
+              <a:t>       Index, which is highly contradictory.</a:t>
+            </a:r>
+          </a:p>
+          <a:p>
+            <a:pPr marL="285750" indent="-285750">
+              <a:buFont typeface="Wingdings" pitchFamily="2" charset="2"/>
+              <a:buChar char="Ø"/>
+            </a:pPr>
+            <a:r>
+              <a:rPr lang="en-US" sz="1400" b="1" dirty="0"/>
+              <a:t>Raleigh</a:t>
+            </a:r>
+            <a:r>
+              <a:rPr lang="en-US" sz="1400" dirty="0"/>
+              <a:t> fairs well amongst all as it has</a:t>
+            </a:r>
+          </a:p>
+          <a:p>
+            <a:r>
+              <a:rPr lang="en-US" sz="1400" dirty="0"/>
+              <a:t>        Climate Index and lower Pollution Index.</a:t>
+            </a:r>
+          </a:p>
+          <a:p>
+            <a:r>
+              <a:rPr lang="en-US" sz="1400" dirty="0"/>
+              <a:t> </a:t>
+            </a:r>
+          </a:p>
+        </p:txBody>
+      </p:sp>
+      <p:sp>
+        <p:nvSpPr>
+          <p:cNvPr id="2" name="TextBox 1">
+            <a:extLst>
+              <a:ext uri="{FF2B5EF4-FFF2-40B4-BE49-F238E27FC236}">
+                <a16:creationId xmlns:a16="http://schemas.microsoft.com/office/drawing/2014/main" id="{26FB7254-7444-6946-A06D-C3F3E8665D46}"/>
+              </a:ext>
+            </a:extLst>
+          </p:cNvPr>
+          <p:cNvSpPr txBox="1"/>
+          <p:nvPr/>
+        </p:nvSpPr>
+        <p:spPr>
+          <a:xfrm>
+            <a:off x="6419756" y="6090500"/>
+            <a:ext cx="5580374" cy="261610"/>
+          </a:xfrm>
+          <a:prstGeom prst="rect">
+            <a:avLst/>
+          </a:prstGeom>
+          <a:noFill/>
+        </p:spPr>
+        <p:txBody>
+          <a:bodyPr wrap="none" rtlCol="0">
+            <a:spAutoFit/>
+          </a:bodyPr>
+          <a:lstStyle/>
+          <a:p>
+            <a:r>
+              <a:rPr lang="en-US" sz="1100" dirty="0"/>
+              <a:t>Source: </a:t>
+            </a:r>
+            <a:r>
+              <a:rPr lang="en-US" sz="1100" dirty="0">
+                <a:hlinkClick r:id="rId4"/>
+              </a:rPr>
+              <a:t>https://</a:t>
+            </a:r>
+            <a:r>
+              <a:rPr lang="en-US" sz="1100" dirty="0" err="1">
+                <a:hlinkClick r:id="rId4"/>
+              </a:rPr>
+              <a:t>www.numbeo.com</a:t>
+            </a:r>
+            <a:r>
+              <a:rPr lang="en-US" sz="1100" dirty="0">
+                <a:hlinkClick r:id="rId4"/>
+              </a:rPr>
+              <a:t>/quality-of-life/</a:t>
+            </a:r>
+            <a:r>
+              <a:rPr lang="en-US" sz="1100" dirty="0" err="1">
+                <a:hlinkClick r:id="rId4"/>
+              </a:rPr>
+              <a:t>region_rankings.jsp?title</a:t>
+            </a:r>
+            <a:r>
+              <a:rPr lang="en-US" sz="1100" dirty="0">
+                <a:hlinkClick r:id="rId4"/>
+              </a:rPr>
+              <a:t>=2018&amp;region=019</a:t>
+            </a:r>
+            <a:endParaRPr lang="en-US" sz="1100" dirty="0"/>
+          </a:p>
+        </p:txBody>
+      </p:sp>
     </p:spTree>
     <p:extLst>
       <p:ext uri="{BB962C8B-B14F-4D97-AF65-F5344CB8AC3E}">
-        <p14:creationId xmlns:p14="http://schemas.microsoft.com/office/powerpoint/2010/main" val="3746184928"/>
+        <p14:creationId xmlns:p14="http://schemas.microsoft.com/office/powerpoint/2010/main" val="2356615832"/>
       </p:ext>
     </p:extLst>
   </p:cSld>

</xml_diff>

<commit_message>
Added weights one sentence reasoning
</commit_message>
<xml_diff>
--- a/Project1_Presentation.pptx
+++ b/Project1_Presentation.pptx
@@ -364,7 +364,7 @@
           <a:p>
             <a:fld id="{F70A646C-22A8-4D69-ACFD-CD88A31D50DB}" type="datetimeFigureOut">
               <a:rPr lang="en-US" smtClean="0"/>
-              <a:t>4/3/18</a:t>
+              <a:t>4/3/2018</a:t>
             </a:fld>
             <a:endParaRPr lang="en-US"/>
           </a:p>
@@ -572,7 +572,7 @@
           <a:p>
             <a:fld id="{F70A646C-22A8-4D69-ACFD-CD88A31D50DB}" type="datetimeFigureOut">
               <a:rPr lang="en-US" smtClean="0"/>
-              <a:t>4/3/18</a:t>
+              <a:t>4/3/2018</a:t>
             </a:fld>
             <a:endParaRPr lang="en-US"/>
           </a:p>
@@ -828,7 +828,7 @@
           <a:p>
             <a:fld id="{F70A646C-22A8-4D69-ACFD-CD88A31D50DB}" type="datetimeFigureOut">
               <a:rPr lang="en-US" smtClean="0"/>
-              <a:t>4/3/18</a:t>
+              <a:t>4/3/2018</a:t>
             </a:fld>
             <a:endParaRPr lang="en-US"/>
           </a:p>
@@ -1002,7 +1002,7 @@
           <a:p>
             <a:fld id="{F70A646C-22A8-4D69-ACFD-CD88A31D50DB}" type="datetimeFigureOut">
               <a:rPr lang="en-US" smtClean="0"/>
-              <a:t>4/3/18</a:t>
+              <a:t>4/3/2018</a:t>
             </a:fld>
             <a:endParaRPr lang="en-US"/>
           </a:p>
@@ -1345,7 +1345,7 @@
           <a:p>
             <a:fld id="{F70A646C-22A8-4D69-ACFD-CD88A31D50DB}" type="datetimeFigureOut">
               <a:rPr lang="en-US" smtClean="0"/>
-              <a:t>4/3/18</a:t>
+              <a:t>4/3/2018</a:t>
             </a:fld>
             <a:endParaRPr lang="en-US"/>
           </a:p>
@@ -1620,7 +1620,7 @@
           <a:p>
             <a:fld id="{F70A646C-22A8-4D69-ACFD-CD88A31D50DB}" type="datetimeFigureOut">
               <a:rPr lang="en-US" smtClean="0"/>
-              <a:t>4/3/18</a:t>
+              <a:t>4/3/2018</a:t>
             </a:fld>
             <a:endParaRPr lang="en-US"/>
           </a:p>
@@ -1999,7 +1999,7 @@
           <a:p>
             <a:fld id="{F70A646C-22A8-4D69-ACFD-CD88A31D50DB}" type="datetimeFigureOut">
               <a:rPr lang="en-US" smtClean="0"/>
-              <a:t>4/3/18</a:t>
+              <a:t>4/3/2018</a:t>
             </a:fld>
             <a:endParaRPr lang="en-US"/>
           </a:p>
@@ -2117,7 +2117,7 @@
           <a:p>
             <a:fld id="{F70A646C-22A8-4D69-ACFD-CD88A31D50DB}" type="datetimeFigureOut">
               <a:rPr lang="en-US" smtClean="0"/>
-              <a:t>4/3/18</a:t>
+              <a:t>4/3/2018</a:t>
             </a:fld>
             <a:endParaRPr lang="en-US"/>
           </a:p>
@@ -2288,7 +2288,7 @@
           <a:p>
             <a:fld id="{F70A646C-22A8-4D69-ACFD-CD88A31D50DB}" type="datetimeFigureOut">
               <a:rPr lang="en-US" smtClean="0"/>
-              <a:t>4/3/18</a:t>
+              <a:t>4/3/2018</a:t>
             </a:fld>
             <a:endParaRPr lang="en-US"/>
           </a:p>
@@ -2642,7 +2642,7 @@
           <a:p>
             <a:fld id="{F70A646C-22A8-4D69-ACFD-CD88A31D50DB}" type="datetimeFigureOut">
               <a:rPr lang="en-US" smtClean="0"/>
-              <a:t>4/3/18</a:t>
+              <a:t>4/3/2018</a:t>
             </a:fld>
             <a:endParaRPr lang="en-US"/>
           </a:p>
@@ -3024,7 +3024,7 @@
           <a:p>
             <a:fld id="{F70A646C-22A8-4D69-ACFD-CD88A31D50DB}" type="datetimeFigureOut">
               <a:rPr lang="en-US" smtClean="0"/>
-              <a:t>4/3/18</a:t>
+              <a:t>4/3/2018</a:t>
             </a:fld>
             <a:endParaRPr lang="en-US"/>
           </a:p>
@@ -3311,7 +3311,7 @@
           <a:p>
             <a:fld id="{F70A646C-22A8-4D69-ACFD-CD88A31D50DB}" type="datetimeFigureOut">
               <a:rPr lang="en-US" smtClean="0"/>
-              <a:t>4/3/18</a:t>
+              <a:t>4/3/2018</a:t>
             </a:fld>
             <a:endParaRPr lang="en-US"/>
           </a:p>
@@ -6073,6 +6073,13 @@
   <p:clrMapOvr>
     <a:masterClrMapping/>
   </p:clrMapOvr>
+  <p:timing>
+    <p:tnLst>
+      <p:par>
+        <p:cTn id="1" dur="indefinite" restart="never" nodeType="tmRoot"/>
+      </p:par>
+    </p:tnLst>
+  </p:timing>
 </p:sld>
 </file>
 
@@ -6318,6 +6325,13 @@
   <p:clrMapOvr>
     <a:masterClrMapping/>
   </p:clrMapOvr>
+  <p:timing>
+    <p:tnLst>
+      <p:par>
+        <p:cTn id="1" dur="indefinite" restart="never" nodeType="tmRoot"/>
+      </p:par>
+    </p:tnLst>
+  </p:timing>
 </p:sld>
 </file>
 
@@ -6622,6 +6636,13 @@
   <p:clrMapOvr>
     <a:masterClrMapping/>
   </p:clrMapOvr>
+  <p:timing>
+    <p:tnLst>
+      <p:par>
+        <p:cTn id="1" dur="indefinite" restart="never" nodeType="tmRoot"/>
+      </p:par>
+    </p:tnLst>
+  </p:timing>
 </p:sld>
 </file>
 
@@ -7175,6 +7196,36 @@
           </a:p>
         </p:txBody>
       </p:sp>
+      <p:cxnSp>
+        <p:nvCxnSpPr>
+          <p:cNvPr id="6" name="Straight Connector 5"/>
+          <p:cNvCxnSpPr/>
+          <p:nvPr/>
+        </p:nvCxnSpPr>
+        <p:spPr>
+          <a:xfrm>
+            <a:off x="518160" y="798667"/>
+            <a:ext cx="11175076" cy="0"/>
+          </a:xfrm>
+          <a:prstGeom prst="line">
+            <a:avLst/>
+          </a:prstGeom>
+        </p:spPr>
+        <p:style>
+          <a:lnRef idx="1">
+            <a:schemeClr val="accent1"/>
+          </a:lnRef>
+          <a:fillRef idx="0">
+            <a:schemeClr val="accent1"/>
+          </a:fillRef>
+          <a:effectRef idx="0">
+            <a:schemeClr val="accent1"/>
+          </a:effectRef>
+          <a:fontRef idx="minor">
+            <a:schemeClr val="tx1"/>
+          </a:fontRef>
+        </p:style>
+      </p:cxnSp>
     </p:spTree>
     <p:extLst>
       <p:ext uri="{BB962C8B-B14F-4D97-AF65-F5344CB8AC3E}">
@@ -7185,6 +7236,13 @@
   <p:clrMapOvr>
     <a:masterClrMapping/>
   </p:clrMapOvr>
+  <p:timing>
+    <p:tnLst>
+      <p:par>
+        <p:cTn id="1" dur="indefinite" restart="never" nodeType="tmRoot"/>
+      </p:par>
+    </p:tnLst>
+  </p:timing>
 </p:sld>
 </file>
 
@@ -8156,6 +8214,36 @@
           </a:p>
         </p:txBody>
       </p:sp>
+      <p:cxnSp>
+        <p:nvCxnSpPr>
+          <p:cNvPr id="13" name="Straight Connector 12"/>
+          <p:cNvCxnSpPr/>
+          <p:nvPr/>
+        </p:nvCxnSpPr>
+        <p:spPr>
+          <a:xfrm>
+            <a:off x="518160" y="798667"/>
+            <a:ext cx="11175076" cy="0"/>
+          </a:xfrm>
+          <a:prstGeom prst="line">
+            <a:avLst/>
+          </a:prstGeom>
+        </p:spPr>
+        <p:style>
+          <a:lnRef idx="1">
+            <a:schemeClr val="accent1"/>
+          </a:lnRef>
+          <a:fillRef idx="0">
+            <a:schemeClr val="accent1"/>
+          </a:fillRef>
+          <a:effectRef idx="0">
+            <a:schemeClr val="accent1"/>
+          </a:effectRef>
+          <a:fontRef idx="minor">
+            <a:schemeClr val="tx1"/>
+          </a:fontRef>
+        </p:style>
+      </p:cxnSp>
     </p:spTree>
     <p:extLst>
       <p:ext uri="{BB962C8B-B14F-4D97-AF65-F5344CB8AC3E}">
@@ -8166,6 +8254,13 @@
   <p:clrMapOvr>
     <a:masterClrMapping/>
   </p:clrMapOvr>
+  <p:timing>
+    <p:tnLst>
+      <p:par>
+        <p:cTn id="1" dur="indefinite" restart="never" nodeType="tmRoot"/>
+      </p:par>
+    </p:tnLst>
+  </p:timing>
 </p:sld>
 </file>
 
@@ -8235,7 +8330,7 @@
         </p:nvCxnSpPr>
         <p:spPr>
           <a:xfrm>
-            <a:off x="1248032" y="902043"/>
+            <a:off x="989398" y="989012"/>
             <a:ext cx="9069860" cy="0"/>
           </a:xfrm>
           <a:prstGeom prst="line">
@@ -8276,7 +8371,7 @@
         </p:nvSpPr>
         <p:spPr>
           <a:xfrm>
-            <a:off x="290363" y="1235120"/>
+            <a:off x="290347" y="1067951"/>
             <a:ext cx="2162580" cy="369332"/>
           </a:xfrm>
           <a:prstGeom prst="rect">
@@ -8311,7 +8406,7 @@
         </p:nvSpPr>
         <p:spPr>
           <a:xfrm>
-            <a:off x="5942987" y="1184314"/>
+            <a:off x="5942971" y="1017145"/>
             <a:ext cx="1928541" cy="369332"/>
           </a:xfrm>
           <a:prstGeom prst="rect">
@@ -8360,7 +8455,7 @@
         </p:blipFill>
         <p:spPr>
           <a:xfrm>
-            <a:off x="67962" y="1816697"/>
+            <a:off x="67946" y="1649528"/>
             <a:ext cx="5715000" cy="3378200"/>
           </a:xfrm>
           <a:prstGeom prst="rect">
@@ -8383,7 +8478,7 @@
         <p:spPr>
           <a:xfrm>
             <a:off x="364005" y="5194897"/>
-            <a:ext cx="1007648" cy="369332"/>
+            <a:ext cx="10517623" cy="369332"/>
           </a:xfrm>
           <a:prstGeom prst="rect">
             <a:avLst/>
@@ -8398,9 +8493,10 @@
           <a:p>
             <a:pPr fontAlgn="base"/>
             <a:r>
-              <a:rPr lang="en-US" dirty="0"/>
-              <a:t>Weights:</a:t>
-            </a:r>
+              <a:rPr lang="en-US" dirty="0" smtClean="0"/>
+              <a:t>Weights (Definition: What would make someone in tech move cities or what would grow the tech labor force) :</a:t>
+            </a:r>
+            <a:endParaRPr lang="en-US" dirty="0"/>
           </a:p>
         </p:txBody>
       </p:sp>
@@ -9060,7 +9156,7 @@
         </p:blipFill>
         <p:spPr>
           <a:xfrm>
-            <a:off x="5942983" y="1809997"/>
+            <a:off x="5942967" y="1642828"/>
             <a:ext cx="5715000" cy="3378200"/>
           </a:xfrm>
           <a:prstGeom prst="rect">
@@ -9078,6 +9174,13 @@
   <p:clrMapOvr>
     <a:masterClrMapping/>
   </p:clrMapOvr>
+  <p:timing>
+    <p:tnLst>
+      <p:par>
+        <p:cTn id="1" dur="indefinite" restart="never" nodeType="tmRoot"/>
+      </p:par>
+    </p:tnLst>
+  </p:timing>
 </p:sld>
 </file>
 

</xml_diff>

<commit_message>
changes to amenity  and env slides
</commit_message>
<xml_diff>
--- a/Project1_Presentation.pptx
+++ b/Project1_Presentation.pptx
@@ -24,14 +24,12 @@
     <p:sldId id="285" r:id="rId18"/>
     <p:sldId id="283" r:id="rId19"/>
     <p:sldId id="280" r:id="rId20"/>
-    <p:sldId id="281" r:id="rId21"/>
-    <p:sldId id="275" r:id="rId22"/>
-    <p:sldId id="261" r:id="rId23"/>
-    <p:sldId id="277" r:id="rId24"/>
-    <p:sldId id="293" r:id="rId25"/>
-    <p:sldId id="289" r:id="rId26"/>
-    <p:sldId id="290" r:id="rId27"/>
-    <p:sldId id="292" r:id="rId28"/>
+    <p:sldId id="275" r:id="rId21"/>
+    <p:sldId id="261" r:id="rId22"/>
+    <p:sldId id="293" r:id="rId23"/>
+    <p:sldId id="289" r:id="rId24"/>
+    <p:sldId id="290" r:id="rId25"/>
+    <p:sldId id="292" r:id="rId26"/>
   </p:sldIdLst>
   <p:sldSz cx="12192000" cy="6858000"/>
   <p:notesSz cx="6858000" cy="9144000"/>
@@ -5732,89 +5730,6 @@
           <p:cNvPr id="2" name="Title 1">
             <a:extLst>
               <a:ext uri="{FF2B5EF4-FFF2-40B4-BE49-F238E27FC236}">
-                <a16:creationId xmlns:a16="http://schemas.microsoft.com/office/drawing/2014/main" id="{390EB264-3883-41F9-BACB-285D2229980C}"/>
-              </a:ext>
-            </a:extLst>
-          </p:cNvPr>
-          <p:cNvSpPr>
-            <a:spLocks noGrp="1"/>
-          </p:cNvSpPr>
-          <p:nvPr>
-            <p:ph type="title"/>
-          </p:nvPr>
-        </p:nvSpPr>
-        <p:spPr/>
-        <p:txBody>
-          <a:bodyPr/>
-          <a:lstStyle/>
-          <a:p>
-            <a:r>
-              <a:rPr lang="en-US" dirty="0"/>
-              <a:t>Lessons learnt </a:t>
-            </a:r>
-          </a:p>
-        </p:txBody>
-      </p:sp>
-      <p:sp>
-        <p:nvSpPr>
-          <p:cNvPr id="3" name="Content Placeholder 2">
-            <a:extLst>
-              <a:ext uri="{FF2B5EF4-FFF2-40B4-BE49-F238E27FC236}">
-                <a16:creationId xmlns:a16="http://schemas.microsoft.com/office/drawing/2014/main" id="{BEC8BDDB-FD44-4EB6-BE27-4A708B75BDAB}"/>
-              </a:ext>
-            </a:extLst>
-          </p:cNvPr>
-          <p:cNvSpPr>
-            <a:spLocks noGrp="1"/>
-          </p:cNvSpPr>
-          <p:nvPr>
-            <p:ph idx="1"/>
-          </p:nvPr>
-        </p:nvSpPr>
-        <p:spPr/>
-        <p:txBody>
-          <a:bodyPr/>
-          <a:lstStyle/>
-          <a:p>
-            <a:endParaRPr lang="en-US" dirty="0"/>
-          </a:p>
-        </p:txBody>
-      </p:sp>
-    </p:spTree>
-    <p:extLst>
-      <p:ext uri="{BB962C8B-B14F-4D97-AF65-F5344CB8AC3E}">
-        <p14:creationId xmlns:p14="http://schemas.microsoft.com/office/powerpoint/2010/main" val="2977691450"/>
-      </p:ext>
-    </p:extLst>
-  </p:cSld>
-  <p:clrMapOvr>
-    <a:masterClrMapping/>
-  </p:clrMapOvr>
-</p:sld>
-</file>
-
-<file path=ppt/slides/slide21.xml><?xml version="1.0" encoding="utf-8"?>
-<p:sld xmlns:a="http://schemas.openxmlformats.org/drawingml/2006/main" xmlns:r="http://schemas.openxmlformats.org/officeDocument/2006/relationships" xmlns:p="http://schemas.openxmlformats.org/presentationml/2006/main">
-  <p:cSld>
-    <p:spTree>
-      <p:nvGrpSpPr>
-        <p:cNvPr id="1" name=""/>
-        <p:cNvGrpSpPr/>
-        <p:nvPr/>
-      </p:nvGrpSpPr>
-      <p:grpSpPr>
-        <a:xfrm>
-          <a:off x="0" y="0"/>
-          <a:ext cx="0" cy="0"/>
-          <a:chOff x="0" y="0"/>
-          <a:chExt cx="0" cy="0"/>
-        </a:xfrm>
-      </p:grpSpPr>
-      <p:sp>
-        <p:nvSpPr>
-          <p:cNvPr id="2" name="Title 1">
-            <a:extLst>
-              <a:ext uri="{FF2B5EF4-FFF2-40B4-BE49-F238E27FC236}">
                 <a16:creationId xmlns:a16="http://schemas.microsoft.com/office/drawing/2014/main" id="{BD461D94-0D0F-0348-95E5-2A357932C23B}"/>
               </a:ext>
             </a:extLst>
@@ -5833,7 +5748,7 @@
           <a:p>
             <a:r>
               <a:rPr lang="en-US" dirty="0"/>
-              <a:t>Nearby Amenities</a:t>
+              <a:t>Nearby Amenities                     </a:t>
             </a:r>
           </a:p>
         </p:txBody>
@@ -5977,7 +5892,7 @@
 </p:sld>
 </file>
 
-<file path=ppt/slides/slide22.xml><?xml version="1.0" encoding="utf-8"?>
+<file path=ppt/slides/slide21.xml><?xml version="1.0" encoding="utf-8"?>
 <p:sld xmlns:a="http://schemas.openxmlformats.org/drawingml/2006/main" xmlns:r="http://schemas.openxmlformats.org/officeDocument/2006/relationships" xmlns:p="http://schemas.openxmlformats.org/presentationml/2006/main">
   <p:cSld>
     <p:spTree>
@@ -6023,8 +5938,8 @@
         </p:blipFill>
         <p:spPr>
           <a:xfrm>
-            <a:off x="1497330" y="3371850"/>
-            <a:ext cx="8341355" cy="2948940"/>
+            <a:off x="160020" y="2174695"/>
+            <a:ext cx="5463911" cy="1931670"/>
           </a:xfrm>
         </p:spPr>
       </p:pic>
@@ -6055,119 +5970,20 @@
         </p:blipFill>
         <p:spPr>
           <a:xfrm>
-            <a:off x="1497330" y="0"/>
-            <a:ext cx="8469630" cy="3009085"/>
+            <a:off x="160020" y="131480"/>
+            <a:ext cx="5463911" cy="1941215"/>
           </a:xfrm>
           <a:prstGeom prst="rect">
             <a:avLst/>
           </a:prstGeom>
         </p:spPr>
       </p:pic>
-    </p:spTree>
-    <p:extLst>
-      <p:ext uri="{BB962C8B-B14F-4D97-AF65-F5344CB8AC3E}">
-        <p14:creationId xmlns:p14="http://schemas.microsoft.com/office/powerpoint/2010/main" val="3344394509"/>
-      </p:ext>
-    </p:extLst>
-  </p:cSld>
-  <p:clrMapOvr>
-    <a:masterClrMapping/>
-  </p:clrMapOvr>
-</p:sld>
-</file>
-
-<file path=ppt/slides/slide23.xml><?xml version="1.0" encoding="utf-8"?>
-<p:sld xmlns:a="http://schemas.openxmlformats.org/drawingml/2006/main" xmlns:r="http://schemas.openxmlformats.org/officeDocument/2006/relationships" xmlns:p="http://schemas.openxmlformats.org/presentationml/2006/main">
-  <p:cSld>
-    <p:spTree>
-      <p:nvGrpSpPr>
-        <p:cNvPr id="1" name=""/>
-        <p:cNvGrpSpPr/>
-        <p:nvPr/>
-      </p:nvGrpSpPr>
-      <p:grpSpPr>
-        <a:xfrm>
-          <a:off x="0" y="0"/>
-          <a:ext cx="0" cy="0"/>
-          <a:chOff x="0" y="0"/>
-          <a:chExt cx="0" cy="0"/>
-        </a:xfrm>
-      </p:grpSpPr>
       <p:pic>
         <p:nvPicPr>
-          <p:cNvPr id="5" name="Content Placeholder 4">
+          <p:cNvPr id="4" name="Content Placeholder 4">
             <a:extLst>
               <a:ext uri="{FF2B5EF4-FFF2-40B4-BE49-F238E27FC236}">
-                <a16:creationId xmlns:a16="http://schemas.microsoft.com/office/drawing/2014/main" id="{36B990E2-5C8A-CE4F-BA1B-9615A1BA1A1D}"/>
-              </a:ext>
-            </a:extLst>
-          </p:cNvPr>
-          <p:cNvPicPr>
-            <a:picLocks noGrp="1" noChangeAspect="1"/>
-          </p:cNvPicPr>
-          <p:nvPr>
-            <p:ph idx="1"/>
-          </p:nvPr>
-        </p:nvPicPr>
-        <p:blipFill rotWithShape="1">
-          <a:blip r:embed="rId2">
-            <a:extLst>
-              <a:ext uri="{28A0092B-C50C-407E-A947-70E740481C1C}">
-                <a14:useLocalDpi xmlns:a14="http://schemas.microsoft.com/office/drawing/2010/main" val="0"/>
-              </a:ext>
-            </a:extLst>
-          </a:blip>
-          <a:srcRect t="7541" b="6508"/>
-          <a:stretch/>
-        </p:blipFill>
-        <p:spPr>
-          <a:xfrm>
-            <a:off x="18331" y="3533623"/>
-            <a:ext cx="8089879" cy="2594610"/>
-          </a:xfrm>
-        </p:spPr>
-      </p:pic>
-      <p:pic>
-        <p:nvPicPr>
-          <p:cNvPr id="7" name="Picture 6">
-            <a:extLst>
-              <a:ext uri="{FF2B5EF4-FFF2-40B4-BE49-F238E27FC236}">
-                <a16:creationId xmlns:a16="http://schemas.microsoft.com/office/drawing/2014/main" id="{F0B7390A-C610-2B43-8DC6-788A9A6E46F5}"/>
-              </a:ext>
-            </a:extLst>
-          </p:cNvPr>
-          <p:cNvPicPr>
-            <a:picLocks noChangeAspect="1"/>
-          </p:cNvPicPr>
-          <p:nvPr/>
-        </p:nvPicPr>
-        <p:blipFill rotWithShape="1">
-          <a:blip r:embed="rId3">
-            <a:extLst>
-              <a:ext uri="{28A0092B-C50C-407E-A947-70E740481C1C}">
-                <a14:useLocalDpi xmlns:a14="http://schemas.microsoft.com/office/drawing/2010/main" val="0"/>
-              </a:ext>
-            </a:extLst>
-          </a:blip>
-          <a:srcRect t="7157" r="-1893" b="5449"/>
-          <a:stretch/>
-        </p:blipFill>
-        <p:spPr>
-          <a:xfrm>
-            <a:off x="-1" y="1003783"/>
-            <a:ext cx="6905953" cy="2208047"/>
-          </a:xfrm>
-          <a:prstGeom prst="rect">
-            <a:avLst/>
-          </a:prstGeom>
-        </p:spPr>
-      </p:pic>
-      <p:pic>
-        <p:nvPicPr>
-          <p:cNvPr id="9" name="Picture 8">
-            <a:extLst>
-              <a:ext uri="{FF2B5EF4-FFF2-40B4-BE49-F238E27FC236}">
-                <a16:creationId xmlns:a16="http://schemas.microsoft.com/office/drawing/2014/main" id="{EB8C8D5D-5AF2-7D40-8967-2B74C36CFC4D}"/>
+                <a16:creationId xmlns:a16="http://schemas.microsoft.com/office/drawing/2014/main" id="{F930DFD4-7DC4-BA48-8BE0-C53550486381}"/>
               </a:ext>
             </a:extLst>
           </p:cNvPr>
@@ -6184,25 +6000,60 @@
               </a:ext>
             </a:extLst>
           </a:blip>
-          <a:srcRect l="7238" t="11981" r="8057" b="6871"/>
+          <a:srcRect t="-1188" b="6507"/>
           <a:stretch/>
         </p:blipFill>
         <p:spPr>
           <a:xfrm>
-            <a:off x="6767722" y="615163"/>
-            <a:ext cx="5416658" cy="2594610"/>
+            <a:off x="189782" y="4208365"/>
+            <a:ext cx="5434149" cy="1919867"/>
           </a:xfrm>
           <a:prstGeom prst="rect">
             <a:avLst/>
           </a:prstGeom>
         </p:spPr>
       </p:pic>
-      <p:sp>
-        <p:nvSpPr>
-          <p:cNvPr id="10" name="TextBox 9">
+      <p:pic>
+        <p:nvPicPr>
+          <p:cNvPr id="7" name="Picture 6">
             <a:extLst>
               <a:ext uri="{FF2B5EF4-FFF2-40B4-BE49-F238E27FC236}">
-                <a16:creationId xmlns:a16="http://schemas.microsoft.com/office/drawing/2014/main" id="{0BA7F892-9743-8143-96D2-F33A666E5F12}"/>
+                <a16:creationId xmlns:a16="http://schemas.microsoft.com/office/drawing/2014/main" id="{77BEE3A1-599D-2B46-8066-A4515D155334}"/>
+              </a:ext>
+            </a:extLst>
+          </p:cNvPr>
+          <p:cNvPicPr>
+            <a:picLocks noChangeAspect="1"/>
+          </p:cNvPicPr>
+          <p:nvPr/>
+        </p:nvPicPr>
+        <p:blipFill rotWithShape="1">
+          <a:blip r:embed="rId5">
+            <a:extLst>
+              <a:ext uri="{28A0092B-C50C-407E-A947-70E740481C1C}">
+                <a14:useLocalDpi xmlns:a14="http://schemas.microsoft.com/office/drawing/2010/main" val="0"/>
+              </a:ext>
+            </a:extLst>
+          </a:blip>
+          <a:srcRect t="7157" r="-1893" b="5449"/>
+          <a:stretch/>
+        </p:blipFill>
+        <p:spPr>
+          <a:xfrm>
+            <a:off x="6435089" y="325714"/>
+            <a:ext cx="5463911" cy="1746981"/>
+          </a:xfrm>
+          <a:prstGeom prst="rect">
+            <a:avLst/>
+          </a:prstGeom>
+        </p:spPr>
+      </p:pic>
+      <p:sp>
+        <p:nvSpPr>
+          <p:cNvPr id="8" name="TextBox 7">
+            <a:extLst>
+              <a:ext uri="{FF2B5EF4-FFF2-40B4-BE49-F238E27FC236}">
+                <a16:creationId xmlns:a16="http://schemas.microsoft.com/office/drawing/2014/main" id="{9002BB3E-30A7-3C48-9B2B-D6092C00DC4D}"/>
               </a:ext>
             </a:extLst>
           </p:cNvPr>
@@ -6211,8 +6062,8 @@
         </p:nvSpPr>
         <p:spPr>
           <a:xfrm>
-            <a:off x="8375012" y="338164"/>
-            <a:ext cx="2202078" cy="276999"/>
+            <a:off x="8150090" y="131480"/>
+            <a:ext cx="2033908" cy="238527"/>
           </a:xfrm>
           <a:prstGeom prst="rect">
             <a:avLst/>
@@ -6220,26 +6071,115 @@
           <a:noFill/>
         </p:spPr>
         <p:txBody>
-          <a:bodyPr wrap="none" rtlCol="0">
+          <a:bodyPr wrap="square" rtlCol="0">
             <a:spAutoFit/>
           </a:bodyPr>
           <a:lstStyle/>
           <a:p>
             <a:r>
-              <a:rPr lang="en-US" sz="1200" b="1" dirty="0">
+              <a:rPr lang="en-US" sz="950" b="1" dirty="0">
                 <a:latin typeface="Arial Rounded MT Bold" panose="020F0704030504030204" pitchFamily="34" charset="77"/>
               </a:rPr>
-              <a:t>City Refreshments Ranking</a:t>
-            </a:r>
-          </a:p>
-        </p:txBody>
-      </p:sp>
-      <p:sp>
-        <p:nvSpPr>
-          <p:cNvPr id="11" name="TextBox 10">
+              <a:t>City Gymnasium Ranking</a:t>
+            </a:r>
+          </a:p>
+        </p:txBody>
+      </p:sp>
+      <p:sp>
+        <p:nvSpPr>
+          <p:cNvPr id="6" name="Rectangle 5">
             <a:extLst>
               <a:ext uri="{FF2B5EF4-FFF2-40B4-BE49-F238E27FC236}">
-                <a16:creationId xmlns:a16="http://schemas.microsoft.com/office/drawing/2014/main" id="{E4867827-C2BD-3A44-9CDA-CADE25064467}"/>
+                <a16:creationId xmlns:a16="http://schemas.microsoft.com/office/drawing/2014/main" id="{400D8EB4-3C96-6445-A8B7-531B20BD3B35}"/>
+              </a:ext>
+            </a:extLst>
+          </p:cNvPr>
+          <p:cNvSpPr/>
+          <p:nvPr/>
+        </p:nvSpPr>
+        <p:spPr>
+          <a:xfrm>
+            <a:off x="5509260" y="1657350"/>
+            <a:ext cx="1040130" cy="137160"/>
+          </a:xfrm>
+          <a:prstGeom prst="rect">
+            <a:avLst/>
+          </a:prstGeom>
+          <a:solidFill>
+            <a:schemeClr val="bg1"/>
+          </a:solidFill>
+          <a:ln>
+            <a:solidFill>
+              <a:schemeClr val="bg1"/>
+            </a:solidFill>
+          </a:ln>
+        </p:spPr>
+        <p:style>
+          <a:lnRef idx="2">
+            <a:schemeClr val="accent1">
+              <a:shade val="50000"/>
+            </a:schemeClr>
+          </a:lnRef>
+          <a:fillRef idx="1">
+            <a:schemeClr val="accent1"/>
+          </a:fillRef>
+          <a:effectRef idx="0">
+            <a:schemeClr val="accent1"/>
+          </a:effectRef>
+          <a:fontRef idx="minor">
+            <a:schemeClr val="lt1"/>
+          </a:fontRef>
+        </p:style>
+        <p:txBody>
+          <a:bodyPr rtlCol="0" anchor="ctr"/>
+          <a:lstStyle/>
+          <a:p>
+            <a:pPr algn="ctr"/>
+            <a:endParaRPr lang="en-US"/>
+          </a:p>
+        </p:txBody>
+      </p:sp>
+      <p:pic>
+        <p:nvPicPr>
+          <p:cNvPr id="11" name="Picture 10">
+            <a:extLst>
+              <a:ext uri="{FF2B5EF4-FFF2-40B4-BE49-F238E27FC236}">
+                <a16:creationId xmlns:a16="http://schemas.microsoft.com/office/drawing/2014/main" id="{1C7BDB0E-7B94-BE41-9862-E2F150F683BF}"/>
+              </a:ext>
+            </a:extLst>
+          </p:cNvPr>
+          <p:cNvPicPr>
+            <a:picLocks noChangeAspect="1"/>
+          </p:cNvPicPr>
+          <p:nvPr/>
+        </p:nvPicPr>
+        <p:blipFill rotWithShape="1">
+          <a:blip r:embed="rId6">
+            <a:extLst>
+              <a:ext uri="{28A0092B-C50C-407E-A947-70E740481C1C}">
+                <a14:useLocalDpi xmlns:a14="http://schemas.microsoft.com/office/drawing/2010/main" val="0"/>
+              </a:ext>
+            </a:extLst>
+          </a:blip>
+          <a:srcRect l="7238" t="11981" r="8057" b="6871"/>
+          <a:stretch/>
+        </p:blipFill>
+        <p:spPr>
+          <a:xfrm>
+            <a:off x="6482342" y="2346962"/>
+            <a:ext cx="5416658" cy="2594610"/>
+          </a:xfrm>
+          <a:prstGeom prst="rect">
+            <a:avLst/>
+          </a:prstGeom>
+        </p:spPr>
+      </p:pic>
+      <p:sp>
+        <p:nvSpPr>
+          <p:cNvPr id="12" name="TextBox 11">
+            <a:extLst>
+              <a:ext uri="{FF2B5EF4-FFF2-40B4-BE49-F238E27FC236}">
+                <a16:creationId xmlns:a16="http://schemas.microsoft.com/office/drawing/2014/main" id="{4E866195-45D8-2E4D-AA91-B00032E00B23}"/>
               </a:ext>
             </a:extLst>
           </p:cNvPr>
@@ -6248,8 +6188,8 @@
         </p:nvSpPr>
         <p:spPr>
           <a:xfrm>
-            <a:off x="1257932" y="341974"/>
-            <a:ext cx="2043060" cy="276999"/>
+            <a:off x="8202736" y="2108435"/>
+            <a:ext cx="1794081" cy="238527"/>
           </a:xfrm>
           <a:prstGeom prst="rect">
             <a:avLst/>
@@ -6263,20 +6203,20 @@
           <a:lstStyle/>
           <a:p>
             <a:r>
-              <a:rPr lang="en-US" sz="1200" b="1" dirty="0">
+              <a:rPr lang="en-US" sz="950" b="1" dirty="0">
                 <a:latin typeface="Arial Rounded MT Bold" panose="020F0704030504030204" pitchFamily="34" charset="77"/>
               </a:rPr>
-              <a:t>City Gymnasium Ranking</a:t>
-            </a:r>
-          </a:p>
-        </p:txBody>
-      </p:sp>
-      <p:sp>
-        <p:nvSpPr>
-          <p:cNvPr id="12" name="TextBox 11">
+              <a:t>City Refreshments Ranking</a:t>
+            </a:r>
+          </a:p>
+        </p:txBody>
+      </p:sp>
+      <p:sp>
+        <p:nvSpPr>
+          <p:cNvPr id="9" name="TextBox 8">
             <a:extLst>
               <a:ext uri="{FF2B5EF4-FFF2-40B4-BE49-F238E27FC236}">
-                <a16:creationId xmlns:a16="http://schemas.microsoft.com/office/drawing/2014/main" id="{F9429A70-E256-964E-A767-948DBCB84358}"/>
+                <a16:creationId xmlns:a16="http://schemas.microsoft.com/office/drawing/2014/main" id="{3B19A831-84D7-6546-B194-2C799EA1257A}"/>
               </a:ext>
             </a:extLst>
           </p:cNvPr>
@@ -6285,8 +6225,68 @@
         </p:nvSpPr>
         <p:spPr>
           <a:xfrm>
-            <a:off x="2846702" y="3359494"/>
-            <a:ext cx="1758238" cy="276999"/>
+            <a:off x="6693315" y="5571256"/>
+            <a:ext cx="5498685" cy="738664"/>
+          </a:xfrm>
+          <a:prstGeom prst="rect">
+            <a:avLst/>
+          </a:prstGeom>
+          <a:solidFill>
+            <a:schemeClr val="accent5">
+              <a:lumMod val="20000"/>
+              <a:lumOff val="80000"/>
+            </a:schemeClr>
+          </a:solidFill>
+        </p:spPr>
+        <p:txBody>
+          <a:bodyPr wrap="none" rtlCol="0">
+            <a:spAutoFit/>
+          </a:bodyPr>
+          <a:lstStyle/>
+          <a:p>
+            <a:r>
+              <a:rPr lang="en-US" sz="1400" b="1" dirty="0"/>
+              <a:t>Observations:</a:t>
+            </a:r>
+          </a:p>
+          <a:p>
+            <a:pPr marL="285750" indent="-285750">
+              <a:buFont typeface="Wingdings" pitchFamily="2" charset="2"/>
+              <a:buChar char="Ø"/>
+            </a:pPr>
+            <a:r>
+              <a:rPr lang="en-US" sz="1400" b="1" dirty="0"/>
+              <a:t>New York, Chicago &amp; Boston</a:t>
+            </a:r>
+            <a:r>
+              <a:rPr lang="en-US" sz="1400" dirty="0"/>
+              <a:t> were consistently top cities for most of</a:t>
+            </a:r>
+          </a:p>
+          <a:p>
+            <a:r>
+              <a:rPr lang="en-US" sz="1400" dirty="0"/>
+              <a:t>       the amenities.</a:t>
+            </a:r>
+          </a:p>
+        </p:txBody>
+      </p:sp>
+      <p:sp>
+        <p:nvSpPr>
+          <p:cNvPr id="13" name="TextBox 12">
+            <a:extLst>
+              <a:ext uri="{FF2B5EF4-FFF2-40B4-BE49-F238E27FC236}">
+                <a16:creationId xmlns:a16="http://schemas.microsoft.com/office/drawing/2014/main" id="{912993C5-A7B1-D64D-9B5F-6980B6E6EC6A}"/>
+              </a:ext>
+            </a:extLst>
+          </p:cNvPr>
+          <p:cNvSpPr txBox="1"/>
+          <p:nvPr/>
+        </p:nvSpPr>
+        <p:spPr>
+          <a:xfrm>
+            <a:off x="6693315" y="4979415"/>
+            <a:ext cx="4140877" cy="553998"/>
           </a:xfrm>
           <a:prstGeom prst="rect">
             <a:avLst/>
@@ -6300,10 +6300,20 @@
           <a:lstStyle/>
           <a:p>
             <a:r>
-              <a:rPr lang="en-US" sz="1200" b="1" dirty="0">
-                <a:latin typeface="Arial Rounded MT Bold" panose="020F0704030504030204" pitchFamily="34" charset="77"/>
-              </a:rPr>
-              <a:t>City Errands Ranking</a:t>
+              <a:rPr lang="en-US" sz="1000" dirty="0"/>
+              <a:t>*City Amenities results within 2 mile radius were averaged over all the sites.</a:t>
+            </a:r>
+          </a:p>
+          <a:p>
+            <a:r>
+              <a:rPr lang="en-US" sz="1000" dirty="0"/>
+              <a:t>** For Restaurants and Cafes, all cities had more than 20, and so was </a:t>
+            </a:r>
+          </a:p>
+          <a:p>
+            <a:r>
+              <a:rPr lang="en-US" sz="1000" dirty="0"/>
+              <a:t>ranked over average ratings. </a:t>
             </a:r>
           </a:p>
         </p:txBody>
@@ -6311,7 +6321,7 @@
     </p:spTree>
     <p:extLst>
       <p:ext uri="{BB962C8B-B14F-4D97-AF65-F5344CB8AC3E}">
-        <p14:creationId xmlns:p14="http://schemas.microsoft.com/office/powerpoint/2010/main" val="1367037543"/>
+        <p14:creationId xmlns:p14="http://schemas.microsoft.com/office/powerpoint/2010/main" val="3344394509"/>
       </p:ext>
     </p:extLst>
   </p:cSld>
@@ -6321,7 +6331,7 @@
 </p:sld>
 </file>
 
-<file path=ppt/slides/slide24.xml><?xml version="1.0" encoding="utf-8"?>
+<file path=ppt/slides/slide22.xml><?xml version="1.0" encoding="utf-8"?>
 <p:sld xmlns:a="http://schemas.openxmlformats.org/drawingml/2006/main" xmlns:r="http://schemas.openxmlformats.org/officeDocument/2006/relationships" xmlns:p="http://schemas.openxmlformats.org/presentationml/2006/main">
   <p:cSld>
     <p:spTree>
@@ -6368,8 +6378,8 @@
         </p:blipFill>
         <p:spPr>
           <a:xfrm>
-            <a:off x="342583" y="3726180"/>
-            <a:ext cx="7478775" cy="2495125"/>
+            <a:off x="180376" y="758435"/>
+            <a:ext cx="6318159" cy="2107912"/>
           </a:xfrm>
         </p:spPr>
       </p:pic>
@@ -6401,8 +6411,8 @@
         </p:blipFill>
         <p:spPr>
           <a:xfrm>
-            <a:off x="6660742" y="196618"/>
-            <a:ext cx="5189842" cy="3712442"/>
+            <a:off x="466126" y="2944512"/>
+            <a:ext cx="4482375" cy="3206371"/>
           </a:xfrm>
           <a:prstGeom prst="rect">
             <a:avLst/>
@@ -6421,41 +6431,6 @@
       </p:pic>
       <p:sp>
         <p:nvSpPr>
-          <p:cNvPr id="6" name="Title 1">
-            <a:extLst>
-              <a:ext uri="{FF2B5EF4-FFF2-40B4-BE49-F238E27FC236}">
-                <a16:creationId xmlns:a16="http://schemas.microsoft.com/office/drawing/2014/main" id="{F7AE8CE4-FE90-A745-8DB6-6765DD447C6B}"/>
-              </a:ext>
-            </a:extLst>
-          </p:cNvPr>
-          <p:cNvSpPr>
-            <a:spLocks noGrp="1"/>
-          </p:cNvSpPr>
-          <p:nvPr>
-            <p:ph type="title"/>
-          </p:nvPr>
-        </p:nvSpPr>
-        <p:spPr>
-          <a:xfrm>
-            <a:off x="1097280" y="286603"/>
-            <a:ext cx="10058400" cy="1450757"/>
-          </a:xfrm>
-        </p:spPr>
-        <p:txBody>
-          <a:bodyPr>
-            <a:normAutofit/>
-          </a:bodyPr>
-          <a:lstStyle/>
-          <a:p>
-            <a:r>
-              <a:rPr lang="en-US" sz="4000" dirty="0"/>
-              <a:t>Environment Index</a:t>
-            </a:r>
-          </a:p>
-        </p:txBody>
-      </p:sp>
-      <p:sp>
-        <p:nvSpPr>
           <p:cNvPr id="4" name="TextBox 3">
             <a:extLst>
               <a:ext uri="{FF2B5EF4-FFF2-40B4-BE49-F238E27FC236}">
@@ -6468,8 +6443,8 @@
         </p:nvSpPr>
         <p:spPr>
           <a:xfrm>
-            <a:off x="8401050" y="4423410"/>
-            <a:ext cx="3449534" cy="1661993"/>
+            <a:off x="5344104" y="4121339"/>
+            <a:ext cx="6523503" cy="738664"/>
           </a:xfrm>
           <a:prstGeom prst="rect">
             <a:avLst/>
@@ -6482,18 +6457,14 @@
           </a:solidFill>
         </p:spPr>
         <p:txBody>
-          <a:bodyPr wrap="none" rtlCol="0">
+          <a:bodyPr wrap="square" rtlCol="0">
             <a:spAutoFit/>
           </a:bodyPr>
           <a:lstStyle/>
           <a:p>
             <a:r>
               <a:rPr lang="en-US" sz="1400" b="1" dirty="0"/>
-              <a:t>Observations</a:t>
-            </a:r>
-            <a:r>
-              <a:rPr lang="en-US" b="1" dirty="0"/>
-              <a:t>:</a:t>
+              <a:t>Amenity vs Walk Score Observations:</a:t>
             </a:r>
           </a:p>
           <a:p>
@@ -6502,46 +6473,18 @@
               <a:buChar char="Ø"/>
             </a:pPr>
             <a:r>
+              <a:rPr lang="en-US" sz="1400" b="1" dirty="0"/>
+              <a:t>New York, Chicago &amp; Boston </a:t>
+            </a:r>
+            <a:r>
               <a:rPr lang="en-US" sz="1400" dirty="0"/>
-              <a:t>Most cities with higher Climate Index</a:t>
+              <a:t>not only were consistently top cities for most of</a:t>
             </a:r>
           </a:p>
           <a:p>
             <a:r>
               <a:rPr lang="en-US" sz="1400" dirty="0"/>
-              <a:t>       also tends to have a very high Pollution</a:t>
-            </a:r>
-          </a:p>
-          <a:p>
-            <a:r>
-              <a:rPr lang="en-US" sz="1400" dirty="0"/>
-              <a:t>       Index, which is highly contradictory.</a:t>
-            </a:r>
-          </a:p>
-          <a:p>
-            <a:pPr marL="285750" indent="-285750">
-              <a:buFont typeface="Wingdings" pitchFamily="2" charset="2"/>
-              <a:buChar char="Ø"/>
-            </a:pPr>
-            <a:r>
-              <a:rPr lang="en-US" sz="1400" b="1" dirty="0"/>
-              <a:t>Raleigh</a:t>
-            </a:r>
-            <a:r>
-              <a:rPr lang="en-US" sz="1400" dirty="0"/>
-              <a:t> fairs well amongst all as it has</a:t>
-            </a:r>
-          </a:p>
-          <a:p>
-            <a:r>
-              <a:rPr lang="en-US" sz="1400" dirty="0"/>
-              <a:t>        Climate Index and lower Pollution Index.</a:t>
-            </a:r>
-          </a:p>
-          <a:p>
-            <a:r>
-              <a:rPr lang="en-US" sz="1400" dirty="0"/>
-              <a:t> </a:t>
+              <a:t>       the amenities, but also had best walk score.</a:t>
             </a:r>
           </a:p>
         </p:txBody>
@@ -6609,6 +6552,324 @@
               <a:t>=2018&amp;region=019</a:t>
             </a:r>
             <a:endParaRPr lang="en-US" sz="1100" dirty="0"/>
+          </a:p>
+        </p:txBody>
+      </p:sp>
+      <p:sp>
+        <p:nvSpPr>
+          <p:cNvPr id="11" name="TextBox 10">
+            <a:extLst>
+              <a:ext uri="{FF2B5EF4-FFF2-40B4-BE49-F238E27FC236}">
+                <a16:creationId xmlns:a16="http://schemas.microsoft.com/office/drawing/2014/main" id="{C1EB101A-557C-B742-8621-0B2B4F845F4F}"/>
+              </a:ext>
+            </a:extLst>
+          </p:cNvPr>
+          <p:cNvSpPr txBox="1"/>
+          <p:nvPr/>
+        </p:nvSpPr>
+        <p:spPr>
+          <a:xfrm>
+            <a:off x="185527" y="208543"/>
+            <a:ext cx="5514587" cy="461665"/>
+          </a:xfrm>
+          <a:prstGeom prst="rect">
+            <a:avLst/>
+          </a:prstGeom>
+          <a:noFill/>
+        </p:spPr>
+        <p:txBody>
+          <a:bodyPr wrap="none" rtlCol="0">
+            <a:spAutoFit/>
+          </a:bodyPr>
+          <a:lstStyle/>
+          <a:p>
+            <a:r>
+              <a:rPr lang="en-US" sz="2400" b="1" dirty="0"/>
+              <a:t>Amenities &amp; Environment Index summary</a:t>
+            </a:r>
+          </a:p>
+        </p:txBody>
+      </p:sp>
+      <p:cxnSp>
+        <p:nvCxnSpPr>
+          <p:cNvPr id="13" name="Straight Connector 12">
+            <a:extLst>
+              <a:ext uri="{FF2B5EF4-FFF2-40B4-BE49-F238E27FC236}">
+                <a16:creationId xmlns:a16="http://schemas.microsoft.com/office/drawing/2014/main" id="{39131A28-7C0F-014F-8DE5-068C6C1DCF44}"/>
+              </a:ext>
+            </a:extLst>
+          </p:cNvPr>
+          <p:cNvCxnSpPr/>
+          <p:nvPr/>
+        </p:nvCxnSpPr>
+        <p:spPr>
+          <a:xfrm>
+            <a:off x="0" y="608653"/>
+            <a:ext cx="12192000" cy="0"/>
+          </a:xfrm>
+          <a:prstGeom prst="line">
+            <a:avLst/>
+          </a:prstGeom>
+          <a:ln>
+            <a:solidFill>
+              <a:schemeClr val="tx1"/>
+            </a:solidFill>
+          </a:ln>
+        </p:spPr>
+        <p:style>
+          <a:lnRef idx="1">
+            <a:schemeClr val="accent1"/>
+          </a:lnRef>
+          <a:fillRef idx="0">
+            <a:schemeClr val="accent1"/>
+          </a:fillRef>
+          <a:effectRef idx="0">
+            <a:schemeClr val="accent1"/>
+          </a:effectRef>
+          <a:fontRef idx="minor">
+            <a:schemeClr val="tx1"/>
+          </a:fontRef>
+        </p:style>
+      </p:cxnSp>
+      <p:sp>
+        <p:nvSpPr>
+          <p:cNvPr id="14" name="TextBox 13">
+            <a:extLst>
+              <a:ext uri="{FF2B5EF4-FFF2-40B4-BE49-F238E27FC236}">
+                <a16:creationId xmlns:a16="http://schemas.microsoft.com/office/drawing/2014/main" id="{ED540B83-7037-AC4B-8A24-1C59DF45346D}"/>
+              </a:ext>
+            </a:extLst>
+          </p:cNvPr>
+          <p:cNvSpPr txBox="1"/>
+          <p:nvPr/>
+        </p:nvSpPr>
+        <p:spPr>
+          <a:xfrm>
+            <a:off x="5347914" y="4913819"/>
+            <a:ext cx="6523503" cy="954107"/>
+          </a:xfrm>
+          <a:prstGeom prst="rect">
+            <a:avLst/>
+          </a:prstGeom>
+          <a:solidFill>
+            <a:schemeClr val="accent5">
+              <a:lumMod val="20000"/>
+              <a:lumOff val="80000"/>
+            </a:schemeClr>
+          </a:solidFill>
+        </p:spPr>
+        <p:txBody>
+          <a:bodyPr wrap="square" rtlCol="0">
+            <a:spAutoFit/>
+          </a:bodyPr>
+          <a:lstStyle/>
+          <a:p>
+            <a:r>
+              <a:rPr lang="en-US" sz="1400" b="1" dirty="0"/>
+              <a:t>Environment Index Observations:</a:t>
+            </a:r>
+            <a:endParaRPr lang="en-US" sz="1400" dirty="0"/>
+          </a:p>
+          <a:p>
+            <a:pPr marL="285750" indent="-285750">
+              <a:buFont typeface="Wingdings" pitchFamily="2" charset="2"/>
+              <a:buChar char="Ø"/>
+            </a:pPr>
+            <a:r>
+              <a:rPr lang="en-US" sz="1400" dirty="0"/>
+              <a:t>Most cities with higher Climate Index also tends to have a very high Pollution Index, which is highly contradictory.</a:t>
+            </a:r>
+          </a:p>
+          <a:p>
+            <a:pPr marL="285750" indent="-285750">
+              <a:buFont typeface="Wingdings" pitchFamily="2" charset="2"/>
+              <a:buChar char="Ø"/>
+            </a:pPr>
+            <a:r>
+              <a:rPr lang="en-US" sz="1400" b="1" dirty="0"/>
+              <a:t>Raleigh</a:t>
+            </a:r>
+            <a:r>
+              <a:rPr lang="en-US" sz="1400" dirty="0"/>
+              <a:t> fairs well amongst all as it has Climate Index and lower Pollution Index.</a:t>
+            </a:r>
+          </a:p>
+        </p:txBody>
+      </p:sp>
+      <p:sp>
+        <p:nvSpPr>
+          <p:cNvPr id="15" name="Rectangle 14">
+            <a:extLst>
+              <a:ext uri="{FF2B5EF4-FFF2-40B4-BE49-F238E27FC236}">
+                <a16:creationId xmlns:a16="http://schemas.microsoft.com/office/drawing/2014/main" id="{080CAF0A-9316-504B-B99C-3E8F645FCFE2}"/>
+              </a:ext>
+            </a:extLst>
+          </p:cNvPr>
+          <p:cNvSpPr/>
+          <p:nvPr/>
+        </p:nvSpPr>
+        <p:spPr>
+          <a:xfrm>
+            <a:off x="6419756" y="1611629"/>
+            <a:ext cx="1078323" cy="125731"/>
+          </a:xfrm>
+          <a:prstGeom prst="rect">
+            <a:avLst/>
+          </a:prstGeom>
+          <a:solidFill>
+            <a:schemeClr val="bg1"/>
+          </a:solidFill>
+          <a:ln>
+            <a:solidFill>
+              <a:schemeClr val="bg1"/>
+            </a:solidFill>
+          </a:ln>
+        </p:spPr>
+        <p:style>
+          <a:lnRef idx="2">
+            <a:schemeClr val="accent1">
+              <a:shade val="50000"/>
+            </a:schemeClr>
+          </a:lnRef>
+          <a:fillRef idx="1">
+            <a:schemeClr val="accent1"/>
+          </a:fillRef>
+          <a:effectRef idx="0">
+            <a:schemeClr val="accent1"/>
+          </a:effectRef>
+          <a:fontRef idx="minor">
+            <a:schemeClr val="lt1"/>
+          </a:fontRef>
+        </p:style>
+        <p:txBody>
+          <a:bodyPr rtlCol="0" anchor="ctr"/>
+          <a:lstStyle/>
+          <a:p>
+            <a:pPr algn="ctr"/>
+            <a:endParaRPr lang="en-US"/>
+          </a:p>
+        </p:txBody>
+      </p:sp>
+      <p:pic>
+        <p:nvPicPr>
+          <p:cNvPr id="10" name="Picture 9">
+            <a:extLst>
+              <a:ext uri="{FF2B5EF4-FFF2-40B4-BE49-F238E27FC236}">
+                <a16:creationId xmlns:a16="http://schemas.microsoft.com/office/drawing/2014/main" id="{6958D2B4-2D3C-CB45-B8C0-FFC226462351}"/>
+              </a:ext>
+            </a:extLst>
+          </p:cNvPr>
+          <p:cNvPicPr>
+            <a:picLocks noChangeAspect="1"/>
+          </p:cNvPicPr>
+          <p:nvPr/>
+        </p:nvPicPr>
+        <p:blipFill>
+          <a:blip r:embed="rId5">
+            <a:extLst>
+              <a:ext uri="{28A0092B-C50C-407E-A947-70E740481C1C}">
+                <a14:useLocalDpi xmlns:a14="http://schemas.microsoft.com/office/drawing/2010/main" val="0"/>
+              </a:ext>
+            </a:extLst>
+          </a:blip>
+          <a:stretch>
+            <a:fillRect/>
+          </a:stretch>
+        </p:blipFill>
+        <p:spPr>
+          <a:xfrm>
+            <a:off x="7407329" y="208543"/>
+            <a:ext cx="4460279" cy="3207697"/>
+          </a:xfrm>
+          <a:prstGeom prst="rect">
+            <a:avLst/>
+          </a:prstGeom>
+          <a:ln>
+            <a:noFill/>
+          </a:ln>
+          <a:effectLst>
+            <a:outerShdw blurRad="190500" algn="tl" rotWithShape="0">
+              <a:srgbClr val="000000">
+                <a:alpha val="70000"/>
+              </a:srgbClr>
+            </a:outerShdw>
+          </a:effectLst>
+        </p:spPr>
+      </p:pic>
+      <p:pic>
+        <p:nvPicPr>
+          <p:cNvPr id="16" name="Content Placeholder 4">
+            <a:extLst>
+              <a:ext uri="{FF2B5EF4-FFF2-40B4-BE49-F238E27FC236}">
+                <a16:creationId xmlns:a16="http://schemas.microsoft.com/office/drawing/2014/main" id="{5C377463-4E64-0343-AE2D-9E67A0801FC5}"/>
+              </a:ext>
+            </a:extLst>
+          </p:cNvPr>
+          <p:cNvPicPr>
+            <a:picLocks noChangeAspect="1"/>
+          </p:cNvPicPr>
+          <p:nvPr/>
+        </p:nvPicPr>
+        <p:blipFill>
+          <a:blip r:embed="rId2">
+            <a:extLst>
+              <a:ext uri="{28A0092B-C50C-407E-A947-70E740481C1C}">
+                <a14:useLocalDpi xmlns:a14="http://schemas.microsoft.com/office/drawing/2010/main" val="0"/>
+              </a:ext>
+            </a:extLst>
+          </a:blip>
+          <a:stretch>
+            <a:fillRect/>
+          </a:stretch>
+        </p:blipFill>
+        <p:spPr>
+          <a:xfrm>
+            <a:off x="185527" y="765113"/>
+            <a:ext cx="6318159" cy="2107912"/>
+          </a:xfrm>
+          <a:prstGeom prst="rect">
+            <a:avLst/>
+          </a:prstGeom>
+        </p:spPr>
+      </p:pic>
+      <p:sp>
+        <p:nvSpPr>
+          <p:cNvPr id="17" name="TextBox 16">
+            <a:extLst>
+              <a:ext uri="{FF2B5EF4-FFF2-40B4-BE49-F238E27FC236}">
+                <a16:creationId xmlns:a16="http://schemas.microsoft.com/office/drawing/2014/main" id="{4445F055-FCE5-1D40-9159-47316912EEEA}"/>
+              </a:ext>
+            </a:extLst>
+          </p:cNvPr>
+          <p:cNvSpPr txBox="1"/>
+          <p:nvPr/>
+        </p:nvSpPr>
+        <p:spPr>
+          <a:xfrm>
+            <a:off x="7311025" y="3539351"/>
+            <a:ext cx="4514377" cy="400110"/>
+          </a:xfrm>
+          <a:prstGeom prst="rect">
+            <a:avLst/>
+          </a:prstGeom>
+          <a:noFill/>
+        </p:spPr>
+        <p:txBody>
+          <a:bodyPr wrap="none" rtlCol="0">
+            <a:spAutoFit/>
+          </a:bodyPr>
+          <a:lstStyle/>
+          <a:p>
+            <a:r>
+              <a:rPr lang="en-US" sz="1000" dirty="0"/>
+              <a:t>*Looking at the correlation between Amenities accessibility within 2 miles radius of</a:t>
+            </a:r>
+          </a:p>
+          <a:p>
+            <a:r>
+              <a:rPr lang="en-US" sz="1000" dirty="0"/>
+              <a:t>Site and its walk score  to observe the efficiency of site.</a:t>
+            </a:r>
           </a:p>
         </p:txBody>
       </p:sp>
@@ -6625,7 +6886,7 @@
 </p:sld>
 </file>
 
-<file path=ppt/slides/slide25.xml><?xml version="1.0" encoding="utf-8"?>
+<file path=ppt/slides/slide23.xml><?xml version="1.0" encoding="utf-8"?>
 <p:sld xmlns:a="http://schemas.openxmlformats.org/drawingml/2006/main" xmlns:r="http://schemas.openxmlformats.org/officeDocument/2006/relationships" xmlns:p="http://schemas.openxmlformats.org/presentationml/2006/main">
   <p:cSld>
     <p:spTree>
@@ -7188,7 +7449,7 @@
 </p:sld>
 </file>
 
-<file path=ppt/slides/slide26.xml><?xml version="1.0" encoding="utf-8"?>
+<file path=ppt/slides/slide24.xml><?xml version="1.0" encoding="utf-8"?>
 <p:sld xmlns:a="http://schemas.openxmlformats.org/drawingml/2006/main" xmlns:r="http://schemas.openxmlformats.org/officeDocument/2006/relationships" xmlns:p="http://schemas.openxmlformats.org/presentationml/2006/main">
   <p:cSld>
     <p:spTree>
@@ -8169,7 +8430,7 @@
 </p:sld>
 </file>
 
-<file path=ppt/slides/slide27.xml><?xml version="1.0" encoding="utf-8"?>
+<file path=ppt/slides/slide25.xml><?xml version="1.0" encoding="utf-8"?>
 <p:sld xmlns:a="http://schemas.openxmlformats.org/drawingml/2006/main" xmlns:r="http://schemas.openxmlformats.org/officeDocument/2006/relationships" xmlns:p="http://schemas.openxmlformats.org/presentationml/2006/main">
   <p:cSld>
     <p:spTree>

</xml_diff>

<commit_message>
update final score slides
</commit_message>
<xml_diff>
--- a/Project1_Presentation.pptx
+++ b/Project1_Presentation.pptx
@@ -31,6 +31,7 @@
     <p:sldId id="289" r:id="rId25"/>
     <p:sldId id="290" r:id="rId26"/>
     <p:sldId id="292" r:id="rId27"/>
+    <p:sldId id="294" r:id="rId28"/>
   </p:sldIdLst>
   <p:sldSz cx="12192000" cy="6858000"/>
   <p:notesSz cx="6858000" cy="9144000"/>
@@ -8695,82 +8696,12 @@
           </a:fontRef>
         </p:style>
       </p:cxnSp>
-      <p:sp>
-        <p:nvSpPr>
-          <p:cNvPr id="13" name="TextBox 12">
+      <p:pic>
+        <p:nvPicPr>
+          <p:cNvPr id="8" name="Picture 7">
             <a:extLst>
               <a:ext uri="{FF2B5EF4-FFF2-40B4-BE49-F238E27FC236}">
-                <a16:creationId xmlns:a16="http://schemas.microsoft.com/office/drawing/2014/main" id="{2F54B774-97D6-374E-AF3C-3039E753E6FE}"/>
-              </a:ext>
-            </a:extLst>
-          </p:cNvPr>
-          <p:cNvSpPr txBox="1"/>
-          <p:nvPr/>
-        </p:nvSpPr>
-        <p:spPr>
-          <a:xfrm>
-            <a:off x="290347" y="1067951"/>
-            <a:ext cx="2162580" cy="369332"/>
-          </a:xfrm>
-          <a:prstGeom prst="rect">
-            <a:avLst/>
-          </a:prstGeom>
-          <a:noFill/>
-        </p:spPr>
-        <p:txBody>
-          <a:bodyPr wrap="none" rtlCol="0">
-            <a:spAutoFit/>
-          </a:bodyPr>
-          <a:lstStyle/>
-          <a:p>
-            <a:r>
-              <a:rPr lang="en-US" dirty="0"/>
-              <a:t>Unweighted rankings</a:t>
-            </a:r>
-          </a:p>
-        </p:txBody>
-      </p:sp>
-      <p:sp>
-        <p:nvSpPr>
-          <p:cNvPr id="14" name="TextBox 13">
-            <a:extLst>
-              <a:ext uri="{FF2B5EF4-FFF2-40B4-BE49-F238E27FC236}">
-                <a16:creationId xmlns:a16="http://schemas.microsoft.com/office/drawing/2014/main" id="{2A70FE4E-E05B-FB42-88DC-7CBDC43B4C5C}"/>
-              </a:ext>
-            </a:extLst>
-          </p:cNvPr>
-          <p:cNvSpPr txBox="1"/>
-          <p:nvPr/>
-        </p:nvSpPr>
-        <p:spPr>
-          <a:xfrm>
-            <a:off x="5942971" y="1017145"/>
-            <a:ext cx="1928541" cy="369332"/>
-          </a:xfrm>
-          <a:prstGeom prst="rect">
-            <a:avLst/>
-          </a:prstGeom>
-          <a:noFill/>
-        </p:spPr>
-        <p:txBody>
-          <a:bodyPr wrap="none" rtlCol="0">
-            <a:spAutoFit/>
-          </a:bodyPr>
-          <a:lstStyle/>
-          <a:p>
-            <a:r>
-              <a:rPr lang="en-US" dirty="0"/>
-              <a:t>Weighted rankings</a:t>
-            </a:r>
-          </a:p>
-        </p:txBody>
-      </p:sp>
-      <p:pic>
-        <p:nvPicPr>
-          <p:cNvPr id="20" name="Picture 19">
-            <a:extLst>
-              <a:ext uri="{FF2B5EF4-FFF2-40B4-BE49-F238E27FC236}">
-                <a16:creationId xmlns:a16="http://schemas.microsoft.com/office/drawing/2014/main" id="{56FED822-01A1-C34D-B232-2F3BEEEAB583}"/>
+                <a16:creationId xmlns:a16="http://schemas.microsoft.com/office/drawing/2014/main" id="{AFA33C52-019E-7142-ABA7-D1815F056185}"/>
               </a:ext>
             </a:extLst>
           </p:cNvPr>
@@ -8793,14 +8724,169 @@
         </p:blipFill>
         <p:spPr>
           <a:xfrm>
-            <a:off x="67946" y="1649528"/>
-            <a:ext cx="5715000" cy="3378200"/>
+            <a:off x="880912" y="1331220"/>
+            <a:ext cx="5711618" cy="4818332"/>
           </a:xfrm>
           <a:prstGeom prst="rect">
             <a:avLst/>
           </a:prstGeom>
         </p:spPr>
       </p:pic>
+      <p:sp>
+        <p:nvSpPr>
+          <p:cNvPr id="18" name="Content Placeholder 2">
+            <a:extLst>
+              <a:ext uri="{FF2B5EF4-FFF2-40B4-BE49-F238E27FC236}">
+                <a16:creationId xmlns:a16="http://schemas.microsoft.com/office/drawing/2014/main" id="{6695956D-51D4-814A-9CFB-3A8B5A4F2C90}"/>
+              </a:ext>
+            </a:extLst>
+          </p:cNvPr>
+          <p:cNvSpPr>
+            <a:spLocks noGrp="1"/>
+          </p:cNvSpPr>
+          <p:nvPr>
+            <p:ph idx="1"/>
+          </p:nvPr>
+        </p:nvSpPr>
+        <p:spPr>
+          <a:xfrm>
+            <a:off x="7089339" y="1974256"/>
+            <a:ext cx="3899263" cy="4010780"/>
+          </a:xfrm>
+        </p:spPr>
+        <p:txBody>
+          <a:bodyPr>
+            <a:normAutofit lnSpcReduction="10000"/>
+          </a:bodyPr>
+          <a:lstStyle/>
+          <a:p>
+            <a:pPr>
+              <a:buFont typeface="Arial" panose="020B0604020202020204" pitchFamily="34" charset="0"/>
+              <a:buChar char="•"/>
+            </a:pPr>
+            <a:r>
+              <a:rPr lang="en-US" sz="3200" dirty="0"/>
+              <a:t> From multiple sources we defined a score for  each city</a:t>
+            </a:r>
+          </a:p>
+          <a:p>
+            <a:pPr>
+              <a:buFont typeface="Arial" panose="020B0604020202020204" pitchFamily="34" charset="0"/>
+              <a:buChar char="•"/>
+            </a:pPr>
+            <a:r>
+              <a:rPr lang="en-US" sz="3200" dirty="0"/>
+              <a:t> We agree that all rankings do not weigh equally, so we defined a set of weights per category to calculate totals.</a:t>
+            </a:r>
+          </a:p>
+        </p:txBody>
+      </p:sp>
+    </p:spTree>
+    <p:extLst>
+      <p:ext uri="{BB962C8B-B14F-4D97-AF65-F5344CB8AC3E}">
+        <p14:creationId xmlns:p14="http://schemas.microsoft.com/office/powerpoint/2010/main" val="3630619199"/>
+      </p:ext>
+    </p:extLst>
+  </p:cSld>
+  <p:clrMapOvr>
+    <a:masterClrMapping/>
+  </p:clrMapOvr>
+</p:sld>
+</file>
+
+<file path=ppt/slides/slide27.xml><?xml version="1.0" encoding="utf-8"?>
+<p:sld xmlns:a="http://schemas.openxmlformats.org/drawingml/2006/main" xmlns:r="http://schemas.openxmlformats.org/officeDocument/2006/relationships" xmlns:p="http://schemas.openxmlformats.org/presentationml/2006/main">
+  <p:cSld>
+    <p:spTree>
+      <p:nvGrpSpPr>
+        <p:cNvPr id="1" name=""/>
+        <p:cNvGrpSpPr/>
+        <p:nvPr/>
+      </p:nvGrpSpPr>
+      <p:grpSpPr>
+        <a:xfrm>
+          <a:off x="0" y="0"/>
+          <a:ext cx="0" cy="0"/>
+          <a:chOff x="0" y="0"/>
+          <a:chExt cx="0" cy="0"/>
+        </a:xfrm>
+      </p:grpSpPr>
+      <p:sp>
+        <p:nvSpPr>
+          <p:cNvPr id="2" name="Title 1">
+            <a:extLst>
+              <a:ext uri="{FF2B5EF4-FFF2-40B4-BE49-F238E27FC236}">
+                <a16:creationId xmlns:a16="http://schemas.microsoft.com/office/drawing/2014/main" id="{390EB264-3883-41F9-BACB-285D2229980C}"/>
+              </a:ext>
+            </a:extLst>
+          </p:cNvPr>
+          <p:cNvSpPr>
+            <a:spLocks noGrp="1"/>
+          </p:cNvSpPr>
+          <p:nvPr>
+            <p:ph type="title"/>
+          </p:nvPr>
+        </p:nvSpPr>
+        <p:spPr>
+          <a:xfrm>
+            <a:off x="1097280" y="286603"/>
+            <a:ext cx="10058400" cy="702409"/>
+          </a:xfrm>
+        </p:spPr>
+        <p:txBody>
+          <a:bodyPr>
+            <a:normAutofit fontScale="90000"/>
+          </a:bodyPr>
+          <a:lstStyle/>
+          <a:p>
+            <a:r>
+              <a:rPr lang="en-US" dirty="0"/>
+              <a:t>Overall City Ranking </a:t>
+            </a:r>
+          </a:p>
+        </p:txBody>
+      </p:sp>
+      <p:cxnSp>
+        <p:nvCxnSpPr>
+          <p:cNvPr id="4" name="Straight Connector 3">
+            <a:extLst>
+              <a:ext uri="{FF2B5EF4-FFF2-40B4-BE49-F238E27FC236}">
+                <a16:creationId xmlns:a16="http://schemas.microsoft.com/office/drawing/2014/main" id="{8FECCD07-FFA9-4129-95C2-D2F2CF8AD354}"/>
+              </a:ext>
+            </a:extLst>
+          </p:cNvPr>
+          <p:cNvCxnSpPr/>
+          <p:nvPr/>
+        </p:nvCxnSpPr>
+        <p:spPr>
+          <a:xfrm>
+            <a:off x="989398" y="989012"/>
+            <a:ext cx="9069860" cy="0"/>
+          </a:xfrm>
+          <a:prstGeom prst="line">
+            <a:avLst/>
+          </a:prstGeom>
+          <a:ln>
+            <a:solidFill>
+              <a:srgbClr val="7030A0"/>
+            </a:solidFill>
+          </a:ln>
+        </p:spPr>
+        <p:style>
+          <a:lnRef idx="1">
+            <a:schemeClr val="accent1"/>
+          </a:lnRef>
+          <a:fillRef idx="0">
+            <a:schemeClr val="accent1"/>
+          </a:fillRef>
+          <a:effectRef idx="0">
+            <a:schemeClr val="accent1"/>
+          </a:effectRef>
+          <a:fontRef idx="minor">
+            <a:schemeClr val="tx1"/>
+          </a:fontRef>
+        </p:style>
+      </p:cxnSp>
       <p:sp>
         <p:nvSpPr>
           <p:cNvPr id="3" name="TextBox 2">
@@ -9467,10 +9553,10 @@
       </p:graphicFrame>
       <p:pic>
         <p:nvPicPr>
-          <p:cNvPr id="7" name="Picture 6">
+          <p:cNvPr id="8" name="Picture 7">
             <a:extLst>
               <a:ext uri="{FF2B5EF4-FFF2-40B4-BE49-F238E27FC236}">
-                <a16:creationId xmlns:a16="http://schemas.microsoft.com/office/drawing/2014/main" id="{7FAF96FF-2589-214D-823A-8EACD8447428}"/>
+                <a16:creationId xmlns:a16="http://schemas.microsoft.com/office/drawing/2014/main" id="{AA652E44-6AA1-CE46-8303-6860B8CBAB1F}"/>
               </a:ext>
             </a:extLst>
           </p:cNvPr>
@@ -9480,7 +9566,7 @@
           <p:nvPr/>
         </p:nvPicPr>
         <p:blipFill>
-          <a:blip r:embed="rId3">
+          <a:blip r:embed="rId2">
             <a:extLst>
               <a:ext uri="{28A0092B-C50C-407E-A947-70E740481C1C}">
                 <a14:useLocalDpi xmlns:a14="http://schemas.microsoft.com/office/drawing/2010/main" val="0"/>
@@ -9493,8 +9579,8 @@
         </p:blipFill>
         <p:spPr>
           <a:xfrm>
-            <a:off x="5942967" y="1642828"/>
-            <a:ext cx="5715000" cy="3378200"/>
+            <a:off x="2449290" y="1472997"/>
+            <a:ext cx="6150076" cy="3635379"/>
           </a:xfrm>
           <a:prstGeom prst="rect">
             <a:avLst/>
@@ -9504,7 +9590,7 @@
     </p:spTree>
     <p:extLst>
       <p:ext uri="{BB962C8B-B14F-4D97-AF65-F5344CB8AC3E}">
-        <p14:creationId xmlns:p14="http://schemas.microsoft.com/office/powerpoint/2010/main" val="3630619199"/>
+        <p14:creationId xmlns:p14="http://schemas.microsoft.com/office/powerpoint/2010/main" val="3915737306"/>
       </p:ext>
     </p:extLst>
   </p:cSld>

</xml_diff>

<commit_message>
Modify presentation and findings
</commit_message>
<xml_diff>
--- a/Project1_Presentation.pptx
+++ b/Project1_Presentation.pptx
@@ -29,8 +29,9 @@
     <p:sldId id="290" r:id="rId23"/>
     <p:sldId id="295" r:id="rId24"/>
     <p:sldId id="296" r:id="rId25"/>
-    <p:sldId id="264" r:id="rId26"/>
-    <p:sldId id="292" r:id="rId27"/>
+    <p:sldId id="297" r:id="rId26"/>
+    <p:sldId id="264" r:id="rId27"/>
+    <p:sldId id="292" r:id="rId28"/>
   </p:sldIdLst>
   <p:sldSz cx="12192000" cy="6858000"/>
   <p:notesSz cx="6858000" cy="9144000"/>
@@ -4736,6 +4737,14 @@
   <p:clrMapOvr>
     <a:masterClrMapping/>
   </p:clrMapOvr>
+  <mc:AlternateContent xmlns:mc="http://schemas.openxmlformats.org/markup-compatibility/2006">
+    <mc:Choice xmlns:p14="http://schemas.microsoft.com/office/powerpoint/2010/main" Requires="p14">
+      <p:transition spd="slow" p14:dur="2000"/>
+    </mc:Choice>
+    <mc:Fallback>
+      <p:transition spd="slow"/>
+    </mc:Fallback>
+  </mc:AlternateContent>
 </p:sld>
 </file>
 
@@ -5393,6 +5402,14 @@
   <p:clrMapOvr>
     <a:masterClrMapping/>
   </p:clrMapOvr>
+  <mc:AlternateContent xmlns:mc="http://schemas.openxmlformats.org/markup-compatibility/2006">
+    <mc:Choice xmlns:p14="http://schemas.microsoft.com/office/powerpoint/2010/main" Requires="p14">
+      <p:transition spd="slow" p14:dur="2000"/>
+    </mc:Choice>
+    <mc:Fallback>
+      <p:transition spd="slow"/>
+    </mc:Fallback>
+  </mc:AlternateContent>
 </p:sld>
 </file>
 
@@ -8607,11 +8624,17 @@
           <p:cNvGraphicFramePr>
             <a:graphicFrameLocks noGrp="1"/>
           </p:cNvGraphicFramePr>
-          <p:nvPr/>
+          <p:nvPr>
+            <p:extLst>
+              <p:ext uri="{D42A27DB-BD31-4B8C-83A1-F6EECF244321}">
+                <p14:modId xmlns:p14="http://schemas.microsoft.com/office/powerpoint/2010/main" val="2103037029"/>
+              </p:ext>
+            </p:extLst>
+          </p:nvPr>
         </p:nvGraphicFramePr>
         <p:xfrm>
           <a:off x="556591" y="5592362"/>
-          <a:ext cx="11101376" cy="487680"/>
+          <a:ext cx="11240235" cy="487680"/>
         </p:xfrm>
         <a:graphic>
           <a:graphicData uri="http://schemas.openxmlformats.org/drawingml/2006/table">
@@ -8620,115 +8643,115 @@
                 <a:tableStyleId>{5C22544A-7EE6-4342-B048-85BDC9FD1C3A}</a:tableStyleId>
               </a:tblPr>
               <a:tblGrid>
-                <a:gridCol w="693836">
+                <a:gridCol w="532499">
                   <a:extLst>
                     <a:ext uri="{9D8B030D-6E8A-4147-A177-3AD203B41FA5}">
                       <a16:colId xmlns:a16="http://schemas.microsoft.com/office/drawing/2014/main" val="2099015565"/>
                     </a:ext>
                   </a:extLst>
                 </a:gridCol>
-                <a:gridCol w="693836">
+                <a:gridCol w="755206">
+                  <a:extLst>
+                    <a:ext uri="{9D8B030D-6E8A-4147-A177-3AD203B41FA5}">
+                      <a16:colId xmlns:a16="http://schemas.microsoft.com/office/drawing/2014/main" val="217390384"/>
+                    </a:ext>
+                  </a:extLst>
+                </a:gridCol>
+                <a:gridCol w="651384">
                   <a:extLst>
                     <a:ext uri="{9D8B030D-6E8A-4147-A177-3AD203B41FA5}">
                       <a16:colId xmlns:a16="http://schemas.microsoft.com/office/drawing/2014/main" val="1131645849"/>
                     </a:ext>
                   </a:extLst>
                 </a:gridCol>
-                <a:gridCol w="693836">
+                <a:gridCol w="776064">
                   <a:extLst>
                     <a:ext uri="{9D8B030D-6E8A-4147-A177-3AD203B41FA5}">
                       <a16:colId xmlns:a16="http://schemas.microsoft.com/office/drawing/2014/main" val="2979348466"/>
                     </a:ext>
                   </a:extLst>
                 </a:gridCol>
-                <a:gridCol w="693836">
-                  <a:extLst>
-                    <a:ext uri="{9D8B030D-6E8A-4147-A177-3AD203B41FA5}">
-                      <a16:colId xmlns:a16="http://schemas.microsoft.com/office/drawing/2014/main" val="3871454820"/>
-                    </a:ext>
-                  </a:extLst>
-                </a:gridCol>
-                <a:gridCol w="693836">
+                <a:gridCol w="623375">
                   <a:extLst>
                     <a:ext uri="{9D8B030D-6E8A-4147-A177-3AD203B41FA5}">
                       <a16:colId xmlns:a16="http://schemas.microsoft.com/office/drawing/2014/main" val="1076730244"/>
                     </a:ext>
                   </a:extLst>
                 </a:gridCol>
-                <a:gridCol w="693836">
-                  <a:extLst>
-                    <a:ext uri="{9D8B030D-6E8A-4147-A177-3AD203B41FA5}">
-                      <a16:colId xmlns:a16="http://schemas.microsoft.com/office/drawing/2014/main" val="3173180166"/>
-                    </a:ext>
-                  </a:extLst>
-                </a:gridCol>
-                <a:gridCol w="693836">
+                <a:gridCol w="718337">
                   <a:extLst>
                     <a:ext uri="{9D8B030D-6E8A-4147-A177-3AD203B41FA5}">
                       <a16:colId xmlns:a16="http://schemas.microsoft.com/office/drawing/2014/main" val="205725656"/>
                     </a:ext>
                   </a:extLst>
                 </a:gridCol>
-                <a:gridCol w="693836">
+                <a:gridCol w="617763">
                   <a:extLst>
                     <a:ext uri="{9D8B030D-6E8A-4147-A177-3AD203B41FA5}">
                       <a16:colId xmlns:a16="http://schemas.microsoft.com/office/drawing/2014/main" val="2271480319"/>
                     </a:ext>
                   </a:extLst>
                 </a:gridCol>
-                <a:gridCol w="693836">
+                <a:gridCol w="818911">
+                  <a:extLst>
+                    <a:ext uri="{9D8B030D-6E8A-4147-A177-3AD203B41FA5}">
+                      <a16:colId xmlns:a16="http://schemas.microsoft.com/office/drawing/2014/main" val="1173683918"/>
+                    </a:ext>
+                  </a:extLst>
+                </a:gridCol>
+                <a:gridCol w="718337">
+                  <a:extLst>
+                    <a:ext uri="{9D8B030D-6E8A-4147-A177-3AD203B41FA5}">
+                      <a16:colId xmlns:a16="http://schemas.microsoft.com/office/drawing/2014/main" val="970753685"/>
+                    </a:ext>
+                  </a:extLst>
+                </a:gridCol>
+                <a:gridCol w="718337">
+                  <a:extLst>
+                    <a:ext uri="{9D8B030D-6E8A-4147-A177-3AD203B41FA5}">
+                      <a16:colId xmlns:a16="http://schemas.microsoft.com/office/drawing/2014/main" val="2519906615"/>
+                    </a:ext>
+                  </a:extLst>
+                </a:gridCol>
+                <a:gridCol w="718337">
+                  <a:extLst>
+                    <a:ext uri="{9D8B030D-6E8A-4147-A177-3AD203B41FA5}">
+                      <a16:colId xmlns:a16="http://schemas.microsoft.com/office/drawing/2014/main" val="3987029071"/>
+                    </a:ext>
+                  </a:extLst>
+                </a:gridCol>
+                <a:gridCol w="718337">
                   <a:extLst>
                     <a:ext uri="{9D8B030D-6E8A-4147-A177-3AD203B41FA5}">
                       <a16:colId xmlns:a16="http://schemas.microsoft.com/office/drawing/2014/main" val="3504083037"/>
                     </a:ext>
                   </a:extLst>
                 </a:gridCol>
-                <a:gridCol w="693836">
+                <a:gridCol w="718337">
                   <a:extLst>
                     <a:ext uri="{9D8B030D-6E8A-4147-A177-3AD203B41FA5}">
                       <a16:colId xmlns:a16="http://schemas.microsoft.com/office/drawing/2014/main" val="295204535"/>
                     </a:ext>
                   </a:extLst>
                 </a:gridCol>
-                <a:gridCol w="693836">
+                <a:gridCol w="718337">
                   <a:extLst>
                     <a:ext uri="{9D8B030D-6E8A-4147-A177-3AD203B41FA5}">
                       <a16:colId xmlns:a16="http://schemas.microsoft.com/office/drawing/2014/main" val="420834283"/>
                     </a:ext>
                   </a:extLst>
                 </a:gridCol>
-                <a:gridCol w="627222">
+                <a:gridCol w="649371">
                   <a:extLst>
                     <a:ext uri="{9D8B030D-6E8A-4147-A177-3AD203B41FA5}">
                       <a16:colId xmlns:a16="http://schemas.microsoft.com/office/drawing/2014/main" val="4186120540"/>
                     </a:ext>
                   </a:extLst>
                 </a:gridCol>
-                <a:gridCol w="760450">
+                <a:gridCol w="787303">
                   <a:extLst>
                     <a:ext uri="{9D8B030D-6E8A-4147-A177-3AD203B41FA5}">
                       <a16:colId xmlns:a16="http://schemas.microsoft.com/office/drawing/2014/main" val="3484716283"/>
-                    </a:ext>
-                  </a:extLst>
-                </a:gridCol>
-                <a:gridCol w="693836">
-                  <a:extLst>
-                    <a:ext uri="{9D8B030D-6E8A-4147-A177-3AD203B41FA5}">
-                      <a16:colId xmlns:a16="http://schemas.microsoft.com/office/drawing/2014/main" val="3882757151"/>
-                    </a:ext>
-                  </a:extLst>
-                </a:gridCol>
-                <a:gridCol w="693836">
-                  <a:extLst>
-                    <a:ext uri="{9D8B030D-6E8A-4147-A177-3AD203B41FA5}">
-                      <a16:colId xmlns:a16="http://schemas.microsoft.com/office/drawing/2014/main" val="4187639300"/>
-                    </a:ext>
-                  </a:extLst>
-                </a:gridCol>
-                <a:gridCol w="693836">
-                  <a:extLst>
-                    <a:ext uri="{9D8B030D-6E8A-4147-A177-3AD203B41FA5}">
-                      <a16:colId xmlns:a16="http://schemas.microsoft.com/office/drawing/2014/main" val="1901181437"/>
                     </a:ext>
                   </a:extLst>
                 </a:gridCol>
@@ -8742,6 +8765,23 @@
                       <a:r>
                         <a:rPr lang="en-US" sz="1000" dirty="0"/>
                         <a:t>House</a:t>
+                      </a:r>
+                    </a:p>
+                  </a:txBody>
+                  <a:tcPr/>
+                </a:tc>
+                <a:tc>
+                  <a:txBody>
+                    <a:bodyPr/>
+                    <a:lstStyle/>
+                    <a:p>
+                      <a:r>
+                        <a:rPr lang="en-US" sz="1000" dirty="0" smtClean="0"/>
+                        <a:t>Tech </a:t>
+                      </a:r>
+                      <a:r>
+                        <a:rPr lang="en-US" sz="1000" dirty="0"/>
+                        <a:t>Pool</a:t>
                       </a:r>
                     </a:p>
                   </a:txBody>
@@ -8780,33 +8820,7 @@
                     <a:p>
                       <a:r>
                         <a:rPr lang="en-US" sz="1000" dirty="0"/>
-                        <a:t>School</a:t>
-                      </a:r>
-                    </a:p>
-                  </a:txBody>
-                  <a:tcPr/>
-                </a:tc>
-                <a:tc>
-                  <a:txBody>
-                    <a:bodyPr/>
-                    <a:lstStyle/>
-                    <a:p>
-                      <a:r>
-                        <a:rPr lang="en-US" sz="1000" dirty="0"/>
                         <a:t>College</a:t>
-                      </a:r>
-                    </a:p>
-                  </a:txBody>
-                  <a:tcPr/>
-                </a:tc>
-                <a:tc>
-                  <a:txBody>
-                    <a:bodyPr/>
-                    <a:lstStyle/>
-                    <a:p>
-                      <a:r>
-                        <a:rPr lang="en-US" sz="1000" dirty="0"/>
-                        <a:t>Tec Pool</a:t>
                       </a:r>
                     </a:p>
                   </a:txBody>
@@ -8831,8 +8845,62 @@
                     <a:lstStyle/>
                     <a:p>
                       <a:r>
+                        <a:rPr lang="en-US" sz="1000" dirty="0" smtClean="0"/>
+                        <a:t>Airports</a:t>
+                      </a:r>
+                      <a:endParaRPr lang="en-US" sz="1000" dirty="0"/>
+                    </a:p>
+                  </a:txBody>
+                  <a:tcPr/>
+                </a:tc>
+                <a:tc>
+                  <a:txBody>
+                    <a:bodyPr/>
+                    <a:lstStyle/>
+                    <a:p>
+                      <a:r>
+                        <a:rPr lang="en-US" sz="1000" dirty="0" smtClean="0"/>
+                        <a:t>K-12 School</a:t>
+                      </a:r>
+                      <a:endParaRPr lang="en-US" sz="1000" dirty="0"/>
+                    </a:p>
+                  </a:txBody>
+                  <a:tcPr/>
+                </a:tc>
+                <a:tc>
+                  <a:txBody>
+                    <a:bodyPr/>
+                    <a:lstStyle/>
+                    <a:p>
+                      <a:r>
                         <a:rPr lang="en-US" sz="1000" dirty="0"/>
-                        <a:t>Airport</a:t>
+                        <a:t>Crime</a:t>
+                      </a:r>
+                    </a:p>
+                  </a:txBody>
+                  <a:tcPr/>
+                </a:tc>
+                <a:tc>
+                  <a:txBody>
+                    <a:bodyPr/>
+                    <a:lstStyle/>
+                    <a:p>
+                      <a:r>
+                        <a:rPr lang="en-US" sz="1000" dirty="0"/>
+                        <a:t>Climate</a:t>
+                      </a:r>
+                    </a:p>
+                  </a:txBody>
+                  <a:tcPr/>
+                </a:tc>
+                <a:tc>
+                  <a:txBody>
+                    <a:bodyPr/>
+                    <a:lstStyle/>
+                    <a:p>
+                      <a:r>
+                        <a:rPr lang="en-US" sz="1000" dirty="0"/>
+                        <a:t>Pollution</a:t>
                       </a:r>
                     </a:p>
                   </a:txBody>
@@ -8845,15 +8913,22 @@
                     <a:p>
                       <a:pPr algn="ctr" fontAlgn="b"/>
                       <a:r>
-                        <a:rPr lang="en-US" sz="1000" b="1" i="0" u="none" strike="noStrike" dirty="0">
+                        <a:rPr lang="en-US" sz="1000" b="1" i="0" u="none" strike="noStrike" dirty="0" smtClean="0">
                           <a:solidFill>
                             <a:schemeClr val="bg1"/>
                           </a:solidFill>
                           <a:effectLst/>
                           <a:latin typeface="+mn-lt"/>
                         </a:rPr>
-                        <a:t>Rest</a:t>
+                        <a:t>Restaurants</a:t>
                       </a:r>
+                      <a:endParaRPr lang="en-US" sz="1000" b="1" i="0" u="none" strike="noStrike" dirty="0">
+                        <a:solidFill>
+                          <a:schemeClr val="bg1"/>
+                        </a:solidFill>
+                        <a:effectLst/>
+                        <a:latin typeface="+mn-lt"/>
+                      </a:endParaRPr>
                     </a:p>
                   </a:txBody>
                   <a:tcPr marL="9525" marR="9525" marT="9525" marB="0" anchor="ctr"/>
@@ -8924,48 +8999,10 @@
                     <a:lstStyle/>
                     <a:p>
                       <a:r>
-                        <a:rPr lang="en-US" sz="1000" dirty="0"/>
-                        <a:t>Fitness</a:t>
+                        <a:rPr lang="en-US" sz="1000" dirty="0" smtClean="0"/>
+                        <a:t>Gyms</a:t>
                       </a:r>
-                    </a:p>
-                  </a:txBody>
-                  <a:tcPr/>
-                </a:tc>
-                <a:tc>
-                  <a:txBody>
-                    <a:bodyPr/>
-                    <a:lstStyle/>
-                    <a:p>
-                      <a:r>
-                        <a:rPr lang="en-US" sz="1000" dirty="0"/>
-                        <a:t>Crime</a:t>
-                      </a:r>
-                    </a:p>
-                  </a:txBody>
-                  <a:tcPr/>
-                </a:tc>
-                <a:tc>
-                  <a:txBody>
-                    <a:bodyPr/>
-                    <a:lstStyle/>
-                    <a:p>
-                      <a:r>
-                        <a:rPr lang="en-US" sz="1000" dirty="0"/>
-                        <a:t>Climate</a:t>
-                      </a:r>
-                    </a:p>
-                  </a:txBody>
-                  <a:tcPr/>
-                </a:tc>
-                <a:tc>
-                  <a:txBody>
-                    <a:bodyPr/>
-                    <a:lstStyle/>
-                    <a:p>
-                      <a:r>
-                        <a:rPr lang="en-US" sz="1000" dirty="0"/>
-                        <a:t>Pollution</a:t>
-                      </a:r>
+                      <a:endParaRPr lang="en-US" sz="1000" dirty="0"/>
                     </a:p>
                   </a:txBody>
                   <a:tcPr/>
@@ -8977,6 +9014,19 @@
                 </a:extLst>
               </a:tr>
               <a:tr h="157618">
+                <a:tc>
+                  <a:txBody>
+                    <a:bodyPr/>
+                    <a:lstStyle/>
+                    <a:p>
+                      <a:r>
+                        <a:rPr lang="en-US" sz="1000" dirty="0"/>
+                        <a:t>3</a:t>
+                      </a:r>
+                    </a:p>
+                  </a:txBody>
+                  <a:tcPr/>
+                </a:tc>
                 <a:tc>
                   <a:txBody>
                     <a:bodyPr/>
@@ -9023,143 +9073,11 @@
                     <a:p>
                       <a:r>
                         <a:rPr lang="en-US" sz="1000" dirty="0"/>
-                        <a:t>1</a:t>
-                      </a:r>
-                    </a:p>
-                  </a:txBody>
-                  <a:tcPr/>
-                </a:tc>
-                <a:tc>
-                  <a:txBody>
-                    <a:bodyPr/>
-                    <a:lstStyle/>
-                    <a:p>
-                      <a:r>
-                        <a:rPr lang="en-US" sz="1000" dirty="0"/>
                         <a:t>2</a:t>
                       </a:r>
                     </a:p>
                   </a:txBody>
                   <a:tcPr/>
-                </a:tc>
-                <a:tc>
-                  <a:txBody>
-                    <a:bodyPr/>
-                    <a:lstStyle/>
-                    <a:p>
-                      <a:r>
-                        <a:rPr lang="en-US" sz="1000" dirty="0"/>
-                        <a:t>3</a:t>
-                      </a:r>
-                    </a:p>
-                  </a:txBody>
-                  <a:tcPr/>
-                </a:tc>
-                <a:tc>
-                  <a:txBody>
-                    <a:bodyPr/>
-                    <a:lstStyle/>
-                    <a:p>
-                      <a:r>
-                        <a:rPr lang="en-US" sz="1000" dirty="0"/>
-                        <a:t>2</a:t>
-                      </a:r>
-                    </a:p>
-                  </a:txBody>
-                  <a:tcPr/>
-                </a:tc>
-                <a:tc>
-                  <a:txBody>
-                    <a:bodyPr/>
-                    <a:lstStyle/>
-                    <a:p>
-                      <a:r>
-                        <a:rPr lang="en-US" sz="1000" dirty="0"/>
-                        <a:t>1</a:t>
-                      </a:r>
-                    </a:p>
-                  </a:txBody>
-                  <a:tcPr/>
-                </a:tc>
-                <a:tc>
-                  <a:txBody>
-                    <a:bodyPr/>
-                    <a:lstStyle/>
-                    <a:p>
-                      <a:pPr algn="l" fontAlgn="b"/>
-                      <a:r>
-                        <a:rPr lang="en-US" sz="1000" b="0" i="0" u="none" strike="noStrike" dirty="0">
-                          <a:solidFill>
-                            <a:srgbClr val="000000"/>
-                          </a:solidFill>
-                          <a:effectLst/>
-                          <a:latin typeface="+mn-lt"/>
-                        </a:rPr>
-                        <a:t> 0.25</a:t>
-                      </a:r>
-                    </a:p>
-                  </a:txBody>
-                  <a:tcPr marL="9525" marR="9525" marT="9525" marB="0" anchor="ctr"/>
-                </a:tc>
-                <a:tc>
-                  <a:txBody>
-                    <a:bodyPr/>
-                    <a:lstStyle/>
-                    <a:p>
-                      <a:pPr algn="l" fontAlgn="b"/>
-                      <a:r>
-                        <a:rPr lang="en-US" sz="1000" b="0" i="0" u="none" strike="noStrike" dirty="0">
-                          <a:solidFill>
-                            <a:srgbClr val="000000"/>
-                          </a:solidFill>
-                          <a:effectLst/>
-                          <a:latin typeface="+mn-lt"/>
-                        </a:rPr>
-                        <a:t> 0.75</a:t>
-                      </a:r>
-                    </a:p>
-                  </a:txBody>
-                  <a:tcPr marL="9525" marR="9525" marT="9525" marB="0" anchor="ctr"/>
-                </a:tc>
-                <a:tc>
-                  <a:txBody>
-                    <a:bodyPr/>
-                    <a:lstStyle/>
-                    <a:p>
-                      <a:pPr algn="l" fontAlgn="b"/>
-                      <a:r>
-                        <a:rPr lang="en-US" sz="1000" b="0" i="0" u="none" strike="noStrike" dirty="0">
-                          <a:solidFill>
-                            <a:srgbClr val="000000"/>
-                          </a:solidFill>
-                          <a:effectLst/>
-                          <a:latin typeface="+mn-lt"/>
-                        </a:rPr>
-                        <a:t> 0.5</a:t>
-                      </a:r>
-                    </a:p>
-                  </a:txBody>
-                  <a:tcPr marL="9525" marR="9525" marT="9525" marB="0" anchor="ctr"/>
-                </a:tc>
-                <a:tc>
-                  <a:txBody>
-                    <a:bodyPr/>
-                    <a:lstStyle/>
-                    <a:p>
-                      <a:pPr algn="l" fontAlgn="b"/>
-                      <a:r>
-                        <a:rPr lang="en-US" sz="1000" b="0" i="0" u="none" strike="noStrike" dirty="0">
-                          <a:solidFill>
-                            <a:srgbClr val="000000"/>
-                          </a:solidFill>
-                          <a:effectLst/>
-                          <a:latin typeface="+mn-lt"/>
-                        </a:rPr>
-                        <a:t> 0.25</a:t>
-                      </a:r>
-                    </a:p>
-                  </a:txBody>
-                  <a:tcPr marL="9525" marR="9525" marT="9525" marB="0" anchor="ctr"/>
                 </a:tc>
                 <a:tc>
                   <a:txBody>
@@ -9213,6 +9131,160 @@
                   </a:txBody>
                   <a:tcPr/>
                 </a:tc>
+                <a:tc>
+                  <a:txBody>
+                    <a:bodyPr/>
+                    <a:lstStyle/>
+                    <a:p>
+                      <a:r>
+                        <a:rPr lang="en-US" sz="1000" dirty="0"/>
+                        <a:t>1</a:t>
+                      </a:r>
+                    </a:p>
+                  </a:txBody>
+                  <a:tcPr/>
+                </a:tc>
+                <a:tc>
+                  <a:txBody>
+                    <a:bodyPr/>
+                    <a:lstStyle/>
+                    <a:p>
+                      <a:r>
+                        <a:rPr lang="en-US" sz="1000" dirty="0"/>
+                        <a:t>1</a:t>
+                      </a:r>
+                    </a:p>
+                  </a:txBody>
+                  <a:tcPr/>
+                </a:tc>
+                <a:tc>
+                  <a:txBody>
+                    <a:bodyPr/>
+                    <a:lstStyle/>
+                    <a:p>
+                      <a:pPr algn="l" fontAlgn="b"/>
+                      <a:r>
+                        <a:rPr lang="en-US" sz="1000" b="0" i="0" u="none" strike="noStrike" dirty="0">
+                          <a:solidFill>
+                            <a:srgbClr val="000000"/>
+                          </a:solidFill>
+                          <a:effectLst/>
+                          <a:latin typeface="+mn-lt"/>
+                        </a:rPr>
+                        <a:t> 0.25</a:t>
+                      </a:r>
+                    </a:p>
+                  </a:txBody>
+                  <a:tcPr marL="9525" marR="9525" marT="9525" marB="0" anchor="ctr"/>
+                </a:tc>
+                <a:tc>
+                  <a:txBody>
+                    <a:bodyPr/>
+                    <a:lstStyle/>
+                    <a:p>
+                      <a:pPr algn="l" fontAlgn="b"/>
+                      <a:r>
+                        <a:rPr lang="en-US" sz="1000" b="0" i="0" u="none" strike="noStrike" dirty="0">
+                          <a:solidFill>
+                            <a:srgbClr val="000000"/>
+                          </a:solidFill>
+                          <a:effectLst/>
+                          <a:latin typeface="+mn-lt"/>
+                        </a:rPr>
+                        <a:t> </a:t>
+                      </a:r>
+                      <a:r>
+                        <a:rPr lang="en-US" sz="1000" b="0" i="0" u="none" strike="noStrike" dirty="0" smtClean="0">
+                          <a:solidFill>
+                            <a:srgbClr val="000000"/>
+                          </a:solidFill>
+                          <a:effectLst/>
+                          <a:latin typeface="+mn-lt"/>
+                        </a:rPr>
+                        <a:t>0.25</a:t>
+                      </a:r>
+                      <a:endParaRPr lang="en-US" sz="1000" b="0" i="0" u="none" strike="noStrike" dirty="0">
+                        <a:solidFill>
+                          <a:srgbClr val="000000"/>
+                        </a:solidFill>
+                        <a:effectLst/>
+                        <a:latin typeface="+mn-lt"/>
+                      </a:endParaRPr>
+                    </a:p>
+                  </a:txBody>
+                  <a:tcPr marL="9525" marR="9525" marT="9525" marB="0" anchor="ctr"/>
+                </a:tc>
+                <a:tc>
+                  <a:txBody>
+                    <a:bodyPr/>
+                    <a:lstStyle/>
+                    <a:p>
+                      <a:pPr algn="l" fontAlgn="b"/>
+                      <a:r>
+                        <a:rPr lang="en-US" sz="1000" b="0" i="0" u="none" strike="noStrike" dirty="0">
+                          <a:solidFill>
+                            <a:srgbClr val="000000"/>
+                          </a:solidFill>
+                          <a:effectLst/>
+                          <a:latin typeface="+mn-lt"/>
+                        </a:rPr>
+                        <a:t> </a:t>
+                      </a:r>
+                      <a:r>
+                        <a:rPr lang="en-US" sz="1000" b="0" i="0" u="none" strike="noStrike" dirty="0" smtClean="0">
+                          <a:solidFill>
+                            <a:srgbClr val="000000"/>
+                          </a:solidFill>
+                          <a:effectLst/>
+                          <a:latin typeface="+mn-lt"/>
+                        </a:rPr>
+                        <a:t>0.25</a:t>
+                      </a:r>
+                      <a:endParaRPr lang="en-US" sz="1000" b="0" i="0" u="none" strike="noStrike" dirty="0">
+                        <a:solidFill>
+                          <a:srgbClr val="000000"/>
+                        </a:solidFill>
+                        <a:effectLst/>
+                        <a:latin typeface="+mn-lt"/>
+                      </a:endParaRPr>
+                    </a:p>
+                  </a:txBody>
+                  <a:tcPr marL="9525" marR="9525" marT="9525" marB="0" anchor="ctr"/>
+                </a:tc>
+                <a:tc>
+                  <a:txBody>
+                    <a:bodyPr/>
+                    <a:lstStyle/>
+                    <a:p>
+                      <a:pPr algn="l" fontAlgn="b"/>
+                      <a:r>
+                        <a:rPr lang="en-US" sz="1000" b="0" i="0" u="none" strike="noStrike" dirty="0">
+                          <a:solidFill>
+                            <a:srgbClr val="000000"/>
+                          </a:solidFill>
+                          <a:effectLst/>
+                          <a:latin typeface="+mn-lt"/>
+                        </a:rPr>
+                        <a:t> 0.25</a:t>
+                      </a:r>
+                    </a:p>
+                  </a:txBody>
+                  <a:tcPr marL="9525" marR="9525" marT="9525" marB="0" anchor="ctr"/>
+                </a:tc>
+                <a:tc>
+                  <a:txBody>
+                    <a:bodyPr/>
+                    <a:lstStyle/>
+                    <a:p>
+                      <a:r>
+                        <a:rPr lang="en-US" sz="1000" dirty="0" smtClean="0"/>
+                        <a:t>0.25</a:t>
+                      </a:r>
+                      <a:endParaRPr lang="en-US" sz="1000" dirty="0"/>
+                    </a:p>
+                  </a:txBody>
+                  <a:tcPr/>
+                </a:tc>
                 <a:extLst>
                   <a:ext uri="{0D108BD9-81ED-4DB2-BD59-A6C34878D82A}">
                     <a16:rowId xmlns:a16="http://schemas.microsoft.com/office/drawing/2014/main" val="3565520845"/>
@@ -9422,6 +9494,112 @@
 </file>
 
 <file path=ppt/slides/slide25.xml><?xml version="1.0" encoding="utf-8"?>
+<p:sld xmlns:a="http://schemas.openxmlformats.org/drawingml/2006/main" xmlns:r="http://schemas.openxmlformats.org/officeDocument/2006/relationships" xmlns:p="http://schemas.openxmlformats.org/presentationml/2006/main">
+  <p:cSld>
+    <p:spTree>
+      <p:nvGrpSpPr>
+        <p:cNvPr id="1" name=""/>
+        <p:cNvGrpSpPr/>
+        <p:nvPr/>
+      </p:nvGrpSpPr>
+      <p:grpSpPr>
+        <a:xfrm>
+          <a:off x="0" y="0"/>
+          <a:ext cx="0" cy="0"/>
+          <a:chOff x="0" y="0"/>
+          <a:chExt cx="0" cy="0"/>
+        </a:xfrm>
+      </p:grpSpPr>
+      <p:sp>
+        <p:nvSpPr>
+          <p:cNvPr id="2" name="Title 1"/>
+          <p:cNvSpPr>
+            <a:spLocks noGrp="1"/>
+          </p:cNvSpPr>
+          <p:nvPr>
+            <p:ph type="title"/>
+          </p:nvPr>
+        </p:nvSpPr>
+        <p:spPr/>
+        <p:txBody>
+          <a:bodyPr/>
+          <a:lstStyle/>
+          <a:p>
+            <a:r>
+              <a:rPr lang="en-US" dirty="0" smtClean="0"/>
+              <a:t>Appendix</a:t>
+            </a:r>
+            <a:endParaRPr lang="en-US" dirty="0"/>
+          </a:p>
+        </p:txBody>
+      </p:sp>
+      <p:sp>
+        <p:nvSpPr>
+          <p:cNvPr id="3" name="Content Placeholder 2"/>
+          <p:cNvSpPr>
+            <a:spLocks noGrp="1"/>
+          </p:cNvSpPr>
+          <p:nvPr>
+            <p:ph idx="1"/>
+          </p:nvPr>
+        </p:nvSpPr>
+        <p:spPr/>
+        <p:txBody>
+          <a:bodyPr/>
+          <a:lstStyle/>
+          <a:p>
+            <a:r>
+              <a:rPr lang="en-US" dirty="0" smtClean="0"/>
+              <a:t>Given the limited time, we arbitrary assigned weights to the categories. If we had more time we would have done the following:</a:t>
+            </a:r>
+          </a:p>
+          <a:p>
+            <a:pPr marL="457200" indent="-457200">
+              <a:buFont typeface="+mj-lt"/>
+              <a:buAutoNum type="arabicPeriod"/>
+            </a:pPr>
+            <a:r>
+              <a:rPr lang="en-US" dirty="0" smtClean="0"/>
+              <a:t>Pull the list of rejected cities and site addresses</a:t>
+            </a:r>
+          </a:p>
+          <a:p>
+            <a:pPr marL="457200" indent="-457200">
+              <a:buFont typeface="+mj-lt"/>
+              <a:buAutoNum type="arabicPeriod"/>
+            </a:pPr>
+            <a:r>
+              <a:rPr lang="en-US" dirty="0" smtClean="0"/>
+              <a:t>Run the reject lists through the API used and create a data frame.</a:t>
+            </a:r>
+          </a:p>
+          <a:p>
+            <a:pPr marL="457200" indent="-457200">
+              <a:buFont typeface="+mj-lt"/>
+              <a:buAutoNum type="arabicPeriod"/>
+            </a:pPr>
+            <a:r>
+              <a:rPr lang="en-US" dirty="0" smtClean="0"/>
+              <a:t>Use the rejected data as the training data to determine the categories weights</a:t>
+            </a:r>
+            <a:endParaRPr lang="en-US" dirty="0"/>
+          </a:p>
+        </p:txBody>
+      </p:sp>
+    </p:spTree>
+    <p:extLst>
+      <p:ext uri="{BB962C8B-B14F-4D97-AF65-F5344CB8AC3E}">
+        <p14:creationId xmlns:p14="http://schemas.microsoft.com/office/powerpoint/2010/main" val="3493860751"/>
+      </p:ext>
+    </p:extLst>
+  </p:cSld>
+  <p:clrMapOvr>
+    <a:masterClrMapping/>
+  </p:clrMapOvr>
+</p:sld>
+</file>
+
+<file path=ppt/slides/slide26.xml><?xml version="1.0" encoding="utf-8"?>
 <p:sld xmlns:a="http://schemas.openxmlformats.org/drawingml/2006/main" xmlns:r="http://schemas.openxmlformats.org/officeDocument/2006/relationships" xmlns:p="http://schemas.openxmlformats.org/presentationml/2006/main" show="0">
   <p:cSld>
     <p:spTree>
@@ -9508,10 +9686,18 @@
   <p:clrMapOvr>
     <a:masterClrMapping/>
   </p:clrMapOvr>
+  <mc:AlternateContent xmlns:mc="http://schemas.openxmlformats.org/markup-compatibility/2006">
+    <mc:Choice xmlns:p14="http://schemas.microsoft.com/office/powerpoint/2010/main" Requires="p14">
+      <p:transition spd="slow" p14:dur="2000"/>
+    </mc:Choice>
+    <mc:Fallback>
+      <p:transition spd="slow"/>
+    </mc:Fallback>
+  </mc:AlternateContent>
 </p:sld>
 </file>
 
-<file path=ppt/slides/slide26.xml><?xml version="1.0" encoding="utf-8"?>
+<file path=ppt/slides/slide27.xml><?xml version="1.0" encoding="utf-8"?>
 <p:sld xmlns:a="http://schemas.openxmlformats.org/drawingml/2006/main" xmlns:r="http://schemas.openxmlformats.org/officeDocument/2006/relationships" xmlns:p="http://schemas.openxmlformats.org/presentationml/2006/main" show="0">
   <p:cSld>
     <p:spTree>
@@ -9699,6 +9885,14 @@
   <p:clrMapOvr>
     <a:masterClrMapping/>
   </p:clrMapOvr>
+  <mc:AlternateContent xmlns:mc="http://schemas.openxmlformats.org/markup-compatibility/2006">
+    <mc:Choice xmlns:p14="http://schemas.microsoft.com/office/powerpoint/2010/main" Requires="p14">
+      <p:transition spd="slow" p14:dur="2000"/>
+    </mc:Choice>
+    <mc:Fallback>
+      <p:transition spd="slow"/>
+    </mc:Fallback>
+  </mc:AlternateContent>
 </p:sld>
 </file>
 

</xml_diff>

<commit_message>
update slide on overall ranking
</commit_message>
<xml_diff>
--- a/Project1_Presentation.pptx
+++ b/Project1_Presentation.pptx
@@ -8525,42 +8525,6 @@
           </a:p>
         </p:txBody>
       </p:sp>
-      <p:pic>
-        <p:nvPicPr>
-          <p:cNvPr id="20" name="Picture 19">
-            <a:extLst>
-              <a:ext uri="{FF2B5EF4-FFF2-40B4-BE49-F238E27FC236}">
-                <a16:creationId xmlns:a16="http://schemas.microsoft.com/office/drawing/2014/main" id="{56FED822-01A1-C34D-B232-2F3BEEEAB583}"/>
-              </a:ext>
-            </a:extLst>
-          </p:cNvPr>
-          <p:cNvPicPr>
-            <a:picLocks noChangeAspect="1"/>
-          </p:cNvPicPr>
-          <p:nvPr/>
-        </p:nvPicPr>
-        <p:blipFill>
-          <a:blip r:embed="rId2">
-            <a:extLst>
-              <a:ext uri="{28A0092B-C50C-407E-A947-70E740481C1C}">
-                <a14:useLocalDpi xmlns:a14="http://schemas.microsoft.com/office/drawing/2010/main" val="0"/>
-              </a:ext>
-            </a:extLst>
-          </a:blip>
-          <a:stretch>
-            <a:fillRect/>
-          </a:stretch>
-        </p:blipFill>
-        <p:spPr>
-          <a:xfrm>
-            <a:off x="67946" y="1649528"/>
-            <a:ext cx="5715000" cy="3378200"/>
-          </a:xfrm>
-          <a:prstGeom prst="rect">
-            <a:avLst/>
-          </a:prstGeom>
-        </p:spPr>
-      </p:pic>
       <p:sp>
         <p:nvSpPr>
           <p:cNvPr id="3" name="TextBox 2">
@@ -9246,6 +9210,42 @@
           <p:nvPr/>
         </p:nvPicPr>
         <p:blipFill>
+          <a:blip r:embed="rId2">
+            <a:extLst>
+              <a:ext uri="{28A0092B-C50C-407E-A947-70E740481C1C}">
+                <a14:useLocalDpi xmlns:a14="http://schemas.microsoft.com/office/drawing/2010/main" val="0"/>
+              </a:ext>
+            </a:extLst>
+          </a:blip>
+          <a:stretch>
+            <a:fillRect/>
+          </a:stretch>
+        </p:blipFill>
+        <p:spPr>
+          <a:xfrm>
+            <a:off x="5942967" y="1642828"/>
+            <a:ext cx="5715000" cy="3378200"/>
+          </a:xfrm>
+          <a:prstGeom prst="rect">
+            <a:avLst/>
+          </a:prstGeom>
+        </p:spPr>
+      </p:pic>
+      <p:pic>
+        <p:nvPicPr>
+          <p:cNvPr id="8" name="Picture 7">
+            <a:extLst>
+              <a:ext uri="{FF2B5EF4-FFF2-40B4-BE49-F238E27FC236}">
+                <a16:creationId xmlns:a16="http://schemas.microsoft.com/office/drawing/2014/main" id="{A3D08F3B-DBCE-7246-8671-09AF4B9AA171}"/>
+              </a:ext>
+            </a:extLst>
+          </p:cNvPr>
+          <p:cNvPicPr>
+            <a:picLocks noChangeAspect="1"/>
+          </p:cNvPicPr>
+          <p:nvPr/>
+        </p:nvPicPr>
+        <p:blipFill>
           <a:blip r:embed="rId3">
             <a:extLst>
               <a:ext uri="{28A0092B-C50C-407E-A947-70E740481C1C}">
@@ -9259,7 +9259,7 @@
         </p:blipFill>
         <p:spPr>
           <a:xfrm>
-            <a:off x="5942967" y="1642828"/>
+            <a:off x="227967" y="1657849"/>
             <a:ext cx="5715000" cy="3378200"/>
           </a:xfrm>
           <a:prstGeom prst="rect">

</xml_diff>